<commit_message>
Slides and Whitepaper coming along...
</commit_message>
<xml_diff>
--- a/Docs/Selje_XSharpFromScratch_Slides.pptx
+++ b/Docs/Selje_XSharpFromScratch_Slides.pptx
@@ -5,36 +5,37 @@
     <p:sldMasterId id="2147483660" r:id="rId36"/>
   </p:sldMasterIdLst>
   <p:notesMasterIdLst>
-    <p:notesMasterId r:id="rId61"/>
+    <p:notesMasterId r:id="rId62"/>
   </p:notesMasterIdLst>
   <p:handoutMasterIdLst>
-    <p:handoutMasterId r:id="rId62"/>
+    <p:handoutMasterId r:id="rId63"/>
   </p:handoutMasterIdLst>
   <p:sldIdLst>
     <p:sldId id="383" r:id="rId37"/>
     <p:sldId id="384" r:id="rId38"/>
     <p:sldId id="385" r:id="rId39"/>
-    <p:sldId id="386" r:id="rId40"/>
-    <p:sldId id="387" r:id="rId41"/>
-    <p:sldId id="402" r:id="rId42"/>
-    <p:sldId id="388" r:id="rId43"/>
-    <p:sldId id="389" r:id="rId44"/>
-    <p:sldId id="403" r:id="rId45"/>
-    <p:sldId id="390" r:id="rId46"/>
-    <p:sldId id="391" r:id="rId47"/>
-    <p:sldId id="404" r:id="rId48"/>
-    <p:sldId id="392" r:id="rId49"/>
-    <p:sldId id="393" r:id="rId50"/>
+    <p:sldId id="408" r:id="rId40"/>
+    <p:sldId id="386" r:id="rId41"/>
+    <p:sldId id="387" r:id="rId42"/>
+    <p:sldId id="402" r:id="rId43"/>
+    <p:sldId id="388" r:id="rId44"/>
+    <p:sldId id="389" r:id="rId45"/>
+    <p:sldId id="403" r:id="rId46"/>
+    <p:sldId id="390" r:id="rId47"/>
+    <p:sldId id="391" r:id="rId48"/>
+    <p:sldId id="404" r:id="rId49"/>
+    <p:sldId id="392" r:id="rId50"/>
     <p:sldId id="405" r:id="rId51"/>
-    <p:sldId id="396" r:id="rId52"/>
-    <p:sldId id="397" r:id="rId53"/>
-    <p:sldId id="398" r:id="rId54"/>
-    <p:sldId id="377" r:id="rId55"/>
-    <p:sldId id="400" r:id="rId56"/>
-    <p:sldId id="401" r:id="rId57"/>
-    <p:sldId id="407" r:id="rId58"/>
-    <p:sldId id="355" r:id="rId59"/>
-    <p:sldId id="334" r:id="rId60"/>
+    <p:sldId id="393" r:id="rId52"/>
+    <p:sldId id="396" r:id="rId53"/>
+    <p:sldId id="397" r:id="rId54"/>
+    <p:sldId id="398" r:id="rId55"/>
+    <p:sldId id="377" r:id="rId56"/>
+    <p:sldId id="400" r:id="rId57"/>
+    <p:sldId id="401" r:id="rId58"/>
+    <p:sldId id="407" r:id="rId59"/>
+    <p:sldId id="355" r:id="rId60"/>
+    <p:sldId id="334" r:id="rId61"/>
   </p:sldIdLst>
   <p:sldSz cx="12188825" cy="6858000"/>
   <p:notesSz cx="9101138" cy="6858000"/>
@@ -141,6 +142,7 @@
             <p14:sldId id="383"/>
             <p14:sldId id="384"/>
             <p14:sldId id="385"/>
+            <p14:sldId id="408"/>
           </p14:sldIdLst>
         </p14:section>
         <p14:section name="Agenda Item #1" id="{B6CC72F0-8A07-4111-80B3-8A0A4B51CBCC}">
@@ -167,8 +169,8 @@
         <p14:section name="Agenda Item #4" id="{9D97F36B-1E0A-47A7-9A6C-D0E15C04EC2C}">
           <p14:sldIdLst>
             <p14:sldId id="392"/>
+            <p14:sldId id="405"/>
             <p14:sldId id="393"/>
-            <p14:sldId id="405"/>
           </p14:sldIdLst>
         </p14:section>
         <p14:section name="Agenda Item #5" id="{07EA3D7F-A661-4FC1-98A4-93F3E6E3A2F4}">
@@ -325,7 +327,7 @@
                   <a:schemeClr val="tx2"/>
                 </a:solidFill>
               </a:rPr>
-              <a:t>19/09/2020</a:t>
+              <a:t>29/09/2020</a:t>
             </a:fld>
             <a:endParaRPr lang="en-GB" dirty="0">
               <a:solidFill>
@@ -518,7 +520,7 @@
           <a:p>
             <a:fld id="{43F82CE1-C859-40EE-9EB2-765AABAEDB14}" type="datetime1">
               <a:rPr lang="en-GB" noProof="0" smtClean="0"/>
-              <a:t>19/09/2020</a:t>
+              <a:t>29/09/2020</a:t>
             </a:fld>
             <a:endParaRPr lang="en-GB" noProof="0" dirty="0"/>
           </a:p>
@@ -863,7 +865,7 @@
           <a:p>
             <a:fld id="{43F82CE1-C859-40EE-9EB2-765AABAEDB14}" type="datetime1">
               <a:rPr lang="en-GB" noProof="0" smtClean="0"/>
-              <a:t>19/09/2020</a:t>
+              <a:t>29/09/2020</a:t>
             </a:fld>
             <a:endParaRPr lang="en-GB" noProof="0" dirty="0"/>
           </a:p>
@@ -898,6 +900,233 @@
     <p:extLst>
       <p:ext uri="{BB962C8B-B14F-4D97-AF65-F5344CB8AC3E}">
         <p14:creationId xmlns:p14="http://schemas.microsoft.com/office/powerpoint/2010/main" val="2264772065"/>
+      </p:ext>
+    </p:extLst>
+  </p:cSld>
+  <p:clrMapOvr>
+    <a:masterClrMapping/>
+  </p:clrMapOvr>
+</p:notes>
+</file>
+
+<file path=ppt/notesSlides/notesSlide2.xml><?xml version="1.0" encoding="utf-8"?>
+<p:notes xmlns:a="http://schemas.openxmlformats.org/drawingml/2006/main" xmlns:r="http://schemas.openxmlformats.org/officeDocument/2006/relationships" xmlns:p="http://schemas.openxmlformats.org/presentationml/2006/main">
+  <p:cSld>
+    <p:spTree>
+      <p:nvGrpSpPr>
+        <p:cNvPr id="1" name=""/>
+        <p:cNvGrpSpPr/>
+        <p:nvPr/>
+      </p:nvGrpSpPr>
+      <p:grpSpPr>
+        <a:xfrm>
+          <a:off x="0" y="0"/>
+          <a:ext cx="0" cy="0"/>
+          <a:chOff x="0" y="0"/>
+          <a:chExt cx="0" cy="0"/>
+        </a:xfrm>
+      </p:grpSpPr>
+      <p:sp>
+        <p:nvSpPr>
+          <p:cNvPr id="2" name="Slide Image Placeholder 1"/>
+          <p:cNvSpPr>
+            <a:spLocks noGrp="1" noRot="1" noChangeAspect="1"/>
+          </p:cNvSpPr>
+          <p:nvPr>
+            <p:ph type="sldImg"/>
+          </p:nvPr>
+        </p:nvSpPr>
+        <p:spPr/>
+      </p:sp>
+      <p:sp>
+        <p:nvSpPr>
+          <p:cNvPr id="3" name="Notes Placeholder 2"/>
+          <p:cNvSpPr>
+            <a:spLocks noGrp="1"/>
+          </p:cNvSpPr>
+          <p:nvPr>
+            <p:ph type="body" idx="1"/>
+          </p:nvPr>
+        </p:nvSpPr>
+        <p:spPr/>
+        <p:txBody>
+          <a:bodyPr/>
+          <a:lstStyle/>
+          <a:p>
+            <a:r>
+              <a:rPr lang="en-US" dirty="0"/>
+              <a:t>Thank you https://www.clipartmax.com/</a:t>
+            </a:r>
+          </a:p>
+          <a:p>
+            <a:endParaRPr lang="en-US" dirty="0"/>
+          </a:p>
+        </p:txBody>
+      </p:sp>
+      <p:sp>
+        <p:nvSpPr>
+          <p:cNvPr id="4" name="Date Placeholder 3"/>
+          <p:cNvSpPr>
+            <a:spLocks noGrp="1"/>
+          </p:cNvSpPr>
+          <p:nvPr>
+            <p:ph type="dt" idx="1"/>
+          </p:nvPr>
+        </p:nvSpPr>
+        <p:spPr/>
+        <p:txBody>
+          <a:bodyPr/>
+          <a:lstStyle/>
+          <a:p>
+            <a:fld id="{43F82CE1-C859-40EE-9EB2-765AABAEDB14}" type="datetime1">
+              <a:rPr lang="en-GB" noProof="0" smtClean="0"/>
+              <a:t>29/09/2020</a:t>
+            </a:fld>
+            <a:endParaRPr lang="en-GB" noProof="0" dirty="0"/>
+          </a:p>
+        </p:txBody>
+      </p:sp>
+      <p:sp>
+        <p:nvSpPr>
+          <p:cNvPr id="5" name="Slide Number Placeholder 4"/>
+          <p:cNvSpPr>
+            <a:spLocks noGrp="1"/>
+          </p:cNvSpPr>
+          <p:nvPr>
+            <p:ph type="sldNum" sz="quarter" idx="5"/>
+          </p:nvPr>
+        </p:nvSpPr>
+        <p:spPr/>
+        <p:txBody>
+          <a:bodyPr/>
+          <a:lstStyle/>
+          <a:p>
+            <a:pPr rtl="0"/>
+            <a:fld id="{B8796F01-7154-41E0-B48B-A6921757531A}" type="slidenum">
+              <a:rPr lang="en-GB" noProof="0" smtClean="0"/>
+              <a:pPr rtl="0"/>
+              <a:t>3</a:t>
+            </a:fld>
+            <a:endParaRPr lang="en-GB" noProof="0" dirty="0"/>
+          </a:p>
+        </p:txBody>
+      </p:sp>
+    </p:spTree>
+    <p:extLst>
+      <p:ext uri="{BB962C8B-B14F-4D97-AF65-F5344CB8AC3E}">
+        <p14:creationId xmlns:p14="http://schemas.microsoft.com/office/powerpoint/2010/main" val="3588440806"/>
+      </p:ext>
+    </p:extLst>
+  </p:cSld>
+  <p:clrMapOvr>
+    <a:masterClrMapping/>
+  </p:clrMapOvr>
+</p:notes>
+</file>
+
+<file path=ppt/notesSlides/notesSlide3.xml><?xml version="1.0" encoding="utf-8"?>
+<p:notes xmlns:a="http://schemas.openxmlformats.org/drawingml/2006/main" xmlns:r="http://schemas.openxmlformats.org/officeDocument/2006/relationships" xmlns:p="http://schemas.openxmlformats.org/presentationml/2006/main">
+  <p:cSld>
+    <p:spTree>
+      <p:nvGrpSpPr>
+        <p:cNvPr id="1" name=""/>
+        <p:cNvGrpSpPr/>
+        <p:nvPr/>
+      </p:nvGrpSpPr>
+      <p:grpSpPr>
+        <a:xfrm>
+          <a:off x="0" y="0"/>
+          <a:ext cx="0" cy="0"/>
+          <a:chOff x="0" y="0"/>
+          <a:chExt cx="0" cy="0"/>
+        </a:xfrm>
+      </p:grpSpPr>
+      <p:sp>
+        <p:nvSpPr>
+          <p:cNvPr id="2" name="Slide Image Placeholder 1"/>
+          <p:cNvSpPr>
+            <a:spLocks noGrp="1" noRot="1" noChangeAspect="1"/>
+          </p:cNvSpPr>
+          <p:nvPr>
+            <p:ph type="sldImg"/>
+          </p:nvPr>
+        </p:nvSpPr>
+        <p:spPr/>
+      </p:sp>
+      <p:sp>
+        <p:nvSpPr>
+          <p:cNvPr id="3" name="Notes Placeholder 2"/>
+          <p:cNvSpPr>
+            <a:spLocks noGrp="1"/>
+          </p:cNvSpPr>
+          <p:nvPr>
+            <p:ph type="body" idx="1"/>
+          </p:nvPr>
+        </p:nvSpPr>
+        <p:spPr/>
+        <p:txBody>
+          <a:bodyPr/>
+          <a:lstStyle/>
+          <a:p>
+            <a:r>
+              <a:rPr lang="en-US" dirty="0"/>
+              <a:t>Not a lot of slides – mostly coding</a:t>
+            </a:r>
+          </a:p>
+        </p:txBody>
+      </p:sp>
+      <p:sp>
+        <p:nvSpPr>
+          <p:cNvPr id="4" name="Date Placeholder 3"/>
+          <p:cNvSpPr>
+            <a:spLocks noGrp="1"/>
+          </p:cNvSpPr>
+          <p:nvPr>
+            <p:ph type="dt" idx="1"/>
+          </p:nvPr>
+        </p:nvSpPr>
+        <p:spPr/>
+        <p:txBody>
+          <a:bodyPr/>
+          <a:lstStyle/>
+          <a:p>
+            <a:fld id="{43F82CE1-C859-40EE-9EB2-765AABAEDB14}" type="datetime1">
+              <a:rPr lang="en-GB" noProof="0" smtClean="0"/>
+              <a:t>29/09/2020</a:t>
+            </a:fld>
+            <a:endParaRPr lang="en-GB" noProof="0" dirty="0"/>
+          </a:p>
+        </p:txBody>
+      </p:sp>
+      <p:sp>
+        <p:nvSpPr>
+          <p:cNvPr id="5" name="Slide Number Placeholder 4"/>
+          <p:cNvSpPr>
+            <a:spLocks noGrp="1"/>
+          </p:cNvSpPr>
+          <p:nvPr>
+            <p:ph type="sldNum" sz="quarter" idx="5"/>
+          </p:nvPr>
+        </p:nvSpPr>
+        <p:spPr/>
+        <p:txBody>
+          <a:bodyPr/>
+          <a:lstStyle/>
+          <a:p>
+            <a:pPr rtl="0"/>
+            <a:fld id="{B8796F01-7154-41E0-B48B-A6921757531A}" type="slidenum">
+              <a:rPr lang="en-GB" noProof="0" smtClean="0"/>
+              <a:pPr rtl="0"/>
+              <a:t>4</a:t>
+            </a:fld>
+            <a:endParaRPr lang="en-GB" noProof="0" dirty="0"/>
+          </a:p>
+        </p:txBody>
+      </p:sp>
+    </p:spTree>
+    <p:extLst>
+      <p:ext uri="{BB962C8B-B14F-4D97-AF65-F5344CB8AC3E}">
+        <p14:creationId xmlns:p14="http://schemas.microsoft.com/office/powerpoint/2010/main" val="2833288949"/>
       </p:ext>
     </p:extLst>
   </p:cSld>
@@ -4911,7 +5140,7 @@
                   <a:schemeClr val="bg1"/>
                 </a:solidFill>
               </a:rPr>
-              <a:t>Agenda Item #2</a:t>
+              <a:t>Classes</a:t>
             </a:r>
           </a:p>
         </p:txBody>
@@ -4953,13 +5182,18 @@
           <a:p>
             <a:pPr algn="ctr"/>
             <a:r>
-              <a:rPr lang="en-US" sz="1600" dirty="0">
+              <a:rPr lang="en-US" sz="1600" dirty="0" err="1">
                 <a:solidFill>
                   <a:srgbClr val="007BFF"/>
                 </a:solidFill>
               </a:rPr>
-              <a:t>Agenda Item #1</a:t>
-            </a:r>
+              <a:t>FoxToDos</a:t>
+            </a:r>
+            <a:endParaRPr lang="en-US" sz="1600" dirty="0">
+              <a:solidFill>
+                <a:srgbClr val="007BFF"/>
+              </a:solidFill>
+            </a:endParaRPr>
           </a:p>
         </p:txBody>
       </p:sp>
@@ -4999,7 +5233,7 @@
                   <a:schemeClr val="bg1"/>
                 </a:solidFill>
               </a:rPr>
-              <a:t>Agenda Item #3</a:t>
+              <a:t>Forms</a:t>
             </a:r>
           </a:p>
         </p:txBody>
@@ -5040,7 +5274,7 @@
                   <a:schemeClr val="bg1"/>
                 </a:solidFill>
               </a:rPr>
-              <a:t>Agenda Item #4</a:t>
+              <a:t>More</a:t>
             </a:r>
           </a:p>
         </p:txBody>
@@ -5076,38 +5310,37 @@
           <a:p>
             <a:pPr lvl="0"/>
             <a:r>
-              <a:rPr lang="en-US"/>
+              <a:rPr lang="en-US" dirty="0"/>
               <a:t>Click to edit Master text styles</a:t>
             </a:r>
           </a:p>
           <a:p>
             <a:pPr lvl="1"/>
             <a:r>
-              <a:rPr lang="en-US"/>
+              <a:rPr lang="en-US" dirty="0"/>
               <a:t>Second level</a:t>
             </a:r>
           </a:p>
           <a:p>
             <a:pPr lvl="2"/>
             <a:r>
-              <a:rPr lang="en-US"/>
+              <a:rPr lang="en-US" dirty="0"/>
               <a:t>Third level</a:t>
             </a:r>
           </a:p>
           <a:p>
             <a:pPr lvl="3"/>
             <a:r>
-              <a:rPr lang="en-US"/>
+              <a:rPr lang="en-US" dirty="0"/>
               <a:t>Fourth level</a:t>
             </a:r>
           </a:p>
           <a:p>
             <a:pPr lvl="4"/>
             <a:r>
-              <a:rPr lang="en-US"/>
+              <a:rPr lang="en-US" dirty="0"/>
               <a:t>Fifth level</a:t>
             </a:r>
-            <a:endParaRPr lang="en-US" dirty="0"/>
           </a:p>
         </p:txBody>
       </p:sp>
@@ -5267,7 +5500,7 @@
                   <a:srgbClr val="007BFF"/>
                 </a:solidFill>
               </a:rPr>
-              <a:t>Agenda Item #2</a:t>
+              <a:t>Classes</a:t>
             </a:r>
           </a:p>
         </p:txBody>
@@ -5307,23 +5540,69 @@
           <a:p>
             <a:pPr algn="ctr"/>
             <a:r>
+              <a:rPr lang="en-US" sz="1600" dirty="0" err="1">
+                <a:solidFill>
+                  <a:schemeClr val="bg1"/>
+                </a:solidFill>
+              </a:rPr>
+              <a:t>FoxToDos</a:t>
+            </a:r>
+            <a:endParaRPr lang="en-US" sz="1600" dirty="0">
+              <a:solidFill>
+                <a:schemeClr val="bg1"/>
+              </a:solidFill>
+            </a:endParaRPr>
+          </a:p>
+        </p:txBody>
+      </p:sp>
+      <p:sp>
+        <p:nvSpPr>
+          <p:cNvPr id="11" name="TextBox 10">
+            <a:hlinkClick r:id="rId7" action="ppaction://hlinksldjump"/>
+            <a:extLst>
+              <a:ext uri="{FF2B5EF4-FFF2-40B4-BE49-F238E27FC236}">
+                <a16:creationId xmlns:a16="http://schemas.microsoft.com/office/drawing/2014/main" id="{9DC25330-F247-4CC7-A77D-B0B1E38A2E0A}"/>
+              </a:ext>
+            </a:extLst>
+          </p:cNvPr>
+          <p:cNvSpPr txBox="1"/>
+          <p:nvPr userDrawn="1"/>
+        </p:nvSpPr>
+        <p:spPr>
+          <a:xfrm>
+            <a:off x="1588" y="3505577"/>
+            <a:ext cx="1554480" cy="769441"/>
+          </a:xfrm>
+          <a:prstGeom prst="rect">
+            <a:avLst/>
+          </a:prstGeom>
+          <a:noFill/>
+        </p:spPr>
+        <p:txBody>
+          <a:bodyPr wrap="square" lIns="137160" tIns="137160" rIns="137160" bIns="137160" rtlCol="0" anchor="ctr">
+            <a:noAutofit/>
+          </a:bodyPr>
+          <a:lstStyle/>
+          <a:p>
+            <a:pPr algn="ctr"/>
+            <a:r>
               <a:rPr lang="en-US" sz="1600" dirty="0">
                 <a:solidFill>
                   <a:schemeClr val="bg1"/>
                 </a:solidFill>
               </a:rPr>
-              <a:t>Agenda Item #1</a:t>
-            </a:r>
-          </a:p>
-        </p:txBody>
-      </p:sp>
-      <p:sp>
-        <p:nvSpPr>
-          <p:cNvPr id="11" name="TextBox 10">
-            <a:hlinkClick r:id="rId7" action="ppaction://hlinksldjump"/>
-            <a:extLst>
-              <a:ext uri="{FF2B5EF4-FFF2-40B4-BE49-F238E27FC236}">
-                <a16:creationId xmlns:a16="http://schemas.microsoft.com/office/drawing/2014/main" id="{9DC25330-F247-4CC7-A77D-B0B1E38A2E0A}"/>
+              <a:t>Forms</a:t>
+            </a:r>
+          </a:p>
+        </p:txBody>
+      </p:sp>
+      <p:sp>
+        <p:nvSpPr>
+          <p:cNvPr id="12" name="TextBox 11">
+            <a:hlinkClick r:id="rId8" action="ppaction://hlinksldjump"/>
+            <a:extLst>
+              <a:ext uri="{FF2B5EF4-FFF2-40B4-BE49-F238E27FC236}">
+                <a16:creationId xmlns:a16="http://schemas.microsoft.com/office/drawing/2014/main" id="{1DDC73F0-30E8-4EFA-9C62-037981905B1B}"/>
               </a:ext>
             </a:extLst>
           </p:cNvPr>
@@ -5332,7 +5611,7 @@
         </p:nvSpPr>
         <p:spPr>
           <a:xfrm>
-            <a:off x="1588" y="3505577"/>
+            <a:off x="0" y="4335959"/>
             <a:ext cx="1554480" cy="769441"/>
           </a:xfrm>
           <a:prstGeom prst="rect">
@@ -5353,48 +5632,7 @@
                   <a:schemeClr val="bg1"/>
                 </a:solidFill>
               </a:rPr>
-              <a:t>Agenda Item #3</a:t>
-            </a:r>
-          </a:p>
-        </p:txBody>
-      </p:sp>
-      <p:sp>
-        <p:nvSpPr>
-          <p:cNvPr id="12" name="TextBox 11">
-            <a:hlinkClick r:id="rId8" action="ppaction://hlinksldjump"/>
-            <a:extLst>
-              <a:ext uri="{FF2B5EF4-FFF2-40B4-BE49-F238E27FC236}">
-                <a16:creationId xmlns:a16="http://schemas.microsoft.com/office/drawing/2014/main" id="{1DDC73F0-30E8-4EFA-9C62-037981905B1B}"/>
-              </a:ext>
-            </a:extLst>
-          </p:cNvPr>
-          <p:cNvSpPr txBox="1"/>
-          <p:nvPr userDrawn="1"/>
-        </p:nvSpPr>
-        <p:spPr>
-          <a:xfrm>
-            <a:off x="0" y="4335959"/>
-            <a:ext cx="1554480" cy="769441"/>
-          </a:xfrm>
-          <a:prstGeom prst="rect">
-            <a:avLst/>
-          </a:prstGeom>
-          <a:noFill/>
-        </p:spPr>
-        <p:txBody>
-          <a:bodyPr wrap="square" lIns="137160" tIns="137160" rIns="137160" bIns="137160" rtlCol="0" anchor="ctr">
-            <a:noAutofit/>
-          </a:bodyPr>
-          <a:lstStyle/>
-          <a:p>
-            <a:pPr algn="ctr"/>
-            <a:r>
-              <a:rPr lang="en-US" sz="1600" dirty="0">
-                <a:solidFill>
-                  <a:schemeClr val="bg1"/>
-                </a:solidFill>
-              </a:rPr>
-              <a:t>Agenda Item #4</a:t>
+              <a:t>More</a:t>
             </a:r>
           </a:p>
         </p:txBody>
@@ -5618,7 +5856,7 @@
                   <a:schemeClr val="bg1"/>
                 </a:solidFill>
               </a:rPr>
-              <a:t>Agenda Item #2</a:t>
+              <a:t>Classes</a:t>
             </a:r>
           </a:p>
         </p:txBody>
@@ -5663,7 +5901,7 @@
                   <a:schemeClr val="bg1"/>
                 </a:solidFill>
               </a:rPr>
-              <a:t>Agenda Item #1</a:t>
+              <a:t>Intro</a:t>
             </a:r>
           </a:p>
         </p:txBody>
@@ -5706,7 +5944,7 @@
                   <a:srgbClr val="007BFF"/>
                 </a:solidFill>
               </a:rPr>
-              <a:t>Agenda Item #3</a:t>
+              <a:t>Forms</a:t>
             </a:r>
           </a:p>
         </p:txBody>
@@ -5747,7 +5985,7 @@
                   <a:schemeClr val="bg1"/>
                 </a:solidFill>
               </a:rPr>
-              <a:t>Agenda Item #4</a:t>
+              <a:t>More</a:t>
             </a:r>
           </a:p>
         </p:txBody>
@@ -5971,7 +6209,7 @@
                   <a:schemeClr val="bg1"/>
                 </a:solidFill>
               </a:rPr>
-              <a:t>Agenda Item #2</a:t>
+              <a:t>Classes</a:t>
             </a:r>
           </a:p>
         </p:txBody>
@@ -6016,7 +6254,7 @@
                   <a:schemeClr val="bg1"/>
                 </a:solidFill>
               </a:rPr>
-              <a:t>Agenda Item #1</a:t>
+              <a:t>Intro</a:t>
             </a:r>
           </a:p>
         </p:txBody>
@@ -6057,7 +6295,7 @@
                   <a:schemeClr val="bg1"/>
                 </a:solidFill>
               </a:rPr>
-              <a:t>Agenda Item #3</a:t>
+              <a:t>Forms</a:t>
             </a:r>
           </a:p>
         </p:txBody>
@@ -6100,7 +6338,7 @@
                   <a:srgbClr val="007BFF"/>
                 </a:solidFill>
               </a:rPr>
-              <a:t>Agenda Item #4</a:t>
+              <a:t>More</a:t>
             </a:r>
           </a:p>
         </p:txBody>
@@ -7442,7 +7680,7 @@
           <p:cNvPr id="2" name="Title 1">
             <a:extLst>
               <a:ext uri="{FF2B5EF4-FFF2-40B4-BE49-F238E27FC236}">
-                <a16:creationId xmlns:a16="http://schemas.microsoft.com/office/drawing/2014/main" id="{6ED8B8A0-29E9-4A44-A556-8027E8160AE2}"/>
+                <a16:creationId xmlns:a16="http://schemas.microsoft.com/office/drawing/2014/main" id="{AF5B0393-7C15-4BD5-B1D2-F6E30724F10F}"/>
               </a:ext>
             </a:extLst>
           </p:cNvPr>
@@ -7450,25 +7688,72 @@
             <a:spLocks noGrp="1"/>
           </p:cNvSpPr>
           <p:nvPr>
-            <p:ph type="ctrTitle"/>
+            <p:ph type="title"/>
           </p:nvPr>
         </p:nvSpPr>
         <p:spPr/>
         <p:txBody>
+          <a:bodyPr>
+            <a:normAutofit fontScale="90000"/>
+          </a:bodyPr>
+          <a:lstStyle/>
+          <a:p>
+            <a:r>
+              <a:rPr lang="en-US" dirty="0"/>
+              <a:t>More Stuff</a:t>
+            </a:r>
+          </a:p>
+        </p:txBody>
+      </p:sp>
+      <p:sp>
+        <p:nvSpPr>
+          <p:cNvPr id="3" name="Content Placeholder 2">
+            <a:extLst>
+              <a:ext uri="{FF2B5EF4-FFF2-40B4-BE49-F238E27FC236}">
+                <a16:creationId xmlns:a16="http://schemas.microsoft.com/office/drawing/2014/main" id="{23C1287B-C391-4226-BFE8-BB62E96A7839}"/>
+              </a:ext>
+            </a:extLst>
+          </p:cNvPr>
+          <p:cNvSpPr>
+            <a:spLocks noGrp="1"/>
+          </p:cNvSpPr>
+          <p:nvPr>
+            <p:ph sz="quarter" idx="10"/>
+          </p:nvPr>
+        </p:nvSpPr>
+        <p:spPr/>
+        <p:txBody>
           <a:bodyPr/>
           <a:lstStyle/>
           <a:p>
             <a:r>
+              <a:rPr lang="en-US" dirty="0" err="1"/>
+              <a:t>Abc</a:t>
+            </a:r>
+            <a:endParaRPr lang="en-US" dirty="0"/>
+          </a:p>
+          <a:p>
+            <a:r>
               <a:rPr lang="en-US" dirty="0"/>
-              <a:t>Section Heading for Agenda Item #3</a:t>
-            </a:r>
+              <a:t>Def</a:t>
+            </a:r>
+          </a:p>
+          <a:p>
+            <a:r>
+              <a:rPr lang="en-US" dirty="0" err="1"/>
+              <a:t>Xyz</a:t>
+            </a:r>
+            <a:endParaRPr lang="en-US" dirty="0"/>
+          </a:p>
+          <a:p>
+            <a:endParaRPr lang="en-US" dirty="0"/>
           </a:p>
         </p:txBody>
       </p:sp>
     </p:spTree>
     <p:extLst>
       <p:ext uri="{BB962C8B-B14F-4D97-AF65-F5344CB8AC3E}">
-        <p14:creationId xmlns:p14="http://schemas.microsoft.com/office/powerpoint/2010/main" val="2071981074"/>
+        <p14:creationId xmlns:p14="http://schemas.microsoft.com/office/powerpoint/2010/main" val="3292209150"/>
       </p:ext>
     </p:extLst>
   </p:cSld>
@@ -7509,10 +7794,10 @@
       </p:grpSpPr>
       <p:sp>
         <p:nvSpPr>
-          <p:cNvPr id="3" name="Title 2">
-            <a:extLst>
-              <a:ext uri="{FF2B5EF4-FFF2-40B4-BE49-F238E27FC236}">
-                <a16:creationId xmlns:a16="http://schemas.microsoft.com/office/drawing/2014/main" id="{EDBECE06-B118-4DF6-9335-BBCA11F5EA70}"/>
+          <p:cNvPr id="2" name="Title 1">
+            <a:extLst>
+              <a:ext uri="{FF2B5EF4-FFF2-40B4-BE49-F238E27FC236}">
+                <a16:creationId xmlns:a16="http://schemas.microsoft.com/office/drawing/2014/main" id="{6ED8B8A0-29E9-4A44-A556-8027E8160AE2}"/>
               </a:ext>
             </a:extLst>
           </p:cNvPr>
@@ -7520,59 +7805,17 @@
             <a:spLocks noGrp="1"/>
           </p:cNvSpPr>
           <p:nvPr>
-            <p:ph type="title"/>
+            <p:ph type="ctrTitle"/>
           </p:nvPr>
         </p:nvSpPr>
         <p:spPr/>
         <p:txBody>
-          <a:bodyPr>
-            <a:normAutofit fontScale="90000"/>
-          </a:bodyPr>
+          <a:bodyPr/>
           <a:lstStyle/>
           <a:p>
             <a:r>
               <a:rPr lang="en-US" dirty="0"/>
-              <a:t>Agenda #3 Title</a:t>
-            </a:r>
-          </a:p>
-        </p:txBody>
-      </p:sp>
-      <p:sp>
-        <p:nvSpPr>
-          <p:cNvPr id="5" name="Content Placeholder 4">
-            <a:extLst>
-              <a:ext uri="{FF2B5EF4-FFF2-40B4-BE49-F238E27FC236}">
-                <a16:creationId xmlns:a16="http://schemas.microsoft.com/office/drawing/2014/main" id="{0EC242EA-8C1C-497A-BC18-E9F052AB8ED6}"/>
-              </a:ext>
-            </a:extLst>
-          </p:cNvPr>
-          <p:cNvSpPr>
-            <a:spLocks noGrp="1"/>
-          </p:cNvSpPr>
-          <p:nvPr>
-            <p:ph sz="quarter" idx="10"/>
-          </p:nvPr>
-        </p:nvSpPr>
-        <p:spPr/>
-        <p:txBody>
-          <a:bodyPr/>
-          <a:lstStyle/>
-          <a:p>
-            <a:r>
-              <a:rPr lang="en-US" dirty="0"/>
-              <a:t>Yada</a:t>
-            </a:r>
-          </a:p>
-          <a:p>
-            <a:r>
-              <a:rPr lang="en-US" dirty="0"/>
-              <a:t>Yada</a:t>
-            </a:r>
-          </a:p>
-          <a:p>
-            <a:r>
-              <a:rPr lang="en-US" dirty="0"/>
-              <a:t>Yada</a:t>
+              <a:t>Forms</a:t>
             </a:r>
           </a:p>
         </p:txBody>
@@ -7580,7 +7823,7 @@
     </p:spTree>
     <p:extLst>
       <p:ext uri="{BB962C8B-B14F-4D97-AF65-F5344CB8AC3E}">
-        <p14:creationId xmlns:p14="http://schemas.microsoft.com/office/powerpoint/2010/main" val="2867149817"/>
+        <p14:creationId xmlns:p14="http://schemas.microsoft.com/office/powerpoint/2010/main" val="2071981074"/>
       </p:ext>
     </p:extLst>
   </p:cSld>
@@ -7621,10 +7864,10 @@
       </p:grpSpPr>
       <p:sp>
         <p:nvSpPr>
-          <p:cNvPr id="2" name="Title 1">
-            <a:extLst>
-              <a:ext uri="{FF2B5EF4-FFF2-40B4-BE49-F238E27FC236}">
-                <a16:creationId xmlns:a16="http://schemas.microsoft.com/office/drawing/2014/main" id="{3B7A0A71-F76E-4139-88E2-72538CD82D8F}"/>
+          <p:cNvPr id="3" name="Title 2">
+            <a:extLst>
+              <a:ext uri="{FF2B5EF4-FFF2-40B4-BE49-F238E27FC236}">
+                <a16:creationId xmlns:a16="http://schemas.microsoft.com/office/drawing/2014/main" id="{EDBECE06-B118-4DF6-9335-BBCA11F5EA70}"/>
               </a:ext>
             </a:extLst>
           </p:cNvPr>
@@ -7644,17 +7887,17 @@
           <a:p>
             <a:r>
               <a:rPr lang="en-US" dirty="0"/>
-              <a:t>More Stuff</a:t>
-            </a:r>
-          </a:p>
-        </p:txBody>
-      </p:sp>
-      <p:sp>
-        <p:nvSpPr>
-          <p:cNvPr id="3" name="Content Placeholder 2">
-            <a:extLst>
-              <a:ext uri="{FF2B5EF4-FFF2-40B4-BE49-F238E27FC236}">
-                <a16:creationId xmlns:a16="http://schemas.microsoft.com/office/drawing/2014/main" id="{E8179D73-20B9-4B88-A9E2-F469622EBF51}"/>
+              <a:t>Agenda #3 Title</a:t>
+            </a:r>
+          </a:p>
+        </p:txBody>
+      </p:sp>
+      <p:sp>
+        <p:nvSpPr>
+          <p:cNvPr id="5" name="Content Placeholder 4">
+            <a:extLst>
+              <a:ext uri="{FF2B5EF4-FFF2-40B4-BE49-F238E27FC236}">
+                <a16:creationId xmlns:a16="http://schemas.microsoft.com/office/drawing/2014/main" id="{0EC242EA-8C1C-497A-BC18-E9F052AB8ED6}"/>
               </a:ext>
             </a:extLst>
           </p:cNvPr>
@@ -7671,33 +7914,28 @@
           <a:lstStyle/>
           <a:p>
             <a:r>
-              <a:rPr lang="en-US" dirty="0" err="1"/>
-              <a:t>Abc</a:t>
-            </a:r>
-            <a:endParaRPr lang="en-US" dirty="0"/>
-          </a:p>
-          <a:p>
-            <a:r>
               <a:rPr lang="en-US" dirty="0"/>
-              <a:t>Def</a:t>
-            </a:r>
-          </a:p>
-          <a:p>
-            <a:r>
-              <a:rPr lang="en-US" dirty="0" err="1"/>
-              <a:t>Xyz</a:t>
-            </a:r>
-            <a:endParaRPr lang="en-US" dirty="0"/>
-          </a:p>
-          <a:p>
-            <a:endParaRPr lang="en-US" dirty="0"/>
+              <a:t>Yada</a:t>
+            </a:r>
+          </a:p>
+          <a:p>
+            <a:r>
+              <a:rPr lang="en-US" dirty="0"/>
+              <a:t>Yada</a:t>
+            </a:r>
+          </a:p>
+          <a:p>
+            <a:r>
+              <a:rPr lang="en-US" dirty="0"/>
+              <a:t>Yada</a:t>
+            </a:r>
           </a:p>
         </p:txBody>
       </p:sp>
     </p:spTree>
     <p:extLst>
       <p:ext uri="{BB962C8B-B14F-4D97-AF65-F5344CB8AC3E}">
-        <p14:creationId xmlns:p14="http://schemas.microsoft.com/office/powerpoint/2010/main" val="731148464"/>
+        <p14:creationId xmlns:p14="http://schemas.microsoft.com/office/powerpoint/2010/main" val="2867149817"/>
       </p:ext>
     </p:extLst>
   </p:cSld>
@@ -7741,7 +7979,7 @@
           <p:cNvPr id="2" name="Title 1">
             <a:extLst>
               <a:ext uri="{FF2B5EF4-FFF2-40B4-BE49-F238E27FC236}">
-                <a16:creationId xmlns:a16="http://schemas.microsoft.com/office/drawing/2014/main" id="{A1CDBAE2-579D-4DF9-9A47-6440ECE5E54B}"/>
+                <a16:creationId xmlns:a16="http://schemas.microsoft.com/office/drawing/2014/main" id="{3B7A0A71-F76E-4139-88E2-72538CD82D8F}"/>
               </a:ext>
             </a:extLst>
           </p:cNvPr>
@@ -7749,25 +7987,72 @@
             <a:spLocks noGrp="1"/>
           </p:cNvSpPr>
           <p:nvPr>
-            <p:ph type="ctrTitle"/>
+            <p:ph type="title"/>
           </p:nvPr>
         </p:nvSpPr>
         <p:spPr/>
         <p:txBody>
+          <a:bodyPr>
+            <a:normAutofit fontScale="90000"/>
+          </a:bodyPr>
+          <a:lstStyle/>
+          <a:p>
+            <a:r>
+              <a:rPr lang="en-US" dirty="0"/>
+              <a:t>More Stuff</a:t>
+            </a:r>
+          </a:p>
+        </p:txBody>
+      </p:sp>
+      <p:sp>
+        <p:nvSpPr>
+          <p:cNvPr id="3" name="Content Placeholder 2">
+            <a:extLst>
+              <a:ext uri="{FF2B5EF4-FFF2-40B4-BE49-F238E27FC236}">
+                <a16:creationId xmlns:a16="http://schemas.microsoft.com/office/drawing/2014/main" id="{E8179D73-20B9-4B88-A9E2-F469622EBF51}"/>
+              </a:ext>
+            </a:extLst>
+          </p:cNvPr>
+          <p:cNvSpPr>
+            <a:spLocks noGrp="1"/>
+          </p:cNvSpPr>
+          <p:nvPr>
+            <p:ph sz="quarter" idx="10"/>
+          </p:nvPr>
+        </p:nvSpPr>
+        <p:spPr/>
+        <p:txBody>
           <a:bodyPr/>
           <a:lstStyle/>
           <a:p>
             <a:r>
+              <a:rPr lang="en-US" dirty="0" err="1"/>
+              <a:t>Abc</a:t>
+            </a:r>
+            <a:endParaRPr lang="en-US" dirty="0"/>
+          </a:p>
+          <a:p>
+            <a:r>
               <a:rPr lang="en-US" dirty="0"/>
-              <a:t>Section Heading for Agenda Item #4</a:t>
-            </a:r>
+              <a:t>Def</a:t>
+            </a:r>
+          </a:p>
+          <a:p>
+            <a:r>
+              <a:rPr lang="en-US" dirty="0" err="1"/>
+              <a:t>Xyz</a:t>
+            </a:r>
+            <a:endParaRPr lang="en-US" dirty="0"/>
+          </a:p>
+          <a:p>
+            <a:endParaRPr lang="en-US" dirty="0"/>
           </a:p>
         </p:txBody>
       </p:sp>
     </p:spTree>
     <p:extLst>
       <p:ext uri="{BB962C8B-B14F-4D97-AF65-F5344CB8AC3E}">
-        <p14:creationId xmlns:p14="http://schemas.microsoft.com/office/powerpoint/2010/main" val="1750679489"/>
+        <p14:creationId xmlns:p14="http://schemas.microsoft.com/office/powerpoint/2010/main" val="731148464"/>
       </p:ext>
     </p:extLst>
   </p:cSld>
@@ -7808,10 +8093,10 @@
       </p:grpSpPr>
       <p:sp>
         <p:nvSpPr>
-          <p:cNvPr id="3" name="Title 2">
-            <a:extLst>
-              <a:ext uri="{FF2B5EF4-FFF2-40B4-BE49-F238E27FC236}">
-                <a16:creationId xmlns:a16="http://schemas.microsoft.com/office/drawing/2014/main" id="{A69AEAF4-5D8A-466B-8B1C-74A1E77A5C2B}"/>
+          <p:cNvPr id="2" name="Title 1">
+            <a:extLst>
+              <a:ext uri="{FF2B5EF4-FFF2-40B4-BE49-F238E27FC236}">
+                <a16:creationId xmlns:a16="http://schemas.microsoft.com/office/drawing/2014/main" id="{A1CDBAE2-579D-4DF9-9A47-6440ECE5E54B}"/>
               </a:ext>
             </a:extLst>
           </p:cNvPr>
@@ -7819,53 +8104,17 @@
             <a:spLocks noGrp="1"/>
           </p:cNvSpPr>
           <p:nvPr>
-            <p:ph type="title"/>
+            <p:ph type="ctrTitle"/>
           </p:nvPr>
         </p:nvSpPr>
         <p:spPr/>
         <p:txBody>
-          <a:bodyPr>
-            <a:normAutofit fontScale="90000"/>
-          </a:bodyPr>
+          <a:bodyPr/>
           <a:lstStyle/>
           <a:p>
             <a:r>
               <a:rPr lang="en-US" dirty="0"/>
-              <a:t>Agenda #4 Title</a:t>
-            </a:r>
-          </a:p>
-        </p:txBody>
-      </p:sp>
-      <p:sp>
-        <p:nvSpPr>
-          <p:cNvPr id="5" name="Content Placeholder 4">
-            <a:extLst>
-              <a:ext uri="{FF2B5EF4-FFF2-40B4-BE49-F238E27FC236}">
-                <a16:creationId xmlns:a16="http://schemas.microsoft.com/office/drawing/2014/main" id="{692F47A7-A5E2-427A-A430-050B7EC1945F}"/>
-              </a:ext>
-            </a:extLst>
-          </p:cNvPr>
-          <p:cNvSpPr>
-            <a:spLocks noGrp="1"/>
-          </p:cNvSpPr>
-          <p:nvPr>
-            <p:ph sz="quarter" idx="10"/>
-          </p:nvPr>
-        </p:nvSpPr>
-        <p:spPr/>
-        <p:txBody>
-          <a:bodyPr/>
-          <a:lstStyle/>
-          <a:p>
-            <a:r>
-              <a:rPr lang="en-US" dirty="0"/>
-              <a:t>Fox</a:t>
-            </a:r>
-          </a:p>
-          <a:p>
-            <a:r>
-              <a:rPr lang="en-US" dirty="0"/>
-              <a:t>Rocks</a:t>
+              <a:t>More</a:t>
             </a:r>
           </a:p>
         </p:txBody>
@@ -7873,7 +8122,7 @@
     </p:spTree>
     <p:extLst>
       <p:ext uri="{BB962C8B-B14F-4D97-AF65-F5344CB8AC3E}">
-        <p14:creationId xmlns:p14="http://schemas.microsoft.com/office/powerpoint/2010/main" val="761535539"/>
+        <p14:creationId xmlns:p14="http://schemas.microsoft.com/office/powerpoint/2010/main" val="1750679489"/>
       </p:ext>
     </p:extLst>
   </p:cSld>
@@ -7964,23 +8213,39 @@
           <a:lstStyle/>
           <a:p>
             <a:r>
-              <a:rPr lang="en-US" dirty="0" err="1"/>
-              <a:t>Abc</a:t>
-            </a:r>
-            <a:endParaRPr lang="en-US" dirty="0"/>
-          </a:p>
-          <a:p>
-            <a:r>
               <a:rPr lang="en-US" dirty="0"/>
-              <a:t>Def</a:t>
-            </a:r>
-          </a:p>
-          <a:p>
-            <a:r>
-              <a:rPr lang="en-US" dirty="0" err="1"/>
-              <a:t>Xyz</a:t>
-            </a:r>
-            <a:endParaRPr lang="en-US" dirty="0"/>
+              <a:t>Reports</a:t>
+            </a:r>
+          </a:p>
+          <a:p>
+            <a:r>
+              <a:rPr lang="en-US" dirty="0"/>
+              <a:t>Source Control</a:t>
+            </a:r>
+          </a:p>
+          <a:p>
+            <a:r>
+              <a:rPr lang="en-US" dirty="0"/>
+              <a:t>Databases</a:t>
+            </a:r>
+          </a:p>
+          <a:p>
+            <a:r>
+              <a:rPr lang="en-US" dirty="0"/>
+              <a:t>Frameworks</a:t>
+            </a:r>
+          </a:p>
+          <a:p>
+            <a:r>
+              <a:rPr lang="en-US" dirty="0"/>
+              <a:t>External Libraries</a:t>
+            </a:r>
+          </a:p>
+          <a:p>
+            <a:r>
+              <a:rPr lang="en-US" dirty="0"/>
+              <a:t>Help</a:t>
+            </a:r>
           </a:p>
           <a:p>
             <a:endParaRPr lang="en-US" dirty="0"/>
@@ -8031,10 +8296,10 @@
       </p:grpSpPr>
       <p:sp>
         <p:nvSpPr>
-          <p:cNvPr id="2" name="Title 1">
-            <a:extLst>
-              <a:ext uri="{FF2B5EF4-FFF2-40B4-BE49-F238E27FC236}">
-                <a16:creationId xmlns:a16="http://schemas.microsoft.com/office/drawing/2014/main" id="{0406F2F8-AB85-4F9C-A292-04A22C58517E}"/>
+          <p:cNvPr id="3" name="Title 2">
+            <a:extLst>
+              <a:ext uri="{FF2B5EF4-FFF2-40B4-BE49-F238E27FC236}">
+                <a16:creationId xmlns:a16="http://schemas.microsoft.com/office/drawing/2014/main" id="{A69AEAF4-5D8A-466B-8B1C-74A1E77A5C2B}"/>
               </a:ext>
             </a:extLst>
           </p:cNvPr>
@@ -8042,17 +8307,53 @@
             <a:spLocks noGrp="1"/>
           </p:cNvSpPr>
           <p:nvPr>
-            <p:ph type="ctrTitle"/>
+            <p:ph type="title"/>
           </p:nvPr>
         </p:nvSpPr>
         <p:spPr/>
         <p:txBody>
+          <a:bodyPr>
+            <a:normAutofit fontScale="90000"/>
+          </a:bodyPr>
+          <a:lstStyle/>
+          <a:p>
+            <a:r>
+              <a:rPr lang="en-US" dirty="0"/>
+              <a:t>Agenda #4 Title</a:t>
+            </a:r>
+          </a:p>
+        </p:txBody>
+      </p:sp>
+      <p:sp>
+        <p:nvSpPr>
+          <p:cNvPr id="5" name="Content Placeholder 4">
+            <a:extLst>
+              <a:ext uri="{FF2B5EF4-FFF2-40B4-BE49-F238E27FC236}">
+                <a16:creationId xmlns:a16="http://schemas.microsoft.com/office/drawing/2014/main" id="{692F47A7-A5E2-427A-A430-050B7EC1945F}"/>
+              </a:ext>
+            </a:extLst>
+          </p:cNvPr>
+          <p:cNvSpPr>
+            <a:spLocks noGrp="1"/>
+          </p:cNvSpPr>
+          <p:nvPr>
+            <p:ph sz="quarter" idx="10"/>
+          </p:nvPr>
+        </p:nvSpPr>
+        <p:spPr/>
+        <p:txBody>
           <a:bodyPr/>
           <a:lstStyle/>
           <a:p>
             <a:r>
               <a:rPr lang="en-US" dirty="0"/>
-              <a:t>Summary</a:t>
+              <a:t>Fox</a:t>
+            </a:r>
+          </a:p>
+          <a:p>
+            <a:r>
+              <a:rPr lang="en-US" dirty="0"/>
+              <a:t>Rocks</a:t>
             </a:r>
           </a:p>
         </p:txBody>
@@ -8060,7 +8361,7 @@
     </p:spTree>
     <p:extLst>
       <p:ext uri="{BB962C8B-B14F-4D97-AF65-F5344CB8AC3E}">
-        <p14:creationId xmlns:p14="http://schemas.microsoft.com/office/powerpoint/2010/main" val="1780635943"/>
+        <p14:creationId xmlns:p14="http://schemas.microsoft.com/office/powerpoint/2010/main" val="761535539"/>
       </p:ext>
     </p:extLst>
   </p:cSld>
@@ -8101,10 +8402,10 @@
       </p:grpSpPr>
       <p:sp>
         <p:nvSpPr>
-          <p:cNvPr id="3" name="Title 2">
-            <a:extLst>
-              <a:ext uri="{FF2B5EF4-FFF2-40B4-BE49-F238E27FC236}">
-                <a16:creationId xmlns:a16="http://schemas.microsoft.com/office/drawing/2014/main" id="{9BC79B9F-116A-4370-9702-B5EBDEC245AB}"/>
+          <p:cNvPr id="2" name="Title 1">
+            <a:extLst>
+              <a:ext uri="{FF2B5EF4-FFF2-40B4-BE49-F238E27FC236}">
+                <a16:creationId xmlns:a16="http://schemas.microsoft.com/office/drawing/2014/main" id="{0406F2F8-AB85-4F9C-A292-04A22C58517E}"/>
               </a:ext>
             </a:extLst>
           </p:cNvPr>
@@ -8112,76 +8413,17 @@
             <a:spLocks noGrp="1"/>
           </p:cNvSpPr>
           <p:nvPr>
-            <p:ph type="title"/>
+            <p:ph type="ctrTitle"/>
           </p:nvPr>
         </p:nvSpPr>
         <p:spPr/>
         <p:txBody>
-          <a:bodyPr>
-            <a:normAutofit fontScale="90000"/>
-          </a:bodyPr>
+          <a:bodyPr/>
           <a:lstStyle/>
           <a:p>
             <a:r>
               <a:rPr lang="en-US" dirty="0"/>
-              <a:t>What You Learned Today</a:t>
-            </a:r>
-          </a:p>
-        </p:txBody>
-      </p:sp>
-      <p:sp>
-        <p:nvSpPr>
-          <p:cNvPr id="4" name="Content Placeholder 3">
-            <a:extLst>
-              <a:ext uri="{FF2B5EF4-FFF2-40B4-BE49-F238E27FC236}">
-                <a16:creationId xmlns:a16="http://schemas.microsoft.com/office/drawing/2014/main" id="{32D84BB3-4E84-4133-A4C9-335F711E4E62}"/>
-              </a:ext>
-            </a:extLst>
-          </p:cNvPr>
-          <p:cNvSpPr>
-            <a:spLocks noGrp="1"/>
-          </p:cNvSpPr>
-          <p:nvPr>
-            <p:ph idx="10"/>
-          </p:nvPr>
-        </p:nvSpPr>
-        <p:spPr>
-          <a:xfrm>
-            <a:off x="1979613" y="1447800"/>
-            <a:ext cx="9675812" cy="4648200"/>
-          </a:xfrm>
-        </p:spPr>
-        <p:txBody>
-          <a:bodyPr/>
-          <a:lstStyle/>
-          <a:p>
-            <a:r>
-              <a:rPr lang="en-US" dirty="0"/>
-              <a:t>Recap your Agenda items</a:t>
-            </a:r>
-          </a:p>
-          <a:p>
-            <a:r>
-              <a:rPr lang="en-US" dirty="0"/>
-              <a:t>Blah, blah, blah</a:t>
-            </a:r>
-          </a:p>
-          <a:p>
-            <a:r>
-              <a:rPr lang="en-US" dirty="0"/>
-              <a:t>Yada, yada, yada</a:t>
-            </a:r>
-          </a:p>
-          <a:p>
-            <a:r>
-              <a:rPr lang="en-US" dirty="0"/>
-              <a:t>Fox Rocks…</a:t>
-            </a:r>
-          </a:p>
-          <a:p>
-            <a:r>
-              <a:rPr lang="en-US" dirty="0"/>
-              <a:t>…And so do you!</a:t>
+              <a:t>Summary</a:t>
             </a:r>
           </a:p>
         </p:txBody>
@@ -8189,7 +8431,7 @@
     </p:spTree>
     <p:extLst>
       <p:ext uri="{BB962C8B-B14F-4D97-AF65-F5344CB8AC3E}">
-        <p14:creationId xmlns:p14="http://schemas.microsoft.com/office/powerpoint/2010/main" val="2653342071"/>
+        <p14:creationId xmlns:p14="http://schemas.microsoft.com/office/powerpoint/2010/main" val="1780635943"/>
       </p:ext>
     </p:extLst>
   </p:cSld>
@@ -8230,10 +8472,10 @@
       </p:grpSpPr>
       <p:sp>
         <p:nvSpPr>
-          <p:cNvPr id="4" name="Title 3">
-            <a:extLst>
-              <a:ext uri="{FF2B5EF4-FFF2-40B4-BE49-F238E27FC236}">
-                <a16:creationId xmlns:a16="http://schemas.microsoft.com/office/drawing/2014/main" id="{1C1C866F-EFAC-46BA-904A-D52904C901EA}"/>
+          <p:cNvPr id="3" name="Title 2">
+            <a:extLst>
+              <a:ext uri="{FF2B5EF4-FFF2-40B4-BE49-F238E27FC236}">
+                <a16:creationId xmlns:a16="http://schemas.microsoft.com/office/drawing/2014/main" id="{9BC79B9F-116A-4370-9702-B5EBDEC245AB}"/>
               </a:ext>
             </a:extLst>
           </p:cNvPr>
@@ -8241,48 +8483,29 @@
             <a:spLocks noGrp="1"/>
           </p:cNvSpPr>
           <p:nvPr>
-            <p:ph type="ctrTitle"/>
+            <p:ph type="title"/>
           </p:nvPr>
         </p:nvSpPr>
         <p:spPr/>
         <p:txBody>
-          <a:bodyPr/>
+          <a:bodyPr>
+            <a:normAutofit fontScale="90000"/>
+          </a:bodyPr>
           <a:lstStyle/>
           <a:p>
             <a:r>
               <a:rPr lang="en-US" dirty="0"/>
-              <a:t>Name</a:t>
-            </a:r>
-            <a:br>
-              <a:rPr lang="en-US" dirty="0"/>
-            </a:br>
-            <a:r>
-              <a:rPr lang="en-US" dirty="0"/>
-              <a:t>Company</a:t>
-            </a:r>
-            <a:br>
-              <a:rPr lang="en-US" dirty="0"/>
-            </a:br>
-            <a:r>
-              <a:rPr lang="en-US" dirty="0"/>
-              <a:t>Email Address</a:t>
-            </a:r>
-            <a:br>
-              <a:rPr lang="en-US" dirty="0"/>
-            </a:br>
-            <a:r>
-              <a:rPr lang="en-US" dirty="0"/>
-              <a:t>Website</a:t>
-            </a:r>
-          </a:p>
-        </p:txBody>
-      </p:sp>
-      <p:sp>
-        <p:nvSpPr>
-          <p:cNvPr id="3" name="Subtitle 2">
-            <a:extLst>
-              <a:ext uri="{FF2B5EF4-FFF2-40B4-BE49-F238E27FC236}">
-                <a16:creationId xmlns:a16="http://schemas.microsoft.com/office/drawing/2014/main" id="{60AFDF34-F8C3-4D4F-95A3-33F2736D6760}"/>
+              <a:t>What You Learned Today</a:t>
+            </a:r>
+          </a:p>
+        </p:txBody>
+      </p:sp>
+      <p:sp>
+        <p:nvSpPr>
+          <p:cNvPr id="4" name="Content Placeholder 3">
+            <a:extLst>
+              <a:ext uri="{FF2B5EF4-FFF2-40B4-BE49-F238E27FC236}">
+                <a16:creationId xmlns:a16="http://schemas.microsoft.com/office/drawing/2014/main" id="{32D84BB3-4E84-4133-A4C9-335F711E4E62}"/>
               </a:ext>
             </a:extLst>
           </p:cNvPr>
@@ -8290,22 +8513,48 @@
             <a:spLocks noGrp="1"/>
           </p:cNvSpPr>
           <p:nvPr>
-            <p:ph type="subTitle" idx="1"/>
+            <p:ph idx="10"/>
           </p:nvPr>
         </p:nvSpPr>
-        <p:spPr/>
+        <p:spPr>
+          <a:xfrm>
+            <a:off x="1979613" y="1447800"/>
+            <a:ext cx="9675812" cy="4648200"/>
+          </a:xfrm>
+        </p:spPr>
         <p:txBody>
           <a:bodyPr/>
           <a:lstStyle/>
           <a:p>
-            <a:endParaRPr lang="en-US"/>
+            <a:r>
+              <a:rPr lang="en-US" dirty="0"/>
+              <a:t>Created an X# Application from scratch</a:t>
+            </a:r>
+          </a:p>
+          <a:p>
+            <a:r>
+              <a:rPr lang="en-US" dirty="0"/>
+              <a:t>Considerations when creating classes</a:t>
+            </a:r>
+          </a:p>
+          <a:p>
+            <a:r>
+              <a:rPr lang="en-US" dirty="0"/>
+              <a:t>Converting visual classes and forms to XAML</a:t>
+            </a:r>
+          </a:p>
+          <a:p>
+            <a:r>
+              <a:rPr lang="en-US" dirty="0"/>
+              <a:t>More!</a:t>
+            </a:r>
           </a:p>
         </p:txBody>
       </p:sp>
     </p:spTree>
     <p:extLst>
       <p:ext uri="{BB962C8B-B14F-4D97-AF65-F5344CB8AC3E}">
-        <p14:creationId xmlns:p14="http://schemas.microsoft.com/office/powerpoint/2010/main" val="2655914804"/>
+        <p14:creationId xmlns:p14="http://schemas.microsoft.com/office/powerpoint/2010/main" val="2653342071"/>
       </p:ext>
     </p:extLst>
   </p:cSld>
@@ -8328,7 +8577,7 @@
 </file>
 
 <file path=ppt/slides/slide19.xml><?xml version="1.0" encoding="utf-8"?>
-<p:sld xmlns:a="http://schemas.openxmlformats.org/drawingml/2006/main" xmlns:r="http://schemas.openxmlformats.org/officeDocument/2006/relationships" xmlns:p="http://schemas.openxmlformats.org/presentationml/2006/main" showMasterSp="0">
+<p:sld xmlns:a="http://schemas.openxmlformats.org/drawingml/2006/main" xmlns:r="http://schemas.openxmlformats.org/officeDocument/2006/relationships" xmlns:p="http://schemas.openxmlformats.org/presentationml/2006/main">
   <p:cSld>
     <p:spTree>
       <p:nvGrpSpPr>
@@ -8344,10 +8593,84 @@
           <a:chExt cx="0" cy="0"/>
         </a:xfrm>
       </p:grpSpPr>
+      <p:sp>
+        <p:nvSpPr>
+          <p:cNvPr id="4" name="Title 3">
+            <a:extLst>
+              <a:ext uri="{FF2B5EF4-FFF2-40B4-BE49-F238E27FC236}">
+                <a16:creationId xmlns:a16="http://schemas.microsoft.com/office/drawing/2014/main" id="{1C1C866F-EFAC-46BA-904A-D52904C901EA}"/>
+              </a:ext>
+            </a:extLst>
+          </p:cNvPr>
+          <p:cNvSpPr>
+            <a:spLocks noGrp="1"/>
+          </p:cNvSpPr>
+          <p:nvPr>
+            <p:ph type="ctrTitle"/>
+          </p:nvPr>
+        </p:nvSpPr>
+        <p:spPr/>
+        <p:txBody>
+          <a:bodyPr/>
+          <a:lstStyle/>
+          <a:p>
+            <a:r>
+              <a:rPr lang="en-US" dirty="0"/>
+              <a:t>Eric Selje</a:t>
+            </a:r>
+            <a:br>
+              <a:rPr lang="en-US" dirty="0"/>
+            </a:br>
+            <a:r>
+              <a:rPr lang="en-US" dirty="0"/>
+              <a:t>Salty Dog Solutions, LLC</a:t>
+            </a:r>
+            <a:br>
+              <a:rPr lang="en-US" dirty="0"/>
+            </a:br>
+            <a:r>
+              <a:rPr lang="en-US" dirty="0" err="1"/>
+              <a:t>Eric@SaltyDogLLC</a:t>
+            </a:r>
+            <a:br>
+              <a:rPr lang="en-US" dirty="0"/>
+            </a:br>
+            <a:r>
+              <a:rPr lang="en-US" dirty="0"/>
+              <a:t>www.SaltyDogLLC.com</a:t>
+            </a:r>
+          </a:p>
+        </p:txBody>
+      </p:sp>
+      <p:sp>
+        <p:nvSpPr>
+          <p:cNvPr id="3" name="Subtitle 2">
+            <a:extLst>
+              <a:ext uri="{FF2B5EF4-FFF2-40B4-BE49-F238E27FC236}">
+                <a16:creationId xmlns:a16="http://schemas.microsoft.com/office/drawing/2014/main" id="{60AFDF34-F8C3-4D4F-95A3-33F2736D6760}"/>
+              </a:ext>
+            </a:extLst>
+          </p:cNvPr>
+          <p:cNvSpPr>
+            <a:spLocks noGrp="1"/>
+          </p:cNvSpPr>
+          <p:nvPr>
+            <p:ph type="subTitle" idx="1"/>
+          </p:nvPr>
+        </p:nvSpPr>
+        <p:spPr/>
+        <p:txBody>
+          <a:bodyPr/>
+          <a:lstStyle/>
+          <a:p>
+            <a:endParaRPr lang="en-US"/>
+          </a:p>
+        </p:txBody>
+      </p:sp>
     </p:spTree>
     <p:extLst>
       <p:ext uri="{BB962C8B-B14F-4D97-AF65-F5344CB8AC3E}">
-        <p14:creationId xmlns:p14="http://schemas.microsoft.com/office/powerpoint/2010/main" val="3295948430"/>
+        <p14:creationId xmlns:p14="http://schemas.microsoft.com/office/powerpoint/2010/main" val="2655914804"/>
       </p:ext>
     </p:extLst>
   </p:cSld>
@@ -8411,7 +8734,7 @@
           <a:p>
             <a:r>
               <a:rPr lang="en-US" dirty="0"/>
-              <a:t>Speaker Name</a:t>
+              <a:t>Eric Selje</a:t>
             </a:r>
           </a:p>
         </p:txBody>
@@ -8444,26 +8767,68 @@
           <a:p>
             <a:r>
               <a:rPr lang="en-US" dirty="0"/>
-              <a:t>Bio goes here</a:t>
+              <a:t>FoxPro Dev from way back</a:t>
             </a:r>
           </a:p>
           <a:p>
             <a:r>
               <a:rPr lang="en-US" dirty="0"/>
-              <a:t>Use the “Content no tabs” slide layout for a single column</a:t>
+              <a:t>Programming is my first love</a:t>
             </a:r>
           </a:p>
           <a:p>
             <a:r>
               <a:rPr lang="en-US" dirty="0"/>
-              <a:t>Use the “Content no tabs – 2 columns” slide layout for 2 columns</a:t>
-            </a:r>
-          </a:p>
-          <a:p>
+              <a:t>Currently IT Security Officer for the U.S. Courts</a:t>
+            </a:r>
+          </a:p>
+          <a:p>
+            <a:pPr marL="0" indent="0">
+              <a:buNone/>
+            </a:pPr>
             <a:endParaRPr lang="en-US" dirty="0"/>
           </a:p>
-        </p:txBody>
-      </p:sp>
+          <a:p>
+            <a:endParaRPr lang="en-US" dirty="0"/>
+          </a:p>
+        </p:txBody>
+      </p:sp>
+      <p:pic>
+        <p:nvPicPr>
+          <p:cNvPr id="5" name="Picture 4" descr="A person wearing a hat&#10;&#10;Description automatically generated">
+            <a:extLst>
+              <a:ext uri="{FF2B5EF4-FFF2-40B4-BE49-F238E27FC236}">
+                <a16:creationId xmlns:a16="http://schemas.microsoft.com/office/drawing/2014/main" id="{4F8AB380-C455-4132-8120-4BEAA78A8440}"/>
+              </a:ext>
+            </a:extLst>
+          </p:cNvPr>
+          <p:cNvPicPr>
+            <a:picLocks noChangeAspect="1"/>
+          </p:cNvPicPr>
+          <p:nvPr/>
+        </p:nvPicPr>
+        <p:blipFill>
+          <a:blip r:embed="rId3">
+            <a:extLst>
+              <a:ext uri="{28A0092B-C50C-407E-A947-70E740481C1C}">
+                <a14:useLocalDpi xmlns:a14="http://schemas.microsoft.com/office/drawing/2010/main" val="0"/>
+              </a:ext>
+            </a:extLst>
+          </a:blip>
+          <a:stretch>
+            <a:fillRect/>
+          </a:stretch>
+        </p:blipFill>
+        <p:spPr>
+          <a:xfrm>
+            <a:off x="10202369" y="457200"/>
+            <a:ext cx="1524000" cy="1524000"/>
+          </a:xfrm>
+          <a:prstGeom prst="rect">
+            <a:avLst/>
+          </a:prstGeom>
+        </p:spPr>
+      </p:pic>
     </p:spTree>
     <p:extLst>
       <p:ext uri="{BB962C8B-B14F-4D97-AF65-F5344CB8AC3E}">
@@ -8490,7 +8855,7 @@
 </file>
 
 <file path=ppt/slides/slide20.xml><?xml version="1.0" encoding="utf-8"?>
-<p:sld xmlns:a="http://schemas.openxmlformats.org/drawingml/2006/main" xmlns:r="http://schemas.openxmlformats.org/officeDocument/2006/relationships" xmlns:p="http://schemas.openxmlformats.org/presentationml/2006/main">
+<p:sld xmlns:a="http://schemas.openxmlformats.org/drawingml/2006/main" xmlns:r="http://schemas.openxmlformats.org/officeDocument/2006/relationships" xmlns:p="http://schemas.openxmlformats.org/presentationml/2006/main" showMasterSp="0">
   <p:cSld>
     <p:spTree>
       <p:nvGrpSpPr>
@@ -8506,38 +8871,46 @@
           <a:chExt cx="0" cy="0"/>
         </a:xfrm>
       </p:grpSpPr>
-      <p:sp>
-        <p:nvSpPr>
-          <p:cNvPr id="2" name="Title 1">
-            <a:extLst>
-              <a:ext uri="{FF2B5EF4-FFF2-40B4-BE49-F238E27FC236}">
-                <a16:creationId xmlns:a16="http://schemas.microsoft.com/office/drawing/2014/main" id="{48FE95CD-8FB4-497D-91AF-3E37610418C4}"/>
-              </a:ext>
-            </a:extLst>
-          </p:cNvPr>
-          <p:cNvSpPr>
-            <a:spLocks noGrp="1"/>
-          </p:cNvSpPr>
-          <p:nvPr>
-            <p:ph type="ctrTitle"/>
-          </p:nvPr>
-        </p:nvSpPr>
-        <p:spPr/>
-        <p:txBody>
-          <a:bodyPr/>
-          <a:lstStyle/>
-          <a:p>
-            <a:r>
-              <a:rPr lang="en-US" dirty="0"/>
-              <a:t>Bonus Info</a:t>
-            </a:r>
-          </a:p>
-        </p:txBody>
-      </p:sp>
+      <p:pic>
+        <p:nvPicPr>
+          <p:cNvPr id="3" name="Picture 2" descr="A picture containing drawing&#10;&#10;Description automatically generated">
+            <a:extLst>
+              <a:ext uri="{FF2B5EF4-FFF2-40B4-BE49-F238E27FC236}">
+                <a16:creationId xmlns:a16="http://schemas.microsoft.com/office/drawing/2014/main" id="{9FD4E7A6-486A-461E-9A4E-FDEB204E877C}"/>
+              </a:ext>
+            </a:extLst>
+          </p:cNvPr>
+          <p:cNvPicPr>
+            <a:picLocks noChangeAspect="1"/>
+          </p:cNvPicPr>
+          <p:nvPr/>
+        </p:nvPicPr>
+        <p:blipFill>
+          <a:blip r:embed="rId2" cstate="print">
+            <a:extLst>
+              <a:ext uri="{28A0092B-C50C-407E-A947-70E740481C1C}">
+                <a14:useLocalDpi xmlns:a14="http://schemas.microsoft.com/office/drawing/2010/main" val="0"/>
+              </a:ext>
+            </a:extLst>
+          </a:blip>
+          <a:stretch>
+            <a:fillRect/>
+          </a:stretch>
+        </p:blipFill>
+        <p:spPr>
+          <a:xfrm>
+            <a:off x="1751012" y="1752600"/>
+            <a:ext cx="10285413" cy="2374469"/>
+          </a:xfrm>
+          <a:prstGeom prst="rect">
+            <a:avLst/>
+          </a:prstGeom>
+        </p:spPr>
+      </p:pic>
     </p:spTree>
     <p:extLst>
       <p:ext uri="{BB962C8B-B14F-4D97-AF65-F5344CB8AC3E}">
-        <p14:creationId xmlns:p14="http://schemas.microsoft.com/office/powerpoint/2010/main" val="3372803397"/>
+        <p14:creationId xmlns:p14="http://schemas.microsoft.com/office/powerpoint/2010/main" val="3295948430"/>
       </p:ext>
     </p:extLst>
   </p:cSld>
@@ -8578,10 +8951,10 @@
       </p:grpSpPr>
       <p:sp>
         <p:nvSpPr>
-          <p:cNvPr id="4" name="Content Placeholder 3">
-            <a:extLst>
-              <a:ext uri="{FF2B5EF4-FFF2-40B4-BE49-F238E27FC236}">
-                <a16:creationId xmlns:a16="http://schemas.microsoft.com/office/drawing/2014/main" id="{D39E01CB-F4A1-4B01-A49C-6E57454363E6}"/>
+          <p:cNvPr id="2" name="Title 1">
+            <a:extLst>
+              <a:ext uri="{FF2B5EF4-FFF2-40B4-BE49-F238E27FC236}">
+                <a16:creationId xmlns:a16="http://schemas.microsoft.com/office/drawing/2014/main" id="{48FE95CD-8FB4-497D-91AF-3E37610418C4}"/>
               </a:ext>
             </a:extLst>
           </p:cNvPr>
@@ -8589,7 +8962,7 @@
             <a:spLocks noGrp="1"/>
           </p:cNvSpPr>
           <p:nvPr>
-            <p:ph idx="1"/>
+            <p:ph type="ctrTitle"/>
           </p:nvPr>
         </p:nvSpPr>
         <p:spPr/>
@@ -8599,60 +8972,7 @@
           <a:p>
             <a:r>
               <a:rPr lang="en-US" dirty="0"/>
-              <a:t>If you order now…</a:t>
-            </a:r>
-          </a:p>
-          <a:p>
-            <a:pPr lvl="1"/>
-            <a:r>
-              <a:rPr lang="en-US" dirty="0"/>
-              <a:t>You’ll get double the product!</a:t>
-            </a:r>
-          </a:p>
-          <a:p>
-            <a:pPr lvl="1"/>
-            <a:r>
-              <a:rPr lang="en-US" dirty="0"/>
-              <a:t>And the shipping is free!</a:t>
-            </a:r>
-          </a:p>
-          <a:p>
-            <a:r>
-              <a:rPr lang="en-US" dirty="0"/>
-              <a:t>The logo at the bottom hyperlinks back to the “Thank-You” slide</a:t>
-            </a:r>
-          </a:p>
-          <a:p>
-            <a:endParaRPr lang="en-US" dirty="0"/>
-          </a:p>
-        </p:txBody>
-      </p:sp>
-      <p:sp>
-        <p:nvSpPr>
-          <p:cNvPr id="3" name="Title 2">
-            <a:extLst>
-              <a:ext uri="{FF2B5EF4-FFF2-40B4-BE49-F238E27FC236}">
-                <a16:creationId xmlns:a16="http://schemas.microsoft.com/office/drawing/2014/main" id="{5CBA38E5-4A77-4425-A8D8-A6D7E700307E}"/>
-              </a:ext>
-            </a:extLst>
-          </p:cNvPr>
-          <p:cNvSpPr>
-            <a:spLocks noGrp="1"/>
-          </p:cNvSpPr>
-          <p:nvPr>
-            <p:ph type="title"/>
-          </p:nvPr>
-        </p:nvSpPr>
-        <p:spPr/>
-        <p:txBody>
-          <a:bodyPr>
-            <a:normAutofit fontScale="90000"/>
-          </a:bodyPr>
-          <a:lstStyle/>
-          <a:p>
-            <a:r>
-              <a:rPr lang="en-US" dirty="0"/>
-              <a:t>But wait … There’s more</a:t>
+              <a:t>Bonus Info</a:t>
             </a:r>
           </a:p>
         </p:txBody>
@@ -8660,7 +8980,7 @@
     </p:spTree>
     <p:extLst>
       <p:ext uri="{BB962C8B-B14F-4D97-AF65-F5344CB8AC3E}">
-        <p14:creationId xmlns:p14="http://schemas.microsoft.com/office/powerpoint/2010/main" val="998561129"/>
+        <p14:creationId xmlns:p14="http://schemas.microsoft.com/office/powerpoint/2010/main" val="3372803397"/>
       </p:ext>
     </p:extLst>
   </p:cSld>
@@ -8701,6 +9021,129 @@
       </p:grpSpPr>
       <p:sp>
         <p:nvSpPr>
+          <p:cNvPr id="4" name="Content Placeholder 3">
+            <a:extLst>
+              <a:ext uri="{FF2B5EF4-FFF2-40B4-BE49-F238E27FC236}">
+                <a16:creationId xmlns:a16="http://schemas.microsoft.com/office/drawing/2014/main" id="{D39E01CB-F4A1-4B01-A49C-6E57454363E6}"/>
+              </a:ext>
+            </a:extLst>
+          </p:cNvPr>
+          <p:cNvSpPr>
+            <a:spLocks noGrp="1"/>
+          </p:cNvSpPr>
+          <p:nvPr>
+            <p:ph idx="1"/>
+          </p:nvPr>
+        </p:nvSpPr>
+        <p:spPr/>
+        <p:txBody>
+          <a:bodyPr/>
+          <a:lstStyle/>
+          <a:p>
+            <a:r>
+              <a:rPr lang="en-US" dirty="0"/>
+              <a:t>If you order now…</a:t>
+            </a:r>
+          </a:p>
+          <a:p>
+            <a:pPr lvl="1"/>
+            <a:r>
+              <a:rPr lang="en-US" dirty="0"/>
+              <a:t>You’ll get double the product!</a:t>
+            </a:r>
+          </a:p>
+          <a:p>
+            <a:pPr lvl="1"/>
+            <a:r>
+              <a:rPr lang="en-US" dirty="0"/>
+              <a:t>And the shipping is free!</a:t>
+            </a:r>
+          </a:p>
+          <a:p>
+            <a:r>
+              <a:rPr lang="en-US" dirty="0"/>
+              <a:t>The logo at the bottom hyperlinks back to the “Thank-You” slide</a:t>
+            </a:r>
+          </a:p>
+          <a:p>
+            <a:endParaRPr lang="en-US" dirty="0"/>
+          </a:p>
+        </p:txBody>
+      </p:sp>
+      <p:sp>
+        <p:nvSpPr>
+          <p:cNvPr id="3" name="Title 2">
+            <a:extLst>
+              <a:ext uri="{FF2B5EF4-FFF2-40B4-BE49-F238E27FC236}">
+                <a16:creationId xmlns:a16="http://schemas.microsoft.com/office/drawing/2014/main" id="{5CBA38E5-4A77-4425-A8D8-A6D7E700307E}"/>
+              </a:ext>
+            </a:extLst>
+          </p:cNvPr>
+          <p:cNvSpPr>
+            <a:spLocks noGrp="1"/>
+          </p:cNvSpPr>
+          <p:nvPr>
+            <p:ph type="title"/>
+          </p:nvPr>
+        </p:nvSpPr>
+        <p:spPr/>
+        <p:txBody>
+          <a:bodyPr>
+            <a:normAutofit fontScale="90000"/>
+          </a:bodyPr>
+          <a:lstStyle/>
+          <a:p>
+            <a:r>
+              <a:rPr lang="en-US" dirty="0"/>
+              <a:t>But wait … There’s more</a:t>
+            </a:r>
+          </a:p>
+        </p:txBody>
+      </p:sp>
+    </p:spTree>
+    <p:extLst>
+      <p:ext uri="{BB962C8B-B14F-4D97-AF65-F5344CB8AC3E}">
+        <p14:creationId xmlns:p14="http://schemas.microsoft.com/office/powerpoint/2010/main" val="998561129"/>
+      </p:ext>
+    </p:extLst>
+  </p:cSld>
+  <p:clrMapOvr>
+    <a:masterClrMapping/>
+  </p:clrMapOvr>
+  <mc:AlternateContent xmlns:mc="http://schemas.openxmlformats.org/markup-compatibility/2006" xmlns:p14="http://schemas.microsoft.com/office/powerpoint/2010/main">
+    <mc:Choice Requires="p14">
+      <p:transition spd="med" p14:dur="700">
+        <p:fade/>
+      </p:transition>
+    </mc:Choice>
+    <mc:Fallback xmlns="">
+      <p:transition spd="med">
+        <p:fade/>
+      </p:transition>
+    </mc:Fallback>
+  </mc:AlternateContent>
+</p:sld>
+</file>
+
+<file path=ppt/slides/slide23.xml><?xml version="1.0" encoding="utf-8"?>
+<p:sld xmlns:a="http://schemas.openxmlformats.org/drawingml/2006/main" xmlns:r="http://schemas.openxmlformats.org/officeDocument/2006/relationships" xmlns:p="http://schemas.openxmlformats.org/presentationml/2006/main">
+  <p:cSld>
+    <p:spTree>
+      <p:nvGrpSpPr>
+        <p:cNvPr id="1" name=""/>
+        <p:cNvGrpSpPr/>
+        <p:nvPr/>
+      </p:nvGrpSpPr>
+      <p:grpSpPr>
+        <a:xfrm>
+          <a:off x="0" y="0"/>
+          <a:ext cx="0" cy="0"/>
+          <a:chOff x="0" y="0"/>
+          <a:chExt cx="0" cy="0"/>
+        </a:xfrm>
+      </p:grpSpPr>
+      <p:sp>
+        <p:nvSpPr>
           <p:cNvPr id="2" name="Content Placeholder 1">
             <a:extLst>
               <a:ext uri="{FF2B5EF4-FFF2-40B4-BE49-F238E27FC236}">
@@ -8799,7 +9242,7 @@
 </p:sld>
 </file>
 
-<file path=ppt/slides/slide23.xml><?xml version="1.0" encoding="utf-8"?>
+<file path=ppt/slides/slide24.xml><?xml version="1.0" encoding="utf-8"?>
 <p:sld xmlns:a="http://schemas.openxmlformats.org/drawingml/2006/main" xmlns:r="http://schemas.openxmlformats.org/officeDocument/2006/relationships" xmlns:p="http://schemas.openxmlformats.org/presentationml/2006/main" showMasterSp="0">
   <p:cSld>
     <p:spTree>
@@ -8841,7 +9284,7 @@
 </p:sld>
 </file>
 
-<file path=ppt/slides/slide24.xml><?xml version="1.0" encoding="utf-8"?>
+<file path=ppt/slides/slide25.xml><?xml version="1.0" encoding="utf-8"?>
 <p:sld xmlns:a="http://schemas.openxmlformats.org/drawingml/2006/main" xmlns:r="http://schemas.openxmlformats.org/officeDocument/2006/relationships" xmlns:p="http://schemas.openxmlformats.org/presentationml/2006/main" showMasterSp="0" show="0">
   <p:cSld>
     <p:spTree>
@@ -12326,62 +12769,84 @@
           <a:p>
             <a:r>
               <a:rPr lang="en-US" dirty="0"/>
-              <a:t>Agenda</a:t>
-            </a:r>
-          </a:p>
-        </p:txBody>
-      </p:sp>
-      <p:sp>
-        <p:nvSpPr>
-          <p:cNvPr id="2" name="Content Placeholder 1">
-            <a:extLst>
-              <a:ext uri="{FF2B5EF4-FFF2-40B4-BE49-F238E27FC236}">
-                <a16:creationId xmlns:a16="http://schemas.microsoft.com/office/drawing/2014/main" id="{DEA40ED6-CFA1-4759-8702-9ED35170F681}"/>
-              </a:ext>
-            </a:extLst>
-          </p:cNvPr>
-          <p:cNvSpPr>
-            <a:spLocks noGrp="1"/>
-          </p:cNvSpPr>
+              <a:t>Goal!</a:t>
+            </a:r>
+          </a:p>
+        </p:txBody>
+      </p:sp>
+      <p:pic>
+        <p:nvPicPr>
+          <p:cNvPr id="5" name="Content Placeholder 4" descr="Diagram&#10;&#10;Description automatically generated">
+            <a:extLst>
+              <a:ext uri="{FF2B5EF4-FFF2-40B4-BE49-F238E27FC236}">
+                <a16:creationId xmlns:a16="http://schemas.microsoft.com/office/drawing/2014/main" id="{9ABDFCB7-145C-48C0-8BF1-020E0F735E9E}"/>
+              </a:ext>
+            </a:extLst>
+          </p:cNvPr>
+          <p:cNvPicPr>
+            <a:picLocks noGrp="1" noChangeAspect="1"/>
+          </p:cNvPicPr>
           <p:nvPr>
             <p:ph idx="10"/>
           </p:nvPr>
-        </p:nvSpPr>
+        </p:nvPicPr>
+        <p:blipFill>
+          <a:blip r:embed="rId3">
+            <a:extLst>
+              <a:ext uri="{28A0092B-C50C-407E-A947-70E740481C1C}">
+                <a14:useLocalDpi xmlns:a14="http://schemas.microsoft.com/office/drawing/2010/main" val="0"/>
+              </a:ext>
+            </a:extLst>
+          </a:blip>
+          <a:stretch>
+            <a:fillRect/>
+          </a:stretch>
+        </p:blipFill>
         <p:spPr>
           <a:xfrm>
-            <a:off x="1979613" y="1447800"/>
-            <a:ext cx="9675812" cy="4648200"/>
-          </a:xfrm>
-        </p:spPr>
-        <p:txBody>
-          <a:bodyPr/>
-          <a:lstStyle/>
-          <a:p>
-            <a:r>
-              <a:rPr lang="en-US" dirty="0"/>
-              <a:t>This is your first agenda item</a:t>
-            </a:r>
-          </a:p>
-          <a:p>
-            <a:r>
-              <a:rPr lang="en-US" dirty="0"/>
-              <a:t>This is your second agenda item</a:t>
-            </a:r>
-          </a:p>
-          <a:p>
-            <a:r>
-              <a:rPr lang="en-US" dirty="0"/>
-              <a:t>This is your third agenda item</a:t>
-            </a:r>
-          </a:p>
-          <a:p>
-            <a:r>
-              <a:rPr lang="en-US" dirty="0"/>
-              <a:t>This is your fourth agenda item</a:t>
-            </a:r>
-          </a:p>
-          <a:p>
-            <a:endParaRPr lang="en-US" dirty="0"/>
+            <a:off x="2284412" y="1286926"/>
+            <a:ext cx="9328768" cy="5113874"/>
+          </a:xfrm>
+        </p:spPr>
+      </p:pic>
+      <p:sp>
+        <p:nvSpPr>
+          <p:cNvPr id="6" name="TextBox 5">
+            <a:extLst>
+              <a:ext uri="{FF2B5EF4-FFF2-40B4-BE49-F238E27FC236}">
+                <a16:creationId xmlns:a16="http://schemas.microsoft.com/office/drawing/2014/main" id="{9021A28B-E541-48F7-87A6-115545A88906}"/>
+              </a:ext>
+            </a:extLst>
+          </p:cNvPr>
+          <p:cNvSpPr txBox="1"/>
+          <p:nvPr/>
+        </p:nvSpPr>
+        <p:spPr>
+          <a:xfrm>
+            <a:off x="4113212" y="2349062"/>
+            <a:ext cx="6324601" cy="2862322"/>
+          </a:xfrm>
+          <a:prstGeom prst="rect">
+            <a:avLst/>
+          </a:prstGeom>
+          <a:noFill/>
+        </p:spPr>
+        <p:txBody>
+          <a:bodyPr wrap="square" rtlCol="0">
+            <a:spAutoFit/>
+          </a:bodyPr>
+          <a:lstStyle/>
+          <a:p>
+            <a:r>
+              <a:rPr lang="en-US" sz="3600" b="1" dirty="0">
+                <a:solidFill>
+                  <a:schemeClr val="accent2">
+                    <a:lumMod val="75000"/>
+                  </a:schemeClr>
+                </a:solidFill>
+              </a:rPr>
+              <a:t>By the end of this session you should have a solid understanding of what it takes to create an X# application from scratch.</a:t>
+            </a:r>
           </a:p>
         </p:txBody>
       </p:sp>
@@ -12432,7 +12897,7 @@
           <p:cNvPr id="3" name="Title 2">
             <a:extLst>
               <a:ext uri="{FF2B5EF4-FFF2-40B4-BE49-F238E27FC236}">
-                <a16:creationId xmlns:a16="http://schemas.microsoft.com/office/drawing/2014/main" id="{B5C635A7-E1B4-4D29-ACCF-1B9B44E13692}"/>
+                <a16:creationId xmlns:a16="http://schemas.microsoft.com/office/drawing/2014/main" id="{956D7F94-3CE0-440C-88F2-F7A8F75C45F5}"/>
               </a:ext>
             </a:extLst>
           </p:cNvPr>
@@ -12440,25 +12905,93 @@
             <a:spLocks noGrp="1"/>
           </p:cNvSpPr>
           <p:nvPr>
-            <p:ph type="ctrTitle"/>
+            <p:ph type="title"/>
           </p:nvPr>
         </p:nvSpPr>
         <p:spPr/>
         <p:txBody>
+          <a:bodyPr>
+            <a:normAutofit fontScale="90000"/>
+          </a:bodyPr>
+          <a:lstStyle/>
+          <a:p>
+            <a:r>
+              <a:rPr lang="en-US" dirty="0"/>
+              <a:t>Agenda</a:t>
+            </a:r>
+          </a:p>
+        </p:txBody>
+      </p:sp>
+      <p:sp>
+        <p:nvSpPr>
+          <p:cNvPr id="2" name="Content Placeholder 1">
+            <a:extLst>
+              <a:ext uri="{FF2B5EF4-FFF2-40B4-BE49-F238E27FC236}">
+                <a16:creationId xmlns:a16="http://schemas.microsoft.com/office/drawing/2014/main" id="{DEA40ED6-CFA1-4759-8702-9ED35170F681}"/>
+              </a:ext>
+            </a:extLst>
+          </p:cNvPr>
+          <p:cNvSpPr>
+            <a:spLocks noGrp="1"/>
+          </p:cNvSpPr>
+          <p:nvPr>
+            <p:ph idx="10"/>
+          </p:nvPr>
+        </p:nvSpPr>
+        <p:spPr>
+          <a:xfrm>
+            <a:off x="1979613" y="1447800"/>
+            <a:ext cx="9675812" cy="4648200"/>
+          </a:xfrm>
+        </p:spPr>
+        <p:txBody>
           <a:bodyPr/>
           <a:lstStyle/>
           <a:p>
             <a:r>
               <a:rPr lang="en-US" dirty="0"/>
-              <a:t>Section Heading for Agenda Item #1</a:t>
-            </a:r>
+              <a:t>Take a look at our sample FoxPro application</a:t>
+            </a:r>
+          </a:p>
+          <a:p>
+            <a:r>
+              <a:rPr lang="en-US" dirty="0"/>
+              <a:t>Create a new X# solution in Visual Studio</a:t>
+            </a:r>
+          </a:p>
+          <a:p>
+            <a:r>
+              <a:rPr lang="en-US" dirty="0"/>
+              <a:t>Write and test our business objects</a:t>
+            </a:r>
+          </a:p>
+          <a:p>
+            <a:r>
+              <a:rPr lang="en-US" dirty="0"/>
+              <a:t>Create a XAML form</a:t>
+            </a:r>
+          </a:p>
+          <a:p>
+            <a:r>
+              <a:rPr lang="en-US" dirty="0"/>
+              <a:t>Discussion</a:t>
+            </a:r>
+          </a:p>
+          <a:p>
+            <a:pPr marL="0" indent="0">
+              <a:buNone/>
+            </a:pPr>
+            <a:endParaRPr lang="en-US" dirty="0"/>
+          </a:p>
+          <a:p>
+            <a:endParaRPr lang="en-US" dirty="0"/>
           </a:p>
         </p:txBody>
       </p:sp>
     </p:spTree>
     <p:extLst>
       <p:ext uri="{BB962C8B-B14F-4D97-AF65-F5344CB8AC3E}">
-        <p14:creationId xmlns:p14="http://schemas.microsoft.com/office/powerpoint/2010/main" val="3397004492"/>
+        <p14:creationId xmlns:p14="http://schemas.microsoft.com/office/powerpoint/2010/main" val="1169166741"/>
       </p:ext>
     </p:extLst>
   </p:cSld>
@@ -12502,7 +13035,7 @@
           <p:cNvPr id="3" name="Title 2">
             <a:extLst>
               <a:ext uri="{FF2B5EF4-FFF2-40B4-BE49-F238E27FC236}">
-                <a16:creationId xmlns:a16="http://schemas.microsoft.com/office/drawing/2014/main" id="{70051E33-F15A-4058-A3AE-FF365FCA4159}"/>
+                <a16:creationId xmlns:a16="http://schemas.microsoft.com/office/drawing/2014/main" id="{B5C635A7-E1B4-4D29-ACCF-1B9B44E13692}"/>
               </a:ext>
             </a:extLst>
           </p:cNvPr>
@@ -12510,61 +13043,18 @@
             <a:spLocks noGrp="1"/>
           </p:cNvSpPr>
           <p:nvPr>
-            <p:ph type="title"/>
+            <p:ph type="ctrTitle"/>
           </p:nvPr>
         </p:nvSpPr>
         <p:spPr/>
         <p:txBody>
-          <a:bodyPr>
-            <a:normAutofit fontScale="90000"/>
-          </a:bodyPr>
-          <a:lstStyle/>
-          <a:p>
-            <a:r>
-              <a:rPr lang="en-US" dirty="0"/>
-              <a:t>Agenda #1 Title</a:t>
-            </a:r>
-          </a:p>
-        </p:txBody>
-      </p:sp>
-      <p:sp>
-        <p:nvSpPr>
-          <p:cNvPr id="4" name="Content Placeholder 3">
-            <a:extLst>
-              <a:ext uri="{FF2B5EF4-FFF2-40B4-BE49-F238E27FC236}">
-                <a16:creationId xmlns:a16="http://schemas.microsoft.com/office/drawing/2014/main" id="{C80A664F-4C2C-4690-BBF4-2158BB0C1FD3}"/>
-              </a:ext>
-            </a:extLst>
-          </p:cNvPr>
-          <p:cNvSpPr>
-            <a:spLocks noGrp="1"/>
-          </p:cNvSpPr>
-          <p:nvPr>
-            <p:ph idx="10"/>
-          </p:nvPr>
-        </p:nvSpPr>
-        <p:spPr>
-          <a:xfrm>
-            <a:off x="1979613" y="1447800"/>
-            <a:ext cx="9675812" cy="4648200"/>
-          </a:xfrm>
-        </p:spPr>
-        <p:txBody>
           <a:bodyPr/>
           <a:lstStyle/>
           <a:p>
             <a:r>
-              <a:rPr lang="en-US" dirty="0"/>
-              <a:t>FYI, the logo at the bottom hyperlinks to the “In Summary” section slide</a:t>
-            </a:r>
-          </a:p>
-          <a:p>
-            <a:r>
-              <a:rPr lang="en-US" dirty="0"/>
-              <a:t>Each Agenda Item in the bar on the left hyperlinks to the corresponding Section slide</a:t>
-            </a:r>
-          </a:p>
-          <a:p>
+              <a:rPr lang="en-US" dirty="0" err="1"/>
+              <a:t>FoxToDos</a:t>
+            </a:r>
             <a:endParaRPr lang="en-US" dirty="0"/>
           </a:p>
         </p:txBody>
@@ -12572,7 +13062,7 @@
     </p:spTree>
     <p:extLst>
       <p:ext uri="{BB962C8B-B14F-4D97-AF65-F5344CB8AC3E}">
-        <p14:creationId xmlns:p14="http://schemas.microsoft.com/office/powerpoint/2010/main" val="1294155941"/>
+        <p14:creationId xmlns:p14="http://schemas.microsoft.com/office/powerpoint/2010/main" val="3397004492"/>
       </p:ext>
     </p:extLst>
   </p:cSld>
@@ -12613,10 +13103,10 @@
       </p:grpSpPr>
       <p:sp>
         <p:nvSpPr>
-          <p:cNvPr id="2" name="Title 1">
-            <a:extLst>
-              <a:ext uri="{FF2B5EF4-FFF2-40B4-BE49-F238E27FC236}">
-                <a16:creationId xmlns:a16="http://schemas.microsoft.com/office/drawing/2014/main" id="{B24F4403-470C-4BAD-854A-20B4A7EDD4E1}"/>
+          <p:cNvPr id="3" name="Title 2">
+            <a:extLst>
+              <a:ext uri="{FF2B5EF4-FFF2-40B4-BE49-F238E27FC236}">
+                <a16:creationId xmlns:a16="http://schemas.microsoft.com/office/drawing/2014/main" id="{70051E33-F15A-4058-A3AE-FF365FCA4159}"/>
               </a:ext>
             </a:extLst>
           </p:cNvPr>
@@ -12636,17 +13126,17 @@
           <a:p>
             <a:r>
               <a:rPr lang="en-US" dirty="0"/>
-              <a:t>More Stuff</a:t>
-            </a:r>
-          </a:p>
-        </p:txBody>
-      </p:sp>
-      <p:sp>
-        <p:nvSpPr>
-          <p:cNvPr id="3" name="Content Placeholder 2">
-            <a:extLst>
-              <a:ext uri="{FF2B5EF4-FFF2-40B4-BE49-F238E27FC236}">
-                <a16:creationId xmlns:a16="http://schemas.microsoft.com/office/drawing/2014/main" id="{584CB90D-C122-4455-AE5C-4D8E92725AE3}"/>
+              <a:t>Here’s our Starting Point</a:t>
+            </a:r>
+          </a:p>
+        </p:txBody>
+      </p:sp>
+      <p:sp>
+        <p:nvSpPr>
+          <p:cNvPr id="4" name="Content Placeholder 3">
+            <a:extLst>
+              <a:ext uri="{FF2B5EF4-FFF2-40B4-BE49-F238E27FC236}">
+                <a16:creationId xmlns:a16="http://schemas.microsoft.com/office/drawing/2014/main" id="{C80A664F-4C2C-4690-BBF4-2158BB0C1FD3}"/>
               </a:ext>
             </a:extLst>
           </p:cNvPr>
@@ -12654,32 +13144,23 @@
             <a:spLocks noGrp="1"/>
           </p:cNvSpPr>
           <p:nvPr>
-            <p:ph sz="quarter" idx="10"/>
+            <p:ph idx="10"/>
           </p:nvPr>
         </p:nvSpPr>
-        <p:spPr/>
+        <p:spPr>
+          <a:xfrm>
+            <a:off x="1979613" y="1447800"/>
+            <a:ext cx="9675812" cy="4648200"/>
+          </a:xfrm>
+        </p:spPr>
         <p:txBody>
           <a:bodyPr/>
           <a:lstStyle/>
           <a:p>
             <a:r>
-              <a:rPr lang="en-US" dirty="0" err="1"/>
-              <a:t>Abc</a:t>
-            </a:r>
-            <a:endParaRPr lang="en-US" dirty="0"/>
-          </a:p>
-          <a:p>
-            <a:r>
               <a:rPr lang="en-US" dirty="0"/>
-              <a:t>Def</a:t>
-            </a:r>
-          </a:p>
-          <a:p>
-            <a:r>
-              <a:rPr lang="en-US" dirty="0" err="1"/>
-              <a:t>Xyz</a:t>
-            </a:r>
-            <a:endParaRPr lang="en-US" dirty="0"/>
+              <a:t>All the code is </a:t>
+            </a:r>
           </a:p>
           <a:p>
             <a:endParaRPr lang="en-US" dirty="0"/>
@@ -12689,7 +13170,7 @@
     </p:spTree>
     <p:extLst>
       <p:ext uri="{BB962C8B-B14F-4D97-AF65-F5344CB8AC3E}">
-        <p14:creationId xmlns:p14="http://schemas.microsoft.com/office/powerpoint/2010/main" val="1859816809"/>
+        <p14:creationId xmlns:p14="http://schemas.microsoft.com/office/powerpoint/2010/main" val="1294155941"/>
       </p:ext>
     </p:extLst>
   </p:cSld>
@@ -12733,7 +13214,7 @@
           <p:cNvPr id="2" name="Title 1">
             <a:extLst>
               <a:ext uri="{FF2B5EF4-FFF2-40B4-BE49-F238E27FC236}">
-                <a16:creationId xmlns:a16="http://schemas.microsoft.com/office/drawing/2014/main" id="{54FD1663-0E26-4E33-8C7F-4D0A34916CAC}"/>
+                <a16:creationId xmlns:a16="http://schemas.microsoft.com/office/drawing/2014/main" id="{B24F4403-470C-4BAD-854A-20B4A7EDD4E1}"/>
               </a:ext>
             </a:extLst>
           </p:cNvPr>
@@ -12741,25 +13222,72 @@
             <a:spLocks noGrp="1"/>
           </p:cNvSpPr>
           <p:nvPr>
-            <p:ph type="ctrTitle"/>
+            <p:ph type="title"/>
           </p:nvPr>
         </p:nvSpPr>
         <p:spPr/>
         <p:txBody>
+          <a:bodyPr>
+            <a:normAutofit fontScale="90000"/>
+          </a:bodyPr>
+          <a:lstStyle/>
+          <a:p>
+            <a:r>
+              <a:rPr lang="en-US" dirty="0"/>
+              <a:t>More Stuff</a:t>
+            </a:r>
+          </a:p>
+        </p:txBody>
+      </p:sp>
+      <p:sp>
+        <p:nvSpPr>
+          <p:cNvPr id="3" name="Content Placeholder 2">
+            <a:extLst>
+              <a:ext uri="{FF2B5EF4-FFF2-40B4-BE49-F238E27FC236}">
+                <a16:creationId xmlns:a16="http://schemas.microsoft.com/office/drawing/2014/main" id="{584CB90D-C122-4455-AE5C-4D8E92725AE3}"/>
+              </a:ext>
+            </a:extLst>
+          </p:cNvPr>
+          <p:cNvSpPr>
+            <a:spLocks noGrp="1"/>
+          </p:cNvSpPr>
+          <p:nvPr>
+            <p:ph sz="quarter" idx="10"/>
+          </p:nvPr>
+        </p:nvSpPr>
+        <p:spPr/>
+        <p:txBody>
           <a:bodyPr/>
           <a:lstStyle/>
           <a:p>
             <a:r>
+              <a:rPr lang="en-US" dirty="0" err="1"/>
+              <a:t>Abc</a:t>
+            </a:r>
+            <a:endParaRPr lang="en-US" dirty="0"/>
+          </a:p>
+          <a:p>
+            <a:r>
               <a:rPr lang="en-US" dirty="0"/>
-              <a:t>Section Heading for Agenda Item #2</a:t>
-            </a:r>
+              <a:t>Def</a:t>
+            </a:r>
+          </a:p>
+          <a:p>
+            <a:r>
+              <a:rPr lang="en-US" dirty="0" err="1"/>
+              <a:t>Xyz</a:t>
+            </a:r>
+            <a:endParaRPr lang="en-US" dirty="0"/>
+          </a:p>
+          <a:p>
+            <a:endParaRPr lang="en-US" dirty="0"/>
           </a:p>
         </p:txBody>
       </p:sp>
     </p:spTree>
     <p:extLst>
       <p:ext uri="{BB962C8B-B14F-4D97-AF65-F5344CB8AC3E}">
-        <p14:creationId xmlns:p14="http://schemas.microsoft.com/office/powerpoint/2010/main" val="3869361077"/>
+        <p14:creationId xmlns:p14="http://schemas.microsoft.com/office/powerpoint/2010/main" val="1859816809"/>
       </p:ext>
     </p:extLst>
   </p:cSld>
@@ -12800,10 +13328,10 @@
       </p:grpSpPr>
       <p:sp>
         <p:nvSpPr>
-          <p:cNvPr id="3" name="Title 2">
-            <a:extLst>
-              <a:ext uri="{FF2B5EF4-FFF2-40B4-BE49-F238E27FC236}">
-                <a16:creationId xmlns:a16="http://schemas.microsoft.com/office/drawing/2014/main" id="{25B867D9-D1FF-4176-8B4C-D87193474447}"/>
+          <p:cNvPr id="2" name="Title 1">
+            <a:extLst>
+              <a:ext uri="{FF2B5EF4-FFF2-40B4-BE49-F238E27FC236}">
+                <a16:creationId xmlns:a16="http://schemas.microsoft.com/office/drawing/2014/main" id="{54FD1663-0E26-4E33-8C7F-4D0A34916CAC}"/>
               </a:ext>
             </a:extLst>
           </p:cNvPr>
@@ -12811,59 +13339,17 @@
             <a:spLocks noGrp="1"/>
           </p:cNvSpPr>
           <p:nvPr>
-            <p:ph type="title"/>
+            <p:ph type="ctrTitle"/>
           </p:nvPr>
         </p:nvSpPr>
         <p:spPr/>
         <p:txBody>
-          <a:bodyPr>
-            <a:normAutofit fontScale="90000"/>
-          </a:bodyPr>
+          <a:bodyPr/>
           <a:lstStyle/>
           <a:p>
             <a:r>
               <a:rPr lang="en-US" dirty="0"/>
-              <a:t>Agenda #2 Title</a:t>
-            </a:r>
-          </a:p>
-        </p:txBody>
-      </p:sp>
-      <p:sp>
-        <p:nvSpPr>
-          <p:cNvPr id="7" name="Content Placeholder 6">
-            <a:extLst>
-              <a:ext uri="{FF2B5EF4-FFF2-40B4-BE49-F238E27FC236}">
-                <a16:creationId xmlns:a16="http://schemas.microsoft.com/office/drawing/2014/main" id="{D0E391EA-1ECC-4EAD-872E-A027BC9E6797}"/>
-              </a:ext>
-            </a:extLst>
-          </p:cNvPr>
-          <p:cNvSpPr>
-            <a:spLocks noGrp="1"/>
-          </p:cNvSpPr>
-          <p:nvPr>
-            <p:ph sz="quarter" idx="10"/>
-          </p:nvPr>
-        </p:nvSpPr>
-        <p:spPr/>
-        <p:txBody>
-          <a:bodyPr/>
-          <a:lstStyle/>
-          <a:p>
-            <a:r>
-              <a:rPr lang="en-US" dirty="0"/>
-              <a:t>Blah</a:t>
-            </a:r>
-          </a:p>
-          <a:p>
-            <a:r>
-              <a:rPr lang="en-US" dirty="0"/>
-              <a:t>Blah</a:t>
-            </a:r>
-          </a:p>
-          <a:p>
-            <a:r>
-              <a:rPr lang="en-US" dirty="0"/>
-              <a:t>Blah</a:t>
+              <a:t>Creating the X# Solution in VS</a:t>
             </a:r>
           </a:p>
         </p:txBody>
@@ -12871,7 +13357,7 @@
     </p:spTree>
     <p:extLst>
       <p:ext uri="{BB962C8B-B14F-4D97-AF65-F5344CB8AC3E}">
-        <p14:creationId xmlns:p14="http://schemas.microsoft.com/office/powerpoint/2010/main" val="1990790040"/>
+        <p14:creationId xmlns:p14="http://schemas.microsoft.com/office/powerpoint/2010/main" val="3869361077"/>
       </p:ext>
     </p:extLst>
   </p:cSld>
@@ -12912,10 +13398,10 @@
       </p:grpSpPr>
       <p:sp>
         <p:nvSpPr>
-          <p:cNvPr id="2" name="Title 1">
-            <a:extLst>
-              <a:ext uri="{FF2B5EF4-FFF2-40B4-BE49-F238E27FC236}">
-                <a16:creationId xmlns:a16="http://schemas.microsoft.com/office/drawing/2014/main" id="{AF5B0393-7C15-4BD5-B1D2-F6E30724F10F}"/>
+          <p:cNvPr id="3" name="Title 2">
+            <a:extLst>
+              <a:ext uri="{FF2B5EF4-FFF2-40B4-BE49-F238E27FC236}">
+                <a16:creationId xmlns:a16="http://schemas.microsoft.com/office/drawing/2014/main" id="{25B867D9-D1FF-4176-8B4C-D87193474447}"/>
               </a:ext>
             </a:extLst>
           </p:cNvPr>
@@ -12935,17 +13421,17 @@
           <a:p>
             <a:r>
               <a:rPr lang="en-US" dirty="0"/>
-              <a:t>More Stuff</a:t>
-            </a:r>
-          </a:p>
-        </p:txBody>
-      </p:sp>
-      <p:sp>
-        <p:nvSpPr>
-          <p:cNvPr id="3" name="Content Placeholder 2">
-            <a:extLst>
-              <a:ext uri="{FF2B5EF4-FFF2-40B4-BE49-F238E27FC236}">
-                <a16:creationId xmlns:a16="http://schemas.microsoft.com/office/drawing/2014/main" id="{23C1287B-C391-4226-BFE8-BB62E96A7839}"/>
+              <a:t>Agenda #2 Title</a:t>
+            </a:r>
+          </a:p>
+        </p:txBody>
+      </p:sp>
+      <p:sp>
+        <p:nvSpPr>
+          <p:cNvPr id="7" name="Content Placeholder 6">
+            <a:extLst>
+              <a:ext uri="{FF2B5EF4-FFF2-40B4-BE49-F238E27FC236}">
+                <a16:creationId xmlns:a16="http://schemas.microsoft.com/office/drawing/2014/main" id="{D0E391EA-1ECC-4EAD-872E-A027BC9E6797}"/>
               </a:ext>
             </a:extLst>
           </p:cNvPr>
@@ -12962,33 +13448,28 @@
           <a:lstStyle/>
           <a:p>
             <a:r>
-              <a:rPr lang="en-US" dirty="0" err="1"/>
-              <a:t>Abc</a:t>
-            </a:r>
-            <a:endParaRPr lang="en-US" dirty="0"/>
-          </a:p>
-          <a:p>
-            <a:r>
               <a:rPr lang="en-US" dirty="0"/>
-              <a:t>Def</a:t>
-            </a:r>
-          </a:p>
-          <a:p>
-            <a:r>
-              <a:rPr lang="en-US" dirty="0" err="1"/>
-              <a:t>Xyz</a:t>
-            </a:r>
-            <a:endParaRPr lang="en-US" dirty="0"/>
-          </a:p>
-          <a:p>
-            <a:endParaRPr lang="en-US" dirty="0"/>
+              <a:t>Blah</a:t>
+            </a:r>
+          </a:p>
+          <a:p>
+            <a:r>
+              <a:rPr lang="en-US" dirty="0"/>
+              <a:t>Blah</a:t>
+            </a:r>
+          </a:p>
+          <a:p>
+            <a:r>
+              <a:rPr lang="en-US" dirty="0"/>
+              <a:t>Blah</a:t>
+            </a:r>
           </a:p>
         </p:txBody>
       </p:sp>
     </p:spTree>
     <p:extLst>
       <p:ext uri="{BB962C8B-B14F-4D97-AF65-F5344CB8AC3E}">
-        <p14:creationId xmlns:p14="http://schemas.microsoft.com/office/powerpoint/2010/main" val="3292209150"/>
+        <p14:creationId xmlns:p14="http://schemas.microsoft.com/office/powerpoint/2010/main" val="1990790040"/>
       </p:ext>
     </p:extLst>
   </p:cSld>
@@ -13820,6 +14301,343 @@
 </file>
 
 <file path=customXml/item1.xml><?xml version="1.0" encoding="utf-8"?>
+<Control xmlns="http://schemas.microsoft.com/VisualStudio/2011/storyboarding/control">
+  <Id Name="3a5f3215-4f7c-4247-9247-a9acf7619a8c" Revision="1" Stencil="System.MyShapes" StencilVersion="1.0"/>
+</Control>
+</file>
+
+<file path=customXml/item10.xml><?xml version="1.0" encoding="utf-8"?>
+<p:properties xmlns:p="http://schemas.microsoft.com/office/2006/metadata/properties" xmlns:xsi="http://www.w3.org/2001/XMLSchema-instance" xmlns:pc="http://schemas.microsoft.com/office/infopath/2007/PartnerControls">
+  <documentManagement>
+    <LocPublishedLinkedAssetsLookup xmlns="4873beb7-5857-4685-be1f-d57550cc96cc" xsi:nil="true"/>
+    <ApprovalStatus xmlns="4873beb7-5857-4685-be1f-d57550cc96cc">InProgress</ApprovalStatus>
+    <MarketSpecific xmlns="4873beb7-5857-4685-be1f-d57550cc96cc">false</MarketSpecific>
+    <LocComments xmlns="4873beb7-5857-4685-be1f-d57550cc96cc" xsi:nil="true"/>
+    <LocLastLocAttemptVersionTypeLookup xmlns="4873beb7-5857-4685-be1f-d57550cc96cc" xsi:nil="true"/>
+    <DirectSourceMarket xmlns="4873beb7-5857-4685-be1f-d57550cc96cc" xsi:nil="true"/>
+    <ThumbnailAssetId xmlns="4873beb7-5857-4685-be1f-d57550cc96cc" xsi:nil="true"/>
+    <PrimaryImageGen xmlns="4873beb7-5857-4685-be1f-d57550cc96cc">false</PrimaryImageGen>
+    <LocNewPublishedVersionLookup xmlns="4873beb7-5857-4685-be1f-d57550cc96cc" xsi:nil="true"/>
+    <LegacyData xmlns="4873beb7-5857-4685-be1f-d57550cc96cc" xsi:nil="true"/>
+    <LocRecommendedHandoff xmlns="4873beb7-5857-4685-be1f-d57550cc96cc" xsi:nil="true"/>
+    <BusinessGroup xmlns="4873beb7-5857-4685-be1f-d57550cc96cc" xsi:nil="true"/>
+    <BlockPublish xmlns="4873beb7-5857-4685-be1f-d57550cc96cc">false</BlockPublish>
+    <TPFriendlyName xmlns="4873beb7-5857-4685-be1f-d57550cc96cc" xsi:nil="true"/>
+    <LocOverallPublishStatusLookup xmlns="4873beb7-5857-4685-be1f-d57550cc96cc" xsi:nil="true"/>
+    <NumericId xmlns="4873beb7-5857-4685-be1f-d57550cc96cc" xsi:nil="true"/>
+    <APEditor xmlns="4873beb7-5857-4685-be1f-d57550cc96cc">
+      <UserInfo>
+        <DisplayName/>
+        <AccountId xsi:nil="true"/>
+        <AccountType/>
+      </UserInfo>
+    </APEditor>
+    <SourceTitle xmlns="4873beb7-5857-4685-be1f-d57550cc96cc" xsi:nil="true"/>
+    <OpenTemplate xmlns="4873beb7-5857-4685-be1f-d57550cc96cc">true</OpenTemplate>
+    <LocOverallLocStatusLookup xmlns="4873beb7-5857-4685-be1f-d57550cc96cc" xsi:nil="true"/>
+    <UALocComments xmlns="4873beb7-5857-4685-be1f-d57550cc96cc" xsi:nil="true"/>
+    <ParentAssetId xmlns="4873beb7-5857-4685-be1f-d57550cc96cc" xsi:nil="true"/>
+    <IntlLangReviewDate xmlns="4873beb7-5857-4685-be1f-d57550cc96cc" xsi:nil="true"/>
+    <FeatureTagsTaxHTField0 xmlns="4873beb7-5857-4685-be1f-d57550cc96cc">
+      <Terms xmlns="http://schemas.microsoft.com/office/infopath/2007/PartnerControls"/>
+    </FeatureTagsTaxHTField0>
+    <PublishStatusLookup xmlns="4873beb7-5857-4685-be1f-d57550cc96cc">
+      <Value>1345039</Value>
+    </PublishStatusLookup>
+    <Providers xmlns="4873beb7-5857-4685-be1f-d57550cc96cc" xsi:nil="true"/>
+    <MachineTranslated xmlns="4873beb7-5857-4685-be1f-d57550cc96cc">false</MachineTranslated>
+    <OriginalSourceMarket xmlns="4873beb7-5857-4685-be1f-d57550cc96cc" xsi:nil="true"/>
+    <APDescription xmlns="4873beb7-5857-4685-be1f-d57550cc96cc">The bookstacks present on most slides  make this a good choice for students, teachers, reading enthusiasts, and others in education. This presentation template contains multiple slide layouts in widescreen format (16x9) and includes a sample table and chart that you can easily  modify.</APDescription>
+    <ClipArtFilename xmlns="4873beb7-5857-4685-be1f-d57550cc96cc" xsi:nil="true"/>
+    <ContentItem xmlns="4873beb7-5857-4685-be1f-d57550cc96cc" xsi:nil="true"/>
+    <TPInstallLocation xmlns="4873beb7-5857-4685-be1f-d57550cc96cc" xsi:nil="true"/>
+    <PublishTargets xmlns="4873beb7-5857-4685-be1f-d57550cc96cc">OfficeOnlineVNext</PublishTargets>
+    <TimesCloned xmlns="4873beb7-5857-4685-be1f-d57550cc96cc" xsi:nil="true"/>
+    <AssetStart xmlns="4873beb7-5857-4685-be1f-d57550cc96cc">2011-11-26T00:00:00+00:00</AssetStart>
+    <Provider xmlns="4873beb7-5857-4685-be1f-d57550cc96cc" xsi:nil="true"/>
+    <AcquiredFrom xmlns="4873beb7-5857-4685-be1f-d57550cc96cc">Internal MS</AcquiredFrom>
+    <FriendlyTitle xmlns="4873beb7-5857-4685-be1f-d57550cc96cc" xsi:nil="true"/>
+    <LastHandOff xmlns="4873beb7-5857-4685-be1f-d57550cc96cc" xsi:nil="true"/>
+    <TPClientViewer xmlns="4873beb7-5857-4685-be1f-d57550cc96cc" xsi:nil="true"/>
+    <TemplateStatus xmlns="4873beb7-5857-4685-be1f-d57550cc96cc">Complete</TemplateStatus>
+    <Downloads xmlns="4873beb7-5857-4685-be1f-d57550cc96cc">0</Downloads>
+    <OOCacheId xmlns="4873beb7-5857-4685-be1f-d57550cc96cc" xsi:nil="true"/>
+    <IsDeleted xmlns="4873beb7-5857-4685-be1f-d57550cc96cc">false</IsDeleted>
+    <LocPublishedDependentAssetsLookup xmlns="4873beb7-5857-4685-be1f-d57550cc96cc" xsi:nil="true"/>
+    <AssetExpire xmlns="4873beb7-5857-4685-be1f-d57550cc96cc">2029-05-12T07:00:00+00:00</AssetExpire>
+    <DSATActionTaken xmlns="4873beb7-5857-4685-be1f-d57550cc96cc" xsi:nil="true"/>
+    <CSXSubmissionMarket xmlns="4873beb7-5857-4685-be1f-d57550cc96cc" xsi:nil="true"/>
+    <TPExecutable xmlns="4873beb7-5857-4685-be1f-d57550cc96cc" xsi:nil="true"/>
+    <EditorialTags xmlns="4873beb7-5857-4685-be1f-d57550cc96cc" xsi:nil="true"/>
+    <SubmitterId xmlns="4873beb7-5857-4685-be1f-d57550cc96cc" xsi:nil="true"/>
+    <ApprovalLog xmlns="4873beb7-5857-4685-be1f-d57550cc96cc" xsi:nil="true"/>
+    <AssetType xmlns="4873beb7-5857-4685-be1f-d57550cc96cc">TP</AssetType>
+    <BugNumber xmlns="4873beb7-5857-4685-be1f-d57550cc96cc" xsi:nil="true"/>
+    <CSXSubmissionDate xmlns="4873beb7-5857-4685-be1f-d57550cc96cc" xsi:nil="true"/>
+    <CSXUpdate xmlns="4873beb7-5857-4685-be1f-d57550cc96cc">false</CSXUpdate>
+    <Milestone xmlns="4873beb7-5857-4685-be1f-d57550cc96cc" xsi:nil="true"/>
+    <RecommendationsModifier xmlns="4873beb7-5857-4685-be1f-d57550cc96cc" xsi:nil="true"/>
+    <OriginAsset xmlns="4873beb7-5857-4685-be1f-d57550cc96cc" xsi:nil="true"/>
+    <TPComponent xmlns="4873beb7-5857-4685-be1f-d57550cc96cc" xsi:nil="true"/>
+    <AssetId xmlns="4873beb7-5857-4685-be1f-d57550cc96cc">TP102787939</AssetId>
+    <IntlLocPriority xmlns="4873beb7-5857-4685-be1f-d57550cc96cc" xsi:nil="true"/>
+    <PolicheckWords xmlns="4873beb7-5857-4685-be1f-d57550cc96cc" xsi:nil="true"/>
+    <TPLaunchHelpLink xmlns="4873beb7-5857-4685-be1f-d57550cc96cc" xsi:nil="true"/>
+    <TPApplication xmlns="4873beb7-5857-4685-be1f-d57550cc96cc" xsi:nil="true"/>
+    <CrawlForDependencies xmlns="4873beb7-5857-4685-be1f-d57550cc96cc">false</CrawlForDependencies>
+    <HandoffToMSDN xmlns="4873beb7-5857-4685-be1f-d57550cc96cc" xsi:nil="true"/>
+    <PlannedPubDate xmlns="4873beb7-5857-4685-be1f-d57550cc96cc" xsi:nil="true"/>
+    <IntlLangReviewer xmlns="4873beb7-5857-4685-be1f-d57550cc96cc" xsi:nil="true"/>
+    <TrustLevel xmlns="4873beb7-5857-4685-be1f-d57550cc96cc">1 Microsoft Managed Content</TrustLevel>
+    <LocLastLocAttemptVersionLookup xmlns="4873beb7-5857-4685-be1f-d57550cc96cc">694216</LocLastLocAttemptVersionLookup>
+    <LocProcessedForHandoffsLookup xmlns="4873beb7-5857-4685-be1f-d57550cc96cc" xsi:nil="true"/>
+    <IsSearchable xmlns="4873beb7-5857-4685-be1f-d57550cc96cc">true</IsSearchable>
+    <TemplateTemplateType xmlns="4873beb7-5857-4685-be1f-d57550cc96cc">PowerPoint Presentation Template</TemplateTemplateType>
+    <CampaignTagsTaxHTField0 xmlns="4873beb7-5857-4685-be1f-d57550cc96cc">
+      <Terms xmlns="http://schemas.microsoft.com/office/infopath/2007/PartnerControls"/>
+    </CampaignTagsTaxHTField0>
+    <TPNamespace xmlns="4873beb7-5857-4685-be1f-d57550cc96cc" xsi:nil="true"/>
+    <LocOverallPreviewStatusLookup xmlns="4873beb7-5857-4685-be1f-d57550cc96cc" xsi:nil="true"/>
+    <TaxCatchAll xmlns="4873beb7-5857-4685-be1f-d57550cc96cc"/>
+    <Markets xmlns="4873beb7-5857-4685-be1f-d57550cc96cc"/>
+    <UAProjectedTotalWords xmlns="4873beb7-5857-4685-be1f-d57550cc96cc" xsi:nil="true"/>
+    <IntlLangReview xmlns="4873beb7-5857-4685-be1f-d57550cc96cc" xsi:nil="true"/>
+    <OutputCachingOn xmlns="4873beb7-5857-4685-be1f-d57550cc96cc">false</OutputCachingOn>
+    <AverageRating xmlns="4873beb7-5857-4685-be1f-d57550cc96cc" xsi:nil="true"/>
+    <APAuthor xmlns="4873beb7-5857-4685-be1f-d57550cc96cc">
+      <UserInfo>
+        <DisplayName>REDMOND\kristaa</DisplayName>
+        <AccountId>136</AccountId>
+        <AccountType/>
+      </UserInfo>
+    </APAuthor>
+    <LocManualTestRequired xmlns="4873beb7-5857-4685-be1f-d57550cc96cc">false</LocManualTestRequired>
+    <TPCommandLine xmlns="4873beb7-5857-4685-be1f-d57550cc96cc" xsi:nil="true"/>
+    <TPAppVersion xmlns="4873beb7-5857-4685-be1f-d57550cc96cc" xsi:nil="true"/>
+    <EditorialStatus xmlns="4873beb7-5857-4685-be1f-d57550cc96cc">Complete</EditorialStatus>
+    <LastModifiedDateTime xmlns="4873beb7-5857-4685-be1f-d57550cc96cc" xsi:nil="true"/>
+    <ScenarioTagsTaxHTField0 xmlns="4873beb7-5857-4685-be1f-d57550cc96cc">
+      <Terms xmlns="http://schemas.microsoft.com/office/infopath/2007/PartnerControls"/>
+    </ScenarioTagsTaxHTField0>
+    <LocProcessedForMarketsLookup xmlns="4873beb7-5857-4685-be1f-d57550cc96cc" xsi:nil="true"/>
+    <TPLaunchHelpLinkType xmlns="4873beb7-5857-4685-be1f-d57550cc96cc">Template</TPLaunchHelpLinkType>
+    <OriginalRelease xmlns="4873beb7-5857-4685-be1f-d57550cc96cc">15</OriginalRelease>
+    <LocalizationTagsTaxHTField0 xmlns="4873beb7-5857-4685-be1f-d57550cc96cc">
+      <Terms xmlns="http://schemas.microsoft.com/office/infopath/2007/PartnerControls"/>
+    </LocalizationTagsTaxHTField0>
+    <UACurrentWords xmlns="4873beb7-5857-4685-be1f-d57550cc96cc" xsi:nil="true"/>
+    <ArtSampleDocs xmlns="4873beb7-5857-4685-be1f-d57550cc96cc" xsi:nil="true"/>
+    <UALocRecommendation xmlns="4873beb7-5857-4685-be1f-d57550cc96cc">Localize</UALocRecommendation>
+    <Manager xmlns="4873beb7-5857-4685-be1f-d57550cc96cc" xsi:nil="true"/>
+    <LocOverallHandbackStatusLookup xmlns="4873beb7-5857-4685-be1f-d57550cc96cc" xsi:nil="true"/>
+    <ShowIn xmlns="4873beb7-5857-4685-be1f-d57550cc96cc">Show everywhere</ShowIn>
+    <UANotes xmlns="4873beb7-5857-4685-be1f-d57550cc96cc" xsi:nil="true"/>
+    <InternalTagsTaxHTField0 xmlns="4873beb7-5857-4685-be1f-d57550cc96cc">
+      <Terms xmlns="http://schemas.microsoft.com/office/infopath/2007/PartnerControls"/>
+    </InternalTagsTaxHTField0>
+    <CSXHash xmlns="4873beb7-5857-4685-be1f-d57550cc96cc" xsi:nil="true"/>
+    <VoteCount xmlns="4873beb7-5857-4685-be1f-d57550cc96cc" xsi:nil="true"/>
+    <LocMarketGroupTiers2 xmlns="4873beb7-5857-4685-be1f-d57550cc96cc" xsi:nil="true"/>
+  </documentManagement>
+</p:properties>
+</file>
+
+<file path=customXml/item11.xml><?xml version="1.0" encoding="utf-8"?>
+<Control xmlns="http://schemas.microsoft.com/VisualStudio/2011/storyboarding/control">
+  <Id Name="37d07999-8e88-45a7-b776-aa394cd3ee89" Revision="1" Stencil="System.MyShapes" StencilVersion="1.0"/>
+</Control>
+</file>
+
+<file path=customXml/item12.xml><?xml version="1.0" encoding="utf-8"?>
+<Control xmlns="http://schemas.microsoft.com/VisualStudio/2011/storyboarding/control">
+  <Id Name="37d07999-8e88-45a7-b776-aa394cd3ee89" Revision="1" Stencil="System.MyShapes" StencilVersion="1.0"/>
+</Control>
+</file>
+
+<file path=customXml/item13.xml><?xml version="1.0" encoding="utf-8"?>
+<Control xmlns="http://schemas.microsoft.com/VisualStudio/2011/storyboarding/control">
+  <Id Name="3a5f3215-4f7c-4247-9247-a9acf7619a8c" Revision="1" Stencil="System.MyShapes" StencilVersion="1.0"/>
+</Control>
+</file>
+
+<file path=customXml/item14.xml><?xml version="1.0" encoding="utf-8"?>
+<Control xmlns="http://schemas.microsoft.com/VisualStudio/2011/storyboarding/control">
+  <Id Name="3a5f3215-4f7c-4247-9247-a9acf7619a8c" Revision="1" Stencil="System.MyShapes" StencilVersion="1.0"/>
+</Control>
+</file>
+
+<file path=customXml/item15.xml><?xml version="1.0" encoding="utf-8"?>
+<Control xmlns="http://schemas.microsoft.com/VisualStudio/2011/storyboarding/control">
+  <Id Name="37d07999-8e88-45a7-b776-aa394cd3ee89" Revision="1" Stencil="System.MyShapes" StencilVersion="1.0"/>
+</Control>
+</file>
+
+<file path=customXml/item16.xml><?xml version="1.0" encoding="utf-8"?>
+<Control xmlns="http://schemas.microsoft.com/VisualStudio/2011/storyboarding/control">
+  <Id Name="3a5f3215-4f7c-4247-9247-a9acf7619a8c" Revision="1" Stencil="System.MyShapes" StencilVersion="1.0"/>
+</Control>
+</file>
+
+<file path=customXml/item17.xml><?xml version="1.0" encoding="utf-8"?>
+<Control xmlns="http://schemas.microsoft.com/VisualStudio/2011/storyboarding/control">
+  <Id Name="3a5f3215-4f7c-4247-9247-a9acf7619a8c" Revision="1" Stencil="System.MyShapes" StencilVersion="1.0"/>
+</Control>
+</file>
+
+<file path=customXml/item18.xml><?xml version="1.0" encoding="utf-8"?>
+<Control xmlns="http://schemas.microsoft.com/VisualStudio/2011/storyboarding/control">
+  <Id Name="37d07999-8e88-45a7-b776-aa394cd3ee89" Revision="1" Stencil="System.MyShapes" StencilVersion="1.0"/>
+</Control>
+</file>
+
+<file path=customXml/item19.xml><?xml version="1.0" encoding="utf-8"?>
+<Control xmlns="http://schemas.microsoft.com/VisualStudio/2011/storyboarding/control">
+  <Id Name="3a5f3215-4f7c-4247-9247-a9acf7619a8c" Revision="1" Stencil="System.MyShapes" StencilVersion="1.0"/>
+</Control>
+</file>
+
+<file path=customXml/item2.xml><?xml version="1.0" encoding="utf-8"?>
+<Control xmlns="http://schemas.microsoft.com/VisualStudio/2011/storyboarding/control">
+  <Id Name="37d07999-8e88-45a7-b776-aa394cd3ee89" Revision="1" Stencil="System.MyShapes" StencilVersion="1.0"/>
+</Control>
+</file>
+
+<file path=customXml/item20.xml><?xml version="1.0" encoding="utf-8"?>
+<Control xmlns="http://schemas.microsoft.com/VisualStudio/2011/storyboarding/control">
+  <Id Name="3a5f3215-4f7c-4247-9247-a9acf7619a8c" Revision="1" Stencil="System.MyShapes" StencilVersion="1.0"/>
+</Control>
+</file>
+
+<file path=customXml/item21.xml><?xml version="1.0" encoding="utf-8"?>
+<Control xmlns="http://schemas.microsoft.com/VisualStudio/2011/storyboarding/control">
+  <Id Name="37d07999-8e88-45a7-b776-aa394cd3ee89" Revision="1" Stencil="System.MyShapes" StencilVersion="1.0"/>
+</Control>
+</file>
+
+<file path=customXml/item22.xml><?xml version="1.0" encoding="utf-8"?>
+<Control xmlns="http://schemas.microsoft.com/VisualStudio/2011/storyboarding/control">
+  <Id Name="3a5f3215-4f7c-4247-9247-a9acf7619a8c" Revision="1" Stencil="System.MyShapes" StencilVersion="1.0"/>
+</Control>
+</file>
+
+<file path=customXml/item23.xml><?xml version="1.0" encoding="utf-8"?>
+<Control xmlns="http://schemas.microsoft.com/VisualStudio/2011/storyboarding/control">
+  <Id Name="3a5f3215-4f7c-4247-9247-a9acf7619a8c" Revision="1" Stencil="System.MyShapes" StencilVersion="1.0"/>
+</Control>
+</file>
+
+<file path=customXml/item24.xml><?xml version="1.0" encoding="utf-8"?>
+<Control xmlns="http://schemas.microsoft.com/VisualStudio/2011/storyboarding/control">
+  <Id Name="3a5f3215-4f7c-4247-9247-a9acf7619a8c" Revision="1" Stencil="System.MyShapes" StencilVersion="1.0"/>
+</Control>
+</file>
+
+<file path=customXml/item25.xml><?xml version="1.0" encoding="utf-8"?>
+<Control xmlns="http://schemas.microsoft.com/VisualStudio/2011/storyboarding/control">
+  <Id Name="37d07999-8e88-45a7-b776-aa394cd3ee89" Revision="1" Stencil="System.MyShapes" StencilVersion="1.0"/>
+</Control>
+</file>
+
+<file path=customXml/item26.xml><?xml version="1.0" encoding="utf-8"?>
+<Control xmlns="http://schemas.microsoft.com/VisualStudio/2011/storyboarding/control">
+  <Id Name="37d07999-8e88-45a7-b776-aa394cd3ee89" Revision="1" Stencil="System.MyShapes" StencilVersion="1.0"/>
+</Control>
+</file>
+
+<file path=customXml/item27.xml><?xml version="1.0" encoding="utf-8"?>
+<Control xmlns="http://schemas.microsoft.com/VisualStudio/2011/storyboarding/control">
+  <Id Name="3a5f3215-4f7c-4247-9247-a9acf7619a8c" Revision="1" Stencil="System.MyShapes" StencilVersion="1.0"/>
+</Control>
+</file>
+
+<file path=customXml/item28.xml><?xml version="1.0" encoding="utf-8"?>
+<Control xmlns="http://schemas.microsoft.com/VisualStudio/2011/storyboarding/control">
+  <Id Name="3a5f3215-4f7c-4247-9247-a9acf7619a8c" Revision="1" Stencil="System.MyShapes" StencilVersion="1.0"/>
+</Control>
+</file>
+
+<file path=customXml/item29.xml><?xml version="1.0" encoding="utf-8"?>
+<Control xmlns="http://schemas.microsoft.com/VisualStudio/2011/storyboarding/control">
+  <Id Name="3a5f3215-4f7c-4247-9247-a9acf7619a8c" Revision="1" Stencil="System.MyShapes" StencilVersion="1.0"/>
+</Control>
+</file>
+
+<file path=customXml/item3.xml><?xml version="1.0" encoding="utf-8"?>
+<Control xmlns="http://schemas.microsoft.com/VisualStudio/2011/storyboarding/control">
+  <Id Name="3a5f3215-4f7c-4247-9247-a9acf7619a8c" Revision="1" Stencil="System.MyShapes" StencilVersion="1.0"/>
+</Control>
+</file>
+
+<file path=customXml/item30.xml><?xml version="1.0" encoding="utf-8"?>
+<Control xmlns="http://schemas.microsoft.com/VisualStudio/2011/storyboarding/control">
+  <Id Name="37d07999-8e88-45a7-b776-aa394cd3ee89" Revision="1" Stencil="System.MyShapes" StencilVersion="1.0"/>
+</Control>
+</file>
+
+<file path=customXml/item31.xml><?xml version="1.0" encoding="utf-8"?>
+<Control xmlns="http://schemas.microsoft.com/VisualStudio/2011/storyboarding/control">
+  <Id Name="3a5f3215-4f7c-4247-9247-a9acf7619a8c" Revision="1" Stencil="System.MyShapes" StencilVersion="1.0"/>
+</Control>
+</file>
+
+<file path=customXml/item32.xml><?xml version="1.0" encoding="utf-8"?>
+<Control xmlns="http://schemas.microsoft.com/VisualStudio/2011/storyboarding/control">
+  <Id Name="3a5f3215-4f7c-4247-9247-a9acf7619a8c" Revision="1" Stencil="System.MyShapes" StencilVersion="1.0"/>
+</Control>
+</file>
+
+<file path=customXml/item33.xml><?xml version="1.0" encoding="utf-8"?>
+<Control xmlns="http://schemas.microsoft.com/VisualStudio/2011/storyboarding/control">
+  <Id Name="37d07999-8e88-45a7-b776-aa394cd3ee89" Revision="1" Stencil="System.MyShapes" StencilVersion="1.0"/>
+</Control>
+</file>
+
+<file path=customXml/item34.xml><?xml version="1.0" encoding="utf-8"?>
+<Control xmlns="http://schemas.microsoft.com/VisualStudio/2011/storyboarding/control">
+  <Id Name="3a5f3215-4f7c-4247-9247-a9acf7619a8c" Revision="1" Stencil="System.MyShapes" StencilVersion="1.0"/>
+</Control>
+</file>
+
+<file path=customXml/item35.xml><?xml version="1.0" encoding="utf-8"?>
+<Control xmlns="http://schemas.microsoft.com/VisualStudio/2011/storyboarding/control">
+  <Id Name="37d07999-8e88-45a7-b776-aa394cd3ee89" Revision="1" Stencil="System.MyShapes" StencilVersion="1.0"/>
+</Control>
+</file>
+
+<file path=customXml/item4.xml><?xml version="1.0" encoding="utf-8"?>
+<?mso-contentType ?>
+<FormTemplates xmlns="http://schemas.microsoft.com/sharepoint/v3/contenttype/forms">
+  <Display>DocumentLibraryForm</Display>
+  <Edit>AssetEditForm</Edit>
+  <New>DocumentLibraryForm</New>
+</FormTemplates>
+</file>
+
+<file path=customXml/item5.xml><?xml version="1.0" encoding="utf-8"?>
+<Control xmlns="http://schemas.microsoft.com/VisualStudio/2011/storyboarding/control">
+  <Id Name="37d07999-8e88-45a7-b776-aa394cd3ee89" Revision="1" Stencil="System.MyShapes" StencilVersion="1.0"/>
+</Control>
+</file>
+
+<file path=customXml/item6.xml><?xml version="1.0" encoding="utf-8"?>
+<Control xmlns="http://schemas.microsoft.com/VisualStudio/2011/storyboarding/control">
+  <Id Name="3a5f3215-4f7c-4247-9247-a9acf7619a8c" Revision="1" Stencil="System.MyShapes" StencilVersion="1.0"/>
+</Control>
+</file>
+
+<file path=customXml/item7.xml><?xml version="1.0" encoding="utf-8"?>
+<Control xmlns="http://schemas.microsoft.com/VisualStudio/2011/storyboarding/control">
+  <Id Name="3a5f3215-4f7c-4247-9247-a9acf7619a8c" Revision="1" Stencil="System.MyShapes" StencilVersion="1.0"/>
+</Control>
+</file>
+
+<file path=customXml/item8.xml><?xml version="1.0" encoding="utf-8"?>
+<Control xmlns="http://schemas.microsoft.com/VisualStudio/2011/storyboarding/control">
+  <Id Name="3a5f3215-4f7c-4247-9247-a9acf7619a8c" Revision="1" Stencil="System.MyShapes" StencilVersion="1.0"/>
+</Control>
+</file>
+
+<file path=customXml/item9.xml><?xml version="1.0" encoding="utf-8"?>
 <ct:contentTypeSchema xmlns:ct="http://schemas.microsoft.com/office/2006/metadata/contentType" xmlns:ma="http://schemas.microsoft.com/office/2006/metadata/properties/metaAttributes" ct:_="" ma:_="" ma:contentTypeName="TemplateFile" ma:contentTypeID="0x0101006EDDDB5EE6D98C44930B742096920B300400F5B6D36B3EF94B4E9A635CDF2A18F5B8" ma:contentTypeVersion="72" ma:contentTypeDescription="Create a new document." ma:contentTypeScope="" ma:versionID="a23e56308344d904b51738559c3d67c9">
   <xsd:schema xmlns:xsd="http://www.w3.org/2001/XMLSchema" xmlns:xs="http://www.w3.org/2001/XMLSchema" xmlns:p="http://schemas.microsoft.com/office/2006/metadata/properties" xmlns:ns2="4873beb7-5857-4685-be1f-d57550cc96cc" targetNamespace="http://schemas.microsoft.com/office/2006/metadata/properties" ma:root="true" ma:fieldsID="cd0908cc4600e77bf5da051303e00c8d" ns2:_="">
     <xsd:import namespace="4873beb7-5857-4685-be1f-d57550cc96cc"/>
@@ -14859,344 +15677,281 @@
 </ct:contentTypeSchema>
 </file>
 
-<file path=customXml/item10.xml><?xml version="1.0" encoding="utf-8"?>
-<Control xmlns="http://schemas.microsoft.com/VisualStudio/2011/storyboarding/control">
-  <Id Name="37d07999-8e88-45a7-b776-aa394cd3ee89" Revision="1" Stencil="System.MyShapes" StencilVersion="1.0"/>
-</Control>
+<file path=customXml/itemProps1.xml><?xml version="1.0" encoding="utf-8"?>
+<ds:datastoreItem xmlns:ds="http://schemas.openxmlformats.org/officeDocument/2006/customXml" ds:itemID="{1F5A8671-688F-418F-87AD-EBAB911812B5}">
+  <ds:schemaRefs>
+    <ds:schemaRef ds:uri="http://schemas.microsoft.com/VisualStudio/2011/storyboarding/control"/>
+  </ds:schemaRefs>
+</ds:datastoreItem>
 </file>
 
-<file path=customXml/item11.xml><?xml version="1.0" encoding="utf-8"?>
-<Control xmlns="http://schemas.microsoft.com/VisualStudio/2011/storyboarding/control">
-  <Id Name="37d07999-8e88-45a7-b776-aa394cd3ee89" Revision="1" Stencil="System.MyShapes" StencilVersion="1.0"/>
-</Control>
+<file path=customXml/itemProps10.xml><?xml version="1.0" encoding="utf-8"?>
+<ds:datastoreItem xmlns:ds="http://schemas.openxmlformats.org/officeDocument/2006/customXml" ds:itemID="{F301D382-32B0-43EE-932C-28906AF37617}">
+  <ds:schemaRefs>
+    <ds:schemaRef ds:uri="http://schemas.microsoft.com/office/2006/metadata/properties"/>
+    <ds:schemaRef ds:uri="http://schemas.microsoft.com/office/infopath/2007/PartnerControls"/>
+    <ds:schemaRef ds:uri="4873beb7-5857-4685-be1f-d57550cc96cc"/>
+  </ds:schemaRefs>
+</ds:datastoreItem>
 </file>
 
-<file path=customXml/item12.xml><?xml version="1.0" encoding="utf-8"?>
-<Control xmlns="http://schemas.microsoft.com/VisualStudio/2011/storyboarding/control">
-  <Id Name="37d07999-8e88-45a7-b776-aa394cd3ee89" Revision="1" Stencil="System.MyShapes" StencilVersion="1.0"/>
-</Control>
+<file path=customXml/itemProps11.xml><?xml version="1.0" encoding="utf-8"?>
+<ds:datastoreItem xmlns:ds="http://schemas.openxmlformats.org/officeDocument/2006/customXml" ds:itemID="{D64DEF83-831D-41CA-B887-8B4678D84355}">
+  <ds:schemaRefs>
+    <ds:schemaRef ds:uri="http://schemas.microsoft.com/VisualStudio/2011/storyboarding/control"/>
+  </ds:schemaRefs>
+</ds:datastoreItem>
 </file>
 
-<file path=customXml/item13.xml><?xml version="1.0" encoding="utf-8"?>
-<Control xmlns="http://schemas.microsoft.com/VisualStudio/2011/storyboarding/control">
-  <Id Name="3a5f3215-4f7c-4247-9247-a9acf7619a8c" Revision="1" Stencil="System.MyShapes" StencilVersion="1.0"/>
-</Control>
+<file path=customXml/itemProps12.xml><?xml version="1.0" encoding="utf-8"?>
+<ds:datastoreItem xmlns:ds="http://schemas.openxmlformats.org/officeDocument/2006/customXml" ds:itemID="{B3671B56-5AB6-40D1-9748-16D9AEAD0962}">
+  <ds:schemaRefs>
+    <ds:schemaRef ds:uri="http://schemas.microsoft.com/VisualStudio/2011/storyboarding/control"/>
+  </ds:schemaRefs>
+</ds:datastoreItem>
 </file>
 
-<file path=customXml/item14.xml><?xml version="1.0" encoding="utf-8"?>
-<Control xmlns="http://schemas.microsoft.com/VisualStudio/2011/storyboarding/control">
-  <Id Name="3a5f3215-4f7c-4247-9247-a9acf7619a8c" Revision="1" Stencil="System.MyShapes" StencilVersion="1.0"/>
-</Control>
+<file path=customXml/itemProps13.xml><?xml version="1.0" encoding="utf-8"?>
+<ds:datastoreItem xmlns:ds="http://schemas.openxmlformats.org/officeDocument/2006/customXml" ds:itemID="{EACA768D-D3F6-4A15-AE55-87B86B85F153}">
+  <ds:schemaRefs>
+    <ds:schemaRef ds:uri="http://schemas.microsoft.com/VisualStudio/2011/storyboarding/control"/>
+  </ds:schemaRefs>
+</ds:datastoreItem>
 </file>
 
-<file path=customXml/item15.xml><?xml version="1.0" encoding="utf-8"?>
-<Control xmlns="http://schemas.microsoft.com/VisualStudio/2011/storyboarding/control">
-  <Id Name="37d07999-8e88-45a7-b776-aa394cd3ee89" Revision="1" Stencil="System.MyShapes" StencilVersion="1.0"/>
-</Control>
+<file path=customXml/itemProps14.xml><?xml version="1.0" encoding="utf-8"?>
+<ds:datastoreItem xmlns:ds="http://schemas.openxmlformats.org/officeDocument/2006/customXml" ds:itemID="{3DCE84C0-C49E-43FD-B3E0-95EA30D6B555}">
+  <ds:schemaRefs>
+    <ds:schemaRef ds:uri="http://schemas.microsoft.com/VisualStudio/2011/storyboarding/control"/>
+  </ds:schemaRefs>
+</ds:datastoreItem>
 </file>
 
-<file path=customXml/item16.xml><?xml version="1.0" encoding="utf-8"?>
-<Control xmlns="http://schemas.microsoft.com/VisualStudio/2011/storyboarding/control">
-  <Id Name="3a5f3215-4f7c-4247-9247-a9acf7619a8c" Revision="1" Stencil="System.MyShapes" StencilVersion="1.0"/>
-</Control>
+<file path=customXml/itemProps15.xml><?xml version="1.0" encoding="utf-8"?>
+<ds:datastoreItem xmlns:ds="http://schemas.openxmlformats.org/officeDocument/2006/customXml" ds:itemID="{E81EC6C6-313F-4420-95BE-F0E8567B4073}">
+  <ds:schemaRefs>
+    <ds:schemaRef ds:uri="http://schemas.microsoft.com/VisualStudio/2011/storyboarding/control"/>
+  </ds:schemaRefs>
+</ds:datastoreItem>
 </file>
 
-<file path=customXml/item17.xml><?xml version="1.0" encoding="utf-8"?>
-<Control xmlns="http://schemas.microsoft.com/VisualStudio/2011/storyboarding/control">
-  <Id Name="3a5f3215-4f7c-4247-9247-a9acf7619a8c" Revision="1" Stencil="System.MyShapes" StencilVersion="1.0"/>
-</Control>
+<file path=customXml/itemProps16.xml><?xml version="1.0" encoding="utf-8"?>
+<ds:datastoreItem xmlns:ds="http://schemas.openxmlformats.org/officeDocument/2006/customXml" ds:itemID="{72561CD2-555C-498E-8707-E7E0AC23D6F7}">
+  <ds:schemaRefs>
+    <ds:schemaRef ds:uri="http://schemas.microsoft.com/VisualStudio/2011/storyboarding/control"/>
+  </ds:schemaRefs>
+</ds:datastoreItem>
 </file>
 
-<file path=customXml/item18.xml><?xml version="1.0" encoding="utf-8"?>
-<Control xmlns="http://schemas.microsoft.com/VisualStudio/2011/storyboarding/control">
-  <Id Name="37d07999-8e88-45a7-b776-aa394cd3ee89" Revision="1" Stencil="System.MyShapes" StencilVersion="1.0"/>
-</Control>
+<file path=customXml/itemProps17.xml><?xml version="1.0" encoding="utf-8"?>
+<ds:datastoreItem xmlns:ds="http://schemas.openxmlformats.org/officeDocument/2006/customXml" ds:itemID="{F37E7FF5-D44D-41C7-A85C-ED0B35DB1B54}">
+  <ds:schemaRefs>
+    <ds:schemaRef ds:uri="http://schemas.microsoft.com/VisualStudio/2011/storyboarding/control"/>
+  </ds:schemaRefs>
+</ds:datastoreItem>
 </file>
 
-<file path=customXml/item19.xml><?xml version="1.0" encoding="utf-8"?>
-<Control xmlns="http://schemas.microsoft.com/VisualStudio/2011/storyboarding/control">
-  <Id Name="3a5f3215-4f7c-4247-9247-a9acf7619a8c" Revision="1" Stencil="System.MyShapes" StencilVersion="1.0"/>
-</Control>
+<file path=customXml/itemProps18.xml><?xml version="1.0" encoding="utf-8"?>
+<ds:datastoreItem xmlns:ds="http://schemas.openxmlformats.org/officeDocument/2006/customXml" ds:itemID="{24248713-04D9-4B55-9B64-290315285C69}">
+  <ds:schemaRefs>
+    <ds:schemaRef ds:uri="http://schemas.microsoft.com/VisualStudio/2011/storyboarding/control"/>
+  </ds:schemaRefs>
+</ds:datastoreItem>
 </file>
 
-<file path=customXml/item2.xml><?xml version="1.0" encoding="utf-8"?>
-<Control xmlns="http://schemas.microsoft.com/VisualStudio/2011/storyboarding/control">
-  <Id Name="37d07999-8e88-45a7-b776-aa394cd3ee89" Revision="1" Stencil="System.MyShapes" StencilVersion="1.0"/>
-</Control>
+<file path=customXml/itemProps19.xml><?xml version="1.0" encoding="utf-8"?>
+<ds:datastoreItem xmlns:ds="http://schemas.openxmlformats.org/officeDocument/2006/customXml" ds:itemID="{0C9D7982-E449-4E88-B30D-029D8CC3261F}">
+  <ds:schemaRefs>
+    <ds:schemaRef ds:uri="http://schemas.microsoft.com/VisualStudio/2011/storyboarding/control"/>
+  </ds:schemaRefs>
+</ds:datastoreItem>
 </file>
 
-<file path=customXml/item20.xml><?xml version="1.0" encoding="utf-8"?>
-<Control xmlns="http://schemas.microsoft.com/VisualStudio/2011/storyboarding/control">
-  <Id Name="3a5f3215-4f7c-4247-9247-a9acf7619a8c" Revision="1" Stencil="System.MyShapes" StencilVersion="1.0"/>
-</Control>
+<file path=customXml/itemProps2.xml><?xml version="1.0" encoding="utf-8"?>
+<ds:datastoreItem xmlns:ds="http://schemas.openxmlformats.org/officeDocument/2006/customXml" ds:itemID="{E1C273FD-24F9-45CA-B498-6393D3AA6D7F}">
+  <ds:schemaRefs>
+    <ds:schemaRef ds:uri="http://schemas.microsoft.com/VisualStudio/2011/storyboarding/control"/>
+  </ds:schemaRefs>
+</ds:datastoreItem>
 </file>
 
-<file path=customXml/item21.xml><?xml version="1.0" encoding="utf-8"?>
-<Control xmlns="http://schemas.microsoft.com/VisualStudio/2011/storyboarding/control">
-  <Id Name="37d07999-8e88-45a7-b776-aa394cd3ee89" Revision="1" Stencil="System.MyShapes" StencilVersion="1.0"/>
-</Control>
+<file path=customXml/itemProps20.xml><?xml version="1.0" encoding="utf-8"?>
+<ds:datastoreItem xmlns:ds="http://schemas.openxmlformats.org/officeDocument/2006/customXml" ds:itemID="{C9624944-4F3E-45E8-8829-37C8DAF54683}">
+  <ds:schemaRefs>
+    <ds:schemaRef ds:uri="http://schemas.microsoft.com/VisualStudio/2011/storyboarding/control"/>
+  </ds:schemaRefs>
+</ds:datastoreItem>
 </file>
 
-<file path=customXml/item22.xml><?xml version="1.0" encoding="utf-8"?>
-<Control xmlns="http://schemas.microsoft.com/VisualStudio/2011/storyboarding/control">
-  <Id Name="3a5f3215-4f7c-4247-9247-a9acf7619a8c" Revision="1" Stencil="System.MyShapes" StencilVersion="1.0"/>
-</Control>
+<file path=customXml/itemProps21.xml><?xml version="1.0" encoding="utf-8"?>
+<ds:datastoreItem xmlns:ds="http://schemas.openxmlformats.org/officeDocument/2006/customXml" ds:itemID="{9BE992AB-AC79-4CFA-8E4D-01B8E612C593}">
+  <ds:schemaRefs>
+    <ds:schemaRef ds:uri="http://schemas.microsoft.com/VisualStudio/2011/storyboarding/control"/>
+  </ds:schemaRefs>
+</ds:datastoreItem>
 </file>
 
-<file path=customXml/item23.xml><?xml version="1.0" encoding="utf-8"?>
-<Control xmlns="http://schemas.microsoft.com/VisualStudio/2011/storyboarding/control">
-  <Id Name="3a5f3215-4f7c-4247-9247-a9acf7619a8c" Revision="1" Stencil="System.MyShapes" StencilVersion="1.0"/>
-</Control>
+<file path=customXml/itemProps22.xml><?xml version="1.0" encoding="utf-8"?>
+<ds:datastoreItem xmlns:ds="http://schemas.openxmlformats.org/officeDocument/2006/customXml" ds:itemID="{B93E3EFA-D9D3-4448-BC21-BB6156158366}">
+  <ds:schemaRefs>
+    <ds:schemaRef ds:uri="http://schemas.microsoft.com/VisualStudio/2011/storyboarding/control"/>
+  </ds:schemaRefs>
+</ds:datastoreItem>
 </file>
 
-<file path=customXml/item24.xml><?xml version="1.0" encoding="utf-8"?>
-<Control xmlns="http://schemas.microsoft.com/VisualStudio/2011/storyboarding/control">
-  <Id Name="37d07999-8e88-45a7-b776-aa394cd3ee89" Revision="1" Stencil="System.MyShapes" StencilVersion="1.0"/>
-</Control>
+<file path=customXml/itemProps23.xml><?xml version="1.0" encoding="utf-8"?>
+<ds:datastoreItem xmlns:ds="http://schemas.openxmlformats.org/officeDocument/2006/customXml" ds:itemID="{C6026F5C-553B-4AEF-A946-FF60FDFF7695}">
+  <ds:schemaRefs>
+    <ds:schemaRef ds:uri="http://schemas.microsoft.com/VisualStudio/2011/storyboarding/control"/>
+  </ds:schemaRefs>
+</ds:datastoreItem>
 </file>
 
-<file path=customXml/item25.xml><?xml version="1.0" encoding="utf-8"?>
-<Control xmlns="http://schemas.microsoft.com/VisualStudio/2011/storyboarding/control">
-  <Id Name="3a5f3215-4f7c-4247-9247-a9acf7619a8c" Revision="1" Stencil="System.MyShapes" StencilVersion="1.0"/>
-</Control>
+<file path=customXml/itemProps24.xml><?xml version="1.0" encoding="utf-8"?>
+<ds:datastoreItem xmlns:ds="http://schemas.openxmlformats.org/officeDocument/2006/customXml" ds:itemID="{703D5DC7-4616-43D3-84A1-089DFA00F45E}">
+  <ds:schemaRefs>
+    <ds:schemaRef ds:uri="http://schemas.microsoft.com/VisualStudio/2011/storyboarding/control"/>
+  </ds:schemaRefs>
+</ds:datastoreItem>
 </file>
 
-<file path=customXml/item26.xml><?xml version="1.0" encoding="utf-8"?>
-<Control xmlns="http://schemas.microsoft.com/VisualStudio/2011/storyboarding/control">
-  <Id Name="3a5f3215-4f7c-4247-9247-a9acf7619a8c" Revision="1" Stencil="System.MyShapes" StencilVersion="1.0"/>
-</Control>
+<file path=customXml/itemProps25.xml><?xml version="1.0" encoding="utf-8"?>
+<ds:datastoreItem xmlns:ds="http://schemas.openxmlformats.org/officeDocument/2006/customXml" ds:itemID="{56D5947B-D538-4E10-AB7C-984491B58DE1}">
+  <ds:schemaRefs>
+    <ds:schemaRef ds:uri="http://schemas.microsoft.com/VisualStudio/2011/storyboarding/control"/>
+  </ds:schemaRefs>
+</ds:datastoreItem>
 </file>
 
-<file path=customXml/item27.xml><?xml version="1.0" encoding="utf-8"?>
-<Control xmlns="http://schemas.microsoft.com/VisualStudio/2011/storyboarding/control">
-  <Id Name="37d07999-8e88-45a7-b776-aa394cd3ee89" Revision="1" Stencil="System.MyShapes" StencilVersion="1.0"/>
-</Control>
+<file path=customXml/itemProps26.xml><?xml version="1.0" encoding="utf-8"?>
+<ds:datastoreItem xmlns:ds="http://schemas.openxmlformats.org/officeDocument/2006/customXml" ds:itemID="{1C519524-8703-4E59-AB9B-4A5A7263BA01}">
+  <ds:schemaRefs>
+    <ds:schemaRef ds:uri="http://schemas.microsoft.com/VisualStudio/2011/storyboarding/control"/>
+  </ds:schemaRefs>
+</ds:datastoreItem>
 </file>
 
-<file path=customXml/item28.xml><?xml version="1.0" encoding="utf-8"?>
-<Control xmlns="http://schemas.microsoft.com/VisualStudio/2011/storyboarding/control">
-  <Id Name="3a5f3215-4f7c-4247-9247-a9acf7619a8c" Revision="1" Stencil="System.MyShapes" StencilVersion="1.0"/>
-</Control>
+<file path=customXml/itemProps27.xml><?xml version="1.0" encoding="utf-8"?>
+<ds:datastoreItem xmlns:ds="http://schemas.openxmlformats.org/officeDocument/2006/customXml" ds:itemID="{A449BAC2-0751-46E4-958E-F0D2B9AA6981}">
+  <ds:schemaRefs>
+    <ds:schemaRef ds:uri="http://schemas.microsoft.com/VisualStudio/2011/storyboarding/control"/>
+  </ds:schemaRefs>
+</ds:datastoreItem>
 </file>
 
-<file path=customXml/item29.xml><?xml version="1.0" encoding="utf-8"?>
-<Control xmlns="http://schemas.microsoft.com/VisualStudio/2011/storyboarding/control">
-  <Id Name="3a5f3215-4f7c-4247-9247-a9acf7619a8c" Revision="1" Stencil="System.MyShapes" StencilVersion="1.0"/>
-</Control>
+<file path=customXml/itemProps28.xml><?xml version="1.0" encoding="utf-8"?>
+<ds:datastoreItem xmlns:ds="http://schemas.openxmlformats.org/officeDocument/2006/customXml" ds:itemID="{F8B7C765-2F36-4486-9DE5-D0E485AFE8E4}">
+  <ds:schemaRefs>
+    <ds:schemaRef ds:uri="http://schemas.microsoft.com/VisualStudio/2011/storyboarding/control"/>
+  </ds:schemaRefs>
+</ds:datastoreItem>
 </file>
 
-<file path=customXml/item3.xml><?xml version="1.0" encoding="utf-8"?>
-<Control xmlns="http://schemas.microsoft.com/VisualStudio/2011/storyboarding/control">
-  <Id Name="3a5f3215-4f7c-4247-9247-a9acf7619a8c" Revision="1" Stencil="System.MyShapes" StencilVersion="1.0"/>
-</Control>
+<file path=customXml/itemProps29.xml><?xml version="1.0" encoding="utf-8"?>
+<ds:datastoreItem xmlns:ds="http://schemas.openxmlformats.org/officeDocument/2006/customXml" ds:itemID="{424F15E0-202D-4292-9536-B4298F98D690}">
+  <ds:schemaRefs>
+    <ds:schemaRef ds:uri="http://schemas.microsoft.com/VisualStudio/2011/storyboarding/control"/>
+  </ds:schemaRefs>
+</ds:datastoreItem>
 </file>
 
-<file path=customXml/item30.xml><?xml version="1.0" encoding="utf-8"?>
-<Control xmlns="http://schemas.microsoft.com/VisualStudio/2011/storyboarding/control">
-  <Id Name="37d07999-8e88-45a7-b776-aa394cd3ee89" Revision="1" Stencil="System.MyShapes" StencilVersion="1.0"/>
-</Control>
+<file path=customXml/itemProps3.xml><?xml version="1.0" encoding="utf-8"?>
+<ds:datastoreItem xmlns:ds="http://schemas.openxmlformats.org/officeDocument/2006/customXml" ds:itemID="{E8F86DD1-857D-4AA1-B615-777BBB99609C}">
+  <ds:schemaRefs>
+    <ds:schemaRef ds:uri="http://schemas.microsoft.com/VisualStudio/2011/storyboarding/control"/>
+  </ds:schemaRefs>
+</ds:datastoreItem>
 </file>
 
-<file path=customXml/item31.xml><?xml version="1.0" encoding="utf-8"?>
-<Control xmlns="http://schemas.microsoft.com/VisualStudio/2011/storyboarding/control">
-  <Id Name="3a5f3215-4f7c-4247-9247-a9acf7619a8c" Revision="1" Stencil="System.MyShapes" StencilVersion="1.0"/>
-</Control>
+<file path=customXml/itemProps30.xml><?xml version="1.0" encoding="utf-8"?>
+<ds:datastoreItem xmlns:ds="http://schemas.openxmlformats.org/officeDocument/2006/customXml" ds:itemID="{BF220CCF-993E-43A0-9212-BB380CAF8162}">
+  <ds:schemaRefs>
+    <ds:schemaRef ds:uri="http://schemas.microsoft.com/VisualStudio/2011/storyboarding/control"/>
+  </ds:schemaRefs>
+</ds:datastoreItem>
 </file>
 
-<file path=customXml/item32.xml><?xml version="1.0" encoding="utf-8"?>
-<Control xmlns="http://schemas.microsoft.com/VisualStudio/2011/storyboarding/control">
-  <Id Name="3a5f3215-4f7c-4247-9247-a9acf7619a8c" Revision="1" Stencil="System.MyShapes" StencilVersion="1.0"/>
-</Control>
+<file path=customXml/itemProps31.xml><?xml version="1.0" encoding="utf-8"?>
+<ds:datastoreItem xmlns:ds="http://schemas.openxmlformats.org/officeDocument/2006/customXml" ds:itemID="{6F3822C3-EEBF-463B-A843-8264A05022FC}">
+  <ds:schemaRefs>
+    <ds:schemaRef ds:uri="http://schemas.microsoft.com/VisualStudio/2011/storyboarding/control"/>
+  </ds:schemaRefs>
+</ds:datastoreItem>
 </file>
 
-<file path=customXml/item33.xml><?xml version="1.0" encoding="utf-8"?>
-<Control xmlns="http://schemas.microsoft.com/VisualStudio/2011/storyboarding/control">
-  <Id Name="37d07999-8e88-45a7-b776-aa394cd3ee89" Revision="1" Stencil="System.MyShapes" StencilVersion="1.0"/>
-</Control>
+<file path=customXml/itemProps32.xml><?xml version="1.0" encoding="utf-8"?>
+<ds:datastoreItem xmlns:ds="http://schemas.openxmlformats.org/officeDocument/2006/customXml" ds:itemID="{0BFC68A0-F33C-4D0A-8B07-0BF6B29C698E}">
+  <ds:schemaRefs>
+    <ds:schemaRef ds:uri="http://schemas.microsoft.com/VisualStudio/2011/storyboarding/control"/>
+  </ds:schemaRefs>
+</ds:datastoreItem>
 </file>
 
-<file path=customXml/item34.xml><?xml version="1.0" encoding="utf-8"?>
-<Control xmlns="http://schemas.microsoft.com/VisualStudio/2011/storyboarding/control">
-  <Id Name="3a5f3215-4f7c-4247-9247-a9acf7619a8c" Revision="1" Stencil="System.MyShapes" StencilVersion="1.0"/>
-</Control>
+<file path=customXml/itemProps33.xml><?xml version="1.0" encoding="utf-8"?>
+<ds:datastoreItem xmlns:ds="http://schemas.openxmlformats.org/officeDocument/2006/customXml" ds:itemID="{15FBB92F-9753-43F3-AE00-0E261CE62CA8}">
+  <ds:schemaRefs>
+    <ds:schemaRef ds:uri="http://schemas.microsoft.com/VisualStudio/2011/storyboarding/control"/>
+  </ds:schemaRefs>
+</ds:datastoreItem>
 </file>
 
-<file path=customXml/item35.xml><?xml version="1.0" encoding="utf-8"?>
-<Control xmlns="http://schemas.microsoft.com/VisualStudio/2011/storyboarding/control">
-  <Id Name="3a5f3215-4f7c-4247-9247-a9acf7619a8c" Revision="1" Stencil="System.MyShapes" StencilVersion="1.0"/>
-</Control>
+<file path=customXml/itemProps34.xml><?xml version="1.0" encoding="utf-8"?>
+<ds:datastoreItem xmlns:ds="http://schemas.openxmlformats.org/officeDocument/2006/customXml" ds:itemID="{E8627265-8428-4117-A97B-61BC0B24BAEF}">
+  <ds:schemaRefs>
+    <ds:schemaRef ds:uri="http://schemas.microsoft.com/VisualStudio/2011/storyboarding/control"/>
+  </ds:schemaRefs>
+</ds:datastoreItem>
 </file>
 
-<file path=customXml/item4.xml><?xml version="1.0" encoding="utf-8"?>
-<Control xmlns="http://schemas.microsoft.com/VisualStudio/2011/storyboarding/control">
-  <Id Name="37d07999-8e88-45a7-b776-aa394cd3ee89" Revision="1" Stencil="System.MyShapes" StencilVersion="1.0"/>
-</Control>
+<file path=customXml/itemProps35.xml><?xml version="1.0" encoding="utf-8"?>
+<ds:datastoreItem xmlns:ds="http://schemas.openxmlformats.org/officeDocument/2006/customXml" ds:itemID="{ACA1E08C-925C-4F09-8122-887C405DAD0E}">
+  <ds:schemaRefs>
+    <ds:schemaRef ds:uri="http://schemas.microsoft.com/VisualStudio/2011/storyboarding/control"/>
+  </ds:schemaRefs>
+</ds:datastoreItem>
 </file>
 
-<file path=customXml/item5.xml><?xml version="1.0" encoding="utf-8"?>
-<Control xmlns="http://schemas.microsoft.com/VisualStudio/2011/storyboarding/control">
-  <Id Name="3a5f3215-4f7c-4247-9247-a9acf7619a8c" Revision="1" Stencil="System.MyShapes" StencilVersion="1.0"/>
-</Control>
+<file path=customXml/itemProps4.xml><?xml version="1.0" encoding="utf-8"?>
+<ds:datastoreItem xmlns:ds="http://schemas.openxmlformats.org/officeDocument/2006/customXml" ds:itemID="{E1B558C7-619B-49BE-9097-7FCBDADD4ECE}">
+  <ds:schemaRefs>
+    <ds:schemaRef ds:uri="http://schemas.microsoft.com/sharepoint/v3/contenttype/forms"/>
+  </ds:schemaRefs>
+</ds:datastoreItem>
 </file>
 
-<file path=customXml/item6.xml><?xml version="1.0" encoding="utf-8"?>
-<p:properties xmlns:p="http://schemas.microsoft.com/office/2006/metadata/properties" xmlns:xsi="http://www.w3.org/2001/XMLSchema-instance" xmlns:pc="http://schemas.microsoft.com/office/infopath/2007/PartnerControls">
-  <documentManagement>
-    <LocPublishedLinkedAssetsLookup xmlns="4873beb7-5857-4685-be1f-d57550cc96cc" xsi:nil="true"/>
-    <ApprovalStatus xmlns="4873beb7-5857-4685-be1f-d57550cc96cc">InProgress</ApprovalStatus>
-    <MarketSpecific xmlns="4873beb7-5857-4685-be1f-d57550cc96cc">false</MarketSpecific>
-    <LocComments xmlns="4873beb7-5857-4685-be1f-d57550cc96cc" xsi:nil="true"/>
-    <LocLastLocAttemptVersionTypeLookup xmlns="4873beb7-5857-4685-be1f-d57550cc96cc" xsi:nil="true"/>
-    <DirectSourceMarket xmlns="4873beb7-5857-4685-be1f-d57550cc96cc" xsi:nil="true"/>
-    <ThumbnailAssetId xmlns="4873beb7-5857-4685-be1f-d57550cc96cc" xsi:nil="true"/>
-    <PrimaryImageGen xmlns="4873beb7-5857-4685-be1f-d57550cc96cc">false</PrimaryImageGen>
-    <LocNewPublishedVersionLookup xmlns="4873beb7-5857-4685-be1f-d57550cc96cc" xsi:nil="true"/>
-    <LegacyData xmlns="4873beb7-5857-4685-be1f-d57550cc96cc" xsi:nil="true"/>
-    <LocRecommendedHandoff xmlns="4873beb7-5857-4685-be1f-d57550cc96cc" xsi:nil="true"/>
-    <BusinessGroup xmlns="4873beb7-5857-4685-be1f-d57550cc96cc" xsi:nil="true"/>
-    <BlockPublish xmlns="4873beb7-5857-4685-be1f-d57550cc96cc">false</BlockPublish>
-    <TPFriendlyName xmlns="4873beb7-5857-4685-be1f-d57550cc96cc" xsi:nil="true"/>
-    <LocOverallPublishStatusLookup xmlns="4873beb7-5857-4685-be1f-d57550cc96cc" xsi:nil="true"/>
-    <NumericId xmlns="4873beb7-5857-4685-be1f-d57550cc96cc" xsi:nil="true"/>
-    <APEditor xmlns="4873beb7-5857-4685-be1f-d57550cc96cc">
-      <UserInfo>
-        <DisplayName/>
-        <AccountId xsi:nil="true"/>
-        <AccountType/>
-      </UserInfo>
-    </APEditor>
-    <SourceTitle xmlns="4873beb7-5857-4685-be1f-d57550cc96cc" xsi:nil="true"/>
-    <OpenTemplate xmlns="4873beb7-5857-4685-be1f-d57550cc96cc">true</OpenTemplate>
-    <LocOverallLocStatusLookup xmlns="4873beb7-5857-4685-be1f-d57550cc96cc" xsi:nil="true"/>
-    <UALocComments xmlns="4873beb7-5857-4685-be1f-d57550cc96cc" xsi:nil="true"/>
-    <ParentAssetId xmlns="4873beb7-5857-4685-be1f-d57550cc96cc" xsi:nil="true"/>
-    <IntlLangReviewDate xmlns="4873beb7-5857-4685-be1f-d57550cc96cc" xsi:nil="true"/>
-    <FeatureTagsTaxHTField0 xmlns="4873beb7-5857-4685-be1f-d57550cc96cc">
-      <Terms xmlns="http://schemas.microsoft.com/office/infopath/2007/PartnerControls"/>
-    </FeatureTagsTaxHTField0>
-    <PublishStatusLookup xmlns="4873beb7-5857-4685-be1f-d57550cc96cc">
-      <Value>1345039</Value>
-    </PublishStatusLookup>
-    <Providers xmlns="4873beb7-5857-4685-be1f-d57550cc96cc" xsi:nil="true"/>
-    <MachineTranslated xmlns="4873beb7-5857-4685-be1f-d57550cc96cc">false</MachineTranslated>
-    <OriginalSourceMarket xmlns="4873beb7-5857-4685-be1f-d57550cc96cc" xsi:nil="true"/>
-    <APDescription xmlns="4873beb7-5857-4685-be1f-d57550cc96cc">The bookstacks present on most slides  make this a good choice for students, teachers, reading enthusiasts, and others in education. This presentation template contains multiple slide layouts in widescreen format (16x9) and includes a sample table and chart that you can easily  modify.</APDescription>
-    <ClipArtFilename xmlns="4873beb7-5857-4685-be1f-d57550cc96cc" xsi:nil="true"/>
-    <ContentItem xmlns="4873beb7-5857-4685-be1f-d57550cc96cc" xsi:nil="true"/>
-    <TPInstallLocation xmlns="4873beb7-5857-4685-be1f-d57550cc96cc" xsi:nil="true"/>
-    <PublishTargets xmlns="4873beb7-5857-4685-be1f-d57550cc96cc">OfficeOnlineVNext</PublishTargets>
-    <TimesCloned xmlns="4873beb7-5857-4685-be1f-d57550cc96cc" xsi:nil="true"/>
-    <AssetStart xmlns="4873beb7-5857-4685-be1f-d57550cc96cc">2011-11-26T00:00:00+00:00</AssetStart>
-    <Provider xmlns="4873beb7-5857-4685-be1f-d57550cc96cc" xsi:nil="true"/>
-    <AcquiredFrom xmlns="4873beb7-5857-4685-be1f-d57550cc96cc">Internal MS</AcquiredFrom>
-    <FriendlyTitle xmlns="4873beb7-5857-4685-be1f-d57550cc96cc" xsi:nil="true"/>
-    <LastHandOff xmlns="4873beb7-5857-4685-be1f-d57550cc96cc" xsi:nil="true"/>
-    <TPClientViewer xmlns="4873beb7-5857-4685-be1f-d57550cc96cc" xsi:nil="true"/>
-    <TemplateStatus xmlns="4873beb7-5857-4685-be1f-d57550cc96cc">Complete</TemplateStatus>
-    <Downloads xmlns="4873beb7-5857-4685-be1f-d57550cc96cc">0</Downloads>
-    <OOCacheId xmlns="4873beb7-5857-4685-be1f-d57550cc96cc" xsi:nil="true"/>
-    <IsDeleted xmlns="4873beb7-5857-4685-be1f-d57550cc96cc">false</IsDeleted>
-    <LocPublishedDependentAssetsLookup xmlns="4873beb7-5857-4685-be1f-d57550cc96cc" xsi:nil="true"/>
-    <AssetExpire xmlns="4873beb7-5857-4685-be1f-d57550cc96cc">2029-05-12T07:00:00+00:00</AssetExpire>
-    <DSATActionTaken xmlns="4873beb7-5857-4685-be1f-d57550cc96cc" xsi:nil="true"/>
-    <CSXSubmissionMarket xmlns="4873beb7-5857-4685-be1f-d57550cc96cc" xsi:nil="true"/>
-    <TPExecutable xmlns="4873beb7-5857-4685-be1f-d57550cc96cc" xsi:nil="true"/>
-    <EditorialTags xmlns="4873beb7-5857-4685-be1f-d57550cc96cc" xsi:nil="true"/>
-    <SubmitterId xmlns="4873beb7-5857-4685-be1f-d57550cc96cc" xsi:nil="true"/>
-    <ApprovalLog xmlns="4873beb7-5857-4685-be1f-d57550cc96cc" xsi:nil="true"/>
-    <AssetType xmlns="4873beb7-5857-4685-be1f-d57550cc96cc">TP</AssetType>
-    <BugNumber xmlns="4873beb7-5857-4685-be1f-d57550cc96cc" xsi:nil="true"/>
-    <CSXSubmissionDate xmlns="4873beb7-5857-4685-be1f-d57550cc96cc" xsi:nil="true"/>
-    <CSXUpdate xmlns="4873beb7-5857-4685-be1f-d57550cc96cc">false</CSXUpdate>
-    <Milestone xmlns="4873beb7-5857-4685-be1f-d57550cc96cc" xsi:nil="true"/>
-    <RecommendationsModifier xmlns="4873beb7-5857-4685-be1f-d57550cc96cc" xsi:nil="true"/>
-    <OriginAsset xmlns="4873beb7-5857-4685-be1f-d57550cc96cc" xsi:nil="true"/>
-    <TPComponent xmlns="4873beb7-5857-4685-be1f-d57550cc96cc" xsi:nil="true"/>
-    <AssetId xmlns="4873beb7-5857-4685-be1f-d57550cc96cc">TP102787939</AssetId>
-    <IntlLocPriority xmlns="4873beb7-5857-4685-be1f-d57550cc96cc" xsi:nil="true"/>
-    <PolicheckWords xmlns="4873beb7-5857-4685-be1f-d57550cc96cc" xsi:nil="true"/>
-    <TPLaunchHelpLink xmlns="4873beb7-5857-4685-be1f-d57550cc96cc" xsi:nil="true"/>
-    <TPApplication xmlns="4873beb7-5857-4685-be1f-d57550cc96cc" xsi:nil="true"/>
-    <CrawlForDependencies xmlns="4873beb7-5857-4685-be1f-d57550cc96cc">false</CrawlForDependencies>
-    <HandoffToMSDN xmlns="4873beb7-5857-4685-be1f-d57550cc96cc" xsi:nil="true"/>
-    <PlannedPubDate xmlns="4873beb7-5857-4685-be1f-d57550cc96cc" xsi:nil="true"/>
-    <IntlLangReviewer xmlns="4873beb7-5857-4685-be1f-d57550cc96cc" xsi:nil="true"/>
-    <TrustLevel xmlns="4873beb7-5857-4685-be1f-d57550cc96cc">1 Microsoft Managed Content</TrustLevel>
-    <LocLastLocAttemptVersionLookup xmlns="4873beb7-5857-4685-be1f-d57550cc96cc">694216</LocLastLocAttemptVersionLookup>
-    <LocProcessedForHandoffsLookup xmlns="4873beb7-5857-4685-be1f-d57550cc96cc" xsi:nil="true"/>
-    <IsSearchable xmlns="4873beb7-5857-4685-be1f-d57550cc96cc">true</IsSearchable>
-    <TemplateTemplateType xmlns="4873beb7-5857-4685-be1f-d57550cc96cc">PowerPoint Presentation Template</TemplateTemplateType>
-    <CampaignTagsTaxHTField0 xmlns="4873beb7-5857-4685-be1f-d57550cc96cc">
-      <Terms xmlns="http://schemas.microsoft.com/office/infopath/2007/PartnerControls"/>
-    </CampaignTagsTaxHTField0>
-    <TPNamespace xmlns="4873beb7-5857-4685-be1f-d57550cc96cc" xsi:nil="true"/>
-    <LocOverallPreviewStatusLookup xmlns="4873beb7-5857-4685-be1f-d57550cc96cc" xsi:nil="true"/>
-    <TaxCatchAll xmlns="4873beb7-5857-4685-be1f-d57550cc96cc"/>
-    <Markets xmlns="4873beb7-5857-4685-be1f-d57550cc96cc"/>
-    <UAProjectedTotalWords xmlns="4873beb7-5857-4685-be1f-d57550cc96cc" xsi:nil="true"/>
-    <IntlLangReview xmlns="4873beb7-5857-4685-be1f-d57550cc96cc" xsi:nil="true"/>
-    <OutputCachingOn xmlns="4873beb7-5857-4685-be1f-d57550cc96cc">false</OutputCachingOn>
-    <AverageRating xmlns="4873beb7-5857-4685-be1f-d57550cc96cc" xsi:nil="true"/>
-    <APAuthor xmlns="4873beb7-5857-4685-be1f-d57550cc96cc">
-      <UserInfo>
-        <DisplayName>REDMOND\kristaa</DisplayName>
-        <AccountId>136</AccountId>
-        <AccountType/>
-      </UserInfo>
-    </APAuthor>
-    <LocManualTestRequired xmlns="4873beb7-5857-4685-be1f-d57550cc96cc">false</LocManualTestRequired>
-    <TPCommandLine xmlns="4873beb7-5857-4685-be1f-d57550cc96cc" xsi:nil="true"/>
-    <TPAppVersion xmlns="4873beb7-5857-4685-be1f-d57550cc96cc" xsi:nil="true"/>
-    <EditorialStatus xmlns="4873beb7-5857-4685-be1f-d57550cc96cc">Complete</EditorialStatus>
-    <LastModifiedDateTime xmlns="4873beb7-5857-4685-be1f-d57550cc96cc" xsi:nil="true"/>
-    <ScenarioTagsTaxHTField0 xmlns="4873beb7-5857-4685-be1f-d57550cc96cc">
-      <Terms xmlns="http://schemas.microsoft.com/office/infopath/2007/PartnerControls"/>
-    </ScenarioTagsTaxHTField0>
-    <LocProcessedForMarketsLookup xmlns="4873beb7-5857-4685-be1f-d57550cc96cc" xsi:nil="true"/>
-    <TPLaunchHelpLinkType xmlns="4873beb7-5857-4685-be1f-d57550cc96cc">Template</TPLaunchHelpLinkType>
-    <OriginalRelease xmlns="4873beb7-5857-4685-be1f-d57550cc96cc">15</OriginalRelease>
-    <LocalizationTagsTaxHTField0 xmlns="4873beb7-5857-4685-be1f-d57550cc96cc">
-      <Terms xmlns="http://schemas.microsoft.com/office/infopath/2007/PartnerControls"/>
-    </LocalizationTagsTaxHTField0>
-    <UACurrentWords xmlns="4873beb7-5857-4685-be1f-d57550cc96cc" xsi:nil="true"/>
-    <ArtSampleDocs xmlns="4873beb7-5857-4685-be1f-d57550cc96cc" xsi:nil="true"/>
-    <UALocRecommendation xmlns="4873beb7-5857-4685-be1f-d57550cc96cc">Localize</UALocRecommendation>
-    <Manager xmlns="4873beb7-5857-4685-be1f-d57550cc96cc" xsi:nil="true"/>
-    <LocOverallHandbackStatusLookup xmlns="4873beb7-5857-4685-be1f-d57550cc96cc" xsi:nil="true"/>
-    <ShowIn xmlns="4873beb7-5857-4685-be1f-d57550cc96cc">Show everywhere</ShowIn>
-    <UANotes xmlns="4873beb7-5857-4685-be1f-d57550cc96cc" xsi:nil="true"/>
-    <InternalTagsTaxHTField0 xmlns="4873beb7-5857-4685-be1f-d57550cc96cc">
-      <Terms xmlns="http://schemas.microsoft.com/office/infopath/2007/PartnerControls"/>
-    </InternalTagsTaxHTField0>
-    <CSXHash xmlns="4873beb7-5857-4685-be1f-d57550cc96cc" xsi:nil="true"/>
-    <VoteCount xmlns="4873beb7-5857-4685-be1f-d57550cc96cc" xsi:nil="true"/>
-    <LocMarketGroupTiers2 xmlns="4873beb7-5857-4685-be1f-d57550cc96cc" xsi:nil="true"/>
-  </documentManagement>
-</p:properties>
+<file path=customXml/itemProps5.xml><?xml version="1.0" encoding="utf-8"?>
+<ds:datastoreItem xmlns:ds="http://schemas.openxmlformats.org/officeDocument/2006/customXml" ds:itemID="{7CC5A912-861C-4DE5-A79D-195E5086349C}">
+  <ds:schemaRefs>
+    <ds:schemaRef ds:uri="http://schemas.microsoft.com/VisualStudio/2011/storyboarding/control"/>
+  </ds:schemaRefs>
+</ds:datastoreItem>
 </file>
 
-<file path=customXml/item7.xml><?xml version="1.0" encoding="utf-8"?>
-<?mso-contentType ?>
-<FormTemplates xmlns="http://schemas.microsoft.com/sharepoint/v3/contenttype/forms">
-  <Display>DocumentLibraryForm</Display>
-  <Edit>AssetEditForm</Edit>
-  <New>DocumentLibraryForm</New>
-</FormTemplates>
+<file path=customXml/itemProps6.xml><?xml version="1.0" encoding="utf-8"?>
+<ds:datastoreItem xmlns:ds="http://schemas.openxmlformats.org/officeDocument/2006/customXml" ds:itemID="{E66239DD-0B2D-408A-BBA0-1CA7E59810AE}">
+  <ds:schemaRefs>
+    <ds:schemaRef ds:uri="http://schemas.microsoft.com/VisualStudio/2011/storyboarding/control"/>
+  </ds:schemaRefs>
+</ds:datastoreItem>
 </file>
 
-<file path=customXml/item8.xml><?xml version="1.0" encoding="utf-8"?>
-<Control xmlns="http://schemas.microsoft.com/VisualStudio/2011/storyboarding/control">
-  <Id Name="3a5f3215-4f7c-4247-9247-a9acf7619a8c" Revision="1" Stencil="System.MyShapes" StencilVersion="1.0"/>
-</Control>
+<file path=customXml/itemProps7.xml><?xml version="1.0" encoding="utf-8"?>
+<ds:datastoreItem xmlns:ds="http://schemas.openxmlformats.org/officeDocument/2006/customXml" ds:itemID="{D525C38F-E3F5-4F86-AA79-5F0615D92028}">
+  <ds:schemaRefs>
+    <ds:schemaRef ds:uri="http://schemas.microsoft.com/VisualStudio/2011/storyboarding/control"/>
+  </ds:schemaRefs>
+</ds:datastoreItem>
 </file>
 
-<file path=customXml/item9.xml><?xml version="1.0" encoding="utf-8"?>
-<Control xmlns="http://schemas.microsoft.com/VisualStudio/2011/storyboarding/control">
-  <Id Name="3a5f3215-4f7c-4247-9247-a9acf7619a8c" Revision="1" Stencil="System.MyShapes" StencilVersion="1.0"/>
-</Control>
+<file path=customXml/itemProps8.xml><?xml version="1.0" encoding="utf-8"?>
+<ds:datastoreItem xmlns:ds="http://schemas.openxmlformats.org/officeDocument/2006/customXml" ds:itemID="{133E8427-525B-443B-BDB2-D61569B9E8D5}">
+  <ds:schemaRefs>
+    <ds:schemaRef ds:uri="http://schemas.microsoft.com/VisualStudio/2011/storyboarding/control"/>
+  </ds:schemaRefs>
+</ds:datastoreItem>
 </file>
 
-<file path=customXml/itemProps1.xml><?xml version="1.0" encoding="utf-8"?>
+<file path=customXml/itemProps9.xml><?xml version="1.0" encoding="utf-8"?>
 <ds:datastoreItem xmlns:ds="http://schemas.openxmlformats.org/officeDocument/2006/customXml" ds:itemID="{BBB5C329-08A6-4E5E-AEF1-A97828C87411}">
   <ds:schemaRefs>
     <ds:schemaRef ds:uri="http://schemas.microsoft.com/office/2006/metadata/contentType"/>
@@ -15212,278 +15967,4 @@
     <ds:schemaRef ds:uri="http://schemas.microsoft.com/internal/obd"/>
   </ds:schemaRefs>
 </ds:datastoreItem>
-</file>
-
-<file path=customXml/itemProps10.xml><?xml version="1.0" encoding="utf-8"?>
-<ds:datastoreItem xmlns:ds="http://schemas.openxmlformats.org/officeDocument/2006/customXml" ds:itemID="{24248713-04D9-4B55-9B64-290315285C69}">
-  <ds:schemaRefs>
-    <ds:schemaRef ds:uri="http://schemas.microsoft.com/VisualStudio/2011/storyboarding/control"/>
-  </ds:schemaRefs>
-</ds:datastoreItem>
-</file>
-
-<file path=customXml/itemProps11.xml><?xml version="1.0" encoding="utf-8"?>
-<ds:datastoreItem xmlns:ds="http://schemas.openxmlformats.org/officeDocument/2006/customXml" ds:itemID="{D64DEF83-831D-41CA-B887-8B4678D84355}">
-  <ds:schemaRefs>
-    <ds:schemaRef ds:uri="http://schemas.microsoft.com/VisualStudio/2011/storyboarding/control"/>
-  </ds:schemaRefs>
-</ds:datastoreItem>
-</file>
-
-<file path=customXml/itemProps12.xml><?xml version="1.0" encoding="utf-8"?>
-<ds:datastoreItem xmlns:ds="http://schemas.openxmlformats.org/officeDocument/2006/customXml" ds:itemID="{BF220CCF-993E-43A0-9212-BB380CAF8162}">
-  <ds:schemaRefs>
-    <ds:schemaRef ds:uri="http://schemas.microsoft.com/VisualStudio/2011/storyboarding/control"/>
-  </ds:schemaRefs>
-</ds:datastoreItem>
-</file>
-
-<file path=customXml/itemProps13.xml><?xml version="1.0" encoding="utf-8"?>
-<ds:datastoreItem xmlns:ds="http://schemas.openxmlformats.org/officeDocument/2006/customXml" ds:itemID="{E8627265-8428-4117-A97B-61BC0B24BAEF}">
-  <ds:schemaRefs>
-    <ds:schemaRef ds:uri="http://schemas.microsoft.com/VisualStudio/2011/storyboarding/control"/>
-  </ds:schemaRefs>
-</ds:datastoreItem>
-</file>
-
-<file path=customXml/itemProps14.xml><?xml version="1.0" encoding="utf-8"?>
-<ds:datastoreItem xmlns:ds="http://schemas.openxmlformats.org/officeDocument/2006/customXml" ds:itemID="{C6026F5C-553B-4AEF-A946-FF60FDFF7695}">
-  <ds:schemaRefs>
-    <ds:schemaRef ds:uri="http://schemas.microsoft.com/VisualStudio/2011/storyboarding/control"/>
-  </ds:schemaRefs>
-</ds:datastoreItem>
-</file>
-
-<file path=customXml/itemProps15.xml><?xml version="1.0" encoding="utf-8"?>
-<ds:datastoreItem xmlns:ds="http://schemas.openxmlformats.org/officeDocument/2006/customXml" ds:itemID="{E81EC6C6-313F-4420-95BE-F0E8567B4073}">
-  <ds:schemaRefs>
-    <ds:schemaRef ds:uri="http://schemas.microsoft.com/VisualStudio/2011/storyboarding/control"/>
-  </ds:schemaRefs>
-</ds:datastoreItem>
-</file>
-
-<file path=customXml/itemProps16.xml><?xml version="1.0" encoding="utf-8"?>
-<ds:datastoreItem xmlns:ds="http://schemas.openxmlformats.org/officeDocument/2006/customXml" ds:itemID="{E66239DD-0B2D-408A-BBA0-1CA7E59810AE}">
-  <ds:schemaRefs>
-    <ds:schemaRef ds:uri="http://schemas.microsoft.com/VisualStudio/2011/storyboarding/control"/>
-  </ds:schemaRefs>
-</ds:datastoreItem>
-</file>
-
-<file path=customXml/itemProps17.xml><?xml version="1.0" encoding="utf-8"?>
-<ds:datastoreItem xmlns:ds="http://schemas.openxmlformats.org/officeDocument/2006/customXml" ds:itemID="{6F3822C3-EEBF-463B-A843-8264A05022FC}">
-  <ds:schemaRefs>
-    <ds:schemaRef ds:uri="http://schemas.microsoft.com/VisualStudio/2011/storyboarding/control"/>
-  </ds:schemaRefs>
-</ds:datastoreItem>
-</file>
-
-<file path=customXml/itemProps18.xml><?xml version="1.0" encoding="utf-8"?>
-<ds:datastoreItem xmlns:ds="http://schemas.openxmlformats.org/officeDocument/2006/customXml" ds:itemID="{ACA1E08C-925C-4F09-8122-887C405DAD0E}">
-  <ds:schemaRefs>
-    <ds:schemaRef ds:uri="http://schemas.microsoft.com/VisualStudio/2011/storyboarding/control"/>
-  </ds:schemaRefs>
-</ds:datastoreItem>
-</file>
-
-<file path=customXml/itemProps19.xml><?xml version="1.0" encoding="utf-8"?>
-<ds:datastoreItem xmlns:ds="http://schemas.openxmlformats.org/officeDocument/2006/customXml" ds:itemID="{0C9D7982-E449-4E88-B30D-029D8CC3261F}">
-  <ds:schemaRefs>
-    <ds:schemaRef ds:uri="http://schemas.microsoft.com/VisualStudio/2011/storyboarding/control"/>
-  </ds:schemaRefs>
-</ds:datastoreItem>
-</file>
-
-<file path=customXml/itemProps2.xml><?xml version="1.0" encoding="utf-8"?>
-<ds:datastoreItem xmlns:ds="http://schemas.openxmlformats.org/officeDocument/2006/customXml" ds:itemID="{7CC5A912-861C-4DE5-A79D-195E5086349C}">
-  <ds:schemaRefs>
-    <ds:schemaRef ds:uri="http://schemas.microsoft.com/VisualStudio/2011/storyboarding/control"/>
-  </ds:schemaRefs>
-</ds:datastoreItem>
-</file>
-
-<file path=customXml/itemProps20.xml><?xml version="1.0" encoding="utf-8"?>
-<ds:datastoreItem xmlns:ds="http://schemas.openxmlformats.org/officeDocument/2006/customXml" ds:itemID="{D525C38F-E3F5-4F86-AA79-5F0615D92028}">
-  <ds:schemaRefs>
-    <ds:schemaRef ds:uri="http://schemas.microsoft.com/VisualStudio/2011/storyboarding/control"/>
-  </ds:schemaRefs>
-</ds:datastoreItem>
-</file>
-
-<file path=customXml/itemProps21.xml><?xml version="1.0" encoding="utf-8"?>
-<ds:datastoreItem xmlns:ds="http://schemas.openxmlformats.org/officeDocument/2006/customXml" ds:itemID="{E1C273FD-24F9-45CA-B498-6393D3AA6D7F}">
-  <ds:schemaRefs>
-    <ds:schemaRef ds:uri="http://schemas.microsoft.com/VisualStudio/2011/storyboarding/control"/>
-  </ds:schemaRefs>
-</ds:datastoreItem>
-</file>
-
-<file path=customXml/itemProps22.xml><?xml version="1.0" encoding="utf-8"?>
-<ds:datastoreItem xmlns:ds="http://schemas.openxmlformats.org/officeDocument/2006/customXml" ds:itemID="{703D5DC7-4616-43D3-84A1-089DFA00F45E}">
-  <ds:schemaRefs>
-    <ds:schemaRef ds:uri="http://schemas.microsoft.com/VisualStudio/2011/storyboarding/control"/>
-  </ds:schemaRefs>
-</ds:datastoreItem>
-</file>
-
-<file path=customXml/itemProps23.xml><?xml version="1.0" encoding="utf-8"?>
-<ds:datastoreItem xmlns:ds="http://schemas.openxmlformats.org/officeDocument/2006/customXml" ds:itemID="{72561CD2-555C-498E-8707-E7E0AC23D6F7}">
-  <ds:schemaRefs>
-    <ds:schemaRef ds:uri="http://schemas.microsoft.com/VisualStudio/2011/storyboarding/control"/>
-  </ds:schemaRefs>
-</ds:datastoreItem>
-</file>
-
-<file path=customXml/itemProps24.xml><?xml version="1.0" encoding="utf-8"?>
-<ds:datastoreItem xmlns:ds="http://schemas.openxmlformats.org/officeDocument/2006/customXml" ds:itemID="{B3671B56-5AB6-40D1-9748-16D9AEAD0962}">
-  <ds:schemaRefs>
-    <ds:schemaRef ds:uri="http://schemas.microsoft.com/VisualStudio/2011/storyboarding/control"/>
-  </ds:schemaRefs>
-</ds:datastoreItem>
-</file>
-
-<file path=customXml/itemProps25.xml><?xml version="1.0" encoding="utf-8"?>
-<ds:datastoreItem xmlns:ds="http://schemas.openxmlformats.org/officeDocument/2006/customXml" ds:itemID="{0BFC68A0-F33C-4D0A-8B07-0BF6B29C698E}">
-  <ds:schemaRefs>
-    <ds:schemaRef ds:uri="http://schemas.microsoft.com/VisualStudio/2011/storyboarding/control"/>
-  </ds:schemaRefs>
-</ds:datastoreItem>
-</file>
-
-<file path=customXml/itemProps26.xml><?xml version="1.0" encoding="utf-8"?>
-<ds:datastoreItem xmlns:ds="http://schemas.openxmlformats.org/officeDocument/2006/customXml" ds:itemID="{1F5A8671-688F-418F-87AD-EBAB911812B5}">
-  <ds:schemaRefs>
-    <ds:schemaRef ds:uri="http://schemas.microsoft.com/VisualStudio/2011/storyboarding/control"/>
-  </ds:schemaRefs>
-</ds:datastoreItem>
-</file>
-
-<file path=customXml/itemProps27.xml><?xml version="1.0" encoding="utf-8"?>
-<ds:datastoreItem xmlns:ds="http://schemas.openxmlformats.org/officeDocument/2006/customXml" ds:itemID="{56D5947B-D538-4E10-AB7C-984491B58DE1}">
-  <ds:schemaRefs>
-    <ds:schemaRef ds:uri="http://schemas.microsoft.com/VisualStudio/2011/storyboarding/control"/>
-  </ds:schemaRefs>
-</ds:datastoreItem>
-</file>
-
-<file path=customXml/itemProps28.xml><?xml version="1.0" encoding="utf-8"?>
-<ds:datastoreItem xmlns:ds="http://schemas.openxmlformats.org/officeDocument/2006/customXml" ds:itemID="{F37E7FF5-D44D-41C7-A85C-ED0B35DB1B54}">
-  <ds:schemaRefs>
-    <ds:schemaRef ds:uri="http://schemas.microsoft.com/VisualStudio/2011/storyboarding/control"/>
-  </ds:schemaRefs>
-</ds:datastoreItem>
-</file>
-
-<file path=customXml/itemProps29.xml><?xml version="1.0" encoding="utf-8"?>
-<ds:datastoreItem xmlns:ds="http://schemas.openxmlformats.org/officeDocument/2006/customXml" ds:itemID="{133E8427-525B-443B-BDB2-D61569B9E8D5}">
-  <ds:schemaRefs>
-    <ds:schemaRef ds:uri="http://schemas.microsoft.com/VisualStudio/2011/storyboarding/control"/>
-  </ds:schemaRefs>
-</ds:datastoreItem>
-</file>
-
-<file path=customXml/itemProps3.xml><?xml version="1.0" encoding="utf-8"?>
-<ds:datastoreItem xmlns:ds="http://schemas.openxmlformats.org/officeDocument/2006/customXml" ds:itemID="{424F15E0-202D-4292-9536-B4298F98D690}">
-  <ds:schemaRefs>
-    <ds:schemaRef ds:uri="http://schemas.microsoft.com/VisualStudio/2011/storyboarding/control"/>
-  </ds:schemaRefs>
-</ds:datastoreItem>
-</file>
-
-<file path=customXml/itemProps30.xml><?xml version="1.0" encoding="utf-8"?>
-<ds:datastoreItem xmlns:ds="http://schemas.openxmlformats.org/officeDocument/2006/customXml" ds:itemID="{1C519524-8703-4E59-AB9B-4A5A7263BA01}">
-  <ds:schemaRefs>
-    <ds:schemaRef ds:uri="http://schemas.microsoft.com/VisualStudio/2011/storyboarding/control"/>
-  </ds:schemaRefs>
-</ds:datastoreItem>
-</file>
-
-<file path=customXml/itemProps31.xml><?xml version="1.0" encoding="utf-8"?>
-<ds:datastoreItem xmlns:ds="http://schemas.openxmlformats.org/officeDocument/2006/customXml" ds:itemID="{C9624944-4F3E-45E8-8829-37C8DAF54683}">
-  <ds:schemaRefs>
-    <ds:schemaRef ds:uri="http://schemas.microsoft.com/VisualStudio/2011/storyboarding/control"/>
-  </ds:schemaRefs>
-</ds:datastoreItem>
-</file>
-
-<file path=customXml/itemProps32.xml><?xml version="1.0" encoding="utf-8"?>
-<ds:datastoreItem xmlns:ds="http://schemas.openxmlformats.org/officeDocument/2006/customXml" ds:itemID="{EACA768D-D3F6-4A15-AE55-87B86B85F153}">
-  <ds:schemaRefs>
-    <ds:schemaRef ds:uri="http://schemas.microsoft.com/VisualStudio/2011/storyboarding/control"/>
-  </ds:schemaRefs>
-</ds:datastoreItem>
-</file>
-
-<file path=customXml/itemProps33.xml><?xml version="1.0" encoding="utf-8"?>
-<ds:datastoreItem xmlns:ds="http://schemas.openxmlformats.org/officeDocument/2006/customXml" ds:itemID="{15FBB92F-9753-43F3-AE00-0E261CE62CA8}">
-  <ds:schemaRefs>
-    <ds:schemaRef ds:uri="http://schemas.microsoft.com/VisualStudio/2011/storyboarding/control"/>
-  </ds:schemaRefs>
-</ds:datastoreItem>
-</file>
-
-<file path=customXml/itemProps34.xml><?xml version="1.0" encoding="utf-8"?>
-<ds:datastoreItem xmlns:ds="http://schemas.openxmlformats.org/officeDocument/2006/customXml" ds:itemID="{E8F86DD1-857D-4AA1-B615-777BBB99609C}">
-  <ds:schemaRefs>
-    <ds:schemaRef ds:uri="http://schemas.microsoft.com/VisualStudio/2011/storyboarding/control"/>
-  </ds:schemaRefs>
-</ds:datastoreItem>
-</file>
-
-<file path=customXml/itemProps35.xml><?xml version="1.0" encoding="utf-8"?>
-<ds:datastoreItem xmlns:ds="http://schemas.openxmlformats.org/officeDocument/2006/customXml" ds:itemID="{A449BAC2-0751-46E4-958E-F0D2B9AA6981}">
-  <ds:schemaRefs>
-    <ds:schemaRef ds:uri="http://schemas.microsoft.com/VisualStudio/2011/storyboarding/control"/>
-  </ds:schemaRefs>
-</ds:datastoreItem>
-</file>
-
-<file path=customXml/itemProps4.xml><?xml version="1.0" encoding="utf-8"?>
-<ds:datastoreItem xmlns:ds="http://schemas.openxmlformats.org/officeDocument/2006/customXml" ds:itemID="{9BE992AB-AC79-4CFA-8E4D-01B8E612C593}">
-  <ds:schemaRefs>
-    <ds:schemaRef ds:uri="http://schemas.microsoft.com/VisualStudio/2011/storyboarding/control"/>
-  </ds:schemaRefs>
-</ds:datastoreItem>
-</file>
-
-<file path=customXml/itemProps5.xml><?xml version="1.0" encoding="utf-8"?>
-<ds:datastoreItem xmlns:ds="http://schemas.openxmlformats.org/officeDocument/2006/customXml" ds:itemID="{3DCE84C0-C49E-43FD-B3E0-95EA30D6B555}">
-  <ds:schemaRefs>
-    <ds:schemaRef ds:uri="http://schemas.microsoft.com/VisualStudio/2011/storyboarding/control"/>
-  </ds:schemaRefs>
-</ds:datastoreItem>
-</file>
-
-<file path=customXml/itemProps6.xml><?xml version="1.0" encoding="utf-8"?>
-<ds:datastoreItem xmlns:ds="http://schemas.openxmlformats.org/officeDocument/2006/customXml" ds:itemID="{F301D382-32B0-43EE-932C-28906AF37617}">
-  <ds:schemaRefs>
-    <ds:schemaRef ds:uri="http://schemas.microsoft.com/office/2006/metadata/properties"/>
-    <ds:schemaRef ds:uri="http://schemas.microsoft.com/office/infopath/2007/PartnerControls"/>
-    <ds:schemaRef ds:uri="4873beb7-5857-4685-be1f-d57550cc96cc"/>
-  </ds:schemaRefs>
-</ds:datastoreItem>
-</file>
-
-<file path=customXml/itemProps7.xml><?xml version="1.0" encoding="utf-8"?>
-<ds:datastoreItem xmlns:ds="http://schemas.openxmlformats.org/officeDocument/2006/customXml" ds:itemID="{E1B558C7-619B-49BE-9097-7FCBDADD4ECE}">
-  <ds:schemaRefs>
-    <ds:schemaRef ds:uri="http://schemas.microsoft.com/sharepoint/v3/contenttype/forms"/>
-  </ds:schemaRefs>
-</ds:datastoreItem>
-</file>
-
-<file path=customXml/itemProps8.xml><?xml version="1.0" encoding="utf-8"?>
-<ds:datastoreItem xmlns:ds="http://schemas.openxmlformats.org/officeDocument/2006/customXml" ds:itemID="{F8B7C765-2F36-4486-9DE5-D0E485AFE8E4}">
-  <ds:schemaRefs>
-    <ds:schemaRef ds:uri="http://schemas.microsoft.com/VisualStudio/2011/storyboarding/control"/>
-  </ds:schemaRefs>
-</ds:datastoreItem>
-</file>
-
-<file path=customXml/itemProps9.xml><?xml version="1.0" encoding="utf-8"?>
-<ds:datastoreItem xmlns:ds="http://schemas.openxmlformats.org/officeDocument/2006/customXml" ds:itemID="{B93E3EFA-D9D3-4448-BC21-BB6156158366}">
-  <ds:schemaRefs>
-    <ds:schemaRef ds:uri="http://schemas.microsoft.com/VisualStudio/2011/storyboarding/control"/>
-  </ds:schemaRefs>
-</ds:datastoreItem>
 </file>
</xml_diff>

<commit_message>
Version of the docs submitted on Sept 29
</commit_message>
<xml_diff>
--- a/Docs/Selje_XSharpFromScratch_Slides.pptx
+++ b/Docs/Selje_XSharpFromScratch_Slides.pptx
@@ -5,10 +5,10 @@
     <p:sldMasterId id="2147483660" r:id="rId36"/>
   </p:sldMasterIdLst>
   <p:notesMasterIdLst>
-    <p:notesMasterId r:id="rId62"/>
+    <p:notesMasterId r:id="rId61"/>
   </p:notesMasterIdLst>
   <p:handoutMasterIdLst>
-    <p:handoutMasterId r:id="rId63"/>
+    <p:handoutMasterId r:id="rId62"/>
   </p:handoutMasterIdLst>
   <p:sldIdLst>
     <p:sldId id="383" r:id="rId37"/>
@@ -26,16 +26,15 @@
     <p:sldId id="404" r:id="rId49"/>
     <p:sldId id="392" r:id="rId50"/>
     <p:sldId id="405" r:id="rId51"/>
-    <p:sldId id="393" r:id="rId52"/>
-    <p:sldId id="396" r:id="rId53"/>
-    <p:sldId id="397" r:id="rId54"/>
-    <p:sldId id="398" r:id="rId55"/>
-    <p:sldId id="377" r:id="rId56"/>
-    <p:sldId id="400" r:id="rId57"/>
-    <p:sldId id="401" r:id="rId58"/>
-    <p:sldId id="407" r:id="rId59"/>
-    <p:sldId id="355" r:id="rId60"/>
-    <p:sldId id="334" r:id="rId61"/>
+    <p:sldId id="396" r:id="rId52"/>
+    <p:sldId id="397" r:id="rId53"/>
+    <p:sldId id="398" r:id="rId54"/>
+    <p:sldId id="377" r:id="rId55"/>
+    <p:sldId id="400" r:id="rId56"/>
+    <p:sldId id="401" r:id="rId57"/>
+    <p:sldId id="407" r:id="rId58"/>
+    <p:sldId id="355" r:id="rId59"/>
+    <p:sldId id="334" r:id="rId60"/>
   </p:sldIdLst>
   <p:sldSz cx="12188825" cy="6858000"/>
   <p:notesSz cx="9101138" cy="6858000"/>
@@ -170,7 +169,6 @@
           <p14:sldIdLst>
             <p14:sldId id="392"/>
             <p14:sldId id="405"/>
-            <p14:sldId id="393"/>
           </p14:sldIdLst>
         </p14:section>
         <p14:section name="Agenda Item #5" id="{07EA3D7F-A661-4FC1-98A4-93F3E6E3A2F4}">
@@ -1127,6 +1125,127 @@
     <p:extLst>
       <p:ext uri="{BB962C8B-B14F-4D97-AF65-F5344CB8AC3E}">
         <p14:creationId xmlns:p14="http://schemas.microsoft.com/office/powerpoint/2010/main" val="2833288949"/>
+      </p:ext>
+    </p:extLst>
+  </p:cSld>
+  <p:clrMapOvr>
+    <a:masterClrMapping/>
+  </p:clrMapOvr>
+</p:notes>
+</file>
+
+<file path=ppt/notesSlides/notesSlide4.xml><?xml version="1.0" encoding="utf-8"?>
+<p:notes xmlns:a="http://schemas.openxmlformats.org/drawingml/2006/main" xmlns:r="http://schemas.openxmlformats.org/officeDocument/2006/relationships" xmlns:p="http://schemas.openxmlformats.org/presentationml/2006/main">
+  <p:cSld>
+    <p:spTree>
+      <p:nvGrpSpPr>
+        <p:cNvPr id="1" name=""/>
+        <p:cNvGrpSpPr/>
+        <p:nvPr/>
+      </p:nvGrpSpPr>
+      <p:grpSpPr>
+        <a:xfrm>
+          <a:off x="0" y="0"/>
+          <a:ext cx="0" cy="0"/>
+          <a:chOff x="0" y="0"/>
+          <a:chExt cx="0" cy="0"/>
+        </a:xfrm>
+      </p:grpSpPr>
+      <p:sp>
+        <p:nvSpPr>
+          <p:cNvPr id="2" name="Slide Image Placeholder 1"/>
+          <p:cNvSpPr>
+            <a:spLocks noGrp="1" noRot="1" noChangeAspect="1"/>
+          </p:cNvSpPr>
+          <p:nvPr>
+            <p:ph type="sldImg"/>
+          </p:nvPr>
+        </p:nvSpPr>
+        <p:spPr/>
+      </p:sp>
+      <p:sp>
+        <p:nvSpPr>
+          <p:cNvPr id="3" name="Notes Placeholder 2"/>
+          <p:cNvSpPr>
+            <a:spLocks noGrp="1"/>
+          </p:cNvSpPr>
+          <p:nvPr>
+            <p:ph type="body" idx="1"/>
+          </p:nvPr>
+        </p:nvSpPr>
+        <p:spPr/>
+        <p:txBody>
+          <a:bodyPr/>
+          <a:lstStyle/>
+          <a:p>
+            <a:r>
+              <a:rPr lang="en-US" dirty="0"/>
+              <a:t>Look familiar?</a:t>
+            </a:r>
+          </a:p>
+          <a:p>
+            <a:r>
+              <a:rPr lang="en-US" dirty="0"/>
+              <a:t>DBF files</a:t>
+            </a:r>
+          </a:p>
+          <a:p>
+            <a:endParaRPr lang="en-US" dirty="0"/>
+          </a:p>
+        </p:txBody>
+      </p:sp>
+      <p:sp>
+        <p:nvSpPr>
+          <p:cNvPr id="4" name="Date Placeholder 3"/>
+          <p:cNvSpPr>
+            <a:spLocks noGrp="1"/>
+          </p:cNvSpPr>
+          <p:nvPr>
+            <p:ph type="dt" idx="1"/>
+          </p:nvPr>
+        </p:nvSpPr>
+        <p:spPr/>
+        <p:txBody>
+          <a:bodyPr/>
+          <a:lstStyle/>
+          <a:p>
+            <a:fld id="{43F82CE1-C859-40EE-9EB2-765AABAEDB14}" type="datetime1">
+              <a:rPr lang="en-GB" noProof="0" smtClean="0"/>
+              <a:t>29/09/2020</a:t>
+            </a:fld>
+            <a:endParaRPr lang="en-GB" noProof="0" dirty="0"/>
+          </a:p>
+        </p:txBody>
+      </p:sp>
+      <p:sp>
+        <p:nvSpPr>
+          <p:cNvPr id="5" name="Slide Number Placeholder 4"/>
+          <p:cNvSpPr>
+            <a:spLocks noGrp="1"/>
+          </p:cNvSpPr>
+          <p:nvPr>
+            <p:ph type="sldNum" sz="quarter" idx="5"/>
+          </p:nvPr>
+        </p:nvSpPr>
+        <p:spPr/>
+        <p:txBody>
+          <a:bodyPr/>
+          <a:lstStyle/>
+          <a:p>
+            <a:pPr rtl="0"/>
+            <a:fld id="{B8796F01-7154-41E0-B48B-A6921757531A}" type="slidenum">
+              <a:rPr lang="en-GB" noProof="0" smtClean="0"/>
+              <a:pPr rtl="0"/>
+              <a:t>6</a:t>
+            </a:fld>
+            <a:endParaRPr lang="en-GB" noProof="0" dirty="0"/>
+          </a:p>
+        </p:txBody>
+      </p:sp>
+    </p:spTree>
+    <p:extLst>
+      <p:ext uri="{BB962C8B-B14F-4D97-AF65-F5344CB8AC3E}">
+        <p14:creationId xmlns:p14="http://schemas.microsoft.com/office/powerpoint/2010/main" val="3534974856"/>
       </p:ext>
     </p:extLst>
   </p:cSld>
@@ -7700,7 +7819,7 @@
           <a:p>
             <a:r>
               <a:rPr lang="en-US" dirty="0"/>
-              <a:t>More Stuff</a:t>
+              <a:t>Testing our Class</a:t>
             </a:r>
           </a:p>
         </p:txBody>
@@ -7726,24 +7845,24 @@
           <a:bodyPr/>
           <a:lstStyle/>
           <a:p>
-            <a:r>
-              <a:rPr lang="en-US" dirty="0" err="1"/>
-              <a:t>Abc</a:t>
-            </a:r>
-            <a:endParaRPr lang="en-US" dirty="0"/>
-          </a:p>
-          <a:p>
+            <a:pPr>
+              <a:buFont typeface="Wingdings" panose="05000000000000000000" pitchFamily="2" charset="2"/>
+              <a:buChar char="q"/>
+            </a:pPr>
             <a:r>
               <a:rPr lang="en-US" dirty="0"/>
-              <a:t>Def</a:t>
-            </a:r>
-          </a:p>
-          <a:p>
-            <a:r>
-              <a:rPr lang="en-US" dirty="0" err="1"/>
-              <a:t>Xyz</a:t>
-            </a:r>
-            <a:endParaRPr lang="en-US" dirty="0"/>
+              <a:t>Console App</a:t>
+            </a:r>
+          </a:p>
+          <a:p>
+            <a:pPr>
+              <a:buFont typeface="Wingdings" panose="05000000000000000000" pitchFamily="2" charset="2"/>
+              <a:buChar char="q"/>
+            </a:pPr>
+            <a:r>
+              <a:rPr lang="en-US" dirty="0"/>
+              <a:t>Unit Testing</a:t>
+            </a:r>
           </a:p>
           <a:p>
             <a:endParaRPr lang="en-US" dirty="0"/>
@@ -7887,7 +8006,7 @@
           <a:p>
             <a:r>
               <a:rPr lang="en-US" dirty="0"/>
-              <a:t>Agenda #3 Title</a:t>
+              <a:t>Visual Class</a:t>
             </a:r>
           </a:p>
         </p:txBody>
@@ -7908,30 +8027,63 @@
             <p:ph sz="quarter" idx="10"/>
           </p:nvPr>
         </p:nvSpPr>
-        <p:spPr/>
+        <p:spPr>
+          <a:xfrm>
+            <a:off x="1979612" y="3429000"/>
+            <a:ext cx="9676359" cy="2667000"/>
+          </a:xfrm>
+        </p:spPr>
         <p:txBody>
           <a:bodyPr/>
           <a:lstStyle/>
           <a:p>
+            <a:pPr>
+              <a:buFont typeface="Wingdings" panose="05000000000000000000" pitchFamily="2" charset="2"/>
+              <a:buChar char="q"/>
+            </a:pPr>
             <a:r>
               <a:rPr lang="en-US" dirty="0"/>
-              <a:t>Yada</a:t>
-            </a:r>
-          </a:p>
-          <a:p>
-            <a:r>
-              <a:rPr lang="en-US" dirty="0"/>
-              <a:t>Yada</a:t>
-            </a:r>
-          </a:p>
-          <a:p>
-            <a:r>
-              <a:rPr lang="en-US" dirty="0"/>
-              <a:t>Yada</a:t>
-            </a:r>
-          </a:p>
-        </p:txBody>
-      </p:sp>
+              <a:t>Create a panel in XAML</a:t>
+            </a:r>
+          </a:p>
+        </p:txBody>
+      </p:sp>
+      <p:pic>
+        <p:nvPicPr>
+          <p:cNvPr id="4" name="Picture 3" descr="Graphical user interface, application, email&#10;&#10;Description automatically generated">
+            <a:extLst>
+              <a:ext uri="{FF2B5EF4-FFF2-40B4-BE49-F238E27FC236}">
+                <a16:creationId xmlns:a16="http://schemas.microsoft.com/office/drawing/2014/main" id="{E8E54E72-15FE-42DC-A005-A03ED8551475}"/>
+              </a:ext>
+            </a:extLst>
+          </p:cNvPr>
+          <p:cNvPicPr>
+            <a:picLocks noChangeAspect="1"/>
+          </p:cNvPicPr>
+          <p:nvPr/>
+        </p:nvPicPr>
+        <p:blipFill>
+          <a:blip r:embed="rId2">
+            <a:extLst>
+              <a:ext uri="{28A0092B-C50C-407E-A947-70E740481C1C}">
+                <a14:useLocalDpi xmlns:a14="http://schemas.microsoft.com/office/drawing/2010/main" val="0"/>
+              </a:ext>
+            </a:extLst>
+          </a:blip>
+          <a:stretch>
+            <a:fillRect/>
+          </a:stretch>
+        </p:blipFill>
+        <p:spPr>
+          <a:xfrm>
+            <a:off x="4189412" y="1600200"/>
+            <a:ext cx="5295900" cy="1381125"/>
+          </a:xfrm>
+          <a:prstGeom prst="rect">
+            <a:avLst/>
+          </a:prstGeom>
+        </p:spPr>
+      </p:pic>
     </p:spTree>
     <p:extLst>
       <p:ext uri="{BB962C8B-B14F-4D97-AF65-F5344CB8AC3E}">
@@ -7999,7 +8151,7 @@
           <a:p>
             <a:r>
               <a:rPr lang="en-US" dirty="0"/>
-              <a:t>More Stuff</a:t>
+              <a:t>XAML Form</a:t>
             </a:r>
           </a:p>
         </p:txBody>
@@ -8025,26 +8177,59 @@
           <a:bodyPr/>
           <a:lstStyle/>
           <a:p>
-            <a:r>
-              <a:rPr lang="en-US" dirty="0" err="1"/>
-              <a:t>Abc</a:t>
-            </a:r>
-            <a:endParaRPr lang="en-US" dirty="0"/>
-          </a:p>
-          <a:p>
+            <a:pPr>
+              <a:buFont typeface="Wingdings" panose="05000000000000000000" pitchFamily="2" charset="2"/>
+              <a:buChar char="q"/>
+            </a:pPr>
             <a:r>
               <a:rPr lang="en-US" dirty="0"/>
-              <a:t>Def</a:t>
-            </a:r>
-          </a:p>
-          <a:p>
-            <a:r>
-              <a:rPr lang="en-US" dirty="0" err="1"/>
-              <a:t>Xyz</a:t>
-            </a:r>
-            <a:endParaRPr lang="en-US" dirty="0"/>
-          </a:p>
-          <a:p>
+              <a:t>Create a Form</a:t>
+            </a:r>
+          </a:p>
+          <a:p>
+            <a:pPr>
+              <a:buFont typeface="Wingdings" panose="05000000000000000000" pitchFamily="2" charset="2"/>
+              <a:buChar char="q"/>
+            </a:pPr>
+            <a:r>
+              <a:rPr lang="en-US" dirty="0"/>
+              <a:t>Add our Panel</a:t>
+            </a:r>
+          </a:p>
+          <a:p>
+            <a:pPr>
+              <a:buFont typeface="Wingdings" panose="05000000000000000000" pitchFamily="2" charset="2"/>
+              <a:buChar char="q"/>
+            </a:pPr>
+            <a:r>
+              <a:rPr lang="en-US" dirty="0"/>
+              <a:t>Add a couple more controls</a:t>
+            </a:r>
+          </a:p>
+          <a:p>
+            <a:pPr>
+              <a:buFont typeface="Wingdings" panose="05000000000000000000" pitchFamily="2" charset="2"/>
+              <a:buChar char="q"/>
+            </a:pPr>
+            <a:r>
+              <a:rPr lang="en-US" dirty="0"/>
+              <a:t>Bind the events</a:t>
+            </a:r>
+          </a:p>
+          <a:p>
+            <a:pPr>
+              <a:buFont typeface="Wingdings" panose="05000000000000000000" pitchFamily="2" charset="2"/>
+              <a:buChar char="q"/>
+            </a:pPr>
+            <a:r>
+              <a:rPr lang="en-US" dirty="0"/>
+              <a:t>Tie our business objects to it</a:t>
+            </a:r>
+          </a:p>
+          <a:p>
+            <a:pPr marL="0" indent="0">
+              <a:buNone/>
+            </a:pPr>
             <a:endParaRPr lang="en-US" dirty="0"/>
           </a:p>
         </p:txBody>
@@ -8212,36 +8397,60 @@
           <a:bodyPr/>
           <a:lstStyle/>
           <a:p>
+            <a:pPr>
+              <a:buFont typeface="Wingdings" panose="05000000000000000000" pitchFamily="2" charset="2"/>
+              <a:buChar char="q"/>
+            </a:pPr>
             <a:r>
               <a:rPr lang="en-US" dirty="0"/>
               <a:t>Reports</a:t>
             </a:r>
           </a:p>
           <a:p>
+            <a:pPr>
+              <a:buFont typeface="Wingdings" panose="05000000000000000000" pitchFamily="2" charset="2"/>
+              <a:buChar char="q"/>
+            </a:pPr>
             <a:r>
               <a:rPr lang="en-US" dirty="0"/>
               <a:t>Source Control</a:t>
             </a:r>
           </a:p>
           <a:p>
+            <a:pPr>
+              <a:buFont typeface="Wingdings" panose="05000000000000000000" pitchFamily="2" charset="2"/>
+              <a:buChar char="q"/>
+            </a:pPr>
             <a:r>
               <a:rPr lang="en-US" dirty="0"/>
               <a:t>Databases</a:t>
             </a:r>
           </a:p>
           <a:p>
+            <a:pPr>
+              <a:buFont typeface="Wingdings" panose="05000000000000000000" pitchFamily="2" charset="2"/>
+              <a:buChar char="q"/>
+            </a:pPr>
             <a:r>
               <a:rPr lang="en-US" dirty="0"/>
               <a:t>Frameworks</a:t>
             </a:r>
           </a:p>
           <a:p>
+            <a:pPr>
+              <a:buFont typeface="Wingdings" panose="05000000000000000000" pitchFamily="2" charset="2"/>
+              <a:buChar char="q"/>
+            </a:pPr>
             <a:r>
               <a:rPr lang="en-US" dirty="0"/>
               <a:t>External Libraries</a:t>
             </a:r>
           </a:p>
           <a:p>
+            <a:pPr>
+              <a:buFont typeface="Wingdings" panose="05000000000000000000" pitchFamily="2" charset="2"/>
+              <a:buChar char="q"/>
+            </a:pPr>
             <a:r>
               <a:rPr lang="en-US" dirty="0"/>
               <a:t>Help</a:t>
@@ -8296,10 +8505,10 @@
       </p:grpSpPr>
       <p:sp>
         <p:nvSpPr>
-          <p:cNvPr id="3" name="Title 2">
-            <a:extLst>
-              <a:ext uri="{FF2B5EF4-FFF2-40B4-BE49-F238E27FC236}">
-                <a16:creationId xmlns:a16="http://schemas.microsoft.com/office/drawing/2014/main" id="{A69AEAF4-5D8A-466B-8B1C-74A1E77A5C2B}"/>
+          <p:cNvPr id="2" name="Title 1">
+            <a:extLst>
+              <a:ext uri="{FF2B5EF4-FFF2-40B4-BE49-F238E27FC236}">
+                <a16:creationId xmlns:a16="http://schemas.microsoft.com/office/drawing/2014/main" id="{0406F2F8-AB85-4F9C-A292-04A22C58517E}"/>
               </a:ext>
             </a:extLst>
           </p:cNvPr>
@@ -8307,53 +8516,17 @@
             <a:spLocks noGrp="1"/>
           </p:cNvSpPr>
           <p:nvPr>
-            <p:ph type="title"/>
+            <p:ph type="ctrTitle"/>
           </p:nvPr>
         </p:nvSpPr>
         <p:spPr/>
         <p:txBody>
-          <a:bodyPr>
-            <a:normAutofit fontScale="90000"/>
-          </a:bodyPr>
+          <a:bodyPr/>
           <a:lstStyle/>
           <a:p>
             <a:r>
               <a:rPr lang="en-US" dirty="0"/>
-              <a:t>Agenda #4 Title</a:t>
-            </a:r>
-          </a:p>
-        </p:txBody>
-      </p:sp>
-      <p:sp>
-        <p:nvSpPr>
-          <p:cNvPr id="5" name="Content Placeholder 4">
-            <a:extLst>
-              <a:ext uri="{FF2B5EF4-FFF2-40B4-BE49-F238E27FC236}">
-                <a16:creationId xmlns:a16="http://schemas.microsoft.com/office/drawing/2014/main" id="{692F47A7-A5E2-427A-A430-050B7EC1945F}"/>
-              </a:ext>
-            </a:extLst>
-          </p:cNvPr>
-          <p:cNvSpPr>
-            <a:spLocks noGrp="1"/>
-          </p:cNvSpPr>
-          <p:nvPr>
-            <p:ph sz="quarter" idx="10"/>
-          </p:nvPr>
-        </p:nvSpPr>
-        <p:spPr/>
-        <p:txBody>
-          <a:bodyPr/>
-          <a:lstStyle/>
-          <a:p>
-            <a:r>
-              <a:rPr lang="en-US" dirty="0"/>
-              <a:t>Fox</a:t>
-            </a:r>
-          </a:p>
-          <a:p>
-            <a:r>
-              <a:rPr lang="en-US" dirty="0"/>
-              <a:t>Rocks</a:t>
+              <a:t>Summary</a:t>
             </a:r>
           </a:p>
         </p:txBody>
@@ -8361,7 +8534,7 @@
     </p:spTree>
     <p:extLst>
       <p:ext uri="{BB962C8B-B14F-4D97-AF65-F5344CB8AC3E}">
-        <p14:creationId xmlns:p14="http://schemas.microsoft.com/office/powerpoint/2010/main" val="761535539"/>
+        <p14:creationId xmlns:p14="http://schemas.microsoft.com/office/powerpoint/2010/main" val="1780635943"/>
       </p:ext>
     </p:extLst>
   </p:cSld>
@@ -8402,10 +8575,10 @@
       </p:grpSpPr>
       <p:sp>
         <p:nvSpPr>
-          <p:cNvPr id="2" name="Title 1">
-            <a:extLst>
-              <a:ext uri="{FF2B5EF4-FFF2-40B4-BE49-F238E27FC236}">
-                <a16:creationId xmlns:a16="http://schemas.microsoft.com/office/drawing/2014/main" id="{0406F2F8-AB85-4F9C-A292-04A22C58517E}"/>
+          <p:cNvPr id="3" name="Title 2">
+            <a:extLst>
+              <a:ext uri="{FF2B5EF4-FFF2-40B4-BE49-F238E27FC236}">
+                <a16:creationId xmlns:a16="http://schemas.microsoft.com/office/drawing/2014/main" id="{9BC79B9F-116A-4370-9702-B5EBDEC245AB}"/>
               </a:ext>
             </a:extLst>
           </p:cNvPr>
@@ -8413,17 +8586,86 @@
             <a:spLocks noGrp="1"/>
           </p:cNvSpPr>
           <p:nvPr>
-            <p:ph type="ctrTitle"/>
+            <p:ph type="title"/>
           </p:nvPr>
         </p:nvSpPr>
         <p:spPr/>
         <p:txBody>
+          <a:bodyPr>
+            <a:normAutofit fontScale="90000"/>
+          </a:bodyPr>
+          <a:lstStyle/>
+          <a:p>
+            <a:r>
+              <a:rPr lang="en-US" dirty="0"/>
+              <a:t>What You Learned Today</a:t>
+            </a:r>
+          </a:p>
+        </p:txBody>
+      </p:sp>
+      <p:sp>
+        <p:nvSpPr>
+          <p:cNvPr id="4" name="Content Placeholder 3">
+            <a:extLst>
+              <a:ext uri="{FF2B5EF4-FFF2-40B4-BE49-F238E27FC236}">
+                <a16:creationId xmlns:a16="http://schemas.microsoft.com/office/drawing/2014/main" id="{32D84BB3-4E84-4133-A4C9-335F711E4E62}"/>
+              </a:ext>
+            </a:extLst>
+          </p:cNvPr>
+          <p:cNvSpPr>
+            <a:spLocks noGrp="1"/>
+          </p:cNvSpPr>
+          <p:nvPr>
+            <p:ph idx="10"/>
+          </p:nvPr>
+        </p:nvSpPr>
+        <p:spPr>
+          <a:xfrm>
+            <a:off x="1979613" y="1447800"/>
+            <a:ext cx="9675812" cy="4648200"/>
+          </a:xfrm>
+        </p:spPr>
+        <p:txBody>
           <a:bodyPr/>
           <a:lstStyle/>
           <a:p>
+            <a:pPr>
+              <a:buFont typeface="Wingdings" panose="05000000000000000000" pitchFamily="2" charset="2"/>
+              <a:buChar char="q"/>
+            </a:pPr>
             <a:r>
               <a:rPr lang="en-US" dirty="0"/>
-              <a:t>Summary</a:t>
+              <a:t>Created an X# Application from scratch</a:t>
+            </a:r>
+          </a:p>
+          <a:p>
+            <a:pPr>
+              <a:buFont typeface="Wingdings" panose="05000000000000000000" pitchFamily="2" charset="2"/>
+              <a:buChar char="q"/>
+            </a:pPr>
+            <a:r>
+              <a:rPr lang="en-US" dirty="0"/>
+              <a:t>Considerations when creating classes</a:t>
+            </a:r>
+          </a:p>
+          <a:p>
+            <a:pPr>
+              <a:buFont typeface="Wingdings" panose="05000000000000000000" pitchFamily="2" charset="2"/>
+              <a:buChar char="q"/>
+            </a:pPr>
+            <a:r>
+              <a:rPr lang="en-US" dirty="0"/>
+              <a:t>Converting visual classes and forms to XAML</a:t>
+            </a:r>
+          </a:p>
+          <a:p>
+            <a:pPr>
+              <a:buFont typeface="Wingdings" panose="05000000000000000000" pitchFamily="2" charset="2"/>
+              <a:buChar char="q"/>
+            </a:pPr>
+            <a:r>
+              <a:rPr lang="en-US" dirty="0"/>
+              <a:t>More!</a:t>
             </a:r>
           </a:p>
         </p:txBody>
@@ -8431,7 +8673,7 @@
     </p:spTree>
     <p:extLst>
       <p:ext uri="{BB962C8B-B14F-4D97-AF65-F5344CB8AC3E}">
-        <p14:creationId xmlns:p14="http://schemas.microsoft.com/office/powerpoint/2010/main" val="1780635943"/>
+        <p14:creationId xmlns:p14="http://schemas.microsoft.com/office/powerpoint/2010/main" val="2653342071"/>
       </p:ext>
     </p:extLst>
   </p:cSld>
@@ -8472,10 +8714,10 @@
       </p:grpSpPr>
       <p:sp>
         <p:nvSpPr>
-          <p:cNvPr id="3" name="Title 2">
-            <a:extLst>
-              <a:ext uri="{FF2B5EF4-FFF2-40B4-BE49-F238E27FC236}">
-                <a16:creationId xmlns:a16="http://schemas.microsoft.com/office/drawing/2014/main" id="{9BC79B9F-116A-4370-9702-B5EBDEC245AB}"/>
+          <p:cNvPr id="4" name="Title 3">
+            <a:extLst>
+              <a:ext uri="{FF2B5EF4-FFF2-40B4-BE49-F238E27FC236}">
+                <a16:creationId xmlns:a16="http://schemas.microsoft.com/office/drawing/2014/main" id="{1C1C866F-EFAC-46BA-904A-D52904C901EA}"/>
               </a:ext>
             </a:extLst>
           </p:cNvPr>
@@ -8483,29 +8725,48 @@
             <a:spLocks noGrp="1"/>
           </p:cNvSpPr>
           <p:nvPr>
-            <p:ph type="title"/>
+            <p:ph type="ctrTitle"/>
           </p:nvPr>
         </p:nvSpPr>
         <p:spPr/>
         <p:txBody>
-          <a:bodyPr>
-            <a:normAutofit fontScale="90000"/>
-          </a:bodyPr>
+          <a:bodyPr/>
           <a:lstStyle/>
           <a:p>
             <a:r>
               <a:rPr lang="en-US" dirty="0"/>
-              <a:t>What You Learned Today</a:t>
-            </a:r>
-          </a:p>
-        </p:txBody>
-      </p:sp>
-      <p:sp>
-        <p:nvSpPr>
-          <p:cNvPr id="4" name="Content Placeholder 3">
-            <a:extLst>
-              <a:ext uri="{FF2B5EF4-FFF2-40B4-BE49-F238E27FC236}">
-                <a16:creationId xmlns:a16="http://schemas.microsoft.com/office/drawing/2014/main" id="{32D84BB3-4E84-4133-A4C9-335F711E4E62}"/>
+              <a:t>Eric Selje</a:t>
+            </a:r>
+            <a:br>
+              <a:rPr lang="en-US" dirty="0"/>
+            </a:br>
+            <a:r>
+              <a:rPr lang="en-US" dirty="0"/>
+              <a:t>Salty Dog Solutions, LLC</a:t>
+            </a:r>
+            <a:br>
+              <a:rPr lang="en-US" dirty="0"/>
+            </a:br>
+            <a:r>
+              <a:rPr lang="en-US" dirty="0" err="1"/>
+              <a:t>Eric@SaltyDogLLC</a:t>
+            </a:r>
+            <a:br>
+              <a:rPr lang="en-US" dirty="0"/>
+            </a:br>
+            <a:r>
+              <a:rPr lang="en-US" dirty="0"/>
+              <a:t>www.SaltyDogLLC.com</a:t>
+            </a:r>
+          </a:p>
+        </p:txBody>
+      </p:sp>
+      <p:sp>
+        <p:nvSpPr>
+          <p:cNvPr id="3" name="Subtitle 2">
+            <a:extLst>
+              <a:ext uri="{FF2B5EF4-FFF2-40B4-BE49-F238E27FC236}">
+                <a16:creationId xmlns:a16="http://schemas.microsoft.com/office/drawing/2014/main" id="{60AFDF34-F8C3-4D4F-95A3-33F2736D6760}"/>
               </a:ext>
             </a:extLst>
           </p:cNvPr>
@@ -8513,48 +8774,22 @@
             <a:spLocks noGrp="1"/>
           </p:cNvSpPr>
           <p:nvPr>
-            <p:ph idx="10"/>
+            <p:ph type="subTitle" idx="1"/>
           </p:nvPr>
         </p:nvSpPr>
-        <p:spPr>
-          <a:xfrm>
-            <a:off x="1979613" y="1447800"/>
-            <a:ext cx="9675812" cy="4648200"/>
-          </a:xfrm>
-        </p:spPr>
+        <p:spPr/>
         <p:txBody>
           <a:bodyPr/>
           <a:lstStyle/>
           <a:p>
-            <a:r>
-              <a:rPr lang="en-US" dirty="0"/>
-              <a:t>Created an X# Application from scratch</a:t>
-            </a:r>
-          </a:p>
-          <a:p>
-            <a:r>
-              <a:rPr lang="en-US" dirty="0"/>
-              <a:t>Considerations when creating classes</a:t>
-            </a:r>
-          </a:p>
-          <a:p>
-            <a:r>
-              <a:rPr lang="en-US" dirty="0"/>
-              <a:t>Converting visual classes and forms to XAML</a:t>
-            </a:r>
-          </a:p>
-          <a:p>
-            <a:r>
-              <a:rPr lang="en-US" dirty="0"/>
-              <a:t>More!</a:t>
-            </a:r>
+            <a:endParaRPr lang="en-US"/>
           </a:p>
         </p:txBody>
       </p:sp>
     </p:spTree>
     <p:extLst>
       <p:ext uri="{BB962C8B-B14F-4D97-AF65-F5344CB8AC3E}">
-        <p14:creationId xmlns:p14="http://schemas.microsoft.com/office/powerpoint/2010/main" val="2653342071"/>
+        <p14:creationId xmlns:p14="http://schemas.microsoft.com/office/powerpoint/2010/main" val="2655914804"/>
       </p:ext>
     </p:extLst>
   </p:cSld>
@@ -8577,7 +8812,7 @@
 </file>
 
 <file path=ppt/slides/slide19.xml><?xml version="1.0" encoding="utf-8"?>
-<p:sld xmlns:a="http://schemas.openxmlformats.org/drawingml/2006/main" xmlns:r="http://schemas.openxmlformats.org/officeDocument/2006/relationships" xmlns:p="http://schemas.openxmlformats.org/presentationml/2006/main">
+<p:sld xmlns:a="http://schemas.openxmlformats.org/drawingml/2006/main" xmlns:r="http://schemas.openxmlformats.org/officeDocument/2006/relationships" xmlns:p="http://schemas.openxmlformats.org/presentationml/2006/main" showMasterSp="0">
   <p:cSld>
     <p:spTree>
       <p:nvGrpSpPr>
@@ -8593,84 +8828,46 @@
           <a:chExt cx="0" cy="0"/>
         </a:xfrm>
       </p:grpSpPr>
-      <p:sp>
-        <p:nvSpPr>
-          <p:cNvPr id="4" name="Title 3">
-            <a:extLst>
-              <a:ext uri="{FF2B5EF4-FFF2-40B4-BE49-F238E27FC236}">
-                <a16:creationId xmlns:a16="http://schemas.microsoft.com/office/drawing/2014/main" id="{1C1C866F-EFAC-46BA-904A-D52904C901EA}"/>
-              </a:ext>
-            </a:extLst>
-          </p:cNvPr>
-          <p:cNvSpPr>
-            <a:spLocks noGrp="1"/>
-          </p:cNvSpPr>
-          <p:nvPr>
-            <p:ph type="ctrTitle"/>
-          </p:nvPr>
-        </p:nvSpPr>
-        <p:spPr/>
-        <p:txBody>
-          <a:bodyPr/>
-          <a:lstStyle/>
-          <a:p>
-            <a:r>
-              <a:rPr lang="en-US" dirty="0"/>
-              <a:t>Eric Selje</a:t>
-            </a:r>
-            <a:br>
-              <a:rPr lang="en-US" dirty="0"/>
-            </a:br>
-            <a:r>
-              <a:rPr lang="en-US" dirty="0"/>
-              <a:t>Salty Dog Solutions, LLC</a:t>
-            </a:r>
-            <a:br>
-              <a:rPr lang="en-US" dirty="0"/>
-            </a:br>
-            <a:r>
-              <a:rPr lang="en-US" dirty="0" err="1"/>
-              <a:t>Eric@SaltyDogLLC</a:t>
-            </a:r>
-            <a:br>
-              <a:rPr lang="en-US" dirty="0"/>
-            </a:br>
-            <a:r>
-              <a:rPr lang="en-US" dirty="0"/>
-              <a:t>www.SaltyDogLLC.com</a:t>
-            </a:r>
-          </a:p>
-        </p:txBody>
-      </p:sp>
-      <p:sp>
-        <p:nvSpPr>
-          <p:cNvPr id="3" name="Subtitle 2">
-            <a:extLst>
-              <a:ext uri="{FF2B5EF4-FFF2-40B4-BE49-F238E27FC236}">
-                <a16:creationId xmlns:a16="http://schemas.microsoft.com/office/drawing/2014/main" id="{60AFDF34-F8C3-4D4F-95A3-33F2736D6760}"/>
-              </a:ext>
-            </a:extLst>
-          </p:cNvPr>
-          <p:cNvSpPr>
-            <a:spLocks noGrp="1"/>
-          </p:cNvSpPr>
-          <p:nvPr>
-            <p:ph type="subTitle" idx="1"/>
-          </p:nvPr>
-        </p:nvSpPr>
-        <p:spPr/>
-        <p:txBody>
-          <a:bodyPr/>
-          <a:lstStyle/>
-          <a:p>
-            <a:endParaRPr lang="en-US"/>
-          </a:p>
-        </p:txBody>
-      </p:sp>
+      <p:pic>
+        <p:nvPicPr>
+          <p:cNvPr id="3" name="Picture 2" descr="A picture containing drawing&#10;&#10;Description automatically generated">
+            <a:extLst>
+              <a:ext uri="{FF2B5EF4-FFF2-40B4-BE49-F238E27FC236}">
+                <a16:creationId xmlns:a16="http://schemas.microsoft.com/office/drawing/2014/main" id="{9FD4E7A6-486A-461E-9A4E-FDEB204E877C}"/>
+              </a:ext>
+            </a:extLst>
+          </p:cNvPr>
+          <p:cNvPicPr>
+            <a:picLocks noChangeAspect="1"/>
+          </p:cNvPicPr>
+          <p:nvPr/>
+        </p:nvPicPr>
+        <p:blipFill>
+          <a:blip r:embed="rId2" cstate="print">
+            <a:extLst>
+              <a:ext uri="{28A0092B-C50C-407E-A947-70E740481C1C}">
+                <a14:useLocalDpi xmlns:a14="http://schemas.microsoft.com/office/drawing/2010/main" val="0"/>
+              </a:ext>
+            </a:extLst>
+          </a:blip>
+          <a:stretch>
+            <a:fillRect/>
+          </a:stretch>
+        </p:blipFill>
+        <p:spPr>
+          <a:xfrm>
+            <a:off x="1751012" y="1752600"/>
+            <a:ext cx="10285413" cy="2374469"/>
+          </a:xfrm>
+          <a:prstGeom prst="rect">
+            <a:avLst/>
+          </a:prstGeom>
+        </p:spPr>
+      </p:pic>
     </p:spTree>
     <p:extLst>
       <p:ext uri="{BB962C8B-B14F-4D97-AF65-F5344CB8AC3E}">
-        <p14:creationId xmlns:p14="http://schemas.microsoft.com/office/powerpoint/2010/main" val="2655914804"/>
+        <p14:creationId xmlns:p14="http://schemas.microsoft.com/office/powerpoint/2010/main" val="3295948430"/>
       </p:ext>
     </p:extLst>
   </p:cSld>
@@ -8765,26 +8962,39 @@
           <a:bodyPr/>
           <a:lstStyle/>
           <a:p>
+            <a:pPr>
+              <a:buFont typeface="Wingdings" panose="05000000000000000000" pitchFamily="2" charset="2"/>
+              <a:buChar char="q"/>
+            </a:pPr>
             <a:r>
               <a:rPr lang="en-US" dirty="0"/>
               <a:t>FoxPro Dev from way back</a:t>
             </a:r>
           </a:p>
           <a:p>
+            <a:pPr>
+              <a:buFont typeface="Wingdings" panose="05000000000000000000" pitchFamily="2" charset="2"/>
+              <a:buChar char="q"/>
+            </a:pPr>
             <a:r>
               <a:rPr lang="en-US" dirty="0"/>
               <a:t>Programming is my first love</a:t>
             </a:r>
           </a:p>
           <a:p>
+            <a:pPr>
+              <a:buFont typeface="Wingdings" panose="05000000000000000000" pitchFamily="2" charset="2"/>
+              <a:buChar char="q"/>
+            </a:pPr>
             <a:r>
               <a:rPr lang="en-US" dirty="0"/>
               <a:t>Currently IT Security Officer for the U.S. Courts</a:t>
             </a:r>
           </a:p>
           <a:p>
-            <a:pPr marL="0" indent="0">
-              <a:buNone/>
+            <a:pPr>
+              <a:buFont typeface="Wingdings" panose="05000000000000000000" pitchFamily="2" charset="2"/>
+              <a:buChar char="q"/>
             </a:pPr>
             <a:endParaRPr lang="en-US" dirty="0"/>
           </a:p>
@@ -8855,7 +9065,7 @@
 </file>
 
 <file path=ppt/slides/slide20.xml><?xml version="1.0" encoding="utf-8"?>
-<p:sld xmlns:a="http://schemas.openxmlformats.org/drawingml/2006/main" xmlns:r="http://schemas.openxmlformats.org/officeDocument/2006/relationships" xmlns:p="http://schemas.openxmlformats.org/presentationml/2006/main" showMasterSp="0">
+<p:sld xmlns:a="http://schemas.openxmlformats.org/drawingml/2006/main" xmlns:r="http://schemas.openxmlformats.org/officeDocument/2006/relationships" xmlns:p="http://schemas.openxmlformats.org/presentationml/2006/main" show="0">
   <p:cSld>
     <p:spTree>
       <p:nvGrpSpPr>
@@ -8871,59 +9081,51 @@
           <a:chExt cx="0" cy="0"/>
         </a:xfrm>
       </p:grpSpPr>
-      <p:pic>
-        <p:nvPicPr>
-          <p:cNvPr id="3" name="Picture 2" descr="A picture containing drawing&#10;&#10;Description automatically generated">
-            <a:extLst>
-              <a:ext uri="{FF2B5EF4-FFF2-40B4-BE49-F238E27FC236}">
-                <a16:creationId xmlns:a16="http://schemas.microsoft.com/office/drawing/2014/main" id="{9FD4E7A6-486A-461E-9A4E-FDEB204E877C}"/>
-              </a:ext>
-            </a:extLst>
-          </p:cNvPr>
-          <p:cNvPicPr>
-            <a:picLocks noChangeAspect="1"/>
-          </p:cNvPicPr>
-          <p:nvPr/>
-        </p:nvPicPr>
-        <p:blipFill>
-          <a:blip r:embed="rId2" cstate="print">
-            <a:extLst>
-              <a:ext uri="{28A0092B-C50C-407E-A947-70E740481C1C}">
-                <a14:useLocalDpi xmlns:a14="http://schemas.microsoft.com/office/drawing/2010/main" val="0"/>
-              </a:ext>
-            </a:extLst>
-          </a:blip>
-          <a:stretch>
-            <a:fillRect/>
-          </a:stretch>
-        </p:blipFill>
-        <p:spPr>
-          <a:xfrm>
-            <a:off x="1751012" y="1752600"/>
-            <a:ext cx="10285413" cy="2374469"/>
-          </a:xfrm>
-          <a:prstGeom prst="rect">
-            <a:avLst/>
-          </a:prstGeom>
-        </p:spPr>
-      </p:pic>
+      <p:sp>
+        <p:nvSpPr>
+          <p:cNvPr id="2" name="Title 1">
+            <a:extLst>
+              <a:ext uri="{FF2B5EF4-FFF2-40B4-BE49-F238E27FC236}">
+                <a16:creationId xmlns:a16="http://schemas.microsoft.com/office/drawing/2014/main" id="{48FE95CD-8FB4-497D-91AF-3E37610418C4}"/>
+              </a:ext>
+            </a:extLst>
+          </p:cNvPr>
+          <p:cNvSpPr>
+            <a:spLocks noGrp="1"/>
+          </p:cNvSpPr>
+          <p:nvPr>
+            <p:ph type="ctrTitle"/>
+          </p:nvPr>
+        </p:nvSpPr>
+        <p:spPr/>
+        <p:txBody>
+          <a:bodyPr/>
+          <a:lstStyle/>
+          <a:p>
+            <a:r>
+              <a:rPr lang="en-US" dirty="0"/>
+              <a:t>Bonus Info</a:t>
+            </a:r>
+          </a:p>
+        </p:txBody>
+      </p:sp>
     </p:spTree>
     <p:extLst>
       <p:ext uri="{BB962C8B-B14F-4D97-AF65-F5344CB8AC3E}">
-        <p14:creationId xmlns:p14="http://schemas.microsoft.com/office/powerpoint/2010/main" val="3295948430"/>
+        <p14:creationId xmlns:p14="http://schemas.microsoft.com/office/powerpoint/2010/main" val="3372803397"/>
       </p:ext>
     </p:extLst>
   </p:cSld>
   <p:clrMapOvr>
     <a:masterClrMapping/>
   </p:clrMapOvr>
-  <mc:AlternateContent xmlns:mc="http://schemas.openxmlformats.org/markup-compatibility/2006" xmlns:p14="http://schemas.microsoft.com/office/powerpoint/2010/main">
-    <mc:Choice Requires="p14">
+  <mc:AlternateContent xmlns:mc="http://schemas.openxmlformats.org/markup-compatibility/2006">
+    <mc:Choice xmlns:p14="http://schemas.microsoft.com/office/powerpoint/2010/main" Requires="p14">
       <p:transition spd="med" p14:dur="700">
         <p:fade/>
       </p:transition>
     </mc:Choice>
-    <mc:Fallback xmlns="">
+    <mc:Fallback>
       <p:transition spd="med">
         <p:fade/>
       </p:transition>
@@ -8933,7 +9135,7 @@
 </file>
 
 <file path=ppt/slides/slide21.xml><?xml version="1.0" encoding="utf-8"?>
-<p:sld xmlns:a="http://schemas.openxmlformats.org/drawingml/2006/main" xmlns:r="http://schemas.openxmlformats.org/officeDocument/2006/relationships" xmlns:p="http://schemas.openxmlformats.org/presentationml/2006/main">
+<p:sld xmlns:a="http://schemas.openxmlformats.org/drawingml/2006/main" xmlns:r="http://schemas.openxmlformats.org/officeDocument/2006/relationships" xmlns:p="http://schemas.openxmlformats.org/presentationml/2006/main" show="0">
   <p:cSld>
     <p:spTree>
       <p:nvGrpSpPr>
@@ -8951,10 +9153,10 @@
       </p:grpSpPr>
       <p:sp>
         <p:nvSpPr>
-          <p:cNvPr id="2" name="Title 1">
-            <a:extLst>
-              <a:ext uri="{FF2B5EF4-FFF2-40B4-BE49-F238E27FC236}">
-                <a16:creationId xmlns:a16="http://schemas.microsoft.com/office/drawing/2014/main" id="{48FE95CD-8FB4-497D-91AF-3E37610418C4}"/>
+          <p:cNvPr id="4" name="Content Placeholder 3">
+            <a:extLst>
+              <a:ext uri="{FF2B5EF4-FFF2-40B4-BE49-F238E27FC236}">
+                <a16:creationId xmlns:a16="http://schemas.microsoft.com/office/drawing/2014/main" id="{D39E01CB-F4A1-4B01-A49C-6E57454363E6}"/>
               </a:ext>
             </a:extLst>
           </p:cNvPr>
@@ -8962,7 +9164,7 @@
             <a:spLocks noGrp="1"/>
           </p:cNvSpPr>
           <p:nvPr>
-            <p:ph type="ctrTitle"/>
+            <p:ph idx="1"/>
           </p:nvPr>
         </p:nvSpPr>
         <p:spPr/>
@@ -8972,7 +9174,60 @@
           <a:p>
             <a:r>
               <a:rPr lang="en-US" dirty="0"/>
-              <a:t>Bonus Info</a:t>
+              <a:t>If you order now…</a:t>
+            </a:r>
+          </a:p>
+          <a:p>
+            <a:pPr lvl="1"/>
+            <a:r>
+              <a:rPr lang="en-US" dirty="0"/>
+              <a:t>You’ll get double the product!</a:t>
+            </a:r>
+          </a:p>
+          <a:p>
+            <a:pPr lvl="1"/>
+            <a:r>
+              <a:rPr lang="en-US" dirty="0"/>
+              <a:t>And the shipping is free!</a:t>
+            </a:r>
+          </a:p>
+          <a:p>
+            <a:r>
+              <a:rPr lang="en-US" dirty="0"/>
+              <a:t>The logo at the bottom hyperlinks back to the “Thank-You” slide</a:t>
+            </a:r>
+          </a:p>
+          <a:p>
+            <a:endParaRPr lang="en-US" dirty="0"/>
+          </a:p>
+        </p:txBody>
+      </p:sp>
+      <p:sp>
+        <p:nvSpPr>
+          <p:cNvPr id="3" name="Title 2">
+            <a:extLst>
+              <a:ext uri="{FF2B5EF4-FFF2-40B4-BE49-F238E27FC236}">
+                <a16:creationId xmlns:a16="http://schemas.microsoft.com/office/drawing/2014/main" id="{5CBA38E5-4A77-4425-A8D8-A6D7E700307E}"/>
+              </a:ext>
+            </a:extLst>
+          </p:cNvPr>
+          <p:cNvSpPr>
+            <a:spLocks noGrp="1"/>
+          </p:cNvSpPr>
+          <p:nvPr>
+            <p:ph type="title"/>
+          </p:nvPr>
+        </p:nvSpPr>
+        <p:spPr/>
+        <p:txBody>
+          <a:bodyPr>
+            <a:normAutofit fontScale="90000"/>
+          </a:bodyPr>
+          <a:lstStyle/>
+          <a:p>
+            <a:r>
+              <a:rPr lang="en-US" dirty="0"/>
+              <a:t>But wait … There’s more</a:t>
             </a:r>
           </a:p>
         </p:txBody>
@@ -8980,20 +9235,20 @@
     </p:spTree>
     <p:extLst>
       <p:ext uri="{BB962C8B-B14F-4D97-AF65-F5344CB8AC3E}">
-        <p14:creationId xmlns:p14="http://schemas.microsoft.com/office/powerpoint/2010/main" val="3372803397"/>
+        <p14:creationId xmlns:p14="http://schemas.microsoft.com/office/powerpoint/2010/main" val="998561129"/>
       </p:ext>
     </p:extLst>
   </p:cSld>
   <p:clrMapOvr>
     <a:masterClrMapping/>
   </p:clrMapOvr>
-  <mc:AlternateContent xmlns:mc="http://schemas.openxmlformats.org/markup-compatibility/2006" xmlns:p14="http://schemas.microsoft.com/office/powerpoint/2010/main">
-    <mc:Choice Requires="p14">
+  <mc:AlternateContent xmlns:mc="http://schemas.openxmlformats.org/markup-compatibility/2006">
+    <mc:Choice xmlns:p14="http://schemas.microsoft.com/office/powerpoint/2010/main" Requires="p14">
       <p:transition spd="med" p14:dur="700">
         <p:fade/>
       </p:transition>
     </mc:Choice>
-    <mc:Fallback xmlns="">
+    <mc:Fallback>
       <p:transition spd="med">
         <p:fade/>
       </p:transition>
@@ -9003,7 +9258,7 @@
 </file>
 
 <file path=ppt/slides/slide22.xml><?xml version="1.0" encoding="utf-8"?>
-<p:sld xmlns:a="http://schemas.openxmlformats.org/drawingml/2006/main" xmlns:r="http://schemas.openxmlformats.org/officeDocument/2006/relationships" xmlns:p="http://schemas.openxmlformats.org/presentationml/2006/main">
+<p:sld xmlns:a="http://schemas.openxmlformats.org/drawingml/2006/main" xmlns:r="http://schemas.openxmlformats.org/officeDocument/2006/relationships" xmlns:p="http://schemas.openxmlformats.org/presentationml/2006/main" show="0">
   <p:cSld>
     <p:spTree>
       <p:nvGrpSpPr>
@@ -9021,129 +9276,6 @@
       </p:grpSpPr>
       <p:sp>
         <p:nvSpPr>
-          <p:cNvPr id="4" name="Content Placeholder 3">
-            <a:extLst>
-              <a:ext uri="{FF2B5EF4-FFF2-40B4-BE49-F238E27FC236}">
-                <a16:creationId xmlns:a16="http://schemas.microsoft.com/office/drawing/2014/main" id="{D39E01CB-F4A1-4B01-A49C-6E57454363E6}"/>
-              </a:ext>
-            </a:extLst>
-          </p:cNvPr>
-          <p:cNvSpPr>
-            <a:spLocks noGrp="1"/>
-          </p:cNvSpPr>
-          <p:nvPr>
-            <p:ph idx="1"/>
-          </p:nvPr>
-        </p:nvSpPr>
-        <p:spPr/>
-        <p:txBody>
-          <a:bodyPr/>
-          <a:lstStyle/>
-          <a:p>
-            <a:r>
-              <a:rPr lang="en-US" dirty="0"/>
-              <a:t>If you order now…</a:t>
-            </a:r>
-          </a:p>
-          <a:p>
-            <a:pPr lvl="1"/>
-            <a:r>
-              <a:rPr lang="en-US" dirty="0"/>
-              <a:t>You’ll get double the product!</a:t>
-            </a:r>
-          </a:p>
-          <a:p>
-            <a:pPr lvl="1"/>
-            <a:r>
-              <a:rPr lang="en-US" dirty="0"/>
-              <a:t>And the shipping is free!</a:t>
-            </a:r>
-          </a:p>
-          <a:p>
-            <a:r>
-              <a:rPr lang="en-US" dirty="0"/>
-              <a:t>The logo at the bottom hyperlinks back to the “Thank-You” slide</a:t>
-            </a:r>
-          </a:p>
-          <a:p>
-            <a:endParaRPr lang="en-US" dirty="0"/>
-          </a:p>
-        </p:txBody>
-      </p:sp>
-      <p:sp>
-        <p:nvSpPr>
-          <p:cNvPr id="3" name="Title 2">
-            <a:extLst>
-              <a:ext uri="{FF2B5EF4-FFF2-40B4-BE49-F238E27FC236}">
-                <a16:creationId xmlns:a16="http://schemas.microsoft.com/office/drawing/2014/main" id="{5CBA38E5-4A77-4425-A8D8-A6D7E700307E}"/>
-              </a:ext>
-            </a:extLst>
-          </p:cNvPr>
-          <p:cNvSpPr>
-            <a:spLocks noGrp="1"/>
-          </p:cNvSpPr>
-          <p:nvPr>
-            <p:ph type="title"/>
-          </p:nvPr>
-        </p:nvSpPr>
-        <p:spPr/>
-        <p:txBody>
-          <a:bodyPr>
-            <a:normAutofit fontScale="90000"/>
-          </a:bodyPr>
-          <a:lstStyle/>
-          <a:p>
-            <a:r>
-              <a:rPr lang="en-US" dirty="0"/>
-              <a:t>But wait … There’s more</a:t>
-            </a:r>
-          </a:p>
-        </p:txBody>
-      </p:sp>
-    </p:spTree>
-    <p:extLst>
-      <p:ext uri="{BB962C8B-B14F-4D97-AF65-F5344CB8AC3E}">
-        <p14:creationId xmlns:p14="http://schemas.microsoft.com/office/powerpoint/2010/main" val="998561129"/>
-      </p:ext>
-    </p:extLst>
-  </p:cSld>
-  <p:clrMapOvr>
-    <a:masterClrMapping/>
-  </p:clrMapOvr>
-  <mc:AlternateContent xmlns:mc="http://schemas.openxmlformats.org/markup-compatibility/2006" xmlns:p14="http://schemas.microsoft.com/office/powerpoint/2010/main">
-    <mc:Choice Requires="p14">
-      <p:transition spd="med" p14:dur="700">
-        <p:fade/>
-      </p:transition>
-    </mc:Choice>
-    <mc:Fallback xmlns="">
-      <p:transition spd="med">
-        <p:fade/>
-      </p:transition>
-    </mc:Fallback>
-  </mc:AlternateContent>
-</p:sld>
-</file>
-
-<file path=ppt/slides/slide23.xml><?xml version="1.0" encoding="utf-8"?>
-<p:sld xmlns:a="http://schemas.openxmlformats.org/drawingml/2006/main" xmlns:r="http://schemas.openxmlformats.org/officeDocument/2006/relationships" xmlns:p="http://schemas.openxmlformats.org/presentationml/2006/main">
-  <p:cSld>
-    <p:spTree>
-      <p:nvGrpSpPr>
-        <p:cNvPr id="1" name=""/>
-        <p:cNvGrpSpPr/>
-        <p:nvPr/>
-      </p:nvGrpSpPr>
-      <p:grpSpPr>
-        <a:xfrm>
-          <a:off x="0" y="0"/>
-          <a:ext cx="0" cy="0"/>
-          <a:chOff x="0" y="0"/>
-          <a:chExt cx="0" cy="0"/>
-        </a:xfrm>
-      </p:grpSpPr>
-      <p:sp>
-        <p:nvSpPr>
           <p:cNvPr id="2" name="Content Placeholder 1">
             <a:extLst>
               <a:ext uri="{FF2B5EF4-FFF2-40B4-BE49-F238E27FC236}">
@@ -9227,13 +9359,13 @@
   <p:clrMapOvr>
     <a:masterClrMapping/>
   </p:clrMapOvr>
-  <mc:AlternateContent xmlns:mc="http://schemas.openxmlformats.org/markup-compatibility/2006" xmlns:p14="http://schemas.microsoft.com/office/powerpoint/2010/main">
-    <mc:Choice Requires="p14">
+  <mc:AlternateContent xmlns:mc="http://schemas.openxmlformats.org/markup-compatibility/2006">
+    <mc:Choice xmlns:p14="http://schemas.microsoft.com/office/powerpoint/2010/main" Requires="p14">
       <p:transition spd="med" p14:dur="700">
         <p:fade/>
       </p:transition>
     </mc:Choice>
-    <mc:Fallback xmlns="">
+    <mc:Fallback>
       <p:transition spd="med">
         <p:fade/>
       </p:transition>
@@ -9242,7 +9374,7 @@
 </p:sld>
 </file>
 
-<file path=ppt/slides/slide24.xml><?xml version="1.0" encoding="utf-8"?>
+<file path=ppt/slides/slide23.xml><?xml version="1.0" encoding="utf-8"?>
 <p:sld xmlns:a="http://schemas.openxmlformats.org/drawingml/2006/main" xmlns:r="http://schemas.openxmlformats.org/officeDocument/2006/relationships" xmlns:p="http://schemas.openxmlformats.org/presentationml/2006/main" showMasterSp="0">
   <p:cSld>
     <p:spTree>
@@ -9284,7 +9416,7 @@
 </p:sld>
 </file>
 
-<file path=ppt/slides/slide25.xml><?xml version="1.0" encoding="utf-8"?>
+<file path=ppt/slides/slide24.xml><?xml version="1.0" encoding="utf-8"?>
 <p:sld xmlns:a="http://schemas.openxmlformats.org/drawingml/2006/main" xmlns:r="http://schemas.openxmlformats.org/officeDocument/2006/relationships" xmlns:p="http://schemas.openxmlformats.org/presentationml/2006/main" showMasterSp="0" show="0">
   <p:cSld>
     <p:spTree>
@@ -12948,30 +13080,50 @@
           <a:bodyPr/>
           <a:lstStyle/>
           <a:p>
+            <a:pPr>
+              <a:buFont typeface="Wingdings" panose="05000000000000000000" pitchFamily="2" charset="2"/>
+              <a:buChar char="q"/>
+            </a:pPr>
             <a:r>
               <a:rPr lang="en-US" dirty="0"/>
               <a:t>Take a look at our sample FoxPro application</a:t>
             </a:r>
           </a:p>
           <a:p>
+            <a:pPr>
+              <a:buFont typeface="Wingdings" panose="05000000000000000000" pitchFamily="2" charset="2"/>
+              <a:buChar char="q"/>
+            </a:pPr>
             <a:r>
               <a:rPr lang="en-US" dirty="0"/>
               <a:t>Create a new X# solution in Visual Studio</a:t>
             </a:r>
           </a:p>
           <a:p>
+            <a:pPr>
+              <a:buFont typeface="Wingdings" panose="05000000000000000000" pitchFamily="2" charset="2"/>
+              <a:buChar char="q"/>
+            </a:pPr>
             <a:r>
               <a:rPr lang="en-US" dirty="0"/>
               <a:t>Write and test our business objects</a:t>
             </a:r>
           </a:p>
           <a:p>
+            <a:pPr>
+              <a:buFont typeface="Wingdings" panose="05000000000000000000" pitchFamily="2" charset="2"/>
+              <a:buChar char="q"/>
+            </a:pPr>
             <a:r>
               <a:rPr lang="en-US" dirty="0"/>
               <a:t>Create a XAML form</a:t>
             </a:r>
           </a:p>
           <a:p>
+            <a:pPr>
+              <a:buFont typeface="Wingdings" panose="05000000000000000000" pitchFamily="2" charset="2"/>
+              <a:buChar char="q"/>
+            </a:pPr>
             <a:r>
               <a:rPr lang="en-US" dirty="0"/>
               <a:t>Discussion</a:t>
@@ -13131,42 +13283,41 @@
           </a:p>
         </p:txBody>
       </p:sp>
-      <p:sp>
-        <p:nvSpPr>
-          <p:cNvPr id="4" name="Content Placeholder 3">
-            <a:extLst>
-              <a:ext uri="{FF2B5EF4-FFF2-40B4-BE49-F238E27FC236}">
-                <a16:creationId xmlns:a16="http://schemas.microsoft.com/office/drawing/2014/main" id="{C80A664F-4C2C-4690-BBF4-2158BB0C1FD3}"/>
-              </a:ext>
-            </a:extLst>
-          </p:cNvPr>
-          <p:cNvSpPr>
-            <a:spLocks noGrp="1"/>
-          </p:cNvSpPr>
+      <p:pic>
+        <p:nvPicPr>
+          <p:cNvPr id="5" name="Snagit_SNG873">
+            <a:extLst>
+              <a:ext uri="{FF2B5EF4-FFF2-40B4-BE49-F238E27FC236}">
+                <a16:creationId xmlns:a16="http://schemas.microsoft.com/office/drawing/2014/main" id="{0C2E52A6-1CAD-463E-BF0F-91EFF2D99F4D}"/>
+              </a:ext>
+            </a:extLst>
+          </p:cNvPr>
+          <p:cNvPicPr>
+            <a:picLocks noGrp="1" noChangeAspect="1"/>
+          </p:cNvPicPr>
           <p:nvPr>
             <p:ph idx="10"/>
           </p:nvPr>
-        </p:nvSpPr>
+        </p:nvPicPr>
+        <p:blipFill>
+          <a:blip r:embed="rId3">
+            <a:extLst>
+              <a:ext uri="{28A0092B-C50C-407E-A947-70E740481C1C}">
+                <a14:useLocalDpi xmlns:a14="http://schemas.microsoft.com/office/drawing/2010/main" val="0"/>
+              </a:ext>
+            </a:extLst>
+          </a:blip>
+          <a:stretch>
+            <a:fillRect/>
+          </a:stretch>
+        </p:blipFill>
         <p:spPr>
           <a:xfrm>
-            <a:off x="1979613" y="1447800"/>
-            <a:ext cx="9675812" cy="4648200"/>
-          </a:xfrm>
-        </p:spPr>
-        <p:txBody>
-          <a:bodyPr/>
-          <a:lstStyle/>
-          <a:p>
-            <a:r>
-              <a:rPr lang="en-US" dirty="0"/>
-              <a:t>All the code is </a:t>
-            </a:r>
-          </a:p>
-          <a:p>
-            <a:endParaRPr lang="en-US" dirty="0"/>
-          </a:p>
-        </p:txBody>
-      </p:sp>
+            <a:off x="4937919" y="1447800"/>
+            <a:ext cx="3759200" cy="4648200"/>
+          </a:xfrm>
+        </p:spPr>
+      </p:pic>
     </p:spTree>
     <p:extLst>
       <p:ext uri="{BB962C8B-B14F-4D97-AF65-F5344CB8AC3E}">
@@ -13234,48 +13385,164 @@
           <a:p>
             <a:r>
               <a:rPr lang="en-US" dirty="0"/>
-              <a:t>More Stuff</a:t>
-            </a:r>
-          </a:p>
-        </p:txBody>
-      </p:sp>
-      <p:sp>
-        <p:nvSpPr>
-          <p:cNvPr id="3" name="Content Placeholder 2">
-            <a:extLst>
-              <a:ext uri="{FF2B5EF4-FFF2-40B4-BE49-F238E27FC236}">
-                <a16:creationId xmlns:a16="http://schemas.microsoft.com/office/drawing/2014/main" id="{584CB90D-C122-4455-AE5C-4D8E92725AE3}"/>
-              </a:ext>
-            </a:extLst>
-          </p:cNvPr>
-          <p:cNvSpPr>
-            <a:spLocks noGrp="1"/>
-          </p:cNvSpPr>
+              <a:t>Under the Covers</a:t>
+            </a:r>
+          </a:p>
+        </p:txBody>
+      </p:sp>
+      <p:pic>
+        <p:nvPicPr>
+          <p:cNvPr id="5" name="Snagit_SNG87B">
+            <a:extLst>
+              <a:ext uri="{FF2B5EF4-FFF2-40B4-BE49-F238E27FC236}">
+                <a16:creationId xmlns:a16="http://schemas.microsoft.com/office/drawing/2014/main" id="{DC5049C7-7D51-408B-8333-E1BD720E782D}"/>
+              </a:ext>
+            </a:extLst>
+          </p:cNvPr>
+          <p:cNvPicPr>
+            <a:picLocks noGrp="1" noChangeAspect="1"/>
+          </p:cNvPicPr>
           <p:nvPr>
             <p:ph sz="quarter" idx="10"/>
           </p:nvPr>
-        </p:nvSpPr>
-        <p:spPr/>
-        <p:txBody>
-          <a:bodyPr/>
-          <a:lstStyle/>
-          <a:p>
+        </p:nvPicPr>
+        <p:blipFill>
+          <a:blip r:embed="rId2">
+            <a:extLst>
+              <a:ext uri="{28A0092B-C50C-407E-A947-70E740481C1C}">
+                <a14:useLocalDpi xmlns:a14="http://schemas.microsoft.com/office/drawing/2010/main" val="0"/>
+              </a:ext>
+            </a:extLst>
+          </a:blip>
+          <a:stretch>
+            <a:fillRect/>
+          </a:stretch>
+        </p:blipFill>
+        <p:spPr>
+          <a:xfrm>
+            <a:off x="1979612" y="1371600"/>
+            <a:ext cx="3281082" cy="4648200"/>
+          </a:xfrm>
+        </p:spPr>
+      </p:pic>
+      <p:sp>
+        <p:nvSpPr>
+          <p:cNvPr id="6" name="TextBox 5">
+            <a:extLst>
+              <a:ext uri="{FF2B5EF4-FFF2-40B4-BE49-F238E27FC236}">
+                <a16:creationId xmlns:a16="http://schemas.microsoft.com/office/drawing/2014/main" id="{7CDB6BF3-6F1B-4B3F-BACD-FC1749A637B6}"/>
+              </a:ext>
+            </a:extLst>
+          </p:cNvPr>
+          <p:cNvSpPr txBox="1"/>
+          <p:nvPr/>
+        </p:nvSpPr>
+        <p:spPr>
+          <a:xfrm>
+            <a:off x="5561012" y="1524000"/>
+            <a:ext cx="6096000" cy="2677656"/>
+          </a:xfrm>
+          <a:prstGeom prst="rect">
+            <a:avLst/>
+          </a:prstGeom>
+          <a:noFill/>
+        </p:spPr>
+        <p:txBody>
+          <a:bodyPr wrap="square" rtlCol="0">
+            <a:spAutoFit/>
+          </a:bodyPr>
+          <a:lstStyle/>
+          <a:p>
+            <a:pPr marL="342900" indent="-342900">
+              <a:buFont typeface="Arial" panose="020B0604020202020204" pitchFamily="34" charset="0"/>
+              <a:buChar char="•"/>
+            </a:pPr>
+            <a:r>
+              <a:rPr lang="en-US" dirty="0"/>
+              <a:t>Data: </a:t>
+            </a:r>
             <a:r>
               <a:rPr lang="en-US" dirty="0" err="1"/>
-              <a:t>Abc</a:t>
+              <a:t>ToDos.dbf</a:t>
             </a:r>
             <a:endParaRPr lang="en-US" dirty="0"/>
           </a:p>
           <a:p>
+            <a:pPr marL="342900" indent="-342900">
+              <a:buFont typeface="Arial" panose="020B0604020202020204" pitchFamily="34" charset="0"/>
+              <a:buChar char="•"/>
+            </a:pPr>
             <a:r>
               <a:rPr lang="en-US" dirty="0"/>
-              <a:t>Def</a:t>
-            </a:r>
-          </a:p>
-          <a:p>
+              <a:t>Form: </a:t>
+            </a:r>
             <a:r>
               <a:rPr lang="en-US" dirty="0" err="1"/>
-              <a:t>Xyz</a:t>
+              <a:t>ToDos</a:t>
+            </a:r>
+            <a:endParaRPr lang="en-US" dirty="0"/>
+          </a:p>
+          <a:p>
+            <a:pPr marL="342900" indent="-342900">
+              <a:buFont typeface="Arial" panose="020B0604020202020204" pitchFamily="34" charset="0"/>
+              <a:buChar char="•"/>
+            </a:pPr>
+            <a:r>
+              <a:rPr lang="en-US" dirty="0"/>
+              <a:t>Report: </a:t>
+            </a:r>
+            <a:r>
+              <a:rPr lang="en-US" dirty="0" err="1"/>
+              <a:t>ToDos</a:t>
+            </a:r>
+            <a:endParaRPr lang="en-US" dirty="0"/>
+          </a:p>
+          <a:p>
+            <a:pPr marL="342900" indent="-342900">
+              <a:buFont typeface="Arial" panose="020B0604020202020204" pitchFamily="34" charset="0"/>
+              <a:buChar char="•"/>
+            </a:pPr>
+            <a:r>
+              <a:rPr lang="en-US" dirty="0"/>
+              <a:t>Visual Classes: </a:t>
+            </a:r>
+            <a:r>
+              <a:rPr lang="en-US" dirty="0" err="1"/>
+              <a:t>cntToDo</a:t>
+            </a:r>
+            <a:endParaRPr lang="en-US" dirty="0"/>
+          </a:p>
+          <a:p>
+            <a:pPr marL="342900" indent="-342900">
+              <a:buFont typeface="Arial" panose="020B0604020202020204" pitchFamily="34" charset="0"/>
+              <a:buChar char="•"/>
+            </a:pPr>
+            <a:r>
+              <a:rPr lang="en-US" dirty="0" err="1"/>
+              <a:t>NonVisual</a:t>
+            </a:r>
+            <a:r>
+              <a:rPr lang="en-US" dirty="0"/>
+              <a:t> Classes: </a:t>
+            </a:r>
+            <a:r>
+              <a:rPr lang="en-US" dirty="0" err="1"/>
+              <a:t>ToDoClasses</a:t>
+            </a:r>
+            <a:endParaRPr lang="en-US" dirty="0"/>
+          </a:p>
+          <a:p>
+            <a:pPr marL="342900" indent="-342900">
+              <a:buFont typeface="Arial" panose="020B0604020202020204" pitchFamily="34" charset="0"/>
+              <a:buChar char="•"/>
+            </a:pPr>
+            <a:r>
+              <a:rPr lang="en-US" dirty="0"/>
+              <a:t>Code: </a:t>
+            </a:r>
+            <a:r>
+              <a:rPr lang="en-US" dirty="0" err="1"/>
+              <a:t>ToDoMain</a:t>
             </a:r>
             <a:endParaRPr lang="en-US" dirty="0"/>
           </a:p>
@@ -13421,7 +13688,7 @@
           <a:p>
             <a:r>
               <a:rPr lang="en-US" dirty="0"/>
-              <a:t>Agenda #2 Title</a:t>
+              <a:t>Creating a Solution</a:t>
             </a:r>
           </a:p>
         </p:txBody>
@@ -13447,21 +13714,23 @@
           <a:bodyPr/>
           <a:lstStyle/>
           <a:p>
+            <a:pPr>
+              <a:buFont typeface="Wingdings" panose="05000000000000000000" pitchFamily="2" charset="2"/>
+              <a:buChar char="q"/>
+            </a:pPr>
             <a:r>
               <a:rPr lang="en-US" dirty="0"/>
-              <a:t>Blah</a:t>
-            </a:r>
-          </a:p>
-          <a:p>
+              <a:t>Project Templates</a:t>
+            </a:r>
+          </a:p>
+          <a:p>
+            <a:pPr>
+              <a:buFont typeface="Wingdings" panose="05000000000000000000" pitchFamily="2" charset="2"/>
+              <a:buChar char="q"/>
+            </a:pPr>
             <a:r>
               <a:rPr lang="en-US" dirty="0"/>
-              <a:t>Blah</a:t>
-            </a:r>
-          </a:p>
-          <a:p>
-            <a:r>
-              <a:rPr lang="en-US" dirty="0"/>
-              <a:t>Blah</a:t>
+              <a:t>Creating a Class</a:t>
             </a:r>
           </a:p>
         </p:txBody>

</xml_diff>

<commit_message>
All tests pass. Updated docs.
</commit_message>
<xml_diff>
--- a/Docs/Selje_XSharpFromScratch_Slides.pptx
+++ b/Docs/Selje_XSharpFromScratch_Slides.pptx
@@ -325,7 +325,7 @@
                   <a:schemeClr val="tx2"/>
                 </a:solidFill>
               </a:rPr>
-              <a:t>05/10/2020</a:t>
+              <a:t>09/10/2020</a:t>
             </a:fld>
             <a:endParaRPr lang="en-GB" dirty="0">
               <a:solidFill>
@@ -518,7 +518,7 @@
           <a:p>
             <a:fld id="{43F82CE1-C859-40EE-9EB2-765AABAEDB14}" type="datetime1">
               <a:rPr lang="en-GB" noProof="0" smtClean="0"/>
-              <a:t>05/10/2020</a:t>
+              <a:t>09/10/2020</a:t>
             </a:fld>
             <a:endParaRPr lang="en-GB" noProof="0" dirty="0"/>
           </a:p>
@@ -863,7 +863,7 @@
           <a:p>
             <a:fld id="{43F82CE1-C859-40EE-9EB2-765AABAEDB14}" type="datetime1">
               <a:rPr lang="en-GB" noProof="0" smtClean="0"/>
-              <a:t>05/10/2020</a:t>
+              <a:t>09/10/2020</a:t>
             </a:fld>
             <a:endParaRPr lang="en-GB" noProof="0" dirty="0"/>
           </a:p>
@@ -978,7 +978,7 @@
           <a:p>
             <a:fld id="{43F82CE1-C859-40EE-9EB2-765AABAEDB14}" type="datetime1">
               <a:rPr lang="en-GB" noProof="0" smtClean="0"/>
-              <a:t>05/10/2020</a:t>
+              <a:t>09/10/2020</a:t>
             </a:fld>
             <a:endParaRPr lang="en-GB" noProof="0" dirty="0"/>
           </a:p>
@@ -1090,7 +1090,7 @@
           <a:p>
             <a:fld id="{43F82CE1-C859-40EE-9EB2-765AABAEDB14}" type="datetime1">
               <a:rPr lang="en-GB" noProof="0" smtClean="0"/>
-              <a:t>05/10/2020</a:t>
+              <a:t>09/10/2020</a:t>
             </a:fld>
             <a:endParaRPr lang="en-GB" noProof="0" dirty="0"/>
           </a:p>
@@ -1211,7 +1211,7 @@
           <a:p>
             <a:fld id="{43F82CE1-C859-40EE-9EB2-765AABAEDB14}" type="datetime1">
               <a:rPr lang="en-GB" noProof="0" smtClean="0"/>
-              <a:t>05/10/2020</a:t>
+              <a:t>09/10/2020</a:t>
             </a:fld>
             <a:endParaRPr lang="en-GB" noProof="0" dirty="0"/>
           </a:p>
@@ -3173,7 +3173,7 @@
 </file>
 
 <file path=ppt/slideLayouts/slideLayout13.xml><?xml version="1.0" encoding="utf-8"?>
-<p:sldLayout xmlns:a="http://schemas.openxmlformats.org/drawingml/2006/main" xmlns:r="http://schemas.openxmlformats.org/officeDocument/2006/relationships" xmlns:p="http://schemas.openxmlformats.org/presentationml/2006/main" showMasterSp="0" type="title" preserve="1">
+<p:sldLayout xmlns:a="http://schemas.openxmlformats.org/drawingml/2006/main" xmlns:r="http://schemas.openxmlformats.org/officeDocument/2006/relationships" xmlns:p="http://schemas.openxmlformats.org/presentationml/2006/main" showMasterSp="0" preserve="1" userDrawn="1">
   <p:cSld name="Thank-You">
     <p:bg>
       <p:bgPr>
@@ -3528,139 +3528,6 @@
               <a:rPr lang="en-US" dirty="0"/>
               <a:t>Click to edit Name &amp; Contact Info</a:t>
             </a:r>
-          </a:p>
-        </p:txBody>
-      </p:sp>
-      <p:sp>
-        <p:nvSpPr>
-          <p:cNvPr id="3" name="Subtitle 2"/>
-          <p:cNvSpPr>
-            <a:spLocks noGrp="1"/>
-          </p:cNvSpPr>
-          <p:nvPr>
-            <p:ph type="subTitle" idx="1" hasCustomPrompt="1"/>
-          </p:nvPr>
-        </p:nvSpPr>
-        <p:spPr>
-          <a:xfrm>
-            <a:off x="2590125" y="5257798"/>
-            <a:ext cx="7008574" cy="685802"/>
-          </a:xfrm>
-          <a:prstGeom prst="rect">
-            <a:avLst/>
-          </a:prstGeom>
-        </p:spPr>
-        <p:txBody>
-          <a:bodyPr rtlCol="0">
-            <a:normAutofit/>
-          </a:bodyPr>
-          <a:lstStyle>
-            <a:lvl1pPr marL="0" indent="0" algn="ctr">
-              <a:spcBef>
-                <a:spcPts val="0"/>
-              </a:spcBef>
-              <a:buNone/>
-              <a:defRPr sz="2800" b="0">
-                <a:solidFill>
-                  <a:srgbClr val="EA772A"/>
-                </a:solidFill>
-                <a:effectLst>
-                  <a:outerShdw blurRad="50800" dist="38100" dir="2700000" algn="tl" rotWithShape="0">
-                    <a:prstClr val="black">
-                      <a:alpha val="40000"/>
-                    </a:prstClr>
-                  </a:outerShdw>
-                </a:effectLst>
-              </a:defRPr>
-            </a:lvl1pPr>
-            <a:lvl2pPr marL="609493" indent="0" algn="ctr">
-              <a:buNone/>
-              <a:defRPr>
-                <a:solidFill>
-                  <a:schemeClr val="tx1">
-                    <a:tint val="75000"/>
-                  </a:schemeClr>
-                </a:solidFill>
-              </a:defRPr>
-            </a:lvl2pPr>
-            <a:lvl3pPr marL="1218987" indent="0" algn="ctr">
-              <a:buNone/>
-              <a:defRPr>
-                <a:solidFill>
-                  <a:schemeClr val="tx1">
-                    <a:tint val="75000"/>
-                  </a:schemeClr>
-                </a:solidFill>
-              </a:defRPr>
-            </a:lvl3pPr>
-            <a:lvl4pPr marL="1828480" indent="0" algn="ctr">
-              <a:buNone/>
-              <a:defRPr>
-                <a:solidFill>
-                  <a:schemeClr val="tx1">
-                    <a:tint val="75000"/>
-                  </a:schemeClr>
-                </a:solidFill>
-              </a:defRPr>
-            </a:lvl4pPr>
-            <a:lvl5pPr marL="2437973" indent="0" algn="ctr">
-              <a:buNone/>
-              <a:defRPr>
-                <a:solidFill>
-                  <a:schemeClr val="tx1">
-                    <a:tint val="75000"/>
-                  </a:schemeClr>
-                </a:solidFill>
-              </a:defRPr>
-            </a:lvl5pPr>
-            <a:lvl6pPr marL="3047467" indent="0" algn="ctr">
-              <a:buNone/>
-              <a:defRPr>
-                <a:solidFill>
-                  <a:schemeClr val="tx1">
-                    <a:tint val="75000"/>
-                  </a:schemeClr>
-                </a:solidFill>
-              </a:defRPr>
-            </a:lvl6pPr>
-            <a:lvl7pPr marL="3656960" indent="0" algn="ctr">
-              <a:buNone/>
-              <a:defRPr>
-                <a:solidFill>
-                  <a:schemeClr val="tx1">
-                    <a:tint val="75000"/>
-                  </a:schemeClr>
-                </a:solidFill>
-              </a:defRPr>
-            </a:lvl7pPr>
-            <a:lvl8pPr marL="4266453" indent="0" algn="ctr">
-              <a:buNone/>
-              <a:defRPr>
-                <a:solidFill>
-                  <a:schemeClr val="tx1">
-                    <a:tint val="75000"/>
-                  </a:schemeClr>
-                </a:solidFill>
-              </a:defRPr>
-            </a:lvl8pPr>
-            <a:lvl9pPr marL="4875947" indent="0" algn="ctr">
-              <a:buNone/>
-              <a:defRPr>
-                <a:solidFill>
-                  <a:schemeClr val="tx1">
-                    <a:tint val="75000"/>
-                  </a:schemeClr>
-                </a:solidFill>
-              </a:defRPr>
-            </a:lvl9pPr>
-          </a:lstStyle>
-          <a:p>
-            <a:pPr rtl="0"/>
-            <a:r>
-              <a:rPr lang="en-US" dirty="0"/>
-              <a:t>Please fill out your evaluation.</a:t>
-            </a:r>
-            <a:endParaRPr dirty="0"/>
           </a:p>
         </p:txBody>
       </p:sp>
@@ -3917,6 +3784,46 @@
           </a:prstGeom>
         </p:spPr>
       </p:pic>
+      <p:sp>
+        <p:nvSpPr>
+          <p:cNvPr id="4" name="TextBox 3">
+            <a:extLst>
+              <a:ext uri="{FF2B5EF4-FFF2-40B4-BE49-F238E27FC236}">
+                <a16:creationId xmlns:a16="http://schemas.microsoft.com/office/drawing/2014/main" id="{B84376D5-D3DA-4B34-9341-FCE708F0DD5D}"/>
+              </a:ext>
+            </a:extLst>
+          </p:cNvPr>
+          <p:cNvSpPr txBox="1"/>
+          <p:nvPr userDrawn="1"/>
+        </p:nvSpPr>
+        <p:spPr>
+          <a:xfrm>
+            <a:off x="2590125" y="5334000"/>
+            <a:ext cx="7008574" cy="461665"/>
+          </a:xfrm>
+          <a:prstGeom prst="rect">
+            <a:avLst/>
+          </a:prstGeom>
+          <a:noFill/>
+        </p:spPr>
+        <p:txBody>
+          <a:bodyPr wrap="square" rtlCol="0">
+            <a:spAutoFit/>
+          </a:bodyPr>
+          <a:lstStyle/>
+          <a:p>
+            <a:pPr algn="ctr"/>
+            <a:r>
+              <a:rPr lang="en-US" b="1" dirty="0">
+                <a:solidFill>
+                  <a:srgbClr val="FFC000"/>
+                </a:solidFill>
+              </a:rPr>
+              <a:t>Please Fill Out Your Evaluations!</a:t>
+            </a:r>
+          </a:p>
+        </p:txBody>
+      </p:sp>
     </p:spTree>
     <p:extLst>
       <p:ext uri="{BB962C8B-B14F-4D97-AF65-F5344CB8AC3E}">
@@ -8855,31 +8762,6 @@
           </a:p>
         </p:txBody>
       </p:sp>
-      <p:sp>
-        <p:nvSpPr>
-          <p:cNvPr id="3" name="Subtitle 2">
-            <a:extLst>
-              <a:ext uri="{FF2B5EF4-FFF2-40B4-BE49-F238E27FC236}">
-                <a16:creationId xmlns:a16="http://schemas.microsoft.com/office/drawing/2014/main" id="{60AFDF34-F8C3-4D4F-95A3-33F2736D6760}"/>
-              </a:ext>
-            </a:extLst>
-          </p:cNvPr>
-          <p:cNvSpPr>
-            <a:spLocks noGrp="1"/>
-          </p:cNvSpPr>
-          <p:nvPr>
-            <p:ph type="subTitle" idx="1"/>
-          </p:nvPr>
-        </p:nvSpPr>
-        <p:spPr/>
-        <p:txBody>
-          <a:bodyPr/>
-          <a:lstStyle/>
-          <a:p>
-            <a:endParaRPr lang="en-US"/>
-          </a:p>
-        </p:txBody>
-      </p:sp>
     </p:spTree>
     <p:extLst>
       <p:ext uri="{BB962C8B-B14F-4D97-AF65-F5344CB8AC3E}">
@@ -9127,6 +9009,42 @@
           <a:xfrm>
             <a:off x="10202369" y="457200"/>
             <a:ext cx="1524000" cy="1524000"/>
+          </a:xfrm>
+          <a:prstGeom prst="rect">
+            <a:avLst/>
+          </a:prstGeom>
+        </p:spPr>
+      </p:pic>
+      <p:pic>
+        <p:nvPicPr>
+          <p:cNvPr id="8" name="Picture 7" descr="Shape, circle&#10;&#10;Description automatically generated">
+            <a:extLst>
+              <a:ext uri="{FF2B5EF4-FFF2-40B4-BE49-F238E27FC236}">
+                <a16:creationId xmlns:a16="http://schemas.microsoft.com/office/drawing/2014/main" id="{46716F51-6800-418B-A136-BB5E051BFA65}"/>
+              </a:ext>
+            </a:extLst>
+          </p:cNvPr>
+          <p:cNvPicPr>
+            <a:picLocks noChangeAspect="1"/>
+          </p:cNvPicPr>
+          <p:nvPr/>
+        </p:nvPicPr>
+        <p:blipFill>
+          <a:blip r:embed="rId4" cstate="print">
+            <a:extLst>
+              <a:ext uri="{28A0092B-C50C-407E-A947-70E740481C1C}">
+                <a14:useLocalDpi xmlns:a14="http://schemas.microsoft.com/office/drawing/2010/main" val="0"/>
+              </a:ext>
+            </a:extLst>
+          </a:blip>
+          <a:stretch>
+            <a:fillRect/>
+          </a:stretch>
+        </p:blipFill>
+        <p:spPr>
+          <a:xfrm>
+            <a:off x="1598612" y="4038600"/>
+            <a:ext cx="2812605" cy="2338387"/>
           </a:xfrm>
           <a:prstGeom prst="rect">
             <a:avLst/>
@@ -14689,7 +14607,7 @@
 
 <file path=customXml/item13.xml><?xml version="1.0" encoding="utf-8"?>
 <Control xmlns="http://schemas.microsoft.com/VisualStudio/2011/storyboarding/control">
-  <Id Name="3a5f3215-4f7c-4247-9247-a9acf7619a8c" Revision="1" Stencil="System.MyShapes" StencilVersion="1.0"/>
+  <Id Name="37d07999-8e88-45a7-b776-aa394cd3ee89" Revision="1" Stencil="System.MyShapes" StencilVersion="1.0"/>
 </Control>
 </file>
 
@@ -14718,139 +14636,9 @@
 </file>
 
 <file path=customXml/item18.xml><?xml version="1.0" encoding="utf-8"?>
-<p:properties xmlns:p="http://schemas.microsoft.com/office/2006/metadata/properties" xmlns:xsi="http://www.w3.org/2001/XMLSchema-instance" xmlns:pc="http://schemas.microsoft.com/office/infopath/2007/PartnerControls">
-  <documentManagement>
-    <LocPublishedLinkedAssetsLookup xmlns="4873beb7-5857-4685-be1f-d57550cc96cc" xsi:nil="true"/>
-    <ApprovalStatus xmlns="4873beb7-5857-4685-be1f-d57550cc96cc">InProgress</ApprovalStatus>
-    <MarketSpecific xmlns="4873beb7-5857-4685-be1f-d57550cc96cc">false</MarketSpecific>
-    <LocComments xmlns="4873beb7-5857-4685-be1f-d57550cc96cc" xsi:nil="true"/>
-    <LocLastLocAttemptVersionTypeLookup xmlns="4873beb7-5857-4685-be1f-d57550cc96cc" xsi:nil="true"/>
-    <DirectSourceMarket xmlns="4873beb7-5857-4685-be1f-d57550cc96cc" xsi:nil="true"/>
-    <ThumbnailAssetId xmlns="4873beb7-5857-4685-be1f-d57550cc96cc" xsi:nil="true"/>
-    <PrimaryImageGen xmlns="4873beb7-5857-4685-be1f-d57550cc96cc">false</PrimaryImageGen>
-    <LocNewPublishedVersionLookup xmlns="4873beb7-5857-4685-be1f-d57550cc96cc" xsi:nil="true"/>
-    <LegacyData xmlns="4873beb7-5857-4685-be1f-d57550cc96cc" xsi:nil="true"/>
-    <LocRecommendedHandoff xmlns="4873beb7-5857-4685-be1f-d57550cc96cc" xsi:nil="true"/>
-    <BusinessGroup xmlns="4873beb7-5857-4685-be1f-d57550cc96cc" xsi:nil="true"/>
-    <BlockPublish xmlns="4873beb7-5857-4685-be1f-d57550cc96cc">false</BlockPublish>
-    <TPFriendlyName xmlns="4873beb7-5857-4685-be1f-d57550cc96cc" xsi:nil="true"/>
-    <LocOverallPublishStatusLookup xmlns="4873beb7-5857-4685-be1f-d57550cc96cc" xsi:nil="true"/>
-    <NumericId xmlns="4873beb7-5857-4685-be1f-d57550cc96cc" xsi:nil="true"/>
-    <APEditor xmlns="4873beb7-5857-4685-be1f-d57550cc96cc">
-      <UserInfo>
-        <DisplayName/>
-        <AccountId xsi:nil="true"/>
-        <AccountType/>
-      </UserInfo>
-    </APEditor>
-    <SourceTitle xmlns="4873beb7-5857-4685-be1f-d57550cc96cc" xsi:nil="true"/>
-    <OpenTemplate xmlns="4873beb7-5857-4685-be1f-d57550cc96cc">true</OpenTemplate>
-    <LocOverallLocStatusLookup xmlns="4873beb7-5857-4685-be1f-d57550cc96cc" xsi:nil="true"/>
-    <UALocComments xmlns="4873beb7-5857-4685-be1f-d57550cc96cc" xsi:nil="true"/>
-    <ParentAssetId xmlns="4873beb7-5857-4685-be1f-d57550cc96cc" xsi:nil="true"/>
-    <IntlLangReviewDate xmlns="4873beb7-5857-4685-be1f-d57550cc96cc" xsi:nil="true"/>
-    <FeatureTagsTaxHTField0 xmlns="4873beb7-5857-4685-be1f-d57550cc96cc">
-      <Terms xmlns="http://schemas.microsoft.com/office/infopath/2007/PartnerControls"/>
-    </FeatureTagsTaxHTField0>
-    <PublishStatusLookup xmlns="4873beb7-5857-4685-be1f-d57550cc96cc">
-      <Value>1345039</Value>
-    </PublishStatusLookup>
-    <Providers xmlns="4873beb7-5857-4685-be1f-d57550cc96cc" xsi:nil="true"/>
-    <MachineTranslated xmlns="4873beb7-5857-4685-be1f-d57550cc96cc">false</MachineTranslated>
-    <OriginalSourceMarket xmlns="4873beb7-5857-4685-be1f-d57550cc96cc" xsi:nil="true"/>
-    <APDescription xmlns="4873beb7-5857-4685-be1f-d57550cc96cc">The bookstacks present on most slides  make this a good choice for students, teachers, reading enthusiasts, and others in education. This presentation template contains multiple slide layouts in widescreen format (16x9) and includes a sample table and chart that you can easily  modify.</APDescription>
-    <ClipArtFilename xmlns="4873beb7-5857-4685-be1f-d57550cc96cc" xsi:nil="true"/>
-    <ContentItem xmlns="4873beb7-5857-4685-be1f-d57550cc96cc" xsi:nil="true"/>
-    <TPInstallLocation xmlns="4873beb7-5857-4685-be1f-d57550cc96cc" xsi:nil="true"/>
-    <PublishTargets xmlns="4873beb7-5857-4685-be1f-d57550cc96cc">OfficeOnlineVNext</PublishTargets>
-    <TimesCloned xmlns="4873beb7-5857-4685-be1f-d57550cc96cc" xsi:nil="true"/>
-    <AssetStart xmlns="4873beb7-5857-4685-be1f-d57550cc96cc">2011-11-26T00:00:00+00:00</AssetStart>
-    <Provider xmlns="4873beb7-5857-4685-be1f-d57550cc96cc" xsi:nil="true"/>
-    <AcquiredFrom xmlns="4873beb7-5857-4685-be1f-d57550cc96cc">Internal MS</AcquiredFrom>
-    <FriendlyTitle xmlns="4873beb7-5857-4685-be1f-d57550cc96cc" xsi:nil="true"/>
-    <LastHandOff xmlns="4873beb7-5857-4685-be1f-d57550cc96cc" xsi:nil="true"/>
-    <TPClientViewer xmlns="4873beb7-5857-4685-be1f-d57550cc96cc" xsi:nil="true"/>
-    <TemplateStatus xmlns="4873beb7-5857-4685-be1f-d57550cc96cc">Complete</TemplateStatus>
-    <Downloads xmlns="4873beb7-5857-4685-be1f-d57550cc96cc">0</Downloads>
-    <OOCacheId xmlns="4873beb7-5857-4685-be1f-d57550cc96cc" xsi:nil="true"/>
-    <IsDeleted xmlns="4873beb7-5857-4685-be1f-d57550cc96cc">false</IsDeleted>
-    <LocPublishedDependentAssetsLookup xmlns="4873beb7-5857-4685-be1f-d57550cc96cc" xsi:nil="true"/>
-    <AssetExpire xmlns="4873beb7-5857-4685-be1f-d57550cc96cc">2029-05-12T07:00:00+00:00</AssetExpire>
-    <DSATActionTaken xmlns="4873beb7-5857-4685-be1f-d57550cc96cc" xsi:nil="true"/>
-    <CSXSubmissionMarket xmlns="4873beb7-5857-4685-be1f-d57550cc96cc" xsi:nil="true"/>
-    <TPExecutable xmlns="4873beb7-5857-4685-be1f-d57550cc96cc" xsi:nil="true"/>
-    <EditorialTags xmlns="4873beb7-5857-4685-be1f-d57550cc96cc" xsi:nil="true"/>
-    <SubmitterId xmlns="4873beb7-5857-4685-be1f-d57550cc96cc" xsi:nil="true"/>
-    <ApprovalLog xmlns="4873beb7-5857-4685-be1f-d57550cc96cc" xsi:nil="true"/>
-    <AssetType xmlns="4873beb7-5857-4685-be1f-d57550cc96cc">TP</AssetType>
-    <BugNumber xmlns="4873beb7-5857-4685-be1f-d57550cc96cc" xsi:nil="true"/>
-    <CSXSubmissionDate xmlns="4873beb7-5857-4685-be1f-d57550cc96cc" xsi:nil="true"/>
-    <CSXUpdate xmlns="4873beb7-5857-4685-be1f-d57550cc96cc">false</CSXUpdate>
-    <Milestone xmlns="4873beb7-5857-4685-be1f-d57550cc96cc" xsi:nil="true"/>
-    <RecommendationsModifier xmlns="4873beb7-5857-4685-be1f-d57550cc96cc" xsi:nil="true"/>
-    <OriginAsset xmlns="4873beb7-5857-4685-be1f-d57550cc96cc" xsi:nil="true"/>
-    <TPComponent xmlns="4873beb7-5857-4685-be1f-d57550cc96cc" xsi:nil="true"/>
-    <AssetId xmlns="4873beb7-5857-4685-be1f-d57550cc96cc">TP102787939</AssetId>
-    <IntlLocPriority xmlns="4873beb7-5857-4685-be1f-d57550cc96cc" xsi:nil="true"/>
-    <PolicheckWords xmlns="4873beb7-5857-4685-be1f-d57550cc96cc" xsi:nil="true"/>
-    <TPLaunchHelpLink xmlns="4873beb7-5857-4685-be1f-d57550cc96cc" xsi:nil="true"/>
-    <TPApplication xmlns="4873beb7-5857-4685-be1f-d57550cc96cc" xsi:nil="true"/>
-    <CrawlForDependencies xmlns="4873beb7-5857-4685-be1f-d57550cc96cc">false</CrawlForDependencies>
-    <HandoffToMSDN xmlns="4873beb7-5857-4685-be1f-d57550cc96cc" xsi:nil="true"/>
-    <PlannedPubDate xmlns="4873beb7-5857-4685-be1f-d57550cc96cc" xsi:nil="true"/>
-    <IntlLangReviewer xmlns="4873beb7-5857-4685-be1f-d57550cc96cc" xsi:nil="true"/>
-    <TrustLevel xmlns="4873beb7-5857-4685-be1f-d57550cc96cc">1 Microsoft Managed Content</TrustLevel>
-    <LocLastLocAttemptVersionLookup xmlns="4873beb7-5857-4685-be1f-d57550cc96cc">694216</LocLastLocAttemptVersionLookup>
-    <LocProcessedForHandoffsLookup xmlns="4873beb7-5857-4685-be1f-d57550cc96cc" xsi:nil="true"/>
-    <IsSearchable xmlns="4873beb7-5857-4685-be1f-d57550cc96cc">true</IsSearchable>
-    <TemplateTemplateType xmlns="4873beb7-5857-4685-be1f-d57550cc96cc">PowerPoint Presentation Template</TemplateTemplateType>
-    <CampaignTagsTaxHTField0 xmlns="4873beb7-5857-4685-be1f-d57550cc96cc">
-      <Terms xmlns="http://schemas.microsoft.com/office/infopath/2007/PartnerControls"/>
-    </CampaignTagsTaxHTField0>
-    <TPNamespace xmlns="4873beb7-5857-4685-be1f-d57550cc96cc" xsi:nil="true"/>
-    <LocOverallPreviewStatusLookup xmlns="4873beb7-5857-4685-be1f-d57550cc96cc" xsi:nil="true"/>
-    <TaxCatchAll xmlns="4873beb7-5857-4685-be1f-d57550cc96cc"/>
-    <Markets xmlns="4873beb7-5857-4685-be1f-d57550cc96cc"/>
-    <UAProjectedTotalWords xmlns="4873beb7-5857-4685-be1f-d57550cc96cc" xsi:nil="true"/>
-    <IntlLangReview xmlns="4873beb7-5857-4685-be1f-d57550cc96cc" xsi:nil="true"/>
-    <OutputCachingOn xmlns="4873beb7-5857-4685-be1f-d57550cc96cc">false</OutputCachingOn>
-    <AverageRating xmlns="4873beb7-5857-4685-be1f-d57550cc96cc" xsi:nil="true"/>
-    <APAuthor xmlns="4873beb7-5857-4685-be1f-d57550cc96cc">
-      <UserInfo>
-        <DisplayName>REDMOND\kristaa</DisplayName>
-        <AccountId>136</AccountId>
-        <AccountType/>
-      </UserInfo>
-    </APAuthor>
-    <LocManualTestRequired xmlns="4873beb7-5857-4685-be1f-d57550cc96cc">false</LocManualTestRequired>
-    <TPCommandLine xmlns="4873beb7-5857-4685-be1f-d57550cc96cc" xsi:nil="true"/>
-    <TPAppVersion xmlns="4873beb7-5857-4685-be1f-d57550cc96cc" xsi:nil="true"/>
-    <EditorialStatus xmlns="4873beb7-5857-4685-be1f-d57550cc96cc">Complete</EditorialStatus>
-    <LastModifiedDateTime xmlns="4873beb7-5857-4685-be1f-d57550cc96cc" xsi:nil="true"/>
-    <ScenarioTagsTaxHTField0 xmlns="4873beb7-5857-4685-be1f-d57550cc96cc">
-      <Terms xmlns="http://schemas.microsoft.com/office/infopath/2007/PartnerControls"/>
-    </ScenarioTagsTaxHTField0>
-    <LocProcessedForMarketsLookup xmlns="4873beb7-5857-4685-be1f-d57550cc96cc" xsi:nil="true"/>
-    <TPLaunchHelpLinkType xmlns="4873beb7-5857-4685-be1f-d57550cc96cc">Template</TPLaunchHelpLinkType>
-    <OriginalRelease xmlns="4873beb7-5857-4685-be1f-d57550cc96cc">15</OriginalRelease>
-    <LocalizationTagsTaxHTField0 xmlns="4873beb7-5857-4685-be1f-d57550cc96cc">
-      <Terms xmlns="http://schemas.microsoft.com/office/infopath/2007/PartnerControls"/>
-    </LocalizationTagsTaxHTField0>
-    <UACurrentWords xmlns="4873beb7-5857-4685-be1f-d57550cc96cc" xsi:nil="true"/>
-    <ArtSampleDocs xmlns="4873beb7-5857-4685-be1f-d57550cc96cc" xsi:nil="true"/>
-    <UALocRecommendation xmlns="4873beb7-5857-4685-be1f-d57550cc96cc">Localize</UALocRecommendation>
-    <Manager xmlns="4873beb7-5857-4685-be1f-d57550cc96cc" xsi:nil="true"/>
-    <LocOverallHandbackStatusLookup xmlns="4873beb7-5857-4685-be1f-d57550cc96cc" xsi:nil="true"/>
-    <ShowIn xmlns="4873beb7-5857-4685-be1f-d57550cc96cc">Show everywhere</ShowIn>
-    <UANotes xmlns="4873beb7-5857-4685-be1f-d57550cc96cc" xsi:nil="true"/>
-    <InternalTagsTaxHTField0 xmlns="4873beb7-5857-4685-be1f-d57550cc96cc">
-      <Terms xmlns="http://schemas.microsoft.com/office/infopath/2007/PartnerControls"/>
-    </InternalTagsTaxHTField0>
-    <CSXHash xmlns="4873beb7-5857-4685-be1f-d57550cc96cc" xsi:nil="true"/>
-    <VoteCount xmlns="4873beb7-5857-4685-be1f-d57550cc96cc" xsi:nil="true"/>
-    <LocMarketGroupTiers2 xmlns="4873beb7-5857-4685-be1f-d57550cc96cc" xsi:nil="true"/>
-  </documentManagement>
-</p:properties>
+<Control xmlns="http://schemas.microsoft.com/VisualStudio/2011/storyboarding/control">
+  <Id Name="3a5f3215-4f7c-4247-9247-a9acf7619a8c" Revision="1" Stencil="System.MyShapes" StencilVersion="1.0"/>
+</Control>
 </file>
 
 <file path=customXml/item19.xml><?xml version="1.0" encoding="utf-8"?>
@@ -14860,9 +14648,12 @@
 </file>
 
 <file path=customXml/item2.xml><?xml version="1.0" encoding="utf-8"?>
-<Control xmlns="http://schemas.microsoft.com/VisualStudio/2011/storyboarding/control">
-  <Id Name="37d07999-8e88-45a7-b776-aa394cd3ee89" Revision="1" Stencil="System.MyShapes" StencilVersion="1.0"/>
-</Control>
+<?mso-contentType ?>
+<FormTemplates xmlns="http://schemas.microsoft.com/sharepoint/v3/contenttype/forms">
+  <Display>DocumentLibraryForm</Display>
+  <Edit>AssetEditForm</Edit>
+  <New>DocumentLibraryForm</New>
+</FormTemplates>
 </file>
 
 <file path=customXml/item20.xml><?xml version="1.0" encoding="utf-8"?>
@@ -14872,15 +14663,24 @@
 </file>
 
 <file path=customXml/item21.xml><?xml version="1.0" encoding="utf-8"?>
-<?mso-contentType ?>
-<FormTemplates xmlns="http://schemas.microsoft.com/sharepoint/v3/contenttype/forms">
-  <Display>DocumentLibraryForm</Display>
-  <Edit>AssetEditForm</Edit>
-  <New>DocumentLibraryForm</New>
-</FormTemplates>
+<Control xmlns="http://schemas.microsoft.com/VisualStudio/2011/storyboarding/control">
+  <Id Name="3a5f3215-4f7c-4247-9247-a9acf7619a8c" Revision="1" Stencil="System.MyShapes" StencilVersion="1.0"/>
+</Control>
 </file>
 
 <file path=customXml/item22.xml><?xml version="1.0" encoding="utf-8"?>
+<Control xmlns="http://schemas.microsoft.com/VisualStudio/2011/storyboarding/control">
+  <Id Name="3a5f3215-4f7c-4247-9247-a9acf7619a8c" Revision="1" Stencil="System.MyShapes" StencilVersion="1.0"/>
+</Control>
+</file>
+
+<file path=customXml/item23.xml><?xml version="1.0" encoding="utf-8"?>
+<Control xmlns="http://schemas.microsoft.com/VisualStudio/2011/storyboarding/control">
+  <Id Name="37d07999-8e88-45a7-b776-aa394cd3ee89" Revision="1" Stencil="System.MyShapes" StencilVersion="1.0"/>
+</Control>
+</file>
+
+<file path=customXml/item24.xml><?xml version="1.0" encoding="utf-8"?>
 <ct:contentTypeSchema xmlns:ct="http://schemas.microsoft.com/office/2006/metadata/contentType" xmlns:ma="http://schemas.microsoft.com/office/2006/metadata/properties/metaAttributes" ct:_="" ma:_="" ma:contentTypeName="TemplateFile" ma:contentTypeID="0x0101006EDDDB5EE6D98C44930B742096920B300400F5B6D36B3EF94B4E9A635CDF2A18F5B8" ma:contentTypeVersion="72" ma:contentTypeDescription="Create a new document." ma:contentTypeScope="" ma:versionID="a23e56308344d904b51738559c3d67c9">
   <xsd:schema xmlns:xsd="http://www.w3.org/2001/XMLSchema" xmlns:xs="http://www.w3.org/2001/XMLSchema" xmlns:p="http://schemas.microsoft.com/office/2006/metadata/properties" xmlns:ns2="4873beb7-5857-4685-be1f-d57550cc96cc" targetNamespace="http://schemas.microsoft.com/office/2006/metadata/properties" ma:root="true" ma:fieldsID="cd0908cc4600e77bf5da051303e00c8d" ns2:_="">
     <xsd:import namespace="4873beb7-5857-4685-be1f-d57550cc96cc"/>
@@ -15920,21 +15720,9 @@
 </ct:contentTypeSchema>
 </file>
 
-<file path=customXml/item23.xml><?xml version="1.0" encoding="utf-8"?>
-<Control xmlns="http://schemas.microsoft.com/VisualStudio/2011/storyboarding/control">
-  <Id Name="3a5f3215-4f7c-4247-9247-a9acf7619a8c" Revision="1" Stencil="System.MyShapes" StencilVersion="1.0"/>
-</Control>
-</file>
-
-<file path=customXml/item24.xml><?xml version="1.0" encoding="utf-8"?>
-<Control xmlns="http://schemas.microsoft.com/VisualStudio/2011/storyboarding/control">
-  <Id Name="3a5f3215-4f7c-4247-9247-a9acf7619a8c" Revision="1" Stencil="System.MyShapes" StencilVersion="1.0"/>
-</Control>
-</file>
-
 <file path=customXml/item25.xml><?xml version="1.0" encoding="utf-8"?>
 <Control xmlns="http://schemas.microsoft.com/VisualStudio/2011/storyboarding/control">
-  <Id Name="3a5f3215-4f7c-4247-9247-a9acf7619a8c" Revision="1" Stencil="System.MyShapes" StencilVersion="1.0"/>
+  <Id Name="37d07999-8e88-45a7-b776-aa394cd3ee89" Revision="1" Stencil="System.MyShapes" StencilVersion="1.0"/>
 </Control>
 </file>
 
@@ -15970,7 +15758,7 @@
 
 <file path=customXml/item30.xml><?xml version="1.0" encoding="utf-8"?>
 <Control xmlns="http://schemas.microsoft.com/VisualStudio/2011/storyboarding/control">
-  <Id Name="37d07999-8e88-45a7-b776-aa394cd3ee89" Revision="1" Stencil="System.MyShapes" StencilVersion="1.0"/>
+  <Id Name="3a5f3215-4f7c-4247-9247-a9acf7619a8c" Revision="1" Stencil="System.MyShapes" StencilVersion="1.0"/>
 </Control>
 </file>
 
@@ -15982,7 +15770,7 @@
 
 <file path=customXml/item32.xml><?xml version="1.0" encoding="utf-8"?>
 <Control xmlns="http://schemas.microsoft.com/VisualStudio/2011/storyboarding/control">
-  <Id Name="37d07999-8e88-45a7-b776-aa394cd3ee89" Revision="1" Stencil="System.MyShapes" StencilVersion="1.0"/>
+  <Id Name="3a5f3215-4f7c-4247-9247-a9acf7619a8c" Revision="1" Stencil="System.MyShapes" StencilVersion="1.0"/>
 </Control>
 </file>
 
@@ -15999,9 +15787,139 @@
 </file>
 
 <file path=customXml/item35.xml><?xml version="1.0" encoding="utf-8"?>
-<Control xmlns="http://schemas.microsoft.com/VisualStudio/2011/storyboarding/control">
-  <Id Name="37d07999-8e88-45a7-b776-aa394cd3ee89" Revision="1" Stencil="System.MyShapes" StencilVersion="1.0"/>
-</Control>
+<p:properties xmlns:p="http://schemas.microsoft.com/office/2006/metadata/properties" xmlns:xsi="http://www.w3.org/2001/XMLSchema-instance" xmlns:pc="http://schemas.microsoft.com/office/infopath/2007/PartnerControls">
+  <documentManagement>
+    <LocPublishedLinkedAssetsLookup xmlns="4873beb7-5857-4685-be1f-d57550cc96cc" xsi:nil="true"/>
+    <ApprovalStatus xmlns="4873beb7-5857-4685-be1f-d57550cc96cc">InProgress</ApprovalStatus>
+    <MarketSpecific xmlns="4873beb7-5857-4685-be1f-d57550cc96cc">false</MarketSpecific>
+    <LocComments xmlns="4873beb7-5857-4685-be1f-d57550cc96cc" xsi:nil="true"/>
+    <LocLastLocAttemptVersionTypeLookup xmlns="4873beb7-5857-4685-be1f-d57550cc96cc" xsi:nil="true"/>
+    <DirectSourceMarket xmlns="4873beb7-5857-4685-be1f-d57550cc96cc" xsi:nil="true"/>
+    <ThumbnailAssetId xmlns="4873beb7-5857-4685-be1f-d57550cc96cc" xsi:nil="true"/>
+    <PrimaryImageGen xmlns="4873beb7-5857-4685-be1f-d57550cc96cc">false</PrimaryImageGen>
+    <LocNewPublishedVersionLookup xmlns="4873beb7-5857-4685-be1f-d57550cc96cc" xsi:nil="true"/>
+    <LegacyData xmlns="4873beb7-5857-4685-be1f-d57550cc96cc" xsi:nil="true"/>
+    <LocRecommendedHandoff xmlns="4873beb7-5857-4685-be1f-d57550cc96cc" xsi:nil="true"/>
+    <BusinessGroup xmlns="4873beb7-5857-4685-be1f-d57550cc96cc" xsi:nil="true"/>
+    <BlockPublish xmlns="4873beb7-5857-4685-be1f-d57550cc96cc">false</BlockPublish>
+    <TPFriendlyName xmlns="4873beb7-5857-4685-be1f-d57550cc96cc" xsi:nil="true"/>
+    <LocOverallPublishStatusLookup xmlns="4873beb7-5857-4685-be1f-d57550cc96cc" xsi:nil="true"/>
+    <NumericId xmlns="4873beb7-5857-4685-be1f-d57550cc96cc" xsi:nil="true"/>
+    <APEditor xmlns="4873beb7-5857-4685-be1f-d57550cc96cc">
+      <UserInfo>
+        <DisplayName/>
+        <AccountId xsi:nil="true"/>
+        <AccountType/>
+      </UserInfo>
+    </APEditor>
+    <SourceTitle xmlns="4873beb7-5857-4685-be1f-d57550cc96cc" xsi:nil="true"/>
+    <OpenTemplate xmlns="4873beb7-5857-4685-be1f-d57550cc96cc">true</OpenTemplate>
+    <LocOverallLocStatusLookup xmlns="4873beb7-5857-4685-be1f-d57550cc96cc" xsi:nil="true"/>
+    <UALocComments xmlns="4873beb7-5857-4685-be1f-d57550cc96cc" xsi:nil="true"/>
+    <ParentAssetId xmlns="4873beb7-5857-4685-be1f-d57550cc96cc" xsi:nil="true"/>
+    <IntlLangReviewDate xmlns="4873beb7-5857-4685-be1f-d57550cc96cc" xsi:nil="true"/>
+    <FeatureTagsTaxHTField0 xmlns="4873beb7-5857-4685-be1f-d57550cc96cc">
+      <Terms xmlns="http://schemas.microsoft.com/office/infopath/2007/PartnerControls"/>
+    </FeatureTagsTaxHTField0>
+    <PublishStatusLookup xmlns="4873beb7-5857-4685-be1f-d57550cc96cc">
+      <Value>1345039</Value>
+    </PublishStatusLookup>
+    <Providers xmlns="4873beb7-5857-4685-be1f-d57550cc96cc" xsi:nil="true"/>
+    <MachineTranslated xmlns="4873beb7-5857-4685-be1f-d57550cc96cc">false</MachineTranslated>
+    <OriginalSourceMarket xmlns="4873beb7-5857-4685-be1f-d57550cc96cc" xsi:nil="true"/>
+    <APDescription xmlns="4873beb7-5857-4685-be1f-d57550cc96cc">The bookstacks present on most slides  make this a good choice for students, teachers, reading enthusiasts, and others in education. This presentation template contains multiple slide layouts in widescreen format (16x9) and includes a sample table and chart that you can easily  modify.</APDescription>
+    <ClipArtFilename xmlns="4873beb7-5857-4685-be1f-d57550cc96cc" xsi:nil="true"/>
+    <ContentItem xmlns="4873beb7-5857-4685-be1f-d57550cc96cc" xsi:nil="true"/>
+    <TPInstallLocation xmlns="4873beb7-5857-4685-be1f-d57550cc96cc" xsi:nil="true"/>
+    <PublishTargets xmlns="4873beb7-5857-4685-be1f-d57550cc96cc">OfficeOnlineVNext</PublishTargets>
+    <TimesCloned xmlns="4873beb7-5857-4685-be1f-d57550cc96cc" xsi:nil="true"/>
+    <AssetStart xmlns="4873beb7-5857-4685-be1f-d57550cc96cc">2011-11-26T00:00:00+00:00</AssetStart>
+    <Provider xmlns="4873beb7-5857-4685-be1f-d57550cc96cc" xsi:nil="true"/>
+    <AcquiredFrom xmlns="4873beb7-5857-4685-be1f-d57550cc96cc">Internal MS</AcquiredFrom>
+    <FriendlyTitle xmlns="4873beb7-5857-4685-be1f-d57550cc96cc" xsi:nil="true"/>
+    <LastHandOff xmlns="4873beb7-5857-4685-be1f-d57550cc96cc" xsi:nil="true"/>
+    <TPClientViewer xmlns="4873beb7-5857-4685-be1f-d57550cc96cc" xsi:nil="true"/>
+    <TemplateStatus xmlns="4873beb7-5857-4685-be1f-d57550cc96cc">Complete</TemplateStatus>
+    <Downloads xmlns="4873beb7-5857-4685-be1f-d57550cc96cc">0</Downloads>
+    <OOCacheId xmlns="4873beb7-5857-4685-be1f-d57550cc96cc" xsi:nil="true"/>
+    <IsDeleted xmlns="4873beb7-5857-4685-be1f-d57550cc96cc">false</IsDeleted>
+    <LocPublishedDependentAssetsLookup xmlns="4873beb7-5857-4685-be1f-d57550cc96cc" xsi:nil="true"/>
+    <AssetExpire xmlns="4873beb7-5857-4685-be1f-d57550cc96cc">2029-05-12T07:00:00+00:00</AssetExpire>
+    <DSATActionTaken xmlns="4873beb7-5857-4685-be1f-d57550cc96cc" xsi:nil="true"/>
+    <CSXSubmissionMarket xmlns="4873beb7-5857-4685-be1f-d57550cc96cc" xsi:nil="true"/>
+    <TPExecutable xmlns="4873beb7-5857-4685-be1f-d57550cc96cc" xsi:nil="true"/>
+    <EditorialTags xmlns="4873beb7-5857-4685-be1f-d57550cc96cc" xsi:nil="true"/>
+    <SubmitterId xmlns="4873beb7-5857-4685-be1f-d57550cc96cc" xsi:nil="true"/>
+    <ApprovalLog xmlns="4873beb7-5857-4685-be1f-d57550cc96cc" xsi:nil="true"/>
+    <AssetType xmlns="4873beb7-5857-4685-be1f-d57550cc96cc">TP</AssetType>
+    <BugNumber xmlns="4873beb7-5857-4685-be1f-d57550cc96cc" xsi:nil="true"/>
+    <CSXSubmissionDate xmlns="4873beb7-5857-4685-be1f-d57550cc96cc" xsi:nil="true"/>
+    <CSXUpdate xmlns="4873beb7-5857-4685-be1f-d57550cc96cc">false</CSXUpdate>
+    <Milestone xmlns="4873beb7-5857-4685-be1f-d57550cc96cc" xsi:nil="true"/>
+    <RecommendationsModifier xmlns="4873beb7-5857-4685-be1f-d57550cc96cc" xsi:nil="true"/>
+    <OriginAsset xmlns="4873beb7-5857-4685-be1f-d57550cc96cc" xsi:nil="true"/>
+    <TPComponent xmlns="4873beb7-5857-4685-be1f-d57550cc96cc" xsi:nil="true"/>
+    <AssetId xmlns="4873beb7-5857-4685-be1f-d57550cc96cc">TP102787939</AssetId>
+    <IntlLocPriority xmlns="4873beb7-5857-4685-be1f-d57550cc96cc" xsi:nil="true"/>
+    <PolicheckWords xmlns="4873beb7-5857-4685-be1f-d57550cc96cc" xsi:nil="true"/>
+    <TPLaunchHelpLink xmlns="4873beb7-5857-4685-be1f-d57550cc96cc" xsi:nil="true"/>
+    <TPApplication xmlns="4873beb7-5857-4685-be1f-d57550cc96cc" xsi:nil="true"/>
+    <CrawlForDependencies xmlns="4873beb7-5857-4685-be1f-d57550cc96cc">false</CrawlForDependencies>
+    <HandoffToMSDN xmlns="4873beb7-5857-4685-be1f-d57550cc96cc" xsi:nil="true"/>
+    <PlannedPubDate xmlns="4873beb7-5857-4685-be1f-d57550cc96cc" xsi:nil="true"/>
+    <IntlLangReviewer xmlns="4873beb7-5857-4685-be1f-d57550cc96cc" xsi:nil="true"/>
+    <TrustLevel xmlns="4873beb7-5857-4685-be1f-d57550cc96cc">1 Microsoft Managed Content</TrustLevel>
+    <LocLastLocAttemptVersionLookup xmlns="4873beb7-5857-4685-be1f-d57550cc96cc">694216</LocLastLocAttemptVersionLookup>
+    <LocProcessedForHandoffsLookup xmlns="4873beb7-5857-4685-be1f-d57550cc96cc" xsi:nil="true"/>
+    <IsSearchable xmlns="4873beb7-5857-4685-be1f-d57550cc96cc">true</IsSearchable>
+    <TemplateTemplateType xmlns="4873beb7-5857-4685-be1f-d57550cc96cc">PowerPoint Presentation Template</TemplateTemplateType>
+    <CampaignTagsTaxHTField0 xmlns="4873beb7-5857-4685-be1f-d57550cc96cc">
+      <Terms xmlns="http://schemas.microsoft.com/office/infopath/2007/PartnerControls"/>
+    </CampaignTagsTaxHTField0>
+    <TPNamespace xmlns="4873beb7-5857-4685-be1f-d57550cc96cc" xsi:nil="true"/>
+    <LocOverallPreviewStatusLookup xmlns="4873beb7-5857-4685-be1f-d57550cc96cc" xsi:nil="true"/>
+    <TaxCatchAll xmlns="4873beb7-5857-4685-be1f-d57550cc96cc"/>
+    <Markets xmlns="4873beb7-5857-4685-be1f-d57550cc96cc"/>
+    <UAProjectedTotalWords xmlns="4873beb7-5857-4685-be1f-d57550cc96cc" xsi:nil="true"/>
+    <IntlLangReview xmlns="4873beb7-5857-4685-be1f-d57550cc96cc" xsi:nil="true"/>
+    <OutputCachingOn xmlns="4873beb7-5857-4685-be1f-d57550cc96cc">false</OutputCachingOn>
+    <AverageRating xmlns="4873beb7-5857-4685-be1f-d57550cc96cc" xsi:nil="true"/>
+    <APAuthor xmlns="4873beb7-5857-4685-be1f-d57550cc96cc">
+      <UserInfo>
+        <DisplayName>REDMOND\kristaa</DisplayName>
+        <AccountId>136</AccountId>
+        <AccountType/>
+      </UserInfo>
+    </APAuthor>
+    <LocManualTestRequired xmlns="4873beb7-5857-4685-be1f-d57550cc96cc">false</LocManualTestRequired>
+    <TPCommandLine xmlns="4873beb7-5857-4685-be1f-d57550cc96cc" xsi:nil="true"/>
+    <TPAppVersion xmlns="4873beb7-5857-4685-be1f-d57550cc96cc" xsi:nil="true"/>
+    <EditorialStatus xmlns="4873beb7-5857-4685-be1f-d57550cc96cc">Complete</EditorialStatus>
+    <LastModifiedDateTime xmlns="4873beb7-5857-4685-be1f-d57550cc96cc" xsi:nil="true"/>
+    <ScenarioTagsTaxHTField0 xmlns="4873beb7-5857-4685-be1f-d57550cc96cc">
+      <Terms xmlns="http://schemas.microsoft.com/office/infopath/2007/PartnerControls"/>
+    </ScenarioTagsTaxHTField0>
+    <LocProcessedForMarketsLookup xmlns="4873beb7-5857-4685-be1f-d57550cc96cc" xsi:nil="true"/>
+    <TPLaunchHelpLinkType xmlns="4873beb7-5857-4685-be1f-d57550cc96cc">Template</TPLaunchHelpLinkType>
+    <OriginalRelease xmlns="4873beb7-5857-4685-be1f-d57550cc96cc">15</OriginalRelease>
+    <LocalizationTagsTaxHTField0 xmlns="4873beb7-5857-4685-be1f-d57550cc96cc">
+      <Terms xmlns="http://schemas.microsoft.com/office/infopath/2007/PartnerControls"/>
+    </LocalizationTagsTaxHTField0>
+    <UACurrentWords xmlns="4873beb7-5857-4685-be1f-d57550cc96cc" xsi:nil="true"/>
+    <ArtSampleDocs xmlns="4873beb7-5857-4685-be1f-d57550cc96cc" xsi:nil="true"/>
+    <UALocRecommendation xmlns="4873beb7-5857-4685-be1f-d57550cc96cc">Localize</UALocRecommendation>
+    <Manager xmlns="4873beb7-5857-4685-be1f-d57550cc96cc" xsi:nil="true"/>
+    <LocOverallHandbackStatusLookup xmlns="4873beb7-5857-4685-be1f-d57550cc96cc" xsi:nil="true"/>
+    <ShowIn xmlns="4873beb7-5857-4685-be1f-d57550cc96cc">Show everywhere</ShowIn>
+    <UANotes xmlns="4873beb7-5857-4685-be1f-d57550cc96cc" xsi:nil="true"/>
+    <InternalTagsTaxHTField0 xmlns="4873beb7-5857-4685-be1f-d57550cc96cc">
+      <Terms xmlns="http://schemas.microsoft.com/office/infopath/2007/PartnerControls"/>
+    </InternalTagsTaxHTField0>
+    <CSXHash xmlns="4873beb7-5857-4685-be1f-d57550cc96cc" xsi:nil="true"/>
+    <VoteCount xmlns="4873beb7-5857-4685-be1f-d57550cc96cc" xsi:nil="true"/>
+    <LocMarketGroupTiers2 xmlns="4873beb7-5857-4685-be1f-d57550cc96cc" xsi:nil="true"/>
+  </documentManagement>
+</p:properties>
 </file>
 
 <file path=customXml/item4.xml><?xml version="1.0" encoding="utf-8"?>
@@ -16036,12 +15954,12 @@
 
 <file path=customXml/item9.xml><?xml version="1.0" encoding="utf-8"?>
 <Control xmlns="http://schemas.microsoft.com/VisualStudio/2011/storyboarding/control">
-  <Id Name="3a5f3215-4f7c-4247-9247-a9acf7619a8c" Revision="1" Stencil="System.MyShapes" StencilVersion="1.0"/>
+  <Id Name="37d07999-8e88-45a7-b776-aa394cd3ee89" Revision="1" Stencil="System.MyShapes" StencilVersion="1.0"/>
 </Control>
 </file>
 
 <file path=customXml/itemProps1.xml><?xml version="1.0" encoding="utf-8"?>
-<ds:datastoreItem xmlns:ds="http://schemas.openxmlformats.org/officeDocument/2006/customXml" ds:itemID="{1C519524-8703-4E59-AB9B-4A5A7263BA01}">
+<ds:datastoreItem xmlns:ds="http://schemas.openxmlformats.org/officeDocument/2006/customXml" ds:itemID="{BF220CCF-993E-43A0-9212-BB380CAF8162}">
   <ds:schemaRefs>
     <ds:schemaRef ds:uri="http://schemas.microsoft.com/VisualStudio/2011/storyboarding/control"/>
   </ds:schemaRefs>
@@ -16049,7 +15967,7 @@
 </file>
 
 <file path=customXml/itemProps10.xml><?xml version="1.0" encoding="utf-8"?>
-<ds:datastoreItem xmlns:ds="http://schemas.openxmlformats.org/officeDocument/2006/customXml" ds:itemID="{E66239DD-0B2D-408A-BBA0-1CA7E59810AE}">
+<ds:datastoreItem xmlns:ds="http://schemas.openxmlformats.org/officeDocument/2006/customXml" ds:itemID="{72561CD2-555C-498E-8707-E7E0AC23D6F7}">
   <ds:schemaRefs>
     <ds:schemaRef ds:uri="http://schemas.microsoft.com/VisualStudio/2011/storyboarding/control"/>
   </ds:schemaRefs>
@@ -16065,7 +15983,7 @@
 </file>
 
 <file path=customXml/itemProps12.xml><?xml version="1.0" encoding="utf-8"?>
-<ds:datastoreItem xmlns:ds="http://schemas.openxmlformats.org/officeDocument/2006/customXml" ds:itemID="{703D5DC7-4616-43D3-84A1-089DFA00F45E}">
+<ds:datastoreItem xmlns:ds="http://schemas.openxmlformats.org/officeDocument/2006/customXml" ds:itemID="{B93E3EFA-D9D3-4448-BC21-BB6156158366}">
   <ds:schemaRefs>
     <ds:schemaRef ds:uri="http://schemas.microsoft.com/VisualStudio/2011/storyboarding/control"/>
   </ds:schemaRefs>
@@ -16073,7 +15991,7 @@
 </file>
 
 <file path=customXml/itemProps13.xml><?xml version="1.0" encoding="utf-8"?>
-<ds:datastoreItem xmlns:ds="http://schemas.openxmlformats.org/officeDocument/2006/customXml" ds:itemID="{0BFC68A0-F33C-4D0A-8B07-0BF6B29C698E}">
+<ds:datastoreItem xmlns:ds="http://schemas.openxmlformats.org/officeDocument/2006/customXml" ds:itemID="{56D5947B-D538-4E10-AB7C-984491B58DE1}">
   <ds:schemaRefs>
     <ds:schemaRef ds:uri="http://schemas.microsoft.com/VisualStudio/2011/storyboarding/control"/>
   </ds:schemaRefs>
@@ -16081,7 +15999,7 @@
 </file>
 
 <file path=customXml/itemProps14.xml><?xml version="1.0" encoding="utf-8"?>
-<ds:datastoreItem xmlns:ds="http://schemas.openxmlformats.org/officeDocument/2006/customXml" ds:itemID="{7CC5A912-861C-4DE5-A79D-195E5086349C}">
+<ds:datastoreItem xmlns:ds="http://schemas.openxmlformats.org/officeDocument/2006/customXml" ds:itemID="{E1C273FD-24F9-45CA-B498-6393D3AA6D7F}">
   <ds:schemaRefs>
     <ds:schemaRef ds:uri="http://schemas.microsoft.com/VisualStudio/2011/storyboarding/control"/>
   </ds:schemaRefs>
@@ -16097,7 +16015,7 @@
 </file>
 
 <file path=customXml/itemProps16.xml><?xml version="1.0" encoding="utf-8"?>
-<ds:datastoreItem xmlns:ds="http://schemas.openxmlformats.org/officeDocument/2006/customXml" ds:itemID="{C6026F5C-553B-4AEF-A946-FF60FDFF7695}">
+<ds:datastoreItem xmlns:ds="http://schemas.openxmlformats.org/officeDocument/2006/customXml" ds:itemID="{3DCE84C0-C49E-43FD-B3E0-95EA30D6B555}">
   <ds:schemaRefs>
     <ds:schemaRef ds:uri="http://schemas.microsoft.com/VisualStudio/2011/storyboarding/control"/>
   </ds:schemaRefs>
@@ -16105,7 +16023,7 @@
 </file>
 
 <file path=customXml/itemProps17.xml><?xml version="1.0" encoding="utf-8"?>
-<ds:datastoreItem xmlns:ds="http://schemas.openxmlformats.org/officeDocument/2006/customXml" ds:itemID="{F8B7C765-2F36-4486-9DE5-D0E485AFE8E4}">
+<ds:datastoreItem xmlns:ds="http://schemas.openxmlformats.org/officeDocument/2006/customXml" ds:itemID="{133E8427-525B-443B-BDB2-D61569B9E8D5}">
   <ds:schemaRefs>
     <ds:schemaRef ds:uri="http://schemas.microsoft.com/VisualStudio/2011/storyboarding/control"/>
   </ds:schemaRefs>
@@ -16113,11 +16031,9 @@
 </file>
 
 <file path=customXml/itemProps18.xml><?xml version="1.0" encoding="utf-8"?>
-<ds:datastoreItem xmlns:ds="http://schemas.openxmlformats.org/officeDocument/2006/customXml" ds:itemID="{F301D382-32B0-43EE-932C-28906AF37617}">
+<ds:datastoreItem xmlns:ds="http://schemas.openxmlformats.org/officeDocument/2006/customXml" ds:itemID="{E66239DD-0B2D-408A-BBA0-1CA7E59810AE}">
   <ds:schemaRefs>
-    <ds:schemaRef ds:uri="http://schemas.microsoft.com/office/2006/metadata/properties"/>
-    <ds:schemaRef ds:uri="http://schemas.microsoft.com/office/infopath/2007/PartnerControls"/>
-    <ds:schemaRef ds:uri="4873beb7-5857-4685-be1f-d57550cc96cc"/>
+    <ds:schemaRef ds:uri="http://schemas.microsoft.com/VisualStudio/2011/storyboarding/control"/>
   </ds:schemaRefs>
 </ds:datastoreItem>
 </file>
@@ -16131,15 +16047,15 @@
 </file>
 
 <file path=customXml/itemProps2.xml><?xml version="1.0" encoding="utf-8"?>
-<ds:datastoreItem xmlns:ds="http://schemas.openxmlformats.org/officeDocument/2006/customXml" ds:itemID="{9BE992AB-AC79-4CFA-8E4D-01B8E612C593}">
+<ds:datastoreItem xmlns:ds="http://schemas.openxmlformats.org/officeDocument/2006/customXml" ds:itemID="{E1B558C7-619B-49BE-9097-7FCBDADD4ECE}">
   <ds:schemaRefs>
-    <ds:schemaRef ds:uri="http://schemas.microsoft.com/VisualStudio/2011/storyboarding/control"/>
+    <ds:schemaRef ds:uri="http://schemas.microsoft.com/sharepoint/v3/contenttype/forms"/>
   </ds:schemaRefs>
 </ds:datastoreItem>
 </file>
 
 <file path=customXml/itemProps20.xml><?xml version="1.0" encoding="utf-8"?>
-<ds:datastoreItem xmlns:ds="http://schemas.openxmlformats.org/officeDocument/2006/customXml" ds:itemID="{6F3822C3-EEBF-463B-A843-8264A05022FC}">
+<ds:datastoreItem xmlns:ds="http://schemas.openxmlformats.org/officeDocument/2006/customXml" ds:itemID="{F37E7FF5-D44D-41C7-A85C-ED0B35DB1B54}">
   <ds:schemaRefs>
     <ds:schemaRef ds:uri="http://schemas.microsoft.com/VisualStudio/2011/storyboarding/control"/>
   </ds:schemaRefs>
@@ -16147,14 +16063,30 @@
 </file>
 
 <file path=customXml/itemProps21.xml><?xml version="1.0" encoding="utf-8"?>
-<ds:datastoreItem xmlns:ds="http://schemas.openxmlformats.org/officeDocument/2006/customXml" ds:itemID="{E1B558C7-619B-49BE-9097-7FCBDADD4ECE}">
+<ds:datastoreItem xmlns:ds="http://schemas.openxmlformats.org/officeDocument/2006/customXml" ds:itemID="{D525C38F-E3F5-4F86-AA79-5F0615D92028}">
   <ds:schemaRefs>
-    <ds:schemaRef ds:uri="http://schemas.microsoft.com/sharepoint/v3/contenttype/forms"/>
+    <ds:schemaRef ds:uri="http://schemas.microsoft.com/VisualStudio/2011/storyboarding/control"/>
   </ds:schemaRefs>
 </ds:datastoreItem>
 </file>
 
 <file path=customXml/itemProps22.xml><?xml version="1.0" encoding="utf-8"?>
+<ds:datastoreItem xmlns:ds="http://schemas.openxmlformats.org/officeDocument/2006/customXml" ds:itemID="{1F5A8671-688F-418F-87AD-EBAB911812B5}">
+  <ds:schemaRefs>
+    <ds:schemaRef ds:uri="http://schemas.microsoft.com/VisualStudio/2011/storyboarding/control"/>
+  </ds:schemaRefs>
+</ds:datastoreItem>
+</file>
+
+<file path=customXml/itemProps23.xml><?xml version="1.0" encoding="utf-8"?>
+<ds:datastoreItem xmlns:ds="http://schemas.openxmlformats.org/officeDocument/2006/customXml" ds:itemID="{7CC5A912-861C-4DE5-A79D-195E5086349C}">
+  <ds:schemaRefs>
+    <ds:schemaRef ds:uri="http://schemas.microsoft.com/VisualStudio/2011/storyboarding/control"/>
+  </ds:schemaRefs>
+</ds:datastoreItem>
+</file>
+
+<file path=customXml/itemProps24.xml><?xml version="1.0" encoding="utf-8"?>
 <ds:datastoreItem xmlns:ds="http://schemas.openxmlformats.org/officeDocument/2006/customXml" ds:itemID="{BBB5C329-08A6-4E5E-AEF1-A97828C87411}">
   <ds:schemaRefs>
     <ds:schemaRef ds:uri="http://schemas.microsoft.com/office/2006/metadata/contentType"/>
@@ -16172,24 +16104,8 @@
 </ds:datastoreItem>
 </file>
 
-<file path=customXml/itemProps23.xml><?xml version="1.0" encoding="utf-8"?>
-<ds:datastoreItem xmlns:ds="http://schemas.openxmlformats.org/officeDocument/2006/customXml" ds:itemID="{3DCE84C0-C49E-43FD-B3E0-95EA30D6B555}">
-  <ds:schemaRefs>
-    <ds:schemaRef ds:uri="http://schemas.microsoft.com/VisualStudio/2011/storyboarding/control"/>
-  </ds:schemaRefs>
-</ds:datastoreItem>
-</file>
-
-<file path=customXml/itemProps24.xml><?xml version="1.0" encoding="utf-8"?>
-<ds:datastoreItem xmlns:ds="http://schemas.openxmlformats.org/officeDocument/2006/customXml" ds:itemID="{B93E3EFA-D9D3-4448-BC21-BB6156158366}">
-  <ds:schemaRefs>
-    <ds:schemaRef ds:uri="http://schemas.microsoft.com/VisualStudio/2011/storyboarding/control"/>
-  </ds:schemaRefs>
-</ds:datastoreItem>
-</file>
-
 <file path=customXml/itemProps25.xml><?xml version="1.0" encoding="utf-8"?>
-<ds:datastoreItem xmlns:ds="http://schemas.openxmlformats.org/officeDocument/2006/customXml" ds:itemID="{A449BAC2-0751-46E4-958E-F0D2B9AA6981}">
+<ds:datastoreItem xmlns:ds="http://schemas.openxmlformats.org/officeDocument/2006/customXml" ds:itemID="{ACA1E08C-925C-4F09-8122-887C405DAD0E}">
   <ds:schemaRefs>
     <ds:schemaRef ds:uri="http://schemas.microsoft.com/VisualStudio/2011/storyboarding/control"/>
   </ds:schemaRefs>
@@ -16197,7 +16113,7 @@
 </file>
 
 <file path=customXml/itemProps26.xml><?xml version="1.0" encoding="utf-8"?>
-<ds:datastoreItem xmlns:ds="http://schemas.openxmlformats.org/officeDocument/2006/customXml" ds:itemID="{BF220CCF-993E-43A0-9212-BB380CAF8162}">
+<ds:datastoreItem xmlns:ds="http://schemas.openxmlformats.org/officeDocument/2006/customXml" ds:itemID="{B3671B56-5AB6-40D1-9748-16D9AEAD0962}">
   <ds:schemaRefs>
     <ds:schemaRef ds:uri="http://schemas.microsoft.com/VisualStudio/2011/storyboarding/control"/>
   </ds:schemaRefs>
@@ -16205,7 +16121,7 @@
 </file>
 
 <file path=customXml/itemProps27.xml><?xml version="1.0" encoding="utf-8"?>
-<ds:datastoreItem xmlns:ds="http://schemas.openxmlformats.org/officeDocument/2006/customXml" ds:itemID="{ACA1E08C-925C-4F09-8122-887C405DAD0E}">
+<ds:datastoreItem xmlns:ds="http://schemas.openxmlformats.org/officeDocument/2006/customXml" ds:itemID="{24248713-04D9-4B55-9B64-290315285C69}">
   <ds:schemaRefs>
     <ds:schemaRef ds:uri="http://schemas.microsoft.com/VisualStudio/2011/storyboarding/control"/>
   </ds:schemaRefs>
@@ -16213,7 +16129,7 @@
 </file>
 
 <file path=customXml/itemProps28.xml><?xml version="1.0" encoding="utf-8"?>
-<ds:datastoreItem xmlns:ds="http://schemas.openxmlformats.org/officeDocument/2006/customXml" ds:itemID="{133E8427-525B-443B-BDB2-D61569B9E8D5}">
+<ds:datastoreItem xmlns:ds="http://schemas.openxmlformats.org/officeDocument/2006/customXml" ds:itemID="{424F15E0-202D-4292-9536-B4298F98D690}">
   <ds:schemaRefs>
     <ds:schemaRef ds:uri="http://schemas.microsoft.com/VisualStudio/2011/storyboarding/control"/>
   </ds:schemaRefs>
@@ -16221,7 +16137,7 @@
 </file>
 
 <file path=customXml/itemProps29.xml><?xml version="1.0" encoding="utf-8"?>
-<ds:datastoreItem xmlns:ds="http://schemas.openxmlformats.org/officeDocument/2006/customXml" ds:itemID="{E8F86DD1-857D-4AA1-B615-777BBB99609C}">
+<ds:datastoreItem xmlns:ds="http://schemas.openxmlformats.org/officeDocument/2006/customXml" ds:itemID="{E8627265-8428-4117-A97B-61BC0B24BAEF}">
   <ds:schemaRefs>
     <ds:schemaRef ds:uri="http://schemas.microsoft.com/VisualStudio/2011/storyboarding/control"/>
   </ds:schemaRefs>
@@ -16229,7 +16145,7 @@
 </file>
 
 <file path=customXml/itemProps3.xml><?xml version="1.0" encoding="utf-8"?>
-<ds:datastoreItem xmlns:ds="http://schemas.openxmlformats.org/officeDocument/2006/customXml" ds:itemID="{E8627265-8428-4117-A97B-61BC0B24BAEF}">
+<ds:datastoreItem xmlns:ds="http://schemas.openxmlformats.org/officeDocument/2006/customXml" ds:itemID="{EACA768D-D3F6-4A15-AE55-87B86B85F153}">
   <ds:schemaRefs>
     <ds:schemaRef ds:uri="http://schemas.microsoft.com/VisualStudio/2011/storyboarding/control"/>
   </ds:schemaRefs>
@@ -16237,7 +16153,7 @@
 </file>
 
 <file path=customXml/itemProps30.xml><?xml version="1.0" encoding="utf-8"?>
-<ds:datastoreItem xmlns:ds="http://schemas.openxmlformats.org/officeDocument/2006/customXml" ds:itemID="{B3671B56-5AB6-40D1-9748-16D9AEAD0962}">
+<ds:datastoreItem xmlns:ds="http://schemas.openxmlformats.org/officeDocument/2006/customXml" ds:itemID="{703D5DC7-4616-43D3-84A1-089DFA00F45E}">
   <ds:schemaRefs>
     <ds:schemaRef ds:uri="http://schemas.microsoft.com/VisualStudio/2011/storyboarding/control"/>
   </ds:schemaRefs>
@@ -16245,7 +16161,7 @@
 </file>
 
 <file path=customXml/itemProps31.xml><?xml version="1.0" encoding="utf-8"?>
-<ds:datastoreItem xmlns:ds="http://schemas.openxmlformats.org/officeDocument/2006/customXml" ds:itemID="{F37E7FF5-D44D-41C7-A85C-ED0B35DB1B54}">
+<ds:datastoreItem xmlns:ds="http://schemas.openxmlformats.org/officeDocument/2006/customXml" ds:itemID="{F8B7C765-2F36-4486-9DE5-D0E485AFE8E4}">
   <ds:schemaRefs>
     <ds:schemaRef ds:uri="http://schemas.microsoft.com/VisualStudio/2011/storyboarding/control"/>
   </ds:schemaRefs>
@@ -16253,7 +16169,7 @@
 </file>
 
 <file path=customXml/itemProps32.xml><?xml version="1.0" encoding="utf-8"?>
-<ds:datastoreItem xmlns:ds="http://schemas.openxmlformats.org/officeDocument/2006/customXml" ds:itemID="{56D5947B-D538-4E10-AB7C-984491B58DE1}">
+<ds:datastoreItem xmlns:ds="http://schemas.openxmlformats.org/officeDocument/2006/customXml" ds:itemID="{A449BAC2-0751-46E4-958E-F0D2B9AA6981}">
   <ds:schemaRefs>
     <ds:schemaRef ds:uri="http://schemas.microsoft.com/VisualStudio/2011/storyboarding/control"/>
   </ds:schemaRefs>
@@ -16269,7 +16185,7 @@
 </file>
 
 <file path=customXml/itemProps34.xml><?xml version="1.0" encoding="utf-8"?>
-<ds:datastoreItem xmlns:ds="http://schemas.openxmlformats.org/officeDocument/2006/customXml" ds:itemID="{EACA768D-D3F6-4A15-AE55-87B86B85F153}">
+<ds:datastoreItem xmlns:ds="http://schemas.openxmlformats.org/officeDocument/2006/customXml" ds:itemID="{0BFC68A0-F33C-4D0A-8B07-0BF6B29C698E}">
   <ds:schemaRefs>
     <ds:schemaRef ds:uri="http://schemas.microsoft.com/VisualStudio/2011/storyboarding/control"/>
   </ds:schemaRefs>
@@ -16277,15 +16193,17 @@
 </file>
 
 <file path=customXml/itemProps35.xml><?xml version="1.0" encoding="utf-8"?>
-<ds:datastoreItem xmlns:ds="http://schemas.openxmlformats.org/officeDocument/2006/customXml" ds:itemID="{24248713-04D9-4B55-9B64-290315285C69}">
+<ds:datastoreItem xmlns:ds="http://schemas.openxmlformats.org/officeDocument/2006/customXml" ds:itemID="{F301D382-32B0-43EE-932C-28906AF37617}">
   <ds:schemaRefs>
-    <ds:schemaRef ds:uri="http://schemas.microsoft.com/VisualStudio/2011/storyboarding/control"/>
+    <ds:schemaRef ds:uri="http://schemas.microsoft.com/office/2006/metadata/properties"/>
+    <ds:schemaRef ds:uri="http://schemas.microsoft.com/office/infopath/2007/PartnerControls"/>
+    <ds:schemaRef ds:uri="4873beb7-5857-4685-be1f-d57550cc96cc"/>
   </ds:schemaRefs>
 </ds:datastoreItem>
 </file>
 
 <file path=customXml/itemProps4.xml><?xml version="1.0" encoding="utf-8"?>
-<ds:datastoreItem xmlns:ds="http://schemas.openxmlformats.org/officeDocument/2006/customXml" ds:itemID="{D525C38F-E3F5-4F86-AA79-5F0615D92028}">
+<ds:datastoreItem xmlns:ds="http://schemas.openxmlformats.org/officeDocument/2006/customXml" ds:itemID="{C9624944-4F3E-45E8-8829-37C8DAF54683}">
   <ds:schemaRefs>
     <ds:schemaRef ds:uri="http://schemas.microsoft.com/VisualStudio/2011/storyboarding/control"/>
   </ds:schemaRefs>
@@ -16293,7 +16211,7 @@
 </file>
 
 <file path=customXml/itemProps5.xml><?xml version="1.0" encoding="utf-8"?>
-<ds:datastoreItem xmlns:ds="http://schemas.openxmlformats.org/officeDocument/2006/customXml" ds:itemID="{E1C273FD-24F9-45CA-B498-6393D3AA6D7F}">
+<ds:datastoreItem xmlns:ds="http://schemas.openxmlformats.org/officeDocument/2006/customXml" ds:itemID="{9BE992AB-AC79-4CFA-8E4D-01B8E612C593}">
   <ds:schemaRefs>
     <ds:schemaRef ds:uri="http://schemas.microsoft.com/VisualStudio/2011/storyboarding/control"/>
   </ds:schemaRefs>
@@ -16301,7 +16219,7 @@
 </file>
 
 <file path=customXml/itemProps6.xml><?xml version="1.0" encoding="utf-8"?>
-<ds:datastoreItem xmlns:ds="http://schemas.openxmlformats.org/officeDocument/2006/customXml" ds:itemID="{72561CD2-555C-498E-8707-E7E0AC23D6F7}">
+<ds:datastoreItem xmlns:ds="http://schemas.openxmlformats.org/officeDocument/2006/customXml" ds:itemID="{C6026F5C-553B-4AEF-A946-FF60FDFF7695}">
   <ds:schemaRefs>
     <ds:schemaRef ds:uri="http://schemas.microsoft.com/VisualStudio/2011/storyboarding/control"/>
   </ds:schemaRefs>
@@ -16309,7 +16227,7 @@
 </file>
 
 <file path=customXml/itemProps7.xml><?xml version="1.0" encoding="utf-8"?>
-<ds:datastoreItem xmlns:ds="http://schemas.openxmlformats.org/officeDocument/2006/customXml" ds:itemID="{C9624944-4F3E-45E8-8829-37C8DAF54683}">
+<ds:datastoreItem xmlns:ds="http://schemas.openxmlformats.org/officeDocument/2006/customXml" ds:itemID="{6F3822C3-EEBF-463B-A843-8264A05022FC}">
   <ds:schemaRefs>
     <ds:schemaRef ds:uri="http://schemas.microsoft.com/VisualStudio/2011/storyboarding/control"/>
   </ds:schemaRefs>
@@ -16317,7 +16235,7 @@
 </file>
 
 <file path=customXml/itemProps8.xml><?xml version="1.0" encoding="utf-8"?>
-<ds:datastoreItem xmlns:ds="http://schemas.openxmlformats.org/officeDocument/2006/customXml" ds:itemID="{424F15E0-202D-4292-9536-B4298F98D690}">
+<ds:datastoreItem xmlns:ds="http://schemas.openxmlformats.org/officeDocument/2006/customXml" ds:itemID="{E8F86DD1-857D-4AA1-B615-777BBB99609C}">
   <ds:schemaRefs>
     <ds:schemaRef ds:uri="http://schemas.microsoft.com/VisualStudio/2011/storyboarding/control"/>
   </ds:schemaRefs>
@@ -16325,7 +16243,7 @@
 </file>
 
 <file path=customXml/itemProps9.xml><?xml version="1.0" encoding="utf-8"?>
-<ds:datastoreItem xmlns:ds="http://schemas.openxmlformats.org/officeDocument/2006/customXml" ds:itemID="{1F5A8671-688F-418F-87AD-EBAB911812B5}">
+<ds:datastoreItem xmlns:ds="http://schemas.openxmlformats.org/officeDocument/2006/customXml" ds:itemID="{1C519524-8703-4E59-AB9B-4A5A7263BA01}">
   <ds:schemaRefs>
     <ds:schemaRef ds:uri="http://schemas.microsoft.com/VisualStudio/2011/storyboarding/control"/>
   </ds:schemaRefs>

</xml_diff>

<commit_message>
Trying to bind that datagrid to ObservableCollection
</commit_message>
<xml_diff>
--- a/Docs/Selje_XSharpFromScratch_Slides.pptx
+++ b/Docs/Selje_XSharpFromScratch_Slides.pptx
@@ -1246,6 +1246,155 @@
     <p:extLst>
       <p:ext uri="{BB962C8B-B14F-4D97-AF65-F5344CB8AC3E}">
         <p14:creationId xmlns:p14="http://schemas.microsoft.com/office/powerpoint/2010/main" val="3534974856"/>
+      </p:ext>
+    </p:extLst>
+  </p:cSld>
+  <p:clrMapOvr>
+    <a:masterClrMapping/>
+  </p:clrMapOvr>
+</p:notes>
+</file>
+
+<file path=ppt/notesSlides/notesSlide5.xml><?xml version="1.0" encoding="utf-8"?>
+<p:notes xmlns:a="http://schemas.openxmlformats.org/drawingml/2006/main" xmlns:r="http://schemas.openxmlformats.org/officeDocument/2006/relationships" xmlns:p="http://schemas.openxmlformats.org/presentationml/2006/main">
+  <p:cSld>
+    <p:spTree>
+      <p:nvGrpSpPr>
+        <p:cNvPr id="1" name=""/>
+        <p:cNvGrpSpPr/>
+        <p:nvPr/>
+      </p:nvGrpSpPr>
+      <p:grpSpPr>
+        <a:xfrm>
+          <a:off x="0" y="0"/>
+          <a:ext cx="0" cy="0"/>
+          <a:chOff x="0" y="0"/>
+          <a:chExt cx="0" cy="0"/>
+        </a:xfrm>
+      </p:grpSpPr>
+      <p:sp>
+        <p:nvSpPr>
+          <p:cNvPr id="2" name="Slide Image Placeholder 1"/>
+          <p:cNvSpPr>
+            <a:spLocks noGrp="1" noRot="1" noChangeAspect="1"/>
+          </p:cNvSpPr>
+          <p:nvPr>
+            <p:ph type="sldImg"/>
+          </p:nvPr>
+        </p:nvSpPr>
+        <p:spPr/>
+      </p:sp>
+      <p:sp>
+        <p:nvSpPr>
+          <p:cNvPr id="3" name="Notes Placeholder 2"/>
+          <p:cNvSpPr>
+            <a:spLocks noGrp="1"/>
+          </p:cNvSpPr>
+          <p:nvPr>
+            <p:ph type="body" idx="1"/>
+          </p:nvPr>
+        </p:nvSpPr>
+        <p:spPr/>
+        <p:txBody>
+          <a:bodyPr/>
+          <a:lstStyle/>
+          <a:p>
+            <a:r>
+              <a:rPr lang="en-US" dirty="0"/>
+              <a:t>Presentation Reminders for Eric:</a:t>
+            </a:r>
+          </a:p>
+          <a:p>
+            <a:r>
+              <a:rPr lang="en-US" dirty="0"/>
+              <a:t>Use Chrome</a:t>
+            </a:r>
+          </a:p>
+          <a:p>
+            <a:r>
+              <a:rPr lang="en-US" dirty="0"/>
+              <a:t>Get off VPN</a:t>
+            </a:r>
+          </a:p>
+          <a:p>
+            <a:r>
+              <a:rPr lang="en-US" dirty="0"/>
+              <a:t>Make sure your Bluetooth headset is working ok</a:t>
+            </a:r>
+          </a:p>
+          <a:p>
+            <a:r>
+              <a:rPr lang="en-US" dirty="0"/>
+              <a:t>Respect the 20s delay</a:t>
+            </a:r>
+          </a:p>
+          <a:p>
+            <a:r>
+              <a:rPr lang="en-US" dirty="0"/>
+              <a:t>Turn off Camera when </a:t>
+            </a:r>
+            <a:r>
+              <a:rPr lang="en-US"/>
+              <a:t>showing screen</a:t>
+            </a:r>
+          </a:p>
+          <a:p>
+            <a:endParaRPr lang="en-US" dirty="0"/>
+          </a:p>
+        </p:txBody>
+      </p:sp>
+      <p:sp>
+        <p:nvSpPr>
+          <p:cNvPr id="4" name="Date Placeholder 3"/>
+          <p:cNvSpPr>
+            <a:spLocks noGrp="1"/>
+          </p:cNvSpPr>
+          <p:nvPr>
+            <p:ph type="dt" idx="1"/>
+          </p:nvPr>
+        </p:nvSpPr>
+        <p:spPr/>
+        <p:txBody>
+          <a:bodyPr/>
+          <a:lstStyle/>
+          <a:p>
+            <a:fld id="{43F82CE1-C859-40EE-9EB2-765AABAEDB14}" type="datetime1">
+              <a:rPr lang="en-GB" noProof="0" smtClean="0"/>
+              <a:t>09/10/2020</a:t>
+            </a:fld>
+            <a:endParaRPr lang="en-GB" noProof="0" dirty="0"/>
+          </a:p>
+        </p:txBody>
+      </p:sp>
+      <p:sp>
+        <p:nvSpPr>
+          <p:cNvPr id="5" name="Slide Number Placeholder 4"/>
+          <p:cNvSpPr>
+            <a:spLocks noGrp="1"/>
+          </p:cNvSpPr>
+          <p:nvPr>
+            <p:ph type="sldNum" sz="quarter" idx="5"/>
+          </p:nvPr>
+        </p:nvSpPr>
+        <p:spPr/>
+        <p:txBody>
+          <a:bodyPr/>
+          <a:lstStyle/>
+          <a:p>
+            <a:pPr rtl="0"/>
+            <a:fld id="{B8796F01-7154-41E0-B48B-A6921757531A}" type="slidenum">
+              <a:rPr lang="en-GB" noProof="0" smtClean="0"/>
+              <a:pPr rtl="0"/>
+              <a:t>18</a:t>
+            </a:fld>
+            <a:endParaRPr lang="en-GB" noProof="0" dirty="0"/>
+          </a:p>
+        </p:txBody>
+      </p:sp>
+    </p:spTree>
+    <p:extLst>
+      <p:ext uri="{BB962C8B-B14F-4D97-AF65-F5344CB8AC3E}">
+        <p14:creationId xmlns:p14="http://schemas.microsoft.com/office/powerpoint/2010/main" val="1735104126"/>
       </p:ext>
     </p:extLst>
   </p:cSld>

</xml_diff>

<commit_message>
Much work on the whitepaper, up to databinding
</commit_message>
<xml_diff>
--- a/Docs/Selje_XSharpFromScratch_Slides.pptx
+++ b/Docs/Selje_XSharpFromScratch_Slides.pptx
@@ -375,7 +375,7 @@
                   <a:schemeClr val="tx2"/>
                 </a:solidFill>
               </a:rPr>
-              <a:t>18/10/2020</a:t>
+              <a:t>19/10/2020</a:t>
             </a:fld>
             <a:endParaRPr lang="en-GB" dirty="0">
               <a:solidFill>
@@ -568,7 +568,7 @@
           <a:p>
             <a:fld id="{43F82CE1-C859-40EE-9EB2-765AABAEDB14}" type="datetime1">
               <a:rPr lang="en-GB" noProof="0" smtClean="0"/>
-              <a:t>18/10/2020</a:t>
+              <a:t>19/10/2020</a:t>
             </a:fld>
             <a:endParaRPr lang="en-GB" noProof="0" dirty="0"/>
           </a:p>
@@ -964,7 +964,7 @@
           <a:p>
             <a:fld id="{43F82CE1-C859-40EE-9EB2-765AABAEDB14}" type="datetime1">
               <a:rPr lang="en-GB" noProof="0" smtClean="0"/>
-              <a:t>18/10/2020</a:t>
+              <a:t>19/10/2020</a:t>
             </a:fld>
             <a:endParaRPr lang="en-GB" noProof="0" dirty="0"/>
           </a:p>
@@ -1191,7 +1191,7 @@
           <a:p>
             <a:fld id="{43F82CE1-C859-40EE-9EB2-765AABAEDB14}" type="datetime1">
               <a:rPr lang="en-GB" noProof="0" smtClean="0"/>
-              <a:t>18/10/2020</a:t>
+              <a:t>19/10/2020</a:t>
             </a:fld>
             <a:endParaRPr lang="en-GB" noProof="0" dirty="0"/>
           </a:p>
@@ -1368,7 +1368,7 @@
           <a:p>
             <a:fld id="{43F82CE1-C859-40EE-9EB2-765AABAEDB14}" type="datetime1">
               <a:rPr lang="en-GB" noProof="0" smtClean="0"/>
-              <a:t>18/10/2020</a:t>
+              <a:t>19/10/2020</a:t>
             </a:fld>
             <a:endParaRPr lang="en-GB" noProof="0" dirty="0"/>
           </a:p>
@@ -1553,7 +1553,7 @@
           <a:p>
             <a:fld id="{43F82CE1-C859-40EE-9EB2-765AABAEDB14}" type="datetime1">
               <a:rPr lang="en-GB" noProof="0" smtClean="0"/>
-              <a:t>18/10/2020</a:t>
+              <a:t>19/10/2020</a:t>
             </a:fld>
             <a:endParaRPr lang="en-GB" noProof="0" dirty="0"/>
           </a:p>
@@ -1816,7 +1816,7 @@
           <a:p>
             <a:fld id="{43F82CE1-C859-40EE-9EB2-765AABAEDB14}" type="datetime1">
               <a:rPr lang="en-GB" noProof="0" smtClean="0"/>
-              <a:t>18/10/2020</a:t>
+              <a:t>19/10/2020</a:t>
             </a:fld>
             <a:endParaRPr lang="en-GB" noProof="0" dirty="0"/>
           </a:p>
@@ -1939,7 +1939,7 @@
           <a:p>
             <a:fld id="{43F82CE1-C859-40EE-9EB2-765AABAEDB14}" type="datetime1">
               <a:rPr lang="en-GB" noProof="0" smtClean="0"/>
-              <a:t>18/10/2020</a:t>
+              <a:t>19/10/2020</a:t>
             </a:fld>
             <a:endParaRPr lang="en-GB" noProof="0" dirty="0"/>
           </a:p>
@@ -2176,7 +2176,7 @@
           <a:p>
             <a:fld id="{43F82CE1-C859-40EE-9EB2-765AABAEDB14}" type="datetime1">
               <a:rPr lang="en-GB" noProof="0" smtClean="0"/>
-              <a:t>18/10/2020</a:t>
+              <a:t>19/10/2020</a:t>
             </a:fld>
             <a:endParaRPr lang="en-GB" noProof="0" dirty="0"/>
           </a:p>
@@ -2556,7 +2556,7 @@
           <a:p>
             <a:fld id="{43F82CE1-C859-40EE-9EB2-765AABAEDB14}" type="datetime1">
               <a:rPr lang="en-GB" noProof="0" smtClean="0"/>
-              <a:t>18/10/2020</a:t>
+              <a:t>19/10/2020</a:t>
             </a:fld>
             <a:endParaRPr lang="en-GB" noProof="0" dirty="0"/>
           </a:p>
@@ -2811,7 +2811,7 @@
           <a:p>
             <a:fld id="{43F82CE1-C859-40EE-9EB2-765AABAEDB14}" type="datetime1">
               <a:rPr lang="en-GB" noProof="0" smtClean="0"/>
-              <a:t>18/10/2020</a:t>
+              <a:t>19/10/2020</a:t>
             </a:fld>
             <a:endParaRPr lang="en-GB" noProof="0" dirty="0"/>
           </a:p>
@@ -3067,7 +3067,7 @@
           <a:p>
             <a:fld id="{43F82CE1-C859-40EE-9EB2-765AABAEDB14}" type="datetime1">
               <a:rPr lang="en-GB" noProof="0" smtClean="0"/>
-              <a:t>18/10/2020</a:t>
+              <a:t>19/10/2020</a:t>
             </a:fld>
             <a:endParaRPr lang="en-GB" noProof="0" dirty="0"/>
           </a:p>
@@ -3400,7 +3400,7 @@
           <a:p>
             <a:fld id="{43F82CE1-C859-40EE-9EB2-765AABAEDB14}" type="datetime1">
               <a:rPr lang="en-GB" noProof="0" smtClean="0"/>
-              <a:t>18/10/2020</a:t>
+              <a:t>19/10/2020</a:t>
             </a:fld>
             <a:endParaRPr lang="en-GB" noProof="0" dirty="0"/>
           </a:p>
@@ -3509,7 +3509,7 @@
           <a:p>
             <a:fld id="{43F82CE1-C859-40EE-9EB2-765AABAEDB14}" type="datetime1">
               <a:rPr lang="en-GB" noProof="0" smtClean="0"/>
-              <a:t>18/10/2020</a:t>
+              <a:t>19/10/2020</a:t>
             </a:fld>
             <a:endParaRPr lang="en-GB" noProof="0" dirty="0"/>
           </a:p>
@@ -3834,7 +3834,7 @@
           <a:p>
             <a:fld id="{43F82CE1-C859-40EE-9EB2-765AABAEDB14}" type="datetime1">
               <a:rPr lang="en-GB" noProof="0" smtClean="0"/>
-              <a:t>18/10/2020</a:t>
+              <a:t>19/10/2020</a:t>
             </a:fld>
             <a:endParaRPr lang="en-GB" noProof="0" dirty="0"/>
           </a:p>
@@ -3978,7 +3978,7 @@
           <a:p>
             <a:fld id="{43F82CE1-C859-40EE-9EB2-765AABAEDB14}" type="datetime1">
               <a:rPr lang="en-GB" noProof="0" smtClean="0"/>
-              <a:t>18/10/2020</a:t>
+              <a:t>19/10/2020</a:t>
             </a:fld>
             <a:endParaRPr lang="en-GB" noProof="0" dirty="0"/>
           </a:p>
@@ -4136,7 +4136,7 @@
           <a:p>
             <a:fld id="{43F82CE1-C859-40EE-9EB2-765AABAEDB14}" type="datetime1">
               <a:rPr lang="en-GB" noProof="0" smtClean="0"/>
-              <a:t>18/10/2020</a:t>
+              <a:t>19/10/2020</a:t>
             </a:fld>
             <a:endParaRPr lang="en-GB" noProof="0" dirty="0"/>
           </a:p>
@@ -4274,7 +4274,7 @@
           <a:p>
             <a:fld id="{43F82CE1-C859-40EE-9EB2-765AABAEDB14}" type="datetime1">
               <a:rPr lang="en-GB" noProof="0" smtClean="0"/>
-              <a:t>18/10/2020</a:t>
+              <a:t>19/10/2020</a:t>
             </a:fld>
             <a:endParaRPr lang="en-GB" noProof="0" dirty="0"/>
           </a:p>
@@ -4443,7 +4443,7 @@
           <a:p>
             <a:fld id="{43F82CE1-C859-40EE-9EB2-765AABAEDB14}" type="datetime1">
               <a:rPr lang="en-GB" noProof="0" smtClean="0"/>
-              <a:t>18/10/2020</a:t>
+              <a:t>19/10/2020</a:t>
             </a:fld>
             <a:endParaRPr lang="en-GB" noProof="0" dirty="0"/>
           </a:p>
@@ -4588,7 +4588,7 @@
           <a:p>
             <a:fld id="{43F82CE1-C859-40EE-9EB2-765AABAEDB14}" type="datetime1">
               <a:rPr lang="en-GB" noProof="0" smtClean="0"/>
-              <a:t>18/10/2020</a:t>
+              <a:t>19/10/2020</a:t>
             </a:fld>
             <a:endParaRPr lang="en-GB" noProof="0" dirty="0"/>
           </a:p>
@@ -4827,7 +4827,7 @@
           <a:p>
             <a:fld id="{43F82CE1-C859-40EE-9EB2-765AABAEDB14}" type="datetime1">
               <a:rPr lang="en-GB" noProof="0" smtClean="0"/>
-              <a:t>18/10/2020</a:t>
+              <a:t>19/10/2020</a:t>
             </a:fld>
             <a:endParaRPr lang="en-GB" noProof="0" dirty="0"/>
           </a:p>
@@ -4969,7 +4969,7 @@
           <a:p>
             <a:fld id="{43F82CE1-C859-40EE-9EB2-765AABAEDB14}" type="datetime1">
               <a:rPr lang="en-GB" noProof="0" smtClean="0"/>
-              <a:t>18/10/2020</a:t>
+              <a:t>19/10/2020</a:t>
             </a:fld>
             <a:endParaRPr lang="en-GB" noProof="0" dirty="0"/>
           </a:p>
@@ -5149,7 +5149,7 @@
           <a:p>
             <a:fld id="{43F82CE1-C859-40EE-9EB2-765AABAEDB14}" type="datetime1">
               <a:rPr lang="en-GB" noProof="0" smtClean="0"/>
-              <a:t>18/10/2020</a:t>
+              <a:t>19/10/2020</a:t>
             </a:fld>
             <a:endParaRPr lang="en-GB" noProof="0" dirty="0"/>
           </a:p>
@@ -5366,7 +5366,7 @@
           <a:p>
             <a:fld id="{43F82CE1-C859-40EE-9EB2-765AABAEDB14}" type="datetime1">
               <a:rPr lang="en-GB" noProof="0" smtClean="0"/>
-              <a:t>18/10/2020</a:t>
+              <a:t>19/10/2020</a:t>
             </a:fld>
             <a:endParaRPr lang="en-GB" noProof="0" dirty="0"/>
           </a:p>
@@ -5484,7 +5484,7 @@
           <a:p>
             <a:fld id="{43F82CE1-C859-40EE-9EB2-765AABAEDB14}" type="datetime1">
               <a:rPr lang="en-GB" noProof="0" smtClean="0"/>
-              <a:t>18/10/2020</a:t>
+              <a:t>19/10/2020</a:t>
             </a:fld>
             <a:endParaRPr lang="en-GB" noProof="0" dirty="0"/>
           </a:p>
@@ -5652,7 +5652,7 @@
           <a:p>
             <a:fld id="{43F82CE1-C859-40EE-9EB2-765AABAEDB14}" type="datetime1">
               <a:rPr lang="en-GB" noProof="0" smtClean="0"/>
-              <a:t>18/10/2020</a:t>
+              <a:t>19/10/2020</a:t>
             </a:fld>
             <a:endParaRPr lang="en-GB" noProof="0" dirty="0"/>
           </a:p>
@@ -5778,7 +5778,7 @@
           <a:p>
             <a:fld id="{43F82CE1-C859-40EE-9EB2-765AABAEDB14}" type="datetime1">
               <a:rPr lang="en-GB" noProof="0" smtClean="0"/>
-              <a:t>18/10/2020</a:t>
+              <a:t>19/10/2020</a:t>
             </a:fld>
             <a:endParaRPr lang="en-GB" noProof="0" dirty="0"/>
           </a:p>
@@ -5893,7 +5893,7 @@
           <a:p>
             <a:fld id="{43F82CE1-C859-40EE-9EB2-765AABAEDB14}" type="datetime1">
               <a:rPr lang="en-GB" noProof="0" smtClean="0"/>
-              <a:t>18/10/2020</a:t>
+              <a:t>19/10/2020</a:t>
             </a:fld>
             <a:endParaRPr lang="en-GB" noProof="0" dirty="0"/>
           </a:p>
@@ -6020,7 +6020,7 @@
           <a:p>
             <a:fld id="{43F82CE1-C859-40EE-9EB2-765AABAEDB14}" type="datetime1">
               <a:rPr lang="en-GB" noProof="0" smtClean="0"/>
-              <a:t>18/10/2020</a:t>
+              <a:t>19/10/2020</a:t>
             </a:fld>
             <a:endParaRPr lang="en-GB" noProof="0" dirty="0"/>
           </a:p>
@@ -6129,7 +6129,7 @@
           <a:p>
             <a:fld id="{43F82CE1-C859-40EE-9EB2-765AABAEDB14}" type="datetime1">
               <a:rPr lang="en-GB" noProof="0" smtClean="0"/>
-              <a:t>18/10/2020</a:t>
+              <a:t>19/10/2020</a:t>
             </a:fld>
             <a:endParaRPr lang="en-GB" noProof="0" dirty="0"/>
           </a:p>
@@ -6254,7 +6254,7 @@
           <a:p>
             <a:fld id="{43F82CE1-C859-40EE-9EB2-765AABAEDB14}" type="datetime1">
               <a:rPr lang="en-GB" noProof="0" smtClean="0"/>
-              <a:t>18/10/2020</a:t>
+              <a:t>19/10/2020</a:t>
             </a:fld>
             <a:endParaRPr lang="en-GB" noProof="0" dirty="0"/>
           </a:p>
@@ -6395,7 +6395,7 @@
           <a:p>
             <a:fld id="{43F82CE1-C859-40EE-9EB2-765AABAEDB14}" type="datetime1">
               <a:rPr lang="en-GB" noProof="0" smtClean="0"/>
-              <a:t>18/10/2020</a:t>
+              <a:t>19/10/2020</a:t>
             </a:fld>
             <a:endParaRPr lang="en-GB" noProof="0" dirty="0"/>
           </a:p>
@@ -6510,7 +6510,7 @@
           <a:p>
             <a:fld id="{43F82CE1-C859-40EE-9EB2-765AABAEDB14}" type="datetime1">
               <a:rPr lang="en-GB" noProof="0" smtClean="0"/>
-              <a:t>18/10/2020</a:t>
+              <a:t>19/10/2020</a:t>
             </a:fld>
             <a:endParaRPr lang="en-GB" noProof="0" dirty="0"/>
           </a:p>
@@ -6600,13 +6600,13 @@
           <a:p>
             <a:r>
               <a:rPr lang="en-US" dirty="0"/>
-              <a:t>I will pause a few times to take questions </a:t>
+              <a:t>I will pause a few times to take questions – type them in the chat window.</a:t>
             </a:r>
           </a:p>
           <a:p>
             <a:r>
               <a:rPr lang="en-US" dirty="0"/>
-              <a:t>I don’t have Robert here to help me this year so please take it easy on me</a:t>
+              <a:t>I don’t have Robert here to help me this year so please take it easy on me.</a:t>
             </a:r>
           </a:p>
           <a:p>
@@ -6632,7 +6632,15 @@
             </a:pPr>
             <a:r>
               <a:rPr lang="en-US" dirty="0"/>
-              <a:t>Let's get to it</a:t>
+              <a:t>Ok we’ve got a lot to </a:t>
+            </a:r>
+            <a:r>
+              <a:rPr lang="en-US"/>
+              <a:t>talk about so let's </a:t>
+            </a:r>
+            <a:r>
+              <a:rPr lang="en-US" dirty="0"/>
+              <a:t>get to it</a:t>
             </a:r>
           </a:p>
           <a:p>
@@ -6660,7 +6668,7 @@
           <a:p>
             <a:fld id="{43F82CE1-C859-40EE-9EB2-765AABAEDB14}" type="datetime1">
               <a:rPr lang="en-GB" noProof="0" smtClean="0"/>
-              <a:t>18/10/2020</a:t>
+              <a:t>19/10/2020</a:t>
             </a:fld>
             <a:endParaRPr lang="en-GB" noProof="0" dirty="0"/>
           </a:p>
@@ -6797,7 +6805,7 @@
           <a:p>
             <a:fld id="{43F82CE1-C859-40EE-9EB2-765AABAEDB14}" type="datetime1">
               <a:rPr lang="en-GB" noProof="0" smtClean="0"/>
-              <a:t>18/10/2020</a:t>
+              <a:t>19/10/2020</a:t>
             </a:fld>
             <a:endParaRPr lang="en-GB" noProof="0" dirty="0"/>
           </a:p>
@@ -7018,7 +7026,7 @@
           <a:p>
             <a:fld id="{43F82CE1-C859-40EE-9EB2-765AABAEDB14}" type="datetime1">
               <a:rPr lang="en-GB" noProof="0" smtClean="0"/>
-              <a:t>18/10/2020</a:t>
+              <a:t>19/10/2020</a:t>
             </a:fld>
             <a:endParaRPr lang="en-GB" noProof="0" dirty="0"/>
           </a:p>
@@ -7130,7 +7138,7 @@
           <a:p>
             <a:fld id="{43F82CE1-C859-40EE-9EB2-765AABAEDB14}" type="datetime1">
               <a:rPr lang="en-GB" noProof="0" smtClean="0"/>
-              <a:t>18/10/2020</a:t>
+              <a:t>19/10/2020</a:t>
             </a:fld>
             <a:endParaRPr lang="en-GB" noProof="0" dirty="0"/>
           </a:p>
@@ -7309,7 +7317,7 @@
           <a:p>
             <a:fld id="{43F82CE1-C859-40EE-9EB2-765AABAEDB14}" type="datetime1">
               <a:rPr lang="en-GB" noProof="0" smtClean="0"/>
-              <a:t>18/10/2020</a:t>
+              <a:t>19/10/2020</a:t>
             </a:fld>
             <a:endParaRPr lang="en-GB" noProof="0" dirty="0"/>
           </a:p>
@@ -7664,7 +7672,7 @@
           <a:p>
             <a:fld id="{43F82CE1-C859-40EE-9EB2-765AABAEDB14}" type="datetime1">
               <a:rPr lang="en-GB" noProof="0" smtClean="0"/>
-              <a:t>18/10/2020</a:t>
+              <a:t>19/10/2020</a:t>
             </a:fld>
             <a:endParaRPr lang="en-GB" noProof="0" dirty="0"/>
           </a:p>
@@ -32546,17 +32554,14 @@
 
 <file path=customXml/item12.xml><?xml version="1.0" encoding="utf-8"?>
 <Control xmlns="http://schemas.microsoft.com/VisualStudio/2011/storyboarding/control">
-  <Id Name="37d07999-8e88-45a7-b776-aa394cd3ee89" Revision="1" Stencil="System.MyShapes" StencilVersion="1.0"/>
+  <Id Name="3a5f3215-4f7c-4247-9247-a9acf7619a8c" Revision="1" Stencil="System.MyShapes" StencilVersion="1.0"/>
 </Control>
 </file>
 
 <file path=customXml/item13.xml><?xml version="1.0" encoding="utf-8"?>
-<?mso-contentType ?>
-<FormTemplates xmlns="http://schemas.microsoft.com/sharepoint/v3/contenttype/forms">
-  <Display>DocumentLibraryForm</Display>
-  <Edit>AssetEditForm</Edit>
-  <New>DocumentLibraryForm</New>
-</FormTemplates>
+<Control xmlns="http://schemas.microsoft.com/VisualStudio/2011/storyboarding/control">
+  <Id Name="37d07999-8e88-45a7-b776-aa394cd3ee89" Revision="1" Stencil="System.MyShapes" StencilVersion="1.0"/>
+</Control>
 </file>
 
 <file path=customXml/item14.xml><?xml version="1.0" encoding="utf-8"?>
@@ -32567,7 +32572,7 @@
 
 <file path=customXml/item15.xml><?xml version="1.0" encoding="utf-8"?>
 <Control xmlns="http://schemas.microsoft.com/VisualStudio/2011/storyboarding/control">
-  <Id Name="37d07999-8e88-45a7-b776-aa394cd3ee89" Revision="1" Stencil="System.MyShapes" StencilVersion="1.0"/>
+  <Id Name="3a5f3215-4f7c-4247-9247-a9acf7619a8c" Revision="1" Stencil="System.MyShapes" StencilVersion="1.0"/>
 </Control>
 </file>
 
@@ -32585,180 +32590,50 @@
 
 <file path=customXml/item18.xml><?xml version="1.0" encoding="utf-8"?>
 <Control xmlns="http://schemas.microsoft.com/VisualStudio/2011/storyboarding/control">
-  <Id Name="3a5f3215-4f7c-4247-9247-a9acf7619a8c" Revision="1" Stencil="System.MyShapes" StencilVersion="1.0"/>
+  <Id Name="37d07999-8e88-45a7-b776-aa394cd3ee89" Revision="1" Stencil="System.MyShapes" StencilVersion="1.0"/>
 </Control>
 </file>
 
 <file path=customXml/item19.xml><?xml version="1.0" encoding="utf-8"?>
 <Control xmlns="http://schemas.microsoft.com/VisualStudio/2011/storyboarding/control">
-  <Id Name="3a5f3215-4f7c-4247-9247-a9acf7619a8c" Revision="1" Stencil="System.MyShapes" StencilVersion="1.0"/>
+  <Id Name="37d07999-8e88-45a7-b776-aa394cd3ee89" Revision="1" Stencil="System.MyShapes" StencilVersion="1.0"/>
 </Control>
 </file>
 
 <file path=customXml/item2.xml><?xml version="1.0" encoding="utf-8"?>
 <Control xmlns="http://schemas.microsoft.com/VisualStudio/2011/storyboarding/control">
-  <Id Name="3a5f3215-4f7c-4247-9247-a9acf7619a8c" Revision="1" Stencil="System.MyShapes" StencilVersion="1.0"/>
+  <Id Name="37d07999-8e88-45a7-b776-aa394cd3ee89" Revision="1" Stencil="System.MyShapes" StencilVersion="1.0"/>
 </Control>
 </file>
 
 <file path=customXml/item20.xml><?xml version="1.0" encoding="utf-8"?>
 <Control xmlns="http://schemas.microsoft.com/VisualStudio/2011/storyboarding/control">
-  <Id Name="3a5f3215-4f7c-4247-9247-a9acf7619a8c" Revision="1" Stencil="System.MyShapes" StencilVersion="1.0"/>
+  <Id Name="37d07999-8e88-45a7-b776-aa394cd3ee89" Revision="1" Stencil="System.MyShapes" StencilVersion="1.0"/>
 </Control>
 </file>
 
 <file path=customXml/item21.xml><?xml version="1.0" encoding="utf-8"?>
 <Control xmlns="http://schemas.microsoft.com/VisualStudio/2011/storyboarding/control">
-  <Id Name="37d07999-8e88-45a7-b776-aa394cd3ee89" Revision="1" Stencil="System.MyShapes" StencilVersion="1.0"/>
+  <Id Name="3a5f3215-4f7c-4247-9247-a9acf7619a8c" Revision="1" Stencil="System.MyShapes" StencilVersion="1.0"/>
 </Control>
 </file>
 
 <file path=customXml/item22.xml><?xml version="1.0" encoding="utf-8"?>
 <Control xmlns="http://schemas.microsoft.com/VisualStudio/2011/storyboarding/control">
-  <Id Name="37d07999-8e88-45a7-b776-aa394cd3ee89" Revision="1" Stencil="System.MyShapes" StencilVersion="1.0"/>
+  <Id Name="3a5f3215-4f7c-4247-9247-a9acf7619a8c" Revision="1" Stencil="System.MyShapes" StencilVersion="1.0"/>
 </Control>
 </file>
 
 <file path=customXml/item23.xml><?xml version="1.0" encoding="utf-8"?>
 <Control xmlns="http://schemas.microsoft.com/VisualStudio/2011/storyboarding/control">
-  <Id Name="37d07999-8e88-45a7-b776-aa394cd3ee89" Revision="1" Stencil="System.MyShapes" StencilVersion="1.0"/>
+  <Id Name="3a5f3215-4f7c-4247-9247-a9acf7619a8c" Revision="1" Stencil="System.MyShapes" StencilVersion="1.0"/>
 </Control>
 </file>
 
 <file path=customXml/item24.xml><?xml version="1.0" encoding="utf-8"?>
-<p:properties xmlns:p="http://schemas.microsoft.com/office/2006/metadata/properties" xmlns:xsi="http://www.w3.org/2001/XMLSchema-instance" xmlns:pc="http://schemas.microsoft.com/office/infopath/2007/PartnerControls">
-  <documentManagement>
-    <LocPublishedLinkedAssetsLookup xmlns="4873beb7-5857-4685-be1f-d57550cc96cc" xsi:nil="true"/>
-    <ApprovalStatus xmlns="4873beb7-5857-4685-be1f-d57550cc96cc">InProgress</ApprovalStatus>
-    <MarketSpecific xmlns="4873beb7-5857-4685-be1f-d57550cc96cc">false</MarketSpecific>
-    <LocComments xmlns="4873beb7-5857-4685-be1f-d57550cc96cc" xsi:nil="true"/>
-    <LocLastLocAttemptVersionTypeLookup xmlns="4873beb7-5857-4685-be1f-d57550cc96cc" xsi:nil="true"/>
-    <DirectSourceMarket xmlns="4873beb7-5857-4685-be1f-d57550cc96cc" xsi:nil="true"/>
-    <ThumbnailAssetId xmlns="4873beb7-5857-4685-be1f-d57550cc96cc" xsi:nil="true"/>
-    <PrimaryImageGen xmlns="4873beb7-5857-4685-be1f-d57550cc96cc">false</PrimaryImageGen>
-    <LocNewPublishedVersionLookup xmlns="4873beb7-5857-4685-be1f-d57550cc96cc" xsi:nil="true"/>
-    <LegacyData xmlns="4873beb7-5857-4685-be1f-d57550cc96cc" xsi:nil="true"/>
-    <LocRecommendedHandoff xmlns="4873beb7-5857-4685-be1f-d57550cc96cc" xsi:nil="true"/>
-    <BusinessGroup xmlns="4873beb7-5857-4685-be1f-d57550cc96cc" xsi:nil="true"/>
-    <BlockPublish xmlns="4873beb7-5857-4685-be1f-d57550cc96cc">false</BlockPublish>
-    <TPFriendlyName xmlns="4873beb7-5857-4685-be1f-d57550cc96cc" xsi:nil="true"/>
-    <LocOverallPublishStatusLookup xmlns="4873beb7-5857-4685-be1f-d57550cc96cc" xsi:nil="true"/>
-    <NumericId xmlns="4873beb7-5857-4685-be1f-d57550cc96cc" xsi:nil="true"/>
-    <APEditor xmlns="4873beb7-5857-4685-be1f-d57550cc96cc">
-      <UserInfo>
-        <DisplayName/>
-        <AccountId xsi:nil="true"/>
-        <AccountType/>
-      </UserInfo>
-    </APEditor>
-    <SourceTitle xmlns="4873beb7-5857-4685-be1f-d57550cc96cc" xsi:nil="true"/>
-    <OpenTemplate xmlns="4873beb7-5857-4685-be1f-d57550cc96cc">true</OpenTemplate>
-    <LocOverallLocStatusLookup xmlns="4873beb7-5857-4685-be1f-d57550cc96cc" xsi:nil="true"/>
-    <UALocComments xmlns="4873beb7-5857-4685-be1f-d57550cc96cc" xsi:nil="true"/>
-    <ParentAssetId xmlns="4873beb7-5857-4685-be1f-d57550cc96cc" xsi:nil="true"/>
-    <IntlLangReviewDate xmlns="4873beb7-5857-4685-be1f-d57550cc96cc" xsi:nil="true"/>
-    <FeatureTagsTaxHTField0 xmlns="4873beb7-5857-4685-be1f-d57550cc96cc">
-      <Terms xmlns="http://schemas.microsoft.com/office/infopath/2007/PartnerControls"/>
-    </FeatureTagsTaxHTField0>
-    <PublishStatusLookup xmlns="4873beb7-5857-4685-be1f-d57550cc96cc">
-      <Value>1345039</Value>
-    </PublishStatusLookup>
-    <Providers xmlns="4873beb7-5857-4685-be1f-d57550cc96cc" xsi:nil="true"/>
-    <MachineTranslated xmlns="4873beb7-5857-4685-be1f-d57550cc96cc">false</MachineTranslated>
-    <OriginalSourceMarket xmlns="4873beb7-5857-4685-be1f-d57550cc96cc" xsi:nil="true"/>
-    <APDescription xmlns="4873beb7-5857-4685-be1f-d57550cc96cc">The bookstacks present on most slides  make this a good choice for students, teachers, reading enthusiasts, and others in education. This presentation template contains multiple slide layouts in widescreen format (16x9) and includes a sample table and chart that you can easily  modify.</APDescription>
-    <ClipArtFilename xmlns="4873beb7-5857-4685-be1f-d57550cc96cc" xsi:nil="true"/>
-    <ContentItem xmlns="4873beb7-5857-4685-be1f-d57550cc96cc" xsi:nil="true"/>
-    <TPInstallLocation xmlns="4873beb7-5857-4685-be1f-d57550cc96cc" xsi:nil="true"/>
-    <PublishTargets xmlns="4873beb7-5857-4685-be1f-d57550cc96cc">OfficeOnlineVNext</PublishTargets>
-    <TimesCloned xmlns="4873beb7-5857-4685-be1f-d57550cc96cc" xsi:nil="true"/>
-    <AssetStart xmlns="4873beb7-5857-4685-be1f-d57550cc96cc">2011-11-26T00:00:00+00:00</AssetStart>
-    <Provider xmlns="4873beb7-5857-4685-be1f-d57550cc96cc" xsi:nil="true"/>
-    <AcquiredFrom xmlns="4873beb7-5857-4685-be1f-d57550cc96cc">Internal MS</AcquiredFrom>
-    <FriendlyTitle xmlns="4873beb7-5857-4685-be1f-d57550cc96cc" xsi:nil="true"/>
-    <LastHandOff xmlns="4873beb7-5857-4685-be1f-d57550cc96cc" xsi:nil="true"/>
-    <TPClientViewer xmlns="4873beb7-5857-4685-be1f-d57550cc96cc" xsi:nil="true"/>
-    <TemplateStatus xmlns="4873beb7-5857-4685-be1f-d57550cc96cc">Complete</TemplateStatus>
-    <Downloads xmlns="4873beb7-5857-4685-be1f-d57550cc96cc">0</Downloads>
-    <OOCacheId xmlns="4873beb7-5857-4685-be1f-d57550cc96cc" xsi:nil="true"/>
-    <IsDeleted xmlns="4873beb7-5857-4685-be1f-d57550cc96cc">false</IsDeleted>
-    <LocPublishedDependentAssetsLookup xmlns="4873beb7-5857-4685-be1f-d57550cc96cc" xsi:nil="true"/>
-    <AssetExpire xmlns="4873beb7-5857-4685-be1f-d57550cc96cc">2029-05-12T07:00:00+00:00</AssetExpire>
-    <DSATActionTaken xmlns="4873beb7-5857-4685-be1f-d57550cc96cc" xsi:nil="true"/>
-    <CSXSubmissionMarket xmlns="4873beb7-5857-4685-be1f-d57550cc96cc" xsi:nil="true"/>
-    <TPExecutable xmlns="4873beb7-5857-4685-be1f-d57550cc96cc" xsi:nil="true"/>
-    <EditorialTags xmlns="4873beb7-5857-4685-be1f-d57550cc96cc" xsi:nil="true"/>
-    <SubmitterId xmlns="4873beb7-5857-4685-be1f-d57550cc96cc" xsi:nil="true"/>
-    <ApprovalLog xmlns="4873beb7-5857-4685-be1f-d57550cc96cc" xsi:nil="true"/>
-    <AssetType xmlns="4873beb7-5857-4685-be1f-d57550cc96cc">TP</AssetType>
-    <BugNumber xmlns="4873beb7-5857-4685-be1f-d57550cc96cc" xsi:nil="true"/>
-    <CSXSubmissionDate xmlns="4873beb7-5857-4685-be1f-d57550cc96cc" xsi:nil="true"/>
-    <CSXUpdate xmlns="4873beb7-5857-4685-be1f-d57550cc96cc">false</CSXUpdate>
-    <Milestone xmlns="4873beb7-5857-4685-be1f-d57550cc96cc" xsi:nil="true"/>
-    <RecommendationsModifier xmlns="4873beb7-5857-4685-be1f-d57550cc96cc" xsi:nil="true"/>
-    <OriginAsset xmlns="4873beb7-5857-4685-be1f-d57550cc96cc" xsi:nil="true"/>
-    <TPComponent xmlns="4873beb7-5857-4685-be1f-d57550cc96cc" xsi:nil="true"/>
-    <AssetId xmlns="4873beb7-5857-4685-be1f-d57550cc96cc">TP102787939</AssetId>
-    <IntlLocPriority xmlns="4873beb7-5857-4685-be1f-d57550cc96cc" xsi:nil="true"/>
-    <PolicheckWords xmlns="4873beb7-5857-4685-be1f-d57550cc96cc" xsi:nil="true"/>
-    <TPLaunchHelpLink xmlns="4873beb7-5857-4685-be1f-d57550cc96cc" xsi:nil="true"/>
-    <TPApplication xmlns="4873beb7-5857-4685-be1f-d57550cc96cc" xsi:nil="true"/>
-    <CrawlForDependencies xmlns="4873beb7-5857-4685-be1f-d57550cc96cc">false</CrawlForDependencies>
-    <HandoffToMSDN xmlns="4873beb7-5857-4685-be1f-d57550cc96cc" xsi:nil="true"/>
-    <PlannedPubDate xmlns="4873beb7-5857-4685-be1f-d57550cc96cc" xsi:nil="true"/>
-    <IntlLangReviewer xmlns="4873beb7-5857-4685-be1f-d57550cc96cc" xsi:nil="true"/>
-    <TrustLevel xmlns="4873beb7-5857-4685-be1f-d57550cc96cc">1 Microsoft Managed Content</TrustLevel>
-    <LocLastLocAttemptVersionLookup xmlns="4873beb7-5857-4685-be1f-d57550cc96cc">694216</LocLastLocAttemptVersionLookup>
-    <LocProcessedForHandoffsLookup xmlns="4873beb7-5857-4685-be1f-d57550cc96cc" xsi:nil="true"/>
-    <IsSearchable xmlns="4873beb7-5857-4685-be1f-d57550cc96cc">true</IsSearchable>
-    <TemplateTemplateType xmlns="4873beb7-5857-4685-be1f-d57550cc96cc">PowerPoint Presentation Template</TemplateTemplateType>
-    <CampaignTagsTaxHTField0 xmlns="4873beb7-5857-4685-be1f-d57550cc96cc">
-      <Terms xmlns="http://schemas.microsoft.com/office/infopath/2007/PartnerControls"/>
-    </CampaignTagsTaxHTField0>
-    <TPNamespace xmlns="4873beb7-5857-4685-be1f-d57550cc96cc" xsi:nil="true"/>
-    <LocOverallPreviewStatusLookup xmlns="4873beb7-5857-4685-be1f-d57550cc96cc" xsi:nil="true"/>
-    <TaxCatchAll xmlns="4873beb7-5857-4685-be1f-d57550cc96cc"/>
-    <Markets xmlns="4873beb7-5857-4685-be1f-d57550cc96cc"/>
-    <UAProjectedTotalWords xmlns="4873beb7-5857-4685-be1f-d57550cc96cc" xsi:nil="true"/>
-    <IntlLangReview xmlns="4873beb7-5857-4685-be1f-d57550cc96cc" xsi:nil="true"/>
-    <OutputCachingOn xmlns="4873beb7-5857-4685-be1f-d57550cc96cc">false</OutputCachingOn>
-    <AverageRating xmlns="4873beb7-5857-4685-be1f-d57550cc96cc" xsi:nil="true"/>
-    <APAuthor xmlns="4873beb7-5857-4685-be1f-d57550cc96cc">
-      <UserInfo>
-        <DisplayName>REDMOND\kristaa</DisplayName>
-        <AccountId>136</AccountId>
-        <AccountType/>
-      </UserInfo>
-    </APAuthor>
-    <LocManualTestRequired xmlns="4873beb7-5857-4685-be1f-d57550cc96cc">false</LocManualTestRequired>
-    <TPCommandLine xmlns="4873beb7-5857-4685-be1f-d57550cc96cc" xsi:nil="true"/>
-    <TPAppVersion xmlns="4873beb7-5857-4685-be1f-d57550cc96cc" xsi:nil="true"/>
-    <EditorialStatus xmlns="4873beb7-5857-4685-be1f-d57550cc96cc">Complete</EditorialStatus>
-    <LastModifiedDateTime xmlns="4873beb7-5857-4685-be1f-d57550cc96cc" xsi:nil="true"/>
-    <ScenarioTagsTaxHTField0 xmlns="4873beb7-5857-4685-be1f-d57550cc96cc">
-      <Terms xmlns="http://schemas.microsoft.com/office/infopath/2007/PartnerControls"/>
-    </ScenarioTagsTaxHTField0>
-    <LocProcessedForMarketsLookup xmlns="4873beb7-5857-4685-be1f-d57550cc96cc" xsi:nil="true"/>
-    <TPLaunchHelpLinkType xmlns="4873beb7-5857-4685-be1f-d57550cc96cc">Template</TPLaunchHelpLinkType>
-    <OriginalRelease xmlns="4873beb7-5857-4685-be1f-d57550cc96cc">15</OriginalRelease>
-    <LocalizationTagsTaxHTField0 xmlns="4873beb7-5857-4685-be1f-d57550cc96cc">
-      <Terms xmlns="http://schemas.microsoft.com/office/infopath/2007/PartnerControls"/>
-    </LocalizationTagsTaxHTField0>
-    <UACurrentWords xmlns="4873beb7-5857-4685-be1f-d57550cc96cc" xsi:nil="true"/>
-    <ArtSampleDocs xmlns="4873beb7-5857-4685-be1f-d57550cc96cc" xsi:nil="true"/>
-    <UALocRecommendation xmlns="4873beb7-5857-4685-be1f-d57550cc96cc">Localize</UALocRecommendation>
-    <Manager xmlns="4873beb7-5857-4685-be1f-d57550cc96cc" xsi:nil="true"/>
-    <LocOverallHandbackStatusLookup xmlns="4873beb7-5857-4685-be1f-d57550cc96cc" xsi:nil="true"/>
-    <ShowIn xmlns="4873beb7-5857-4685-be1f-d57550cc96cc">Show everywhere</ShowIn>
-    <UANotes xmlns="4873beb7-5857-4685-be1f-d57550cc96cc" xsi:nil="true"/>
-    <InternalTagsTaxHTField0 xmlns="4873beb7-5857-4685-be1f-d57550cc96cc">
-      <Terms xmlns="http://schemas.microsoft.com/office/infopath/2007/PartnerControls"/>
-    </InternalTagsTaxHTField0>
-    <CSXHash xmlns="4873beb7-5857-4685-be1f-d57550cc96cc" xsi:nil="true"/>
-    <VoteCount xmlns="4873beb7-5857-4685-be1f-d57550cc96cc" xsi:nil="true"/>
-    <LocMarketGroupTiers2 xmlns="4873beb7-5857-4685-be1f-d57550cc96cc" xsi:nil="true"/>
-  </documentManagement>
-</p:properties>
+<Control xmlns="http://schemas.microsoft.com/VisualStudio/2011/storyboarding/control">
+  <Id Name="3a5f3215-4f7c-4247-9247-a9acf7619a8c" Revision="1" Stencil="System.MyShapes" StencilVersion="1.0"/>
+</Control>
 </file>
 
 <file path=customXml/item25.xml><?xml version="1.0" encoding="utf-8"?>
@@ -32769,23 +32644,92 @@
 
 <file path=customXml/item26.xml><?xml version="1.0" encoding="utf-8"?>
 <Control xmlns="http://schemas.microsoft.com/VisualStudio/2011/storyboarding/control">
-  <Id Name="3a5f3215-4f7c-4247-9247-a9acf7619a8c" Revision="1" Stencil="System.MyShapes" StencilVersion="1.0"/>
+  <Id Name="37d07999-8e88-45a7-b776-aa394cd3ee89" Revision="1" Stencil="System.MyShapes" StencilVersion="1.0"/>
 </Control>
 </file>
 
 <file path=customXml/item27.xml><?xml version="1.0" encoding="utf-8"?>
 <Control xmlns="http://schemas.microsoft.com/VisualStudio/2011/storyboarding/control">
-  <Id Name="3a5f3215-4f7c-4247-9247-a9acf7619a8c" Revision="1" Stencil="System.MyShapes" StencilVersion="1.0"/>
+  <Id Name="37d07999-8e88-45a7-b776-aa394cd3ee89" Revision="1" Stencil="System.MyShapes" StencilVersion="1.0"/>
 </Control>
 </file>
 
 <file path=customXml/item28.xml><?xml version="1.0" encoding="utf-8"?>
 <Control xmlns="http://schemas.microsoft.com/VisualStudio/2011/storyboarding/control">
+  <Id Name="37d07999-8e88-45a7-b776-aa394cd3ee89" Revision="1" Stencil="System.MyShapes" StencilVersion="1.0"/>
+</Control>
+</file>
+
+<file path=customXml/item29.xml><?xml version="1.0" encoding="utf-8"?>
+<Control xmlns="http://schemas.microsoft.com/VisualStudio/2011/storyboarding/control">
   <Id Name="3a5f3215-4f7c-4247-9247-a9acf7619a8c" Revision="1" Stencil="System.MyShapes" StencilVersion="1.0"/>
 </Control>
 </file>
 
-<file path=customXml/item29.xml><?xml version="1.0" encoding="utf-8"?>
+<file path=customXml/item3.xml><?xml version="1.0" encoding="utf-8"?>
+<Control xmlns="http://schemas.microsoft.com/VisualStudio/2011/storyboarding/control">
+  <Id Name="3a5f3215-4f7c-4247-9247-a9acf7619a8c" Revision="1" Stencil="System.MyShapes" StencilVersion="1.0"/>
+</Control>
+</file>
+
+<file path=customXml/item30.xml><?xml version="1.0" encoding="utf-8"?>
+<Control xmlns="http://schemas.microsoft.com/VisualStudio/2011/storyboarding/control">
+  <Id Name="37d07999-8e88-45a7-b776-aa394cd3ee89" Revision="1" Stencil="System.MyShapes" StencilVersion="1.0"/>
+</Control>
+</file>
+
+<file path=customXml/item31.xml><?xml version="1.0" encoding="utf-8"?>
+<Control xmlns="http://schemas.microsoft.com/VisualStudio/2011/storyboarding/control">
+  <Id Name="37d07999-8e88-45a7-b776-aa394cd3ee89" Revision="1" Stencil="System.MyShapes" StencilVersion="1.0"/>
+</Control>
+</file>
+
+<file path=customXml/item32.xml><?xml version="1.0" encoding="utf-8"?>
+<Control xmlns="http://schemas.microsoft.com/VisualStudio/2011/storyboarding/control">
+  <Id Name="3a5f3215-4f7c-4247-9247-a9acf7619a8c" Revision="1" Stencil="System.MyShapes" StencilVersion="1.0"/>
+</Control>
+</file>
+
+<file path=customXml/item33.xml><?xml version="1.0" encoding="utf-8"?>
+<Control xmlns="http://schemas.microsoft.com/VisualStudio/2011/storyboarding/control">
+  <Id Name="3a5f3215-4f7c-4247-9247-a9acf7619a8c" Revision="1" Stencil="System.MyShapes" StencilVersion="1.0"/>
+</Control>
+</file>
+
+<file path=customXml/item34.xml><?xml version="1.0" encoding="utf-8"?>
+<?mso-contentType ?>
+<FormTemplates xmlns="http://schemas.microsoft.com/sharepoint/v3/contenttype/forms">
+  <Display>DocumentLibraryForm</Display>
+  <Edit>AssetEditForm</Edit>
+  <New>DocumentLibraryForm</New>
+</FormTemplates>
+</file>
+
+<file path=customXml/item35.xml><?xml version="1.0" encoding="utf-8"?>
+<Control xmlns="http://schemas.microsoft.com/VisualStudio/2011/storyboarding/control">
+  <Id Name="3a5f3215-4f7c-4247-9247-a9acf7619a8c" Revision="1" Stencil="System.MyShapes" StencilVersion="1.0"/>
+</Control>
+</file>
+
+<file path=customXml/item4.xml><?xml version="1.0" encoding="utf-8"?>
+<Control xmlns="http://schemas.microsoft.com/VisualStudio/2011/storyboarding/control">
+  <Id Name="3a5f3215-4f7c-4247-9247-a9acf7619a8c" Revision="1" Stencil="System.MyShapes" StencilVersion="1.0"/>
+</Control>
+</file>
+
+<file path=customXml/item5.xml><?xml version="1.0" encoding="utf-8"?>
+<Control xmlns="http://schemas.microsoft.com/VisualStudio/2011/storyboarding/control">
+  <Id Name="3a5f3215-4f7c-4247-9247-a9acf7619a8c" Revision="1" Stencil="System.MyShapes" StencilVersion="1.0"/>
+</Control>
+</file>
+
+<file path=customXml/item6.xml><?xml version="1.0" encoding="utf-8"?>
+<Control xmlns="http://schemas.microsoft.com/VisualStudio/2011/storyboarding/control">
+  <Id Name="3a5f3215-4f7c-4247-9247-a9acf7619a8c" Revision="1" Stencil="System.MyShapes" StencilVersion="1.0"/>
+</Control>
+</file>
+
+<file path=customXml/item7.xml><?xml version="1.0" encoding="utf-8"?>
 <ct:contentTypeSchema xmlns:ct="http://schemas.microsoft.com/office/2006/metadata/contentType" xmlns:ma="http://schemas.microsoft.com/office/2006/metadata/properties/metaAttributes" ct:_="" ma:_="" ma:contentTypeName="TemplateFile" ma:contentTypeID="0x0101006EDDDB5EE6D98C44930B742096920B300400F5B6D36B3EF94B4E9A635CDF2A18F5B8" ma:contentTypeVersion="72" ma:contentTypeDescription="Create a new document." ma:contentTypeScope="" ma:versionID="a23e56308344d904b51738559c3d67c9">
   <xsd:schema xmlns:xsd="http://www.w3.org/2001/XMLSchema" xmlns:xs="http://www.w3.org/2001/XMLSchema" xmlns:p="http://schemas.microsoft.com/office/2006/metadata/properties" xmlns:ns2="4873beb7-5857-4685-be1f-d57550cc96cc" targetNamespace="http://schemas.microsoft.com/office/2006/metadata/properties" ma:root="true" ma:fieldsID="cd0908cc4600e77bf5da051303e00c8d" ns2:_="">
     <xsd:import namespace="4873beb7-5857-4685-be1f-d57550cc96cc"/>
@@ -33825,85 +33769,285 @@
 </ct:contentTypeSchema>
 </file>
 
-<file path=customXml/item3.xml><?xml version="1.0" encoding="utf-8"?>
-<Control xmlns="http://schemas.microsoft.com/VisualStudio/2011/storyboarding/control">
-  <Id Name="37d07999-8e88-45a7-b776-aa394cd3ee89" Revision="1" Stencil="System.MyShapes" StencilVersion="1.0"/>
-</Control>
-</file>
-
-<file path=customXml/item30.xml><?xml version="1.0" encoding="utf-8"?>
+<file path=customXml/item8.xml><?xml version="1.0" encoding="utf-8"?>
 <Control xmlns="http://schemas.microsoft.com/VisualStudio/2011/storyboarding/control">
   <Id Name="3a5f3215-4f7c-4247-9247-a9acf7619a8c" Revision="1" Stencil="System.MyShapes" StencilVersion="1.0"/>
 </Control>
 </file>
 
-<file path=customXml/item31.xml><?xml version="1.0" encoding="utf-8"?>
-<Control xmlns="http://schemas.microsoft.com/VisualStudio/2011/storyboarding/control">
-  <Id Name="37d07999-8e88-45a7-b776-aa394cd3ee89" Revision="1" Stencil="System.MyShapes" StencilVersion="1.0"/>
-</Control>
-</file>
-
-<file path=customXml/item32.xml><?xml version="1.0" encoding="utf-8"?>
-<Control xmlns="http://schemas.microsoft.com/VisualStudio/2011/storyboarding/control">
-  <Id Name="37d07999-8e88-45a7-b776-aa394cd3ee89" Revision="1" Stencil="System.MyShapes" StencilVersion="1.0"/>
-</Control>
-</file>
-
-<file path=customXml/item33.xml><?xml version="1.0" encoding="utf-8"?>
-<Control xmlns="http://schemas.microsoft.com/VisualStudio/2011/storyboarding/control">
-  <Id Name="3a5f3215-4f7c-4247-9247-a9acf7619a8c" Revision="1" Stencil="System.MyShapes" StencilVersion="1.0"/>
-</Control>
-</file>
-
-<file path=customXml/item34.xml><?xml version="1.0" encoding="utf-8"?>
-<Control xmlns="http://schemas.microsoft.com/VisualStudio/2011/storyboarding/control">
-  <Id Name="3a5f3215-4f7c-4247-9247-a9acf7619a8c" Revision="1" Stencil="System.MyShapes" StencilVersion="1.0"/>
-</Control>
-</file>
-
-<file path=customXml/item35.xml><?xml version="1.0" encoding="utf-8"?>
-<Control xmlns="http://schemas.microsoft.com/VisualStudio/2011/storyboarding/control">
-  <Id Name="3a5f3215-4f7c-4247-9247-a9acf7619a8c" Revision="1" Stencil="System.MyShapes" StencilVersion="1.0"/>
-</Control>
-</file>
-
-<file path=customXml/item4.xml><?xml version="1.0" encoding="utf-8"?>
-<Control xmlns="http://schemas.microsoft.com/VisualStudio/2011/storyboarding/control">
-  <Id Name="3a5f3215-4f7c-4247-9247-a9acf7619a8c" Revision="1" Stencil="System.MyShapes" StencilVersion="1.0"/>
-</Control>
-</file>
-
-<file path=customXml/item5.xml><?xml version="1.0" encoding="utf-8"?>
-<Control xmlns="http://schemas.microsoft.com/VisualStudio/2011/storyboarding/control">
-  <Id Name="3a5f3215-4f7c-4247-9247-a9acf7619a8c" Revision="1" Stencil="System.MyShapes" StencilVersion="1.0"/>
-</Control>
-</file>
-
-<file path=customXml/item6.xml><?xml version="1.0" encoding="utf-8"?>
-<Control xmlns="http://schemas.microsoft.com/VisualStudio/2011/storyboarding/control">
-  <Id Name="37d07999-8e88-45a7-b776-aa394cd3ee89" Revision="1" Stencil="System.MyShapes" StencilVersion="1.0"/>
-</Control>
-</file>
-
-<file path=customXml/item7.xml><?xml version="1.0" encoding="utf-8"?>
-<Control xmlns="http://schemas.microsoft.com/VisualStudio/2011/storyboarding/control">
-  <Id Name="3a5f3215-4f7c-4247-9247-a9acf7619a8c" Revision="1" Stencil="System.MyShapes" StencilVersion="1.0"/>
-</Control>
-</file>
-
-<file path=customXml/item8.xml><?xml version="1.0" encoding="utf-8"?>
-<Control xmlns="http://schemas.microsoft.com/VisualStudio/2011/storyboarding/control">
-  <Id Name="37d07999-8e88-45a7-b776-aa394cd3ee89" Revision="1" Stencil="System.MyShapes" StencilVersion="1.0"/>
-</Control>
-</file>
-
 <file path=customXml/item9.xml><?xml version="1.0" encoding="utf-8"?>
-<Control xmlns="http://schemas.microsoft.com/VisualStudio/2011/storyboarding/control">
-  <Id Name="3a5f3215-4f7c-4247-9247-a9acf7619a8c" Revision="1" Stencil="System.MyShapes" StencilVersion="1.0"/>
-</Control>
+<p:properties xmlns:p="http://schemas.microsoft.com/office/2006/metadata/properties" xmlns:xsi="http://www.w3.org/2001/XMLSchema-instance" xmlns:pc="http://schemas.microsoft.com/office/infopath/2007/PartnerControls">
+  <documentManagement>
+    <LocPublishedLinkedAssetsLookup xmlns="4873beb7-5857-4685-be1f-d57550cc96cc" xsi:nil="true"/>
+    <ApprovalStatus xmlns="4873beb7-5857-4685-be1f-d57550cc96cc">InProgress</ApprovalStatus>
+    <MarketSpecific xmlns="4873beb7-5857-4685-be1f-d57550cc96cc">false</MarketSpecific>
+    <LocComments xmlns="4873beb7-5857-4685-be1f-d57550cc96cc" xsi:nil="true"/>
+    <LocLastLocAttemptVersionTypeLookup xmlns="4873beb7-5857-4685-be1f-d57550cc96cc" xsi:nil="true"/>
+    <DirectSourceMarket xmlns="4873beb7-5857-4685-be1f-d57550cc96cc" xsi:nil="true"/>
+    <ThumbnailAssetId xmlns="4873beb7-5857-4685-be1f-d57550cc96cc" xsi:nil="true"/>
+    <PrimaryImageGen xmlns="4873beb7-5857-4685-be1f-d57550cc96cc">false</PrimaryImageGen>
+    <LocNewPublishedVersionLookup xmlns="4873beb7-5857-4685-be1f-d57550cc96cc" xsi:nil="true"/>
+    <LegacyData xmlns="4873beb7-5857-4685-be1f-d57550cc96cc" xsi:nil="true"/>
+    <LocRecommendedHandoff xmlns="4873beb7-5857-4685-be1f-d57550cc96cc" xsi:nil="true"/>
+    <BusinessGroup xmlns="4873beb7-5857-4685-be1f-d57550cc96cc" xsi:nil="true"/>
+    <BlockPublish xmlns="4873beb7-5857-4685-be1f-d57550cc96cc">false</BlockPublish>
+    <TPFriendlyName xmlns="4873beb7-5857-4685-be1f-d57550cc96cc" xsi:nil="true"/>
+    <LocOverallPublishStatusLookup xmlns="4873beb7-5857-4685-be1f-d57550cc96cc" xsi:nil="true"/>
+    <NumericId xmlns="4873beb7-5857-4685-be1f-d57550cc96cc" xsi:nil="true"/>
+    <APEditor xmlns="4873beb7-5857-4685-be1f-d57550cc96cc">
+      <UserInfo>
+        <DisplayName/>
+        <AccountId xsi:nil="true"/>
+        <AccountType/>
+      </UserInfo>
+    </APEditor>
+    <SourceTitle xmlns="4873beb7-5857-4685-be1f-d57550cc96cc" xsi:nil="true"/>
+    <OpenTemplate xmlns="4873beb7-5857-4685-be1f-d57550cc96cc">true</OpenTemplate>
+    <LocOverallLocStatusLookup xmlns="4873beb7-5857-4685-be1f-d57550cc96cc" xsi:nil="true"/>
+    <UALocComments xmlns="4873beb7-5857-4685-be1f-d57550cc96cc" xsi:nil="true"/>
+    <ParentAssetId xmlns="4873beb7-5857-4685-be1f-d57550cc96cc" xsi:nil="true"/>
+    <IntlLangReviewDate xmlns="4873beb7-5857-4685-be1f-d57550cc96cc" xsi:nil="true"/>
+    <FeatureTagsTaxHTField0 xmlns="4873beb7-5857-4685-be1f-d57550cc96cc">
+      <Terms xmlns="http://schemas.microsoft.com/office/infopath/2007/PartnerControls"/>
+    </FeatureTagsTaxHTField0>
+    <PublishStatusLookup xmlns="4873beb7-5857-4685-be1f-d57550cc96cc">
+      <Value>1345039</Value>
+    </PublishStatusLookup>
+    <Providers xmlns="4873beb7-5857-4685-be1f-d57550cc96cc" xsi:nil="true"/>
+    <MachineTranslated xmlns="4873beb7-5857-4685-be1f-d57550cc96cc">false</MachineTranslated>
+    <OriginalSourceMarket xmlns="4873beb7-5857-4685-be1f-d57550cc96cc" xsi:nil="true"/>
+    <APDescription xmlns="4873beb7-5857-4685-be1f-d57550cc96cc">The bookstacks present on most slides  make this a good choice for students, teachers, reading enthusiasts, and others in education. This presentation template contains multiple slide layouts in widescreen format (16x9) and includes a sample table and chart that you can easily  modify.</APDescription>
+    <ClipArtFilename xmlns="4873beb7-5857-4685-be1f-d57550cc96cc" xsi:nil="true"/>
+    <ContentItem xmlns="4873beb7-5857-4685-be1f-d57550cc96cc" xsi:nil="true"/>
+    <TPInstallLocation xmlns="4873beb7-5857-4685-be1f-d57550cc96cc" xsi:nil="true"/>
+    <PublishTargets xmlns="4873beb7-5857-4685-be1f-d57550cc96cc">OfficeOnlineVNext</PublishTargets>
+    <TimesCloned xmlns="4873beb7-5857-4685-be1f-d57550cc96cc" xsi:nil="true"/>
+    <AssetStart xmlns="4873beb7-5857-4685-be1f-d57550cc96cc">2011-11-26T00:00:00+00:00</AssetStart>
+    <Provider xmlns="4873beb7-5857-4685-be1f-d57550cc96cc" xsi:nil="true"/>
+    <AcquiredFrom xmlns="4873beb7-5857-4685-be1f-d57550cc96cc">Internal MS</AcquiredFrom>
+    <FriendlyTitle xmlns="4873beb7-5857-4685-be1f-d57550cc96cc" xsi:nil="true"/>
+    <LastHandOff xmlns="4873beb7-5857-4685-be1f-d57550cc96cc" xsi:nil="true"/>
+    <TPClientViewer xmlns="4873beb7-5857-4685-be1f-d57550cc96cc" xsi:nil="true"/>
+    <TemplateStatus xmlns="4873beb7-5857-4685-be1f-d57550cc96cc">Complete</TemplateStatus>
+    <Downloads xmlns="4873beb7-5857-4685-be1f-d57550cc96cc">0</Downloads>
+    <OOCacheId xmlns="4873beb7-5857-4685-be1f-d57550cc96cc" xsi:nil="true"/>
+    <IsDeleted xmlns="4873beb7-5857-4685-be1f-d57550cc96cc">false</IsDeleted>
+    <LocPublishedDependentAssetsLookup xmlns="4873beb7-5857-4685-be1f-d57550cc96cc" xsi:nil="true"/>
+    <AssetExpire xmlns="4873beb7-5857-4685-be1f-d57550cc96cc">2029-05-12T07:00:00+00:00</AssetExpire>
+    <DSATActionTaken xmlns="4873beb7-5857-4685-be1f-d57550cc96cc" xsi:nil="true"/>
+    <CSXSubmissionMarket xmlns="4873beb7-5857-4685-be1f-d57550cc96cc" xsi:nil="true"/>
+    <TPExecutable xmlns="4873beb7-5857-4685-be1f-d57550cc96cc" xsi:nil="true"/>
+    <EditorialTags xmlns="4873beb7-5857-4685-be1f-d57550cc96cc" xsi:nil="true"/>
+    <SubmitterId xmlns="4873beb7-5857-4685-be1f-d57550cc96cc" xsi:nil="true"/>
+    <ApprovalLog xmlns="4873beb7-5857-4685-be1f-d57550cc96cc" xsi:nil="true"/>
+    <AssetType xmlns="4873beb7-5857-4685-be1f-d57550cc96cc">TP</AssetType>
+    <BugNumber xmlns="4873beb7-5857-4685-be1f-d57550cc96cc" xsi:nil="true"/>
+    <CSXSubmissionDate xmlns="4873beb7-5857-4685-be1f-d57550cc96cc" xsi:nil="true"/>
+    <CSXUpdate xmlns="4873beb7-5857-4685-be1f-d57550cc96cc">false</CSXUpdate>
+    <Milestone xmlns="4873beb7-5857-4685-be1f-d57550cc96cc" xsi:nil="true"/>
+    <RecommendationsModifier xmlns="4873beb7-5857-4685-be1f-d57550cc96cc" xsi:nil="true"/>
+    <OriginAsset xmlns="4873beb7-5857-4685-be1f-d57550cc96cc" xsi:nil="true"/>
+    <TPComponent xmlns="4873beb7-5857-4685-be1f-d57550cc96cc" xsi:nil="true"/>
+    <AssetId xmlns="4873beb7-5857-4685-be1f-d57550cc96cc">TP102787939</AssetId>
+    <IntlLocPriority xmlns="4873beb7-5857-4685-be1f-d57550cc96cc" xsi:nil="true"/>
+    <PolicheckWords xmlns="4873beb7-5857-4685-be1f-d57550cc96cc" xsi:nil="true"/>
+    <TPLaunchHelpLink xmlns="4873beb7-5857-4685-be1f-d57550cc96cc" xsi:nil="true"/>
+    <TPApplication xmlns="4873beb7-5857-4685-be1f-d57550cc96cc" xsi:nil="true"/>
+    <CrawlForDependencies xmlns="4873beb7-5857-4685-be1f-d57550cc96cc">false</CrawlForDependencies>
+    <HandoffToMSDN xmlns="4873beb7-5857-4685-be1f-d57550cc96cc" xsi:nil="true"/>
+    <PlannedPubDate xmlns="4873beb7-5857-4685-be1f-d57550cc96cc" xsi:nil="true"/>
+    <IntlLangReviewer xmlns="4873beb7-5857-4685-be1f-d57550cc96cc" xsi:nil="true"/>
+    <TrustLevel xmlns="4873beb7-5857-4685-be1f-d57550cc96cc">1 Microsoft Managed Content</TrustLevel>
+    <LocLastLocAttemptVersionLookup xmlns="4873beb7-5857-4685-be1f-d57550cc96cc">694216</LocLastLocAttemptVersionLookup>
+    <LocProcessedForHandoffsLookup xmlns="4873beb7-5857-4685-be1f-d57550cc96cc" xsi:nil="true"/>
+    <IsSearchable xmlns="4873beb7-5857-4685-be1f-d57550cc96cc">true</IsSearchable>
+    <TemplateTemplateType xmlns="4873beb7-5857-4685-be1f-d57550cc96cc">PowerPoint Presentation Template</TemplateTemplateType>
+    <CampaignTagsTaxHTField0 xmlns="4873beb7-5857-4685-be1f-d57550cc96cc">
+      <Terms xmlns="http://schemas.microsoft.com/office/infopath/2007/PartnerControls"/>
+    </CampaignTagsTaxHTField0>
+    <TPNamespace xmlns="4873beb7-5857-4685-be1f-d57550cc96cc" xsi:nil="true"/>
+    <LocOverallPreviewStatusLookup xmlns="4873beb7-5857-4685-be1f-d57550cc96cc" xsi:nil="true"/>
+    <TaxCatchAll xmlns="4873beb7-5857-4685-be1f-d57550cc96cc"/>
+    <Markets xmlns="4873beb7-5857-4685-be1f-d57550cc96cc"/>
+    <UAProjectedTotalWords xmlns="4873beb7-5857-4685-be1f-d57550cc96cc" xsi:nil="true"/>
+    <IntlLangReview xmlns="4873beb7-5857-4685-be1f-d57550cc96cc" xsi:nil="true"/>
+    <OutputCachingOn xmlns="4873beb7-5857-4685-be1f-d57550cc96cc">false</OutputCachingOn>
+    <AverageRating xmlns="4873beb7-5857-4685-be1f-d57550cc96cc" xsi:nil="true"/>
+    <APAuthor xmlns="4873beb7-5857-4685-be1f-d57550cc96cc">
+      <UserInfo>
+        <DisplayName>REDMOND\kristaa</DisplayName>
+        <AccountId>136</AccountId>
+        <AccountType/>
+      </UserInfo>
+    </APAuthor>
+    <LocManualTestRequired xmlns="4873beb7-5857-4685-be1f-d57550cc96cc">false</LocManualTestRequired>
+    <TPCommandLine xmlns="4873beb7-5857-4685-be1f-d57550cc96cc" xsi:nil="true"/>
+    <TPAppVersion xmlns="4873beb7-5857-4685-be1f-d57550cc96cc" xsi:nil="true"/>
+    <EditorialStatus xmlns="4873beb7-5857-4685-be1f-d57550cc96cc">Complete</EditorialStatus>
+    <LastModifiedDateTime xmlns="4873beb7-5857-4685-be1f-d57550cc96cc" xsi:nil="true"/>
+    <ScenarioTagsTaxHTField0 xmlns="4873beb7-5857-4685-be1f-d57550cc96cc">
+      <Terms xmlns="http://schemas.microsoft.com/office/infopath/2007/PartnerControls"/>
+    </ScenarioTagsTaxHTField0>
+    <LocProcessedForMarketsLookup xmlns="4873beb7-5857-4685-be1f-d57550cc96cc" xsi:nil="true"/>
+    <TPLaunchHelpLinkType xmlns="4873beb7-5857-4685-be1f-d57550cc96cc">Template</TPLaunchHelpLinkType>
+    <OriginalRelease xmlns="4873beb7-5857-4685-be1f-d57550cc96cc">15</OriginalRelease>
+    <LocalizationTagsTaxHTField0 xmlns="4873beb7-5857-4685-be1f-d57550cc96cc">
+      <Terms xmlns="http://schemas.microsoft.com/office/infopath/2007/PartnerControls"/>
+    </LocalizationTagsTaxHTField0>
+    <UACurrentWords xmlns="4873beb7-5857-4685-be1f-d57550cc96cc" xsi:nil="true"/>
+    <ArtSampleDocs xmlns="4873beb7-5857-4685-be1f-d57550cc96cc" xsi:nil="true"/>
+    <UALocRecommendation xmlns="4873beb7-5857-4685-be1f-d57550cc96cc">Localize</UALocRecommendation>
+    <Manager xmlns="4873beb7-5857-4685-be1f-d57550cc96cc" xsi:nil="true"/>
+    <LocOverallHandbackStatusLookup xmlns="4873beb7-5857-4685-be1f-d57550cc96cc" xsi:nil="true"/>
+    <ShowIn xmlns="4873beb7-5857-4685-be1f-d57550cc96cc">Show everywhere</ShowIn>
+    <UANotes xmlns="4873beb7-5857-4685-be1f-d57550cc96cc" xsi:nil="true"/>
+    <InternalTagsTaxHTField0 xmlns="4873beb7-5857-4685-be1f-d57550cc96cc">
+      <Terms xmlns="http://schemas.microsoft.com/office/infopath/2007/PartnerControls"/>
+    </InternalTagsTaxHTField0>
+    <CSXHash xmlns="4873beb7-5857-4685-be1f-d57550cc96cc" xsi:nil="true"/>
+    <VoteCount xmlns="4873beb7-5857-4685-be1f-d57550cc96cc" xsi:nil="true"/>
+    <LocMarketGroupTiers2 xmlns="4873beb7-5857-4685-be1f-d57550cc96cc" xsi:nil="true"/>
+  </documentManagement>
+</p:properties>
 </file>
 
 <file path=customXml/itemProps1.xml><?xml version="1.0" encoding="utf-8"?>
+<ds:datastoreItem xmlns:ds="http://schemas.openxmlformats.org/officeDocument/2006/customXml" ds:itemID="{E66239DD-0B2D-408A-BBA0-1CA7E59810AE}">
+  <ds:schemaRefs>
+    <ds:schemaRef ds:uri="http://schemas.microsoft.com/VisualStudio/2011/storyboarding/control"/>
+  </ds:schemaRefs>
+</ds:datastoreItem>
+</file>
+
+<file path=customXml/itemProps10.xml><?xml version="1.0" encoding="utf-8"?>
+<ds:datastoreItem xmlns:ds="http://schemas.openxmlformats.org/officeDocument/2006/customXml" ds:itemID="{15FBB92F-9753-43F3-AE00-0E261CE62CA8}">
+  <ds:schemaRefs>
+    <ds:schemaRef ds:uri="http://schemas.microsoft.com/VisualStudio/2011/storyboarding/control"/>
+  </ds:schemaRefs>
+</ds:datastoreItem>
+</file>
+
+<file path=customXml/itemProps11.xml><?xml version="1.0" encoding="utf-8"?>
+<ds:datastoreItem xmlns:ds="http://schemas.openxmlformats.org/officeDocument/2006/customXml" ds:itemID="{D525C38F-E3F5-4F86-AA79-5F0615D92028}">
+  <ds:schemaRefs>
+    <ds:schemaRef ds:uri="http://schemas.microsoft.com/VisualStudio/2011/storyboarding/control"/>
+  </ds:schemaRefs>
+</ds:datastoreItem>
+</file>
+
+<file path=customXml/itemProps12.xml><?xml version="1.0" encoding="utf-8"?>
+<ds:datastoreItem xmlns:ds="http://schemas.openxmlformats.org/officeDocument/2006/customXml" ds:itemID="{133E8427-525B-443B-BDB2-D61569B9E8D5}">
+  <ds:schemaRefs>
+    <ds:schemaRef ds:uri="http://schemas.microsoft.com/VisualStudio/2011/storyboarding/control"/>
+  </ds:schemaRefs>
+</ds:datastoreItem>
+</file>
+
+<file path=customXml/itemProps13.xml><?xml version="1.0" encoding="utf-8"?>
+<ds:datastoreItem xmlns:ds="http://schemas.openxmlformats.org/officeDocument/2006/customXml" ds:itemID="{E81EC6C6-313F-4420-95BE-F0E8567B4073}">
+  <ds:schemaRefs>
+    <ds:schemaRef ds:uri="http://schemas.microsoft.com/VisualStudio/2011/storyboarding/control"/>
+  </ds:schemaRefs>
+</ds:datastoreItem>
+</file>
+
+<file path=customXml/itemProps14.xml><?xml version="1.0" encoding="utf-8"?>
+<ds:datastoreItem xmlns:ds="http://schemas.openxmlformats.org/officeDocument/2006/customXml" ds:itemID="{9BE992AB-AC79-4CFA-8E4D-01B8E612C593}">
+  <ds:schemaRefs>
+    <ds:schemaRef ds:uri="http://schemas.microsoft.com/VisualStudio/2011/storyboarding/control"/>
+  </ds:schemaRefs>
+</ds:datastoreItem>
+</file>
+
+<file path=customXml/itemProps15.xml><?xml version="1.0" encoding="utf-8"?>
+<ds:datastoreItem xmlns:ds="http://schemas.openxmlformats.org/officeDocument/2006/customXml" ds:itemID="{E8627265-8428-4117-A97B-61BC0B24BAEF}">
+  <ds:schemaRefs>
+    <ds:schemaRef ds:uri="http://schemas.microsoft.com/VisualStudio/2011/storyboarding/control"/>
+  </ds:schemaRefs>
+</ds:datastoreItem>
+</file>
+
+<file path=customXml/itemProps16.xml><?xml version="1.0" encoding="utf-8"?>
+<ds:datastoreItem xmlns:ds="http://schemas.openxmlformats.org/officeDocument/2006/customXml" ds:itemID="{424F15E0-202D-4292-9536-B4298F98D690}">
+  <ds:schemaRefs>
+    <ds:schemaRef ds:uri="http://schemas.microsoft.com/VisualStudio/2011/storyboarding/control"/>
+  </ds:schemaRefs>
+</ds:datastoreItem>
+</file>
+
+<file path=customXml/itemProps17.xml><?xml version="1.0" encoding="utf-8"?>
+<ds:datastoreItem xmlns:ds="http://schemas.openxmlformats.org/officeDocument/2006/customXml" ds:itemID="{72561CD2-555C-498E-8707-E7E0AC23D6F7}">
+  <ds:schemaRefs>
+    <ds:schemaRef ds:uri="http://schemas.microsoft.com/VisualStudio/2011/storyboarding/control"/>
+  </ds:schemaRefs>
+</ds:datastoreItem>
+</file>
+
+<file path=customXml/itemProps18.xml><?xml version="1.0" encoding="utf-8"?>
+<ds:datastoreItem xmlns:ds="http://schemas.openxmlformats.org/officeDocument/2006/customXml" ds:itemID="{B3671B56-5AB6-40D1-9748-16D9AEAD0962}">
+  <ds:schemaRefs>
+    <ds:schemaRef ds:uri="http://schemas.microsoft.com/VisualStudio/2011/storyboarding/control"/>
+  </ds:schemaRefs>
+</ds:datastoreItem>
+</file>
+
+<file path=customXml/itemProps19.xml><?xml version="1.0" encoding="utf-8"?>
+<ds:datastoreItem xmlns:ds="http://schemas.openxmlformats.org/officeDocument/2006/customXml" ds:itemID="{56D5947B-D538-4E10-AB7C-984491B58DE1}">
+  <ds:schemaRefs>
+    <ds:schemaRef ds:uri="http://schemas.microsoft.com/VisualStudio/2011/storyboarding/control"/>
+  </ds:schemaRefs>
+</ds:datastoreItem>
+</file>
+
+<file path=customXml/itemProps2.xml><?xml version="1.0" encoding="utf-8"?>
+<ds:datastoreItem xmlns:ds="http://schemas.openxmlformats.org/officeDocument/2006/customXml" ds:itemID="{BF220CCF-993E-43A0-9212-BB380CAF8162}">
+  <ds:schemaRefs>
+    <ds:schemaRef ds:uri="http://schemas.microsoft.com/VisualStudio/2011/storyboarding/control"/>
+  </ds:schemaRefs>
+</ds:datastoreItem>
+</file>
+
+<file path=customXml/itemProps20.xml><?xml version="1.0" encoding="utf-8"?>
+<ds:datastoreItem xmlns:ds="http://schemas.openxmlformats.org/officeDocument/2006/customXml" ds:itemID="{ACA1E08C-925C-4F09-8122-887C405DAD0E}">
+  <ds:schemaRefs>
+    <ds:schemaRef ds:uri="http://schemas.microsoft.com/VisualStudio/2011/storyboarding/control"/>
+  </ds:schemaRefs>
+</ds:datastoreItem>
+</file>
+
+<file path=customXml/itemProps21.xml><?xml version="1.0" encoding="utf-8"?>
+<ds:datastoreItem xmlns:ds="http://schemas.openxmlformats.org/officeDocument/2006/customXml" ds:itemID="{C6026F5C-553B-4AEF-A946-FF60FDFF7695}">
+  <ds:schemaRefs>
+    <ds:schemaRef ds:uri="http://schemas.microsoft.com/VisualStudio/2011/storyboarding/control"/>
+  </ds:schemaRefs>
+</ds:datastoreItem>
+</file>
+
+<file path=customXml/itemProps22.xml><?xml version="1.0" encoding="utf-8"?>
+<ds:datastoreItem xmlns:ds="http://schemas.openxmlformats.org/officeDocument/2006/customXml" ds:itemID="{B93E3EFA-D9D3-4448-BC21-BB6156158366}">
+  <ds:schemaRefs>
+    <ds:schemaRef ds:uri="http://schemas.microsoft.com/VisualStudio/2011/storyboarding/control"/>
+  </ds:schemaRefs>
+</ds:datastoreItem>
+</file>
+
+<file path=customXml/itemProps23.xml><?xml version="1.0" encoding="utf-8"?>
+<ds:datastoreItem xmlns:ds="http://schemas.openxmlformats.org/officeDocument/2006/customXml" ds:itemID="{F8B7C765-2F36-4486-9DE5-D0E485AFE8E4}">
+  <ds:schemaRefs>
+    <ds:schemaRef ds:uri="http://schemas.microsoft.com/VisualStudio/2011/storyboarding/control"/>
+  </ds:schemaRefs>
+</ds:datastoreItem>
+</file>
+
+<file path=customXml/itemProps24.xml><?xml version="1.0" encoding="utf-8"?>
+<ds:datastoreItem xmlns:ds="http://schemas.openxmlformats.org/officeDocument/2006/customXml" ds:itemID="{6F3822C3-EEBF-463B-A843-8264A05022FC}">
+  <ds:schemaRefs>
+    <ds:schemaRef ds:uri="http://schemas.microsoft.com/VisualStudio/2011/storyboarding/control"/>
+  </ds:schemaRefs>
+</ds:datastoreItem>
+</file>
+
+<file path=customXml/itemProps25.xml><?xml version="1.0" encoding="utf-8"?>
 <ds:datastoreItem xmlns:ds="http://schemas.openxmlformats.org/officeDocument/2006/customXml" ds:itemID="{703D5DC7-4616-43D3-84A1-089DFA00F45E}">
   <ds:schemaRefs>
     <ds:schemaRef ds:uri="http://schemas.microsoft.com/VisualStudio/2011/storyboarding/control"/>
@@ -33911,7 +34055,47 @@
 </ds:datastoreItem>
 </file>
 
-<file path=customXml/itemProps10.xml><?xml version="1.0" encoding="utf-8"?>
+<file path=customXml/itemProps26.xml><?xml version="1.0" encoding="utf-8"?>
+<ds:datastoreItem xmlns:ds="http://schemas.openxmlformats.org/officeDocument/2006/customXml" ds:itemID="{7CC5A912-861C-4DE5-A79D-195E5086349C}">
+  <ds:schemaRefs>
+    <ds:schemaRef ds:uri="http://schemas.microsoft.com/VisualStudio/2011/storyboarding/control"/>
+  </ds:schemaRefs>
+</ds:datastoreItem>
+</file>
+
+<file path=customXml/itemProps27.xml><?xml version="1.0" encoding="utf-8"?>
+<ds:datastoreItem xmlns:ds="http://schemas.openxmlformats.org/officeDocument/2006/customXml" ds:itemID="{E1C273FD-24F9-45CA-B498-6393D3AA6D7F}">
+  <ds:schemaRefs>
+    <ds:schemaRef ds:uri="http://schemas.microsoft.com/VisualStudio/2011/storyboarding/control"/>
+  </ds:schemaRefs>
+</ds:datastoreItem>
+</file>
+
+<file path=customXml/itemProps28.xml><?xml version="1.0" encoding="utf-8"?>
+<ds:datastoreItem xmlns:ds="http://schemas.openxmlformats.org/officeDocument/2006/customXml" ds:itemID="{1C519524-8703-4E59-AB9B-4A5A7263BA01}">
+  <ds:schemaRefs>
+    <ds:schemaRef ds:uri="http://schemas.microsoft.com/VisualStudio/2011/storyboarding/control"/>
+  </ds:schemaRefs>
+</ds:datastoreItem>
+</file>
+
+<file path=customXml/itemProps29.xml><?xml version="1.0" encoding="utf-8"?>
+<ds:datastoreItem xmlns:ds="http://schemas.openxmlformats.org/officeDocument/2006/customXml" ds:itemID="{0BFC68A0-F33C-4D0A-8B07-0BF6B29C698E}">
+  <ds:schemaRefs>
+    <ds:schemaRef ds:uri="http://schemas.microsoft.com/VisualStudio/2011/storyboarding/control"/>
+  </ds:schemaRefs>
+</ds:datastoreItem>
+</file>
+
+<file path=customXml/itemProps3.xml><?xml version="1.0" encoding="utf-8"?>
+<ds:datastoreItem xmlns:ds="http://schemas.openxmlformats.org/officeDocument/2006/customXml" ds:itemID="{A449BAC2-0751-46E4-958E-F0D2B9AA6981}">
+  <ds:schemaRefs>
+    <ds:schemaRef ds:uri="http://schemas.microsoft.com/VisualStudio/2011/storyboarding/control"/>
+  </ds:schemaRefs>
+</ds:datastoreItem>
+</file>
+
+<file path=customXml/itemProps30.xml><?xml version="1.0" encoding="utf-8"?>
 <ds:datastoreItem xmlns:ds="http://schemas.openxmlformats.org/officeDocument/2006/customXml" ds:itemID="{D64DEF83-831D-41CA-B887-8B4678D84355}">
   <ds:schemaRefs>
     <ds:schemaRef ds:uri="http://schemas.microsoft.com/VisualStudio/2011/storyboarding/control"/>
@@ -33919,23 +34103,31 @@
 </ds:datastoreItem>
 </file>
 
-<file path=customXml/itemProps11.xml><?xml version="1.0" encoding="utf-8"?>
-<ds:datastoreItem xmlns:ds="http://schemas.openxmlformats.org/officeDocument/2006/customXml" ds:itemID="{1F5A8671-688F-418F-87AD-EBAB911812B5}">
+<file path=customXml/itemProps31.xml><?xml version="1.0" encoding="utf-8"?>
+<ds:datastoreItem xmlns:ds="http://schemas.openxmlformats.org/officeDocument/2006/customXml" ds:itemID="{24248713-04D9-4B55-9B64-290315285C69}">
   <ds:schemaRefs>
     <ds:schemaRef ds:uri="http://schemas.microsoft.com/VisualStudio/2011/storyboarding/control"/>
   </ds:schemaRefs>
 </ds:datastoreItem>
 </file>
 
-<file path=customXml/itemProps12.xml><?xml version="1.0" encoding="utf-8"?>
-<ds:datastoreItem xmlns:ds="http://schemas.openxmlformats.org/officeDocument/2006/customXml" ds:itemID="{ACA1E08C-925C-4F09-8122-887C405DAD0E}">
+<file path=customXml/itemProps32.xml><?xml version="1.0" encoding="utf-8"?>
+<ds:datastoreItem xmlns:ds="http://schemas.openxmlformats.org/officeDocument/2006/customXml" ds:itemID="{F37E7FF5-D44D-41C7-A85C-ED0B35DB1B54}">
   <ds:schemaRefs>
     <ds:schemaRef ds:uri="http://schemas.microsoft.com/VisualStudio/2011/storyboarding/control"/>
   </ds:schemaRefs>
 </ds:datastoreItem>
 </file>
 
-<file path=customXml/itemProps13.xml><?xml version="1.0" encoding="utf-8"?>
+<file path=customXml/itemProps33.xml><?xml version="1.0" encoding="utf-8"?>
+<ds:datastoreItem xmlns:ds="http://schemas.openxmlformats.org/officeDocument/2006/customXml" ds:itemID="{3DCE84C0-C49E-43FD-B3E0-95EA30D6B555}">
+  <ds:schemaRefs>
+    <ds:schemaRef ds:uri="http://schemas.microsoft.com/VisualStudio/2011/storyboarding/control"/>
+  </ds:schemaRefs>
+</ds:datastoreItem>
+</file>
+
+<file path=customXml/itemProps34.xml><?xml version="1.0" encoding="utf-8"?>
 <ds:datastoreItem xmlns:ds="http://schemas.openxmlformats.org/officeDocument/2006/customXml" ds:itemID="{E1B558C7-619B-49BE-9097-7FCBDADD4ECE}">
   <ds:schemaRefs>
     <ds:schemaRef ds:uri="http://schemas.microsoft.com/sharepoint/v3/contenttype/forms"/>
@@ -33943,23 +34135,31 @@
 </ds:datastoreItem>
 </file>
 
-<file path=customXml/itemProps14.xml><?xml version="1.0" encoding="utf-8"?>
-<ds:datastoreItem xmlns:ds="http://schemas.openxmlformats.org/officeDocument/2006/customXml" ds:itemID="{E81EC6C6-313F-4420-95BE-F0E8567B4073}">
+<file path=customXml/itemProps35.xml><?xml version="1.0" encoding="utf-8"?>
+<ds:datastoreItem xmlns:ds="http://schemas.openxmlformats.org/officeDocument/2006/customXml" ds:itemID="{0C9D7982-E449-4E88-B30D-029D8CC3261F}">
   <ds:schemaRefs>
     <ds:schemaRef ds:uri="http://schemas.microsoft.com/VisualStudio/2011/storyboarding/control"/>
   </ds:schemaRefs>
 </ds:datastoreItem>
 </file>
 
-<file path=customXml/itemProps15.xml><?xml version="1.0" encoding="utf-8"?>
-<ds:datastoreItem xmlns:ds="http://schemas.openxmlformats.org/officeDocument/2006/customXml" ds:itemID="{E1C273FD-24F9-45CA-B498-6393D3AA6D7F}">
+<file path=customXml/itemProps4.xml><?xml version="1.0" encoding="utf-8"?>
+<ds:datastoreItem xmlns:ds="http://schemas.openxmlformats.org/officeDocument/2006/customXml" ds:itemID="{EACA768D-D3F6-4A15-AE55-87B86B85F153}">
   <ds:schemaRefs>
     <ds:schemaRef ds:uri="http://schemas.microsoft.com/VisualStudio/2011/storyboarding/control"/>
   </ds:schemaRefs>
 </ds:datastoreItem>
 </file>
 
-<file path=customXml/itemProps16.xml><?xml version="1.0" encoding="utf-8"?>
+<file path=customXml/itemProps5.xml><?xml version="1.0" encoding="utf-8"?>
+<ds:datastoreItem xmlns:ds="http://schemas.openxmlformats.org/officeDocument/2006/customXml" ds:itemID="{C9624944-4F3E-45E8-8829-37C8DAF54683}">
+  <ds:schemaRefs>
+    <ds:schemaRef ds:uri="http://schemas.microsoft.com/VisualStudio/2011/storyboarding/control"/>
+  </ds:schemaRefs>
+</ds:datastoreItem>
+</file>
+
+<file path=customXml/itemProps6.xml><?xml version="1.0" encoding="utf-8"?>
 <ds:datastoreItem xmlns:ds="http://schemas.openxmlformats.org/officeDocument/2006/customXml" ds:itemID="{E8F86DD1-857D-4AA1-B615-777BBB99609C}">
   <ds:schemaRefs>
     <ds:schemaRef ds:uri="http://schemas.microsoft.com/VisualStudio/2011/storyboarding/control"/>
@@ -33967,113 +34167,7 @@
 </ds:datastoreItem>
 </file>
 
-<file path=customXml/itemProps17.xml><?xml version="1.0" encoding="utf-8"?>
-<ds:datastoreItem xmlns:ds="http://schemas.openxmlformats.org/officeDocument/2006/customXml" ds:itemID="{C6026F5C-553B-4AEF-A946-FF60FDFF7695}">
-  <ds:schemaRefs>
-    <ds:schemaRef ds:uri="http://schemas.microsoft.com/VisualStudio/2011/storyboarding/control"/>
-  </ds:schemaRefs>
-</ds:datastoreItem>
-</file>
-
-<file path=customXml/itemProps18.xml><?xml version="1.0" encoding="utf-8"?>
-<ds:datastoreItem xmlns:ds="http://schemas.openxmlformats.org/officeDocument/2006/customXml" ds:itemID="{0C9D7982-E449-4E88-B30D-029D8CC3261F}">
-  <ds:schemaRefs>
-    <ds:schemaRef ds:uri="http://schemas.microsoft.com/VisualStudio/2011/storyboarding/control"/>
-  </ds:schemaRefs>
-</ds:datastoreItem>
-</file>
-
-<file path=customXml/itemProps19.xml><?xml version="1.0" encoding="utf-8"?>
-<ds:datastoreItem xmlns:ds="http://schemas.openxmlformats.org/officeDocument/2006/customXml" ds:itemID="{133E8427-525B-443B-BDB2-D61569B9E8D5}">
-  <ds:schemaRefs>
-    <ds:schemaRef ds:uri="http://schemas.microsoft.com/VisualStudio/2011/storyboarding/control"/>
-  </ds:schemaRefs>
-</ds:datastoreItem>
-</file>
-
-<file path=customXml/itemProps2.xml><?xml version="1.0" encoding="utf-8"?>
-<ds:datastoreItem xmlns:ds="http://schemas.openxmlformats.org/officeDocument/2006/customXml" ds:itemID="{C9624944-4F3E-45E8-8829-37C8DAF54683}">
-  <ds:schemaRefs>
-    <ds:schemaRef ds:uri="http://schemas.microsoft.com/VisualStudio/2011/storyboarding/control"/>
-  </ds:schemaRefs>
-</ds:datastoreItem>
-</file>
-
-<file path=customXml/itemProps20.xml><?xml version="1.0" encoding="utf-8"?>
-<ds:datastoreItem xmlns:ds="http://schemas.openxmlformats.org/officeDocument/2006/customXml" ds:itemID="{6F3822C3-EEBF-463B-A843-8264A05022FC}">
-  <ds:schemaRefs>
-    <ds:schemaRef ds:uri="http://schemas.microsoft.com/VisualStudio/2011/storyboarding/control"/>
-  </ds:schemaRefs>
-</ds:datastoreItem>
-</file>
-
-<file path=customXml/itemProps21.xml><?xml version="1.0" encoding="utf-8"?>
-<ds:datastoreItem xmlns:ds="http://schemas.openxmlformats.org/officeDocument/2006/customXml" ds:itemID="{BF220CCF-993E-43A0-9212-BB380CAF8162}">
-  <ds:schemaRefs>
-    <ds:schemaRef ds:uri="http://schemas.microsoft.com/VisualStudio/2011/storyboarding/control"/>
-  </ds:schemaRefs>
-</ds:datastoreItem>
-</file>
-
-<file path=customXml/itemProps22.xml><?xml version="1.0" encoding="utf-8"?>
-<ds:datastoreItem xmlns:ds="http://schemas.openxmlformats.org/officeDocument/2006/customXml" ds:itemID="{9BE992AB-AC79-4CFA-8E4D-01B8E612C593}">
-  <ds:schemaRefs>
-    <ds:schemaRef ds:uri="http://schemas.microsoft.com/VisualStudio/2011/storyboarding/control"/>
-  </ds:schemaRefs>
-</ds:datastoreItem>
-</file>
-
-<file path=customXml/itemProps23.xml><?xml version="1.0" encoding="utf-8"?>
-<ds:datastoreItem xmlns:ds="http://schemas.openxmlformats.org/officeDocument/2006/customXml" ds:itemID="{1C519524-8703-4E59-AB9B-4A5A7263BA01}">
-  <ds:schemaRefs>
-    <ds:schemaRef ds:uri="http://schemas.microsoft.com/VisualStudio/2011/storyboarding/control"/>
-  </ds:schemaRefs>
-</ds:datastoreItem>
-</file>
-
-<file path=customXml/itemProps24.xml><?xml version="1.0" encoding="utf-8"?>
-<ds:datastoreItem xmlns:ds="http://schemas.openxmlformats.org/officeDocument/2006/customXml" ds:itemID="{F301D382-32B0-43EE-932C-28906AF37617}">
-  <ds:schemaRefs>
-    <ds:schemaRef ds:uri="http://schemas.microsoft.com/office/2006/metadata/properties"/>
-    <ds:schemaRef ds:uri="http://schemas.microsoft.com/office/infopath/2007/PartnerControls"/>
-    <ds:schemaRef ds:uri="4873beb7-5857-4685-be1f-d57550cc96cc"/>
-  </ds:schemaRefs>
-</ds:datastoreItem>
-</file>
-
-<file path=customXml/itemProps25.xml><?xml version="1.0" encoding="utf-8"?>
-<ds:datastoreItem xmlns:ds="http://schemas.openxmlformats.org/officeDocument/2006/customXml" ds:itemID="{B93E3EFA-D9D3-4448-BC21-BB6156158366}">
-  <ds:schemaRefs>
-    <ds:schemaRef ds:uri="http://schemas.microsoft.com/VisualStudio/2011/storyboarding/control"/>
-  </ds:schemaRefs>
-</ds:datastoreItem>
-</file>
-
-<file path=customXml/itemProps26.xml><?xml version="1.0" encoding="utf-8"?>
-<ds:datastoreItem xmlns:ds="http://schemas.openxmlformats.org/officeDocument/2006/customXml" ds:itemID="{E66239DD-0B2D-408A-BBA0-1CA7E59810AE}">
-  <ds:schemaRefs>
-    <ds:schemaRef ds:uri="http://schemas.microsoft.com/VisualStudio/2011/storyboarding/control"/>
-  </ds:schemaRefs>
-</ds:datastoreItem>
-</file>
-
-<file path=customXml/itemProps27.xml><?xml version="1.0" encoding="utf-8"?>
-<ds:datastoreItem xmlns:ds="http://schemas.openxmlformats.org/officeDocument/2006/customXml" ds:itemID="{E8627265-8428-4117-A97B-61BC0B24BAEF}">
-  <ds:schemaRefs>
-    <ds:schemaRef ds:uri="http://schemas.microsoft.com/VisualStudio/2011/storyboarding/control"/>
-  </ds:schemaRefs>
-</ds:datastoreItem>
-</file>
-
-<file path=customXml/itemProps28.xml><?xml version="1.0" encoding="utf-8"?>
-<ds:datastoreItem xmlns:ds="http://schemas.openxmlformats.org/officeDocument/2006/customXml" ds:itemID="{0BFC68A0-F33C-4D0A-8B07-0BF6B29C698E}">
-  <ds:schemaRefs>
-    <ds:schemaRef ds:uri="http://schemas.microsoft.com/VisualStudio/2011/storyboarding/control"/>
-  </ds:schemaRefs>
-</ds:datastoreItem>
-</file>
-
-<file path=customXml/itemProps29.xml><?xml version="1.0" encoding="utf-8"?>
+<file path=customXml/itemProps7.xml><?xml version="1.0" encoding="utf-8"?>
 <ds:datastoreItem xmlns:ds="http://schemas.openxmlformats.org/officeDocument/2006/customXml" ds:itemID="{BBB5C329-08A6-4E5E-AEF1-A97828C87411}">
   <ds:schemaRefs>
     <ds:schemaRef ds:uri="http://schemas.microsoft.com/office/2006/metadata/contentType"/>
@@ -34091,96 +34185,8 @@
 </ds:datastoreItem>
 </file>
 
-<file path=customXml/itemProps3.xml><?xml version="1.0" encoding="utf-8"?>
-<ds:datastoreItem xmlns:ds="http://schemas.openxmlformats.org/officeDocument/2006/customXml" ds:itemID="{56D5947B-D538-4E10-AB7C-984491B58DE1}">
-  <ds:schemaRefs>
-    <ds:schemaRef ds:uri="http://schemas.microsoft.com/VisualStudio/2011/storyboarding/control"/>
-  </ds:schemaRefs>
-</ds:datastoreItem>
-</file>
-
-<file path=customXml/itemProps30.xml><?xml version="1.0" encoding="utf-8"?>
-<ds:datastoreItem xmlns:ds="http://schemas.openxmlformats.org/officeDocument/2006/customXml" ds:itemID="{424F15E0-202D-4292-9536-B4298F98D690}">
-  <ds:schemaRefs>
-    <ds:schemaRef ds:uri="http://schemas.microsoft.com/VisualStudio/2011/storyboarding/control"/>
-  </ds:schemaRefs>
-</ds:datastoreItem>
-</file>
-
-<file path=customXml/itemProps31.xml><?xml version="1.0" encoding="utf-8"?>
-<ds:datastoreItem xmlns:ds="http://schemas.openxmlformats.org/officeDocument/2006/customXml" ds:itemID="{24248713-04D9-4B55-9B64-290315285C69}">
-  <ds:schemaRefs>
-    <ds:schemaRef ds:uri="http://schemas.microsoft.com/VisualStudio/2011/storyboarding/control"/>
-  </ds:schemaRefs>
-</ds:datastoreItem>
-</file>
-
-<file path=customXml/itemProps32.xml><?xml version="1.0" encoding="utf-8"?>
-<ds:datastoreItem xmlns:ds="http://schemas.openxmlformats.org/officeDocument/2006/customXml" ds:itemID="{15FBB92F-9753-43F3-AE00-0E261CE62CA8}">
-  <ds:schemaRefs>
-    <ds:schemaRef ds:uri="http://schemas.microsoft.com/VisualStudio/2011/storyboarding/control"/>
-  </ds:schemaRefs>
-</ds:datastoreItem>
-</file>
-
-<file path=customXml/itemProps33.xml><?xml version="1.0" encoding="utf-8"?>
-<ds:datastoreItem xmlns:ds="http://schemas.openxmlformats.org/officeDocument/2006/customXml" ds:itemID="{F8B7C765-2F36-4486-9DE5-D0E485AFE8E4}">
-  <ds:schemaRefs>
-    <ds:schemaRef ds:uri="http://schemas.microsoft.com/VisualStudio/2011/storyboarding/control"/>
-  </ds:schemaRefs>
-</ds:datastoreItem>
-</file>
-
-<file path=customXml/itemProps34.xml><?xml version="1.0" encoding="utf-8"?>
-<ds:datastoreItem xmlns:ds="http://schemas.openxmlformats.org/officeDocument/2006/customXml" ds:itemID="{A449BAC2-0751-46E4-958E-F0D2B9AA6981}">
-  <ds:schemaRefs>
-    <ds:schemaRef ds:uri="http://schemas.microsoft.com/VisualStudio/2011/storyboarding/control"/>
-  </ds:schemaRefs>
-</ds:datastoreItem>
-</file>
-
-<file path=customXml/itemProps35.xml><?xml version="1.0" encoding="utf-8"?>
-<ds:datastoreItem xmlns:ds="http://schemas.openxmlformats.org/officeDocument/2006/customXml" ds:itemID="{72561CD2-555C-498E-8707-E7E0AC23D6F7}">
-  <ds:schemaRefs>
-    <ds:schemaRef ds:uri="http://schemas.microsoft.com/VisualStudio/2011/storyboarding/control"/>
-  </ds:schemaRefs>
-</ds:datastoreItem>
-</file>
-
-<file path=customXml/itemProps4.xml><?xml version="1.0" encoding="utf-8"?>
-<ds:datastoreItem xmlns:ds="http://schemas.openxmlformats.org/officeDocument/2006/customXml" ds:itemID="{F37E7FF5-D44D-41C7-A85C-ED0B35DB1B54}">
-  <ds:schemaRefs>
-    <ds:schemaRef ds:uri="http://schemas.microsoft.com/VisualStudio/2011/storyboarding/control"/>
-  </ds:schemaRefs>
-</ds:datastoreItem>
-</file>
-
-<file path=customXml/itemProps5.xml><?xml version="1.0" encoding="utf-8"?>
-<ds:datastoreItem xmlns:ds="http://schemas.openxmlformats.org/officeDocument/2006/customXml" ds:itemID="{D525C38F-E3F5-4F86-AA79-5F0615D92028}">
-  <ds:schemaRefs>
-    <ds:schemaRef ds:uri="http://schemas.microsoft.com/VisualStudio/2011/storyboarding/control"/>
-  </ds:schemaRefs>
-</ds:datastoreItem>
-</file>
-
-<file path=customXml/itemProps6.xml><?xml version="1.0" encoding="utf-8"?>
-<ds:datastoreItem xmlns:ds="http://schemas.openxmlformats.org/officeDocument/2006/customXml" ds:itemID="{7CC5A912-861C-4DE5-A79D-195E5086349C}">
-  <ds:schemaRefs>
-    <ds:schemaRef ds:uri="http://schemas.microsoft.com/VisualStudio/2011/storyboarding/control"/>
-  </ds:schemaRefs>
-</ds:datastoreItem>
-</file>
-
-<file path=customXml/itemProps7.xml><?xml version="1.0" encoding="utf-8"?>
-<ds:datastoreItem xmlns:ds="http://schemas.openxmlformats.org/officeDocument/2006/customXml" ds:itemID="{EACA768D-D3F6-4A15-AE55-87B86B85F153}">
-  <ds:schemaRefs>
-    <ds:schemaRef ds:uri="http://schemas.microsoft.com/VisualStudio/2011/storyboarding/control"/>
-  </ds:schemaRefs>
-</ds:datastoreItem>
-</file>
-
 <file path=customXml/itemProps8.xml><?xml version="1.0" encoding="utf-8"?>
-<ds:datastoreItem xmlns:ds="http://schemas.openxmlformats.org/officeDocument/2006/customXml" ds:itemID="{B3671B56-5AB6-40D1-9748-16D9AEAD0962}">
+<ds:datastoreItem xmlns:ds="http://schemas.openxmlformats.org/officeDocument/2006/customXml" ds:itemID="{1F5A8671-688F-418F-87AD-EBAB911812B5}">
   <ds:schemaRefs>
     <ds:schemaRef ds:uri="http://schemas.microsoft.com/VisualStudio/2011/storyboarding/control"/>
   </ds:schemaRefs>
@@ -34188,9 +34194,11 @@
 </file>
 
 <file path=customXml/itemProps9.xml><?xml version="1.0" encoding="utf-8"?>
-<ds:datastoreItem xmlns:ds="http://schemas.openxmlformats.org/officeDocument/2006/customXml" ds:itemID="{3DCE84C0-C49E-43FD-B3E0-95EA30D6B555}">
+<ds:datastoreItem xmlns:ds="http://schemas.openxmlformats.org/officeDocument/2006/customXml" ds:itemID="{F301D382-32B0-43EE-932C-28906AF37617}">
   <ds:schemaRefs>
-    <ds:schemaRef ds:uri="http://schemas.microsoft.com/VisualStudio/2011/storyboarding/control"/>
+    <ds:schemaRef ds:uri="http://schemas.microsoft.com/office/2006/metadata/properties"/>
+    <ds:schemaRef ds:uri="http://schemas.microsoft.com/office/infopath/2007/PartnerControls"/>
+    <ds:schemaRef ds:uri="4873beb7-5857-4685-be1f-d57550cc96cc"/>
   </ds:schemaRefs>
 </ds:datastoreItem>
 </file>
</xml_diff>